<commit_message>
Added info about CLS compliant assemblies
</commit_message>
<xml_diff>
--- a/Presentation/lesson-07-reflection.pptx
+++ b/Presentation/lesson-07-reflection.pptx
@@ -6,7 +6,7 @@
     <p:sldMasterId id="2147483663" r:id="rId2"/>
   </p:sldMasterIdLst>
   <p:notesMasterIdLst>
-    <p:notesMasterId r:id="rId37"/>
+    <p:notesMasterId r:id="rId38"/>
   </p:notesMasterIdLst>
   <p:sldIdLst>
     <p:sldId id="257" r:id="rId3"/>
@@ -38,11 +38,12 @@
     <p:sldId id="262" r:id="rId29"/>
     <p:sldId id="261" r:id="rId30"/>
     <p:sldId id="300" r:id="rId31"/>
-    <p:sldId id="299" r:id="rId32"/>
-    <p:sldId id="263" r:id="rId33"/>
-    <p:sldId id="264" r:id="rId34"/>
-    <p:sldId id="265" r:id="rId35"/>
-    <p:sldId id="271" r:id="rId36"/>
+    <p:sldId id="306" r:id="rId32"/>
+    <p:sldId id="299" r:id="rId33"/>
+    <p:sldId id="263" r:id="rId34"/>
+    <p:sldId id="264" r:id="rId35"/>
+    <p:sldId id="265" r:id="rId36"/>
+    <p:sldId id="271" r:id="rId37"/>
   </p:sldIdLst>
   <p:sldSz cx="9144000" cy="6858000" type="screen4x3"/>
   <p:notesSz cx="6858000" cy="9144000"/>
@@ -227,7 +228,7 @@
             <a:fld id="{B24A7054-7FFB-49F4-A126-5DF6E687FF53}" type="datetimeFigureOut">
               <a:rPr lang="ru-RU" smtClean="0"/>
               <a:pPr/>
-              <a:t>28.06.2013</a:t>
+              <a:t>19.10.2013</a:t>
             </a:fld>
             <a:endParaRPr lang="ru-RU"/>
           </a:p>
@@ -1511,7 +1512,7 @@
             <a:fld id="{8E6E6A2A-E9D3-4A0D-B04A-ABDD367A1E08}" type="datetimeFigureOut">
               <a:rPr lang="ru-RU" smtClean="0"/>
               <a:pPr/>
-              <a:t>28.06.2013</a:t>
+              <a:t>19.10.2013</a:t>
             </a:fld>
             <a:endParaRPr lang="ru-RU"/>
           </a:p>
@@ -1755,7 +1756,7 @@
             <a:fld id="{8E6E6A2A-E9D3-4A0D-B04A-ABDD367A1E08}" type="datetimeFigureOut">
               <a:rPr lang="ru-RU" smtClean="0"/>
               <a:pPr/>
-              <a:t>28.06.2013</a:t>
+              <a:t>19.10.2013</a:t>
             </a:fld>
             <a:endParaRPr lang="ru-RU"/>
           </a:p>
@@ -1927,7 +1928,7 @@
             <a:fld id="{8E6E6A2A-E9D3-4A0D-B04A-ABDD367A1E08}" type="datetimeFigureOut">
               <a:rPr lang="ru-RU" smtClean="0"/>
               <a:pPr/>
-              <a:t>28.06.2013</a:t>
+              <a:t>19.10.2013</a:t>
             </a:fld>
             <a:endParaRPr lang="ru-RU"/>
           </a:p>
@@ -2175,7 +2176,7 @@
             <a:fld id="{8E6E6A2A-E9D3-4A0D-B04A-ABDD367A1E08}" type="datetimeFigureOut">
               <a:rPr lang="ru-RU" smtClean="0"/>
               <a:pPr/>
-              <a:t>28.06.2013</a:t>
+              <a:t>19.10.2013</a:t>
             </a:fld>
             <a:endParaRPr lang="ru-RU"/>
           </a:p>
@@ -2465,7 +2466,7 @@
             <a:fld id="{8E6E6A2A-E9D3-4A0D-B04A-ABDD367A1E08}" type="datetimeFigureOut">
               <a:rPr lang="ru-RU" smtClean="0"/>
               <a:pPr/>
-              <a:t>28.06.2013</a:t>
+              <a:t>19.10.2013</a:t>
             </a:fld>
             <a:endParaRPr lang="ru-RU"/>
           </a:p>
@@ -2889,7 +2890,7 @@
             <a:fld id="{8E6E6A2A-E9D3-4A0D-B04A-ABDD367A1E08}" type="datetimeFigureOut">
               <a:rPr lang="ru-RU" smtClean="0"/>
               <a:pPr/>
-              <a:t>28.06.2013</a:t>
+              <a:t>19.10.2013</a:t>
             </a:fld>
             <a:endParaRPr lang="ru-RU"/>
           </a:p>
@@ -3218,7 +3219,7 @@
             <a:fld id="{8E6E6A2A-E9D3-4A0D-B04A-ABDD367A1E08}" type="datetimeFigureOut">
               <a:rPr lang="ru-RU" smtClean="0"/>
               <a:pPr/>
-              <a:t>28.06.2013</a:t>
+              <a:t>19.10.2013</a:t>
             </a:fld>
             <a:endParaRPr lang="ru-RU"/>
           </a:p>
@@ -3315,7 +3316,7 @@
             <a:fld id="{8E6E6A2A-E9D3-4A0D-B04A-ABDD367A1E08}" type="datetimeFigureOut">
               <a:rPr lang="ru-RU" smtClean="0"/>
               <a:pPr/>
-              <a:t>28.06.2013</a:t>
+              <a:t>19.10.2013</a:t>
             </a:fld>
             <a:endParaRPr lang="ru-RU"/>
           </a:p>
@@ -3594,7 +3595,7 @@
             <a:fld id="{8E6E6A2A-E9D3-4A0D-B04A-ABDD367A1E08}" type="datetimeFigureOut">
               <a:rPr lang="ru-RU" smtClean="0"/>
               <a:pPr/>
-              <a:t>28.06.2013</a:t>
+              <a:t>19.10.2013</a:t>
             </a:fld>
             <a:endParaRPr lang="ru-RU"/>
           </a:p>
@@ -3849,7 +3850,7 @@
             <a:fld id="{8E6E6A2A-E9D3-4A0D-B04A-ABDD367A1E08}" type="datetimeFigureOut">
               <a:rPr lang="ru-RU" smtClean="0"/>
               <a:pPr/>
-              <a:t>28.06.2013</a:t>
+              <a:t>19.10.2013</a:t>
             </a:fld>
             <a:endParaRPr lang="ru-RU"/>
           </a:p>
@@ -4021,7 +4022,7 @@
             <a:fld id="{8E6E6A2A-E9D3-4A0D-B04A-ABDD367A1E08}" type="datetimeFigureOut">
               <a:rPr lang="ru-RU" smtClean="0"/>
               <a:pPr/>
-              <a:t>28.06.2013</a:t>
+              <a:t>19.10.2013</a:t>
             </a:fld>
             <a:endParaRPr lang="ru-RU"/>
           </a:p>
@@ -4203,7 +4204,7 @@
             <a:fld id="{8E6E6A2A-E9D3-4A0D-B04A-ABDD367A1E08}" type="datetimeFigureOut">
               <a:rPr lang="ru-RU" smtClean="0"/>
               <a:pPr/>
-              <a:t>28.06.2013</a:t>
+              <a:t>19.10.2013</a:t>
             </a:fld>
             <a:endParaRPr lang="ru-RU"/>
           </a:p>
@@ -5441,7 +5442,7 @@
             <a:fld id="{AC3D3127-B7C4-45E3-9797-C527EC9FDD78}" type="datetimeFigureOut">
               <a:rPr lang="ru-RU" smtClean="0"/>
               <a:pPr/>
-              <a:t>28.06.2013</a:t>
+              <a:t>19.10.2013</a:t>
             </a:fld>
             <a:endParaRPr lang="ru-RU"/>
           </a:p>
@@ -5963,7 +5964,7 @@
             <a:fld id="{8E6E6A2A-E9D3-4A0D-B04A-ABDD367A1E08}" type="datetimeFigureOut">
               <a:rPr lang="ru-RU" smtClean="0"/>
               <a:pPr/>
-              <a:t>28.06.2013</a:t>
+              <a:t>19.10.2013</a:t>
             </a:fld>
             <a:endParaRPr lang="ru-RU"/>
           </a:p>
@@ -9802,7 +9803,6 @@
               <a:rPr lang="ru-RU" dirty="0" smtClean="0"/>
               <a:t>Задается в свойствах проекта</a:t>
             </a:r>
-            <a:endParaRPr lang="ru-RU" dirty="0" smtClean="0"/>
           </a:p>
           <a:p>
             <a:pPr marL="514350" indent="-514350">
@@ -9815,15 +9815,7 @@
                   <a:srgbClr val="FFFF00"/>
                 </a:solidFill>
               </a:rPr>
-              <a:t>Номер </a:t>
-            </a:r>
-            <a:r>
-              <a:rPr lang="ru-RU" dirty="0" smtClean="0">
-                <a:solidFill>
-                  <a:srgbClr val="FFFF00"/>
-                </a:solidFill>
-              </a:rPr>
-              <a:t>версии сборки</a:t>
+              <a:t>Номер версии сборки</a:t>
             </a:r>
           </a:p>
           <a:p>
@@ -12375,6 +12367,13 @@
   <p:clrMapOvr>
     <a:masterClrMapping/>
   </p:clrMapOvr>
+  <p:timing>
+    <p:tnLst>
+      <p:par>
+        <p:cTn id="1" dur="indefinite" restart="never" nodeType="tmRoot"/>
+      </p:par>
+    </p:tnLst>
+  </p:timing>
 </p:sld>
 </file>
 
@@ -13112,6 +13111,328 @@
           <a:lstStyle/>
           <a:p>
             <a:r>
+              <a:rPr lang="en-US" dirty="0" smtClean="0"/>
+              <a:t>CLS</a:t>
+            </a:r>
+            <a:r>
+              <a:rPr lang="ru-RU" dirty="0" smtClean="0"/>
+              <a:t> совместимые</a:t>
+            </a:r>
+            <a:r>
+              <a:rPr lang="en-US" dirty="0" smtClean="0"/>
+              <a:t> </a:t>
+            </a:r>
+            <a:r>
+              <a:rPr lang="ru-RU" dirty="0" smtClean="0"/>
+              <a:t>сборки</a:t>
+            </a:r>
+            <a:endParaRPr lang="en-US" dirty="0"/>
+          </a:p>
+        </p:txBody>
+      </p:sp>
+      <p:sp>
+        <p:nvSpPr>
+          <p:cNvPr id="3" name="Content Placeholder 2"/>
+          <p:cNvSpPr>
+            <a:spLocks noGrp="1"/>
+          </p:cNvSpPr>
+          <p:nvPr>
+            <p:ph idx="1"/>
+          </p:nvPr>
+        </p:nvSpPr>
+        <p:spPr>
+          <a:xfrm>
+            <a:off x="242616" y="1556792"/>
+            <a:ext cx="8649864" cy="4061048"/>
+          </a:xfrm>
+        </p:spPr>
+        <p:txBody>
+          <a:bodyPr>
+            <a:normAutofit fontScale="70000" lnSpcReduction="20000"/>
+          </a:bodyPr>
+          <a:lstStyle/>
+          <a:p>
+            <a:pPr marL="0" indent="0">
+              <a:buNone/>
+            </a:pPr>
+            <a:r>
+              <a:rPr lang="ru-RU" dirty="0" smtClean="0"/>
+              <a:t>Если вы создает библиотеку (сборку) для внешнего использования и хотите быть уверенными что её можно будет использовать из программ написанных на других языках (таких как </a:t>
+            </a:r>
+            <a:r>
+              <a:rPr lang="en-US" dirty="0" smtClean="0"/>
+              <a:t>VB.NET, F# </a:t>
+            </a:r>
+            <a:r>
+              <a:rPr lang="ru-RU" dirty="0" smtClean="0"/>
+              <a:t>и других)</a:t>
+            </a:r>
+            <a:r>
+              <a:rPr lang="en-US" dirty="0" smtClean="0"/>
+              <a:t>, </a:t>
+            </a:r>
+            <a:r>
+              <a:rPr lang="ru-RU" dirty="0" smtClean="0"/>
+              <a:t>то добавьте к свой сборке атрибут </a:t>
+            </a:r>
+            <a:r>
+              <a:rPr lang="en-US" dirty="0" err="1" smtClean="0"/>
+              <a:t>System.CLSCompliantAttribute</a:t>
+            </a:r>
+            <a:r>
+              <a:rPr lang="en-US" dirty="0" smtClean="0"/>
+              <a:t>.</a:t>
+            </a:r>
+          </a:p>
+          <a:p>
+            <a:pPr marL="0" indent="0">
+              <a:buNone/>
+            </a:pPr>
+            <a:endParaRPr lang="en-US" dirty="0"/>
+          </a:p>
+          <a:p>
+            <a:pPr marL="0" indent="0">
+              <a:buNone/>
+            </a:pPr>
+            <a:r>
+              <a:rPr lang="en-US" dirty="0" smtClean="0"/>
+              <a:t>CLS </a:t>
+            </a:r>
+            <a:r>
+              <a:rPr lang="ru-RU" dirty="0" smtClean="0"/>
+              <a:t>(</a:t>
+            </a:r>
+            <a:r>
+              <a:rPr lang="en-US" dirty="0" smtClean="0"/>
+              <a:t>Common Language Specification</a:t>
+            </a:r>
+            <a:r>
+              <a:rPr lang="ru-RU" dirty="0" smtClean="0"/>
+              <a:t>)</a:t>
+            </a:r>
+            <a:r>
+              <a:rPr lang="en-US" dirty="0" smtClean="0"/>
+              <a:t> </a:t>
+            </a:r>
+            <a:r>
+              <a:rPr lang="ru-RU" dirty="0" smtClean="0"/>
+              <a:t>является набором требований (ограничений) к языку позволяющее ему «бесшовно» взаимодействовать с программами на других языках. Это необходимо так как, </a:t>
+            </a:r>
+            <a:r>
+              <a:rPr lang="ru-RU" dirty="0"/>
+              <a:t>н</a:t>
+            </a:r>
+            <a:r>
+              <a:rPr lang="ru-RU" dirty="0" smtClean="0"/>
+              <a:t>есмотря на наличие «общего знаменателя» в виде </a:t>
+            </a:r>
+            <a:r>
+              <a:rPr lang="en-US" dirty="0" smtClean="0"/>
+              <a:t>IL </a:t>
+            </a:r>
+            <a:r>
+              <a:rPr lang="ru-RU" dirty="0" smtClean="0"/>
+              <a:t>кода, языки могут иметь весьма сильные различия. Компилятор </a:t>
+            </a:r>
+            <a:r>
+              <a:rPr lang="en-US" dirty="0" smtClean="0"/>
+              <a:t>C# </a:t>
+            </a:r>
+            <a:r>
+              <a:rPr lang="ru-RU" smtClean="0"/>
+              <a:t>проверяет </a:t>
+            </a:r>
+            <a:r>
+              <a:rPr lang="ru-RU" dirty="0" smtClean="0"/>
+              <a:t>программу на соответствие этим требованиям, только при наличии атрибута </a:t>
+            </a:r>
+            <a:r>
+              <a:rPr lang="en-US" dirty="0" err="1" smtClean="0"/>
+              <a:t>CLSCompliant</a:t>
+            </a:r>
+            <a:r>
+              <a:rPr lang="ru-RU" dirty="0" smtClean="0"/>
+              <a:t>.</a:t>
+            </a:r>
+            <a:endParaRPr lang="en-US" dirty="0"/>
+          </a:p>
+        </p:txBody>
+      </p:sp>
+      <p:sp>
+        <p:nvSpPr>
+          <p:cNvPr id="4" name="TextBox 3"/>
+          <p:cNvSpPr txBox="1"/>
+          <p:nvPr/>
+        </p:nvSpPr>
+        <p:spPr>
+          <a:xfrm>
+            <a:off x="251520" y="5805264"/>
+            <a:ext cx="8640960" cy="307777"/>
+          </a:xfrm>
+          <a:prstGeom prst="rect">
+            <a:avLst/>
+          </a:prstGeom>
+          <a:solidFill>
+            <a:schemeClr val="bg1"/>
+          </a:solidFill>
+        </p:spPr>
+        <p:txBody>
+          <a:bodyPr wrap="square" rtlCol="0">
+            <a:spAutoFit/>
+          </a:bodyPr>
+          <a:lstStyle/>
+          <a:p>
+            <a:r>
+              <a:rPr lang="en-US" sz="1400" dirty="0" smtClean="0">
+                <a:solidFill>
+                  <a:srgbClr val="000000"/>
+                </a:solidFill>
+                <a:highlight>
+                  <a:srgbClr val="FFFFFF"/>
+                </a:highlight>
+                <a:latin typeface="Courier New" panose="02070309020205020404" pitchFamily="49" charset="0"/>
+                <a:cs typeface="Courier New" panose="02070309020205020404" pitchFamily="49" charset="0"/>
+              </a:rPr>
+              <a:t>[</a:t>
+            </a:r>
+            <a:r>
+              <a:rPr lang="en-US" sz="1400" dirty="0" smtClean="0">
+                <a:solidFill>
+                  <a:srgbClr val="0000FF"/>
+                </a:solidFill>
+                <a:highlight>
+                  <a:srgbClr val="FFFFFF"/>
+                </a:highlight>
+                <a:latin typeface="Courier New" panose="02070309020205020404" pitchFamily="49" charset="0"/>
+                <a:cs typeface="Courier New" panose="02070309020205020404" pitchFamily="49" charset="0"/>
+              </a:rPr>
+              <a:t>assembly</a:t>
+            </a:r>
+            <a:r>
+              <a:rPr lang="en-US" sz="1400" dirty="0">
+                <a:solidFill>
+                  <a:srgbClr val="000000"/>
+                </a:solidFill>
+                <a:highlight>
+                  <a:srgbClr val="FFFFFF"/>
+                </a:highlight>
+                <a:latin typeface="Courier New" panose="02070309020205020404" pitchFamily="49" charset="0"/>
+                <a:cs typeface="Courier New" panose="02070309020205020404" pitchFamily="49" charset="0"/>
+              </a:rPr>
+              <a:t>: </a:t>
+            </a:r>
+            <a:r>
+              <a:rPr lang="en-US" sz="1400" dirty="0" err="1">
+                <a:solidFill>
+                  <a:srgbClr val="2B91AF"/>
+                </a:solidFill>
+                <a:highlight>
+                  <a:srgbClr val="FFFFFF"/>
+                </a:highlight>
+                <a:latin typeface="Courier New" panose="02070309020205020404" pitchFamily="49" charset="0"/>
+                <a:cs typeface="Courier New" panose="02070309020205020404" pitchFamily="49" charset="0"/>
+              </a:rPr>
+              <a:t>CLSCompliant</a:t>
+            </a:r>
+            <a:r>
+              <a:rPr lang="en-US" sz="1400" dirty="0">
+                <a:solidFill>
+                  <a:srgbClr val="000000"/>
+                </a:solidFill>
+                <a:highlight>
+                  <a:srgbClr val="FFFFFF"/>
+                </a:highlight>
+                <a:latin typeface="Courier New" panose="02070309020205020404" pitchFamily="49" charset="0"/>
+                <a:cs typeface="Courier New" panose="02070309020205020404" pitchFamily="49" charset="0"/>
+              </a:rPr>
+              <a:t>(</a:t>
+            </a:r>
+            <a:r>
+              <a:rPr lang="en-US" sz="1400" dirty="0">
+                <a:solidFill>
+                  <a:srgbClr val="0000FF"/>
+                </a:solidFill>
+                <a:highlight>
+                  <a:srgbClr val="FFFFFF"/>
+                </a:highlight>
+                <a:latin typeface="Courier New" panose="02070309020205020404" pitchFamily="49" charset="0"/>
+                <a:cs typeface="Courier New" panose="02070309020205020404" pitchFamily="49" charset="0"/>
+              </a:rPr>
+              <a:t>true</a:t>
+            </a:r>
+            <a:r>
+              <a:rPr lang="en-US" sz="1400" dirty="0" smtClean="0">
+                <a:solidFill>
+                  <a:srgbClr val="000000"/>
+                </a:solidFill>
+                <a:highlight>
+                  <a:srgbClr val="FFFFFF"/>
+                </a:highlight>
+                <a:latin typeface="Courier New" panose="02070309020205020404" pitchFamily="49" charset="0"/>
+                <a:cs typeface="Courier New" panose="02070309020205020404" pitchFamily="49" charset="0"/>
+              </a:rPr>
+              <a:t>)]</a:t>
+            </a:r>
+            <a:endParaRPr lang="ru-RU" sz="1400" dirty="0" smtClean="0">
+              <a:latin typeface="Courier New" panose="02070309020205020404" pitchFamily="49" charset="0"/>
+              <a:cs typeface="Courier New" panose="02070309020205020404" pitchFamily="49" charset="0"/>
+            </a:endParaRPr>
+          </a:p>
+        </p:txBody>
+      </p:sp>
+    </p:spTree>
+    <p:extLst>
+      <p:ext uri="{BB962C8B-B14F-4D97-AF65-F5344CB8AC3E}">
+        <p14:creationId xmlns:p14="http://schemas.microsoft.com/office/powerpoint/2010/main" val="910520611"/>
+      </p:ext>
+    </p:extLst>
+  </p:cSld>
+  <p:clrMapOvr>
+    <a:masterClrMapping/>
+  </p:clrMapOvr>
+  <p:timing>
+    <p:tnLst>
+      <p:par>
+        <p:cTn id="1" dur="indefinite" restart="never" nodeType="tmRoot"/>
+      </p:par>
+    </p:tnLst>
+  </p:timing>
+</p:sld>
+</file>
+
+<file path=ppt/slides/slide31.xml><?xml version="1.0" encoding="utf-8"?>
+<p:sld xmlns:a="http://schemas.openxmlformats.org/drawingml/2006/main" xmlns:r="http://schemas.openxmlformats.org/officeDocument/2006/relationships" xmlns:p="http://schemas.openxmlformats.org/presentationml/2006/main">
+  <p:cSld>
+    <p:spTree>
+      <p:nvGrpSpPr>
+        <p:cNvPr id="1" name=""/>
+        <p:cNvGrpSpPr/>
+        <p:nvPr/>
+      </p:nvGrpSpPr>
+      <p:grpSpPr>
+        <a:xfrm>
+          <a:off x="0" y="0"/>
+          <a:ext cx="0" cy="0"/>
+          <a:chOff x="0" y="0"/>
+          <a:chExt cx="0" cy="0"/>
+        </a:xfrm>
+      </p:grpSpPr>
+      <p:sp>
+        <p:nvSpPr>
+          <p:cNvPr id="2" name="Title 1"/>
+          <p:cNvSpPr>
+            <a:spLocks noGrp="1"/>
+          </p:cNvSpPr>
+          <p:nvPr>
+            <p:ph type="title"/>
+          </p:nvPr>
+        </p:nvSpPr>
+        <p:spPr/>
+        <p:txBody>
+          <a:bodyPr/>
+          <a:lstStyle/>
+          <a:p>
+            <a:r>
               <a:rPr lang="ru-RU" dirty="0" smtClean="0"/>
               <a:t>Механизм </a:t>
             </a:r>
@@ -13138,6 +13459,13 @@
           <a:bodyPr/>
           <a:lstStyle/>
           <a:p>
+            <a:pPr marL="0" indent="0">
+              <a:buNone/>
+            </a:pPr>
+            <a:r>
+              <a:rPr lang="ru-RU" dirty="0" smtClean="0"/>
+              <a:t>Пространство имен </a:t>
+            </a:r>
             <a:r>
               <a:rPr lang="en-US" dirty="0" err="1" smtClean="0"/>
               <a:t>System.Reflection</a:t>
@@ -13156,10 +13484,17 @@
   <p:clrMapOvr>
     <a:masterClrMapping/>
   </p:clrMapOvr>
+  <p:timing>
+    <p:tnLst>
+      <p:par>
+        <p:cTn id="1" dur="indefinite" restart="never" nodeType="tmRoot"/>
+      </p:par>
+    </p:tnLst>
+  </p:timing>
 </p:sld>
 </file>
 
-<file path=ppt/slides/slide31.xml><?xml version="1.0" encoding="utf-8"?>
+<file path=ppt/slides/slide32.xml><?xml version="1.0" encoding="utf-8"?>
 <p:sld xmlns:a="http://schemas.openxmlformats.org/drawingml/2006/main" xmlns:r="http://schemas.openxmlformats.org/officeDocument/2006/relationships" xmlns:p="http://schemas.openxmlformats.org/presentationml/2006/main">
   <p:cSld>
     <p:spTree>
@@ -14030,7 +14365,7 @@
 </p:sld>
 </file>
 
-<file path=ppt/slides/slide32.xml><?xml version="1.0" encoding="utf-8"?>
+<file path=ppt/slides/slide33.xml><?xml version="1.0" encoding="utf-8"?>
 <p:sld xmlns:a="http://schemas.openxmlformats.org/drawingml/2006/main" xmlns:r="http://schemas.openxmlformats.org/officeDocument/2006/relationships" xmlns:p="http://schemas.openxmlformats.org/presentationml/2006/main">
   <p:cSld>
     <p:spTree>
@@ -14889,7 +15224,7 @@
 </p:sld>
 </file>
 
-<file path=ppt/slides/slide33.xml><?xml version="1.0" encoding="utf-8"?>
+<file path=ppt/slides/slide34.xml><?xml version="1.0" encoding="utf-8"?>
 <p:sld xmlns:a="http://schemas.openxmlformats.org/drawingml/2006/main" xmlns:r="http://schemas.openxmlformats.org/officeDocument/2006/relationships" xmlns:p="http://schemas.openxmlformats.org/presentationml/2006/main">
   <p:cSld>
     <p:spTree>
@@ -15543,7 +15878,7 @@
 </p:sld>
 </file>
 
-<file path=ppt/slides/slide34.xml><?xml version="1.0" encoding="utf-8"?>
+<file path=ppt/slides/slide35.xml><?xml version="1.0" encoding="utf-8"?>
 <p:sld xmlns:a="http://schemas.openxmlformats.org/drawingml/2006/main" xmlns:r="http://schemas.openxmlformats.org/officeDocument/2006/relationships" xmlns:p="http://schemas.openxmlformats.org/presentationml/2006/main">
   <p:cSld>
     <p:spTree>

</xml_diff>

<commit_message>
Added slide about internal access modifier
</commit_message>
<xml_diff>
--- a/Presentation/lesson-07-reflection.pptx
+++ b/Presentation/lesson-07-reflection.pptx
@@ -6,7 +6,7 @@
     <p:sldMasterId id="2147483663" r:id="rId2"/>
   </p:sldMasterIdLst>
   <p:notesMasterIdLst>
-    <p:notesMasterId r:id="rId38"/>
+    <p:notesMasterId r:id="rId39"/>
   </p:notesMasterIdLst>
   <p:sldIdLst>
     <p:sldId id="257" r:id="rId3"/>
@@ -23,27 +23,28 @@
     <p:sldId id="303" r:id="rId14"/>
     <p:sldId id="304" r:id="rId15"/>
     <p:sldId id="275" r:id="rId16"/>
-    <p:sldId id="273" r:id="rId17"/>
-    <p:sldId id="274" r:id="rId18"/>
-    <p:sldId id="276" r:id="rId19"/>
-    <p:sldId id="277" r:id="rId20"/>
-    <p:sldId id="280" r:id="rId21"/>
-    <p:sldId id="278" r:id="rId22"/>
-    <p:sldId id="279" r:id="rId23"/>
-    <p:sldId id="290" r:id="rId24"/>
-    <p:sldId id="281" r:id="rId25"/>
-    <p:sldId id="282" r:id="rId26"/>
-    <p:sldId id="292" r:id="rId27"/>
-    <p:sldId id="284" r:id="rId28"/>
-    <p:sldId id="262" r:id="rId29"/>
-    <p:sldId id="261" r:id="rId30"/>
-    <p:sldId id="300" r:id="rId31"/>
-    <p:sldId id="306" r:id="rId32"/>
-    <p:sldId id="299" r:id="rId33"/>
-    <p:sldId id="263" r:id="rId34"/>
-    <p:sldId id="264" r:id="rId35"/>
-    <p:sldId id="265" r:id="rId36"/>
-    <p:sldId id="271" r:id="rId37"/>
+    <p:sldId id="307" r:id="rId17"/>
+    <p:sldId id="273" r:id="rId18"/>
+    <p:sldId id="274" r:id="rId19"/>
+    <p:sldId id="276" r:id="rId20"/>
+    <p:sldId id="277" r:id="rId21"/>
+    <p:sldId id="280" r:id="rId22"/>
+    <p:sldId id="278" r:id="rId23"/>
+    <p:sldId id="279" r:id="rId24"/>
+    <p:sldId id="290" r:id="rId25"/>
+    <p:sldId id="281" r:id="rId26"/>
+    <p:sldId id="282" r:id="rId27"/>
+    <p:sldId id="292" r:id="rId28"/>
+    <p:sldId id="284" r:id="rId29"/>
+    <p:sldId id="262" r:id="rId30"/>
+    <p:sldId id="261" r:id="rId31"/>
+    <p:sldId id="300" r:id="rId32"/>
+    <p:sldId id="306" r:id="rId33"/>
+    <p:sldId id="299" r:id="rId34"/>
+    <p:sldId id="263" r:id="rId35"/>
+    <p:sldId id="264" r:id="rId36"/>
+    <p:sldId id="265" r:id="rId37"/>
+    <p:sldId id="271" r:id="rId38"/>
   </p:sldIdLst>
   <p:sldSz cx="9144000" cy="6858000" type="screen4x3"/>
   <p:notesSz cx="6858000" cy="9144000"/>
@@ -228,7 +229,7 @@
             <a:fld id="{B24A7054-7FFB-49F4-A126-5DF6E687FF53}" type="datetimeFigureOut">
               <a:rPr lang="ru-RU" smtClean="0"/>
               <a:pPr/>
-              <a:t>19.10.2013</a:t>
+              <a:t>22.10.2013</a:t>
             </a:fld>
             <a:endParaRPr lang="ru-RU"/>
           </a:p>
@@ -1512,7 +1513,7 @@
             <a:fld id="{8E6E6A2A-E9D3-4A0D-B04A-ABDD367A1E08}" type="datetimeFigureOut">
               <a:rPr lang="ru-RU" smtClean="0"/>
               <a:pPr/>
-              <a:t>19.10.2013</a:t>
+              <a:t>22.10.2013</a:t>
             </a:fld>
             <a:endParaRPr lang="ru-RU"/>
           </a:p>
@@ -1756,7 +1757,7 @@
             <a:fld id="{8E6E6A2A-E9D3-4A0D-B04A-ABDD367A1E08}" type="datetimeFigureOut">
               <a:rPr lang="ru-RU" smtClean="0"/>
               <a:pPr/>
-              <a:t>19.10.2013</a:t>
+              <a:t>22.10.2013</a:t>
             </a:fld>
             <a:endParaRPr lang="ru-RU"/>
           </a:p>
@@ -1928,7 +1929,7 @@
             <a:fld id="{8E6E6A2A-E9D3-4A0D-B04A-ABDD367A1E08}" type="datetimeFigureOut">
               <a:rPr lang="ru-RU" smtClean="0"/>
               <a:pPr/>
-              <a:t>19.10.2013</a:t>
+              <a:t>22.10.2013</a:t>
             </a:fld>
             <a:endParaRPr lang="ru-RU"/>
           </a:p>
@@ -2176,7 +2177,7 @@
             <a:fld id="{8E6E6A2A-E9D3-4A0D-B04A-ABDD367A1E08}" type="datetimeFigureOut">
               <a:rPr lang="ru-RU" smtClean="0"/>
               <a:pPr/>
-              <a:t>19.10.2013</a:t>
+              <a:t>22.10.2013</a:t>
             </a:fld>
             <a:endParaRPr lang="ru-RU"/>
           </a:p>
@@ -2466,7 +2467,7 @@
             <a:fld id="{8E6E6A2A-E9D3-4A0D-B04A-ABDD367A1E08}" type="datetimeFigureOut">
               <a:rPr lang="ru-RU" smtClean="0"/>
               <a:pPr/>
-              <a:t>19.10.2013</a:t>
+              <a:t>22.10.2013</a:t>
             </a:fld>
             <a:endParaRPr lang="ru-RU"/>
           </a:p>
@@ -2890,7 +2891,7 @@
             <a:fld id="{8E6E6A2A-E9D3-4A0D-B04A-ABDD367A1E08}" type="datetimeFigureOut">
               <a:rPr lang="ru-RU" smtClean="0"/>
               <a:pPr/>
-              <a:t>19.10.2013</a:t>
+              <a:t>22.10.2013</a:t>
             </a:fld>
             <a:endParaRPr lang="ru-RU"/>
           </a:p>
@@ -3219,7 +3220,7 @@
             <a:fld id="{8E6E6A2A-E9D3-4A0D-B04A-ABDD367A1E08}" type="datetimeFigureOut">
               <a:rPr lang="ru-RU" smtClean="0"/>
               <a:pPr/>
-              <a:t>19.10.2013</a:t>
+              <a:t>22.10.2013</a:t>
             </a:fld>
             <a:endParaRPr lang="ru-RU"/>
           </a:p>
@@ -3316,7 +3317,7 @@
             <a:fld id="{8E6E6A2A-E9D3-4A0D-B04A-ABDD367A1E08}" type="datetimeFigureOut">
               <a:rPr lang="ru-RU" smtClean="0"/>
               <a:pPr/>
-              <a:t>19.10.2013</a:t>
+              <a:t>22.10.2013</a:t>
             </a:fld>
             <a:endParaRPr lang="ru-RU"/>
           </a:p>
@@ -3595,7 +3596,7 @@
             <a:fld id="{8E6E6A2A-E9D3-4A0D-B04A-ABDD367A1E08}" type="datetimeFigureOut">
               <a:rPr lang="ru-RU" smtClean="0"/>
               <a:pPr/>
-              <a:t>19.10.2013</a:t>
+              <a:t>22.10.2013</a:t>
             </a:fld>
             <a:endParaRPr lang="ru-RU"/>
           </a:p>
@@ -3850,7 +3851,7 @@
             <a:fld id="{8E6E6A2A-E9D3-4A0D-B04A-ABDD367A1E08}" type="datetimeFigureOut">
               <a:rPr lang="ru-RU" smtClean="0"/>
               <a:pPr/>
-              <a:t>19.10.2013</a:t>
+              <a:t>22.10.2013</a:t>
             </a:fld>
             <a:endParaRPr lang="ru-RU"/>
           </a:p>
@@ -4022,7 +4023,7 @@
             <a:fld id="{8E6E6A2A-E9D3-4A0D-B04A-ABDD367A1E08}" type="datetimeFigureOut">
               <a:rPr lang="ru-RU" smtClean="0"/>
               <a:pPr/>
-              <a:t>19.10.2013</a:t>
+              <a:t>22.10.2013</a:t>
             </a:fld>
             <a:endParaRPr lang="ru-RU"/>
           </a:p>
@@ -4204,7 +4205,7 @@
             <a:fld id="{8E6E6A2A-E9D3-4A0D-B04A-ABDD367A1E08}" type="datetimeFigureOut">
               <a:rPr lang="ru-RU" smtClean="0"/>
               <a:pPr/>
-              <a:t>19.10.2013</a:t>
+              <a:t>22.10.2013</a:t>
             </a:fld>
             <a:endParaRPr lang="ru-RU"/>
           </a:p>
@@ -5442,7 +5443,7 @@
             <a:fld id="{AC3D3127-B7C4-45E3-9797-C527EC9FDD78}" type="datetimeFigureOut">
               <a:rPr lang="ru-RU" smtClean="0"/>
               <a:pPr/>
-              <a:t>19.10.2013</a:t>
+              <a:t>22.10.2013</a:t>
             </a:fld>
             <a:endParaRPr lang="ru-RU"/>
           </a:p>
@@ -5964,7 +5965,7 @@
             <a:fld id="{8E6E6A2A-E9D3-4A0D-B04A-ABDD367A1E08}" type="datetimeFigureOut">
               <a:rPr lang="ru-RU" smtClean="0"/>
               <a:pPr/>
-              <a:t>19.10.2013</a:t>
+              <a:t>22.10.2013</a:t>
             </a:fld>
             <a:endParaRPr lang="ru-RU"/>
           </a:p>
@@ -7735,8 +7736,8 @@
         </p:nvSpPr>
         <p:spPr>
           <a:xfrm>
-            <a:off x="611560" y="692696"/>
-            <a:ext cx="7992888" cy="1908215"/>
+            <a:off x="611560" y="761797"/>
+            <a:ext cx="7992888" cy="2739211"/>
           </a:xfrm>
           <a:prstGeom prst="rect">
             <a:avLst/>
@@ -7787,92 +7788,44 @@
               <a:buChar char="•"/>
             </a:pPr>
             <a:r>
+              <a:rPr lang="en-US" dirty="0">
+                <a:solidFill>
+                  <a:schemeClr val="bg1"/>
+                </a:solidFill>
+              </a:rPr>
+              <a:t>IL </a:t>
+            </a:r>
+            <a:r>
+              <a:rPr lang="en-US" dirty="0" err="1">
+                <a:solidFill>
+                  <a:schemeClr val="bg1"/>
+                </a:solidFill>
+              </a:rPr>
+              <a:t>Dasm</a:t>
+            </a:r>
+            <a:r>
+              <a:rPr lang="en-US" dirty="0">
+                <a:solidFill>
+                  <a:schemeClr val="bg1"/>
+                </a:solidFill>
+              </a:rPr>
+              <a:t> – </a:t>
+            </a:r>
+            <a:r>
+              <a:rPr lang="ru-RU" dirty="0">
+                <a:solidFill>
+                  <a:schemeClr val="bg1"/>
+                </a:solidFill>
+              </a:rPr>
+              <a:t>часть </a:t>
+            </a:r>
+            <a:r>
               <a:rPr lang="en-US" dirty="0" smtClean="0">
                 <a:solidFill>
                   <a:schemeClr val="bg1"/>
                 </a:solidFill>
               </a:rPr>
-              <a:t>IL </a:t>
-            </a:r>
-            <a:r>
-              <a:rPr lang="en-US" dirty="0" err="1" smtClean="0">
-                <a:solidFill>
-                  <a:schemeClr val="bg1"/>
-                </a:solidFill>
-              </a:rPr>
-              <a:t>Dasm</a:t>
-            </a:r>
-            <a:r>
-              <a:rPr lang="en-US" dirty="0" smtClean="0">
-                <a:solidFill>
-                  <a:schemeClr val="bg1"/>
-                </a:solidFill>
-              </a:rPr>
-              <a:t> – </a:t>
-            </a:r>
-            <a:r>
-              <a:rPr lang="ru-RU" dirty="0" smtClean="0">
-                <a:solidFill>
-                  <a:schemeClr val="bg1"/>
-                </a:solidFill>
-              </a:rPr>
-              <a:t>часть </a:t>
-            </a:r>
-            <a:r>
-              <a:rPr lang="en-US" dirty="0" smtClean="0">
-                <a:solidFill>
-                  <a:schemeClr val="bg1"/>
-                </a:solidFill>
-              </a:rPr>
-              <a:t>SDK</a:t>
-            </a:r>
-          </a:p>
-          <a:p>
-            <a:pPr marL="285750" indent="-285750">
-              <a:buFont typeface="Arial" pitchFamily="34" charset="0"/>
-              <a:buChar char="•"/>
-            </a:pPr>
-            <a:r>
-              <a:rPr lang="en-US" dirty="0" err="1" smtClean="0">
-                <a:solidFill>
-                  <a:schemeClr val="bg1"/>
-                </a:solidFill>
-              </a:rPr>
-              <a:t>DotPeek</a:t>
-            </a:r>
-            <a:r>
-              <a:rPr lang="en-US" dirty="0" smtClean="0">
-                <a:solidFill>
-                  <a:schemeClr val="bg1"/>
-                </a:solidFill>
-              </a:rPr>
-              <a:t> </a:t>
-            </a:r>
-            <a:r>
-              <a:rPr lang="en-US" dirty="0">
-                <a:solidFill>
-                  <a:schemeClr val="bg1"/>
-                </a:solidFill>
-              </a:rPr>
-              <a:t>- </a:t>
-            </a:r>
-            <a:r>
-              <a:rPr lang="en-US" dirty="0">
-                <a:solidFill>
-                  <a:schemeClr val="bg1"/>
-                </a:solidFill>
-                <a:hlinkClick r:id="rId2"/>
-              </a:rPr>
-              <a:t>http://www.jetbrains.com/decompiler</a:t>
-            </a:r>
-            <a:r>
-              <a:rPr lang="en-US" dirty="0" smtClean="0">
-                <a:solidFill>
-                  <a:schemeClr val="bg1"/>
-                </a:solidFill>
-                <a:hlinkClick r:id="rId2"/>
-              </a:rPr>
-              <a:t>/</a:t>
+              <a:t>Windows SDK</a:t>
             </a:r>
             <a:endParaRPr lang="en-US" dirty="0" smtClean="0">
               <a:solidFill>
@@ -7891,7 +7844,24 @@
                   <a:schemeClr val="bg1"/>
                 </a:solidFill>
               </a:rPr>
-              <a:t>ReSharper</a:t>
+              <a:t>DotPeek</a:t>
+            </a:r>
+            <a:r>
+              <a:rPr lang="en-US" dirty="0" smtClean="0">
+                <a:solidFill>
+                  <a:schemeClr val="bg1"/>
+                </a:solidFill>
+              </a:rPr>
+              <a:t> - </a:t>
+            </a:r>
+            <a:r>
+              <a:rPr lang="en-US" dirty="0" smtClean="0">
+                <a:solidFill>
+                  <a:schemeClr val="bg1"/>
+                </a:solidFill>
+                <a:hlinkClick r:id="rId2"/>
+              </a:rPr>
+              <a:t>www.jetbrains.com/decompiler</a:t>
             </a:r>
             <a:endParaRPr lang="en-US" dirty="0" smtClean="0">
               <a:solidFill>
@@ -7905,12 +7875,104 @@
               <a:buChar char="•"/>
             </a:pPr>
             <a:r>
+              <a:rPr lang="en-US" dirty="0" smtClean="0">
+                <a:solidFill>
+                  <a:schemeClr val="bg1"/>
+                </a:solidFill>
+              </a:rPr>
+              <a:t>ReSharper - </a:t>
+            </a:r>
+            <a:r>
+              <a:rPr lang="en-US" dirty="0" smtClean="0">
+                <a:solidFill>
+                  <a:schemeClr val="bg1"/>
+                </a:solidFill>
+                <a:hlinkClick r:id="rId3"/>
+              </a:rPr>
+              <a:t>www.jetbrains.com/resharper</a:t>
+            </a:r>
+            <a:endParaRPr lang="en-US" dirty="0" smtClean="0">
+              <a:solidFill>
+                <a:schemeClr val="bg1"/>
+              </a:solidFill>
+            </a:endParaRPr>
+          </a:p>
+          <a:p>
+            <a:pPr marL="285750" indent="-285750">
+              <a:buFont typeface="Arial" pitchFamily="34" charset="0"/>
+              <a:buChar char="•"/>
+            </a:pPr>
+            <a:r>
+              <a:rPr lang="en-US" dirty="0" smtClean="0">
+                <a:solidFill>
+                  <a:schemeClr val="bg1"/>
+                </a:solidFill>
+              </a:rPr>
+              <a:t>Just </a:t>
+            </a:r>
+            <a:r>
+              <a:rPr lang="en-US" dirty="0">
+                <a:solidFill>
+                  <a:schemeClr val="bg1"/>
+                </a:solidFill>
+              </a:rPr>
+              <a:t>Decompile - </a:t>
+            </a:r>
+            <a:r>
+              <a:rPr lang="en-US" dirty="0" smtClean="0">
+                <a:solidFill>
+                  <a:schemeClr val="bg1"/>
+                </a:solidFill>
+                <a:hlinkClick r:id="rId4"/>
+              </a:rPr>
+              <a:t>www.telerik.com/products/decompiler.aspx</a:t>
+            </a:r>
+            <a:endParaRPr lang="en-US" dirty="0" smtClean="0">
+              <a:solidFill>
+                <a:schemeClr val="bg1"/>
+              </a:solidFill>
+            </a:endParaRPr>
+          </a:p>
+          <a:p>
+            <a:pPr marL="285750" indent="-285750">
+              <a:buFont typeface="Arial" pitchFamily="34" charset="0"/>
+              <a:buChar char="•"/>
+            </a:pPr>
+            <a:r>
+              <a:rPr lang="en-US" dirty="0">
+                <a:solidFill>
+                  <a:schemeClr val="bg1"/>
+                </a:solidFill>
+              </a:rPr>
+              <a:t>.NET Reflector - </a:t>
+            </a:r>
+            <a:r>
+              <a:rPr lang="en-US" dirty="0" smtClean="0">
+                <a:solidFill>
+                  <a:schemeClr val="bg1"/>
+                </a:solidFill>
+                <a:hlinkClick r:id="rId5"/>
+              </a:rPr>
+              <a:t>www.red-gate.com/products/dotnet-development/reflector/</a:t>
+            </a:r>
+            <a:endParaRPr lang="en-US" dirty="0" smtClean="0">
+              <a:solidFill>
+                <a:schemeClr val="bg1"/>
+              </a:solidFill>
+            </a:endParaRPr>
+          </a:p>
+          <a:p>
+            <a:pPr marL="285750" indent="-285750">
+              <a:buFont typeface="Arial" pitchFamily="34" charset="0"/>
+              <a:buChar char="•"/>
+            </a:pPr>
+            <a:r>
               <a:rPr lang="en-US" dirty="0" err="1" smtClean="0">
                 <a:solidFill>
                   <a:schemeClr val="bg1"/>
                 </a:solidFill>
               </a:rPr>
-              <a:t>Telerik</a:t>
+              <a:t>ILSpy</a:t>
             </a:r>
             <a:r>
               <a:rPr lang="en-US" dirty="0" smtClean="0">
@@ -7918,8 +7980,28 @@
                   <a:schemeClr val="bg1"/>
                 </a:solidFill>
               </a:rPr>
-              <a:t> Just Decompile</a:t>
-            </a:r>
+              <a:t> - </a:t>
+            </a:r>
+            <a:r>
+              <a:rPr lang="en-US" dirty="0" smtClean="0">
+                <a:solidFill>
+                  <a:schemeClr val="bg1"/>
+                </a:solidFill>
+                <a:hlinkClick r:id="rId6"/>
+              </a:rPr>
+              <a:t>ilspy.net</a:t>
+            </a:r>
+            <a:endParaRPr lang="en-US" dirty="0" smtClean="0">
+              <a:solidFill>
+                <a:schemeClr val="bg1"/>
+              </a:solidFill>
+            </a:endParaRPr>
+          </a:p>
+          <a:p>
+            <a:pPr marL="285750" indent="-285750">
+              <a:buFont typeface="Arial" pitchFamily="34" charset="0"/>
+              <a:buChar char="•"/>
+            </a:pPr>
             <a:endParaRPr lang="en-US" dirty="0">
               <a:solidFill>
                 <a:schemeClr val="bg1"/>
@@ -8061,9 +8143,13 @@
           <a:p>
             <a:r>
               <a:rPr lang="ru-RU" dirty="0" smtClean="0"/>
-              <a:t>Многофайловые сборки</a:t>
-            </a:r>
-            <a:endParaRPr lang="ru-RU" dirty="0"/>
+              <a:t>Модификатор доступа </a:t>
+            </a:r>
+            <a:r>
+              <a:rPr lang="en-US" dirty="0" smtClean="0"/>
+              <a:t>internal</a:t>
+            </a:r>
+            <a:endParaRPr lang="en-US" dirty="0"/>
           </a:p>
         </p:txBody>
       </p:sp>
@@ -8080,93 +8166,58 @@
         <p:spPr/>
         <p:txBody>
           <a:bodyPr>
-            <a:normAutofit/>
+            <a:normAutofit lnSpcReduction="10000"/>
           </a:bodyPr>
           <a:lstStyle/>
           <a:p>
+            <a:pPr marL="0" indent="0">
+              <a:buNone/>
+            </a:pPr>
             <a:r>
               <a:rPr lang="ru-RU" dirty="0" smtClean="0"/>
-              <a:t>Позволяют распределять </a:t>
-            </a:r>
-            <a:r>
-              <a:rPr lang="ru-RU" dirty="0"/>
-              <a:t>типы по разным </a:t>
+              <a:t>Типы объявленные как </a:t>
+            </a:r>
+            <a:r>
+              <a:rPr lang="en-US" dirty="0" smtClean="0"/>
+              <a:t>internal </a:t>
             </a:r>
             <a:r>
               <a:rPr lang="ru-RU" dirty="0" smtClean="0"/>
-              <a:t>файлам</a:t>
-            </a:r>
-          </a:p>
-          <a:p>
-            <a:r>
-              <a:rPr lang="ru-RU" dirty="0"/>
-              <a:t>Позволяют д</a:t>
-            </a:r>
+              <a:t>будут недоступны за пределами сборки где они объявлены. Это дает возможность создавать общие типы которые используются внутри нашей библиотеки, но не могут быть использованы за её пределами.</a:t>
+            </a:r>
+          </a:p>
+          <a:p>
+            <a:pPr marL="0" indent="0">
+              <a:buNone/>
+            </a:pPr>
+            <a:endParaRPr lang="ru-RU" dirty="0"/>
+          </a:p>
+          <a:p>
+            <a:pPr marL="0" indent="0">
+              <a:buNone/>
+            </a:pPr>
             <a:r>
               <a:rPr lang="ru-RU" dirty="0" smtClean="0"/>
-              <a:t>обавлять </a:t>
-            </a:r>
-            <a:r>
-              <a:rPr lang="ru-RU" dirty="0"/>
-              <a:t>к сборке файлы с ресурсами и </a:t>
-            </a:r>
-            <a:r>
-              <a:rPr lang="ru-RU" dirty="0" smtClean="0"/>
-              <a:t>данными</a:t>
-            </a:r>
-          </a:p>
-          <a:p>
-            <a:r>
-              <a:rPr lang="ru-RU" dirty="0"/>
-              <a:t>Позволяют с</a:t>
-            </a:r>
-            <a:r>
-              <a:rPr lang="ru-RU" dirty="0" smtClean="0"/>
-              <a:t>оздавать </a:t>
-            </a:r>
-            <a:r>
-              <a:rPr lang="ru-RU" dirty="0"/>
-              <a:t>сборки, состоящие из типов, написанных на разных языках </a:t>
+              <a:t>Если у класса не указан модификатор доступа, то по умолчанию используется </a:t>
             </a:r>
             <a:r>
               <a:rPr lang="en-US" dirty="0" smtClean="0"/>
-              <a:t>	</a:t>
-            </a:r>
-            <a:r>
-              <a:rPr lang="ru-RU" dirty="0" smtClean="0"/>
-              <a:t>программирования</a:t>
-            </a:r>
-          </a:p>
-          <a:p>
-            <a:r>
-              <a:rPr lang="ru-RU" dirty="0" smtClean="0"/>
-              <a:t>Создаются с помощью утилиты </a:t>
-            </a:r>
-            <a:r>
-              <a:rPr lang="en-US" dirty="0" smtClean="0"/>
-              <a:t>AL.exe</a:t>
-            </a:r>
-            <a:endParaRPr lang="ru-RU" dirty="0"/>
+              <a:t>internal.</a:t>
+            </a:r>
+            <a:endParaRPr lang="en-US" dirty="0"/>
           </a:p>
         </p:txBody>
       </p:sp>
     </p:spTree>
     <p:extLst>
       <p:ext uri="{BB962C8B-B14F-4D97-AF65-F5344CB8AC3E}">
-        <p14:creationId xmlns:p14="http://schemas.microsoft.com/office/powerpoint/2010/main" val="2692656914"/>
+        <p14:creationId xmlns:p14="http://schemas.microsoft.com/office/powerpoint/2010/main" val="1968121537"/>
       </p:ext>
     </p:extLst>
   </p:cSld>
   <p:clrMapOvr>
     <a:masterClrMapping/>
   </p:clrMapOvr>
-  <p:timing>
-    <p:tnLst>
-      <p:par>
-        <p:cTn id="1" dur="indefinite" restart="never" nodeType="tmRoot"/>
-      </p:par>
-    </p:tnLst>
-  </p:timing>
 </p:sld>
 </file>
 
@@ -8197,28 +8248,97 @@
             <p:ph type="title"/>
           </p:nvPr>
         </p:nvSpPr>
-        <p:spPr>
-          <a:xfrm>
-            <a:off x="457200" y="2857500"/>
-            <a:ext cx="8229600" cy="1143000"/>
-          </a:xfrm>
-        </p:spPr>
+        <p:spPr/>
+        <p:txBody>
+          <a:bodyPr/>
+          <a:lstStyle/>
+          <a:p>
+            <a:r>
+              <a:rPr lang="ru-RU" dirty="0" smtClean="0"/>
+              <a:t>Многофайловые сборки</a:t>
+            </a:r>
+            <a:endParaRPr lang="ru-RU" dirty="0"/>
+          </a:p>
+        </p:txBody>
+      </p:sp>
+      <p:sp>
+        <p:nvSpPr>
+          <p:cNvPr id="3" name="Content Placeholder 2"/>
+          <p:cNvSpPr>
+            <a:spLocks noGrp="1"/>
+          </p:cNvSpPr>
+          <p:nvPr>
+            <p:ph idx="1"/>
+          </p:nvPr>
+        </p:nvSpPr>
+        <p:spPr/>
         <p:txBody>
           <a:bodyPr>
-            <a:normAutofit fontScale="90000"/>
+            <a:normAutofit/>
           </a:bodyPr>
           <a:lstStyle/>
           <a:p>
             <a:r>
               <a:rPr lang="ru-RU" dirty="0" smtClean="0"/>
-              <a:t>Многофайловые сборки</a:t>
-            </a:r>
-            <a:br>
+              <a:t>Позволяют распределять </a:t>
+            </a:r>
+            <a:r>
+              <a:rPr lang="ru-RU" dirty="0"/>
+              <a:t>типы по разным </a:t>
+            </a:r>
+            <a:r>
               <a:rPr lang="ru-RU" dirty="0" smtClean="0"/>
-            </a:br>
+              <a:t>файлам</a:t>
+            </a:r>
+          </a:p>
+          <a:p>
+            <a:r>
+              <a:rPr lang="ru-RU" dirty="0"/>
+              <a:t>Позволяют д</a:t>
+            </a:r>
             <a:r>
               <a:rPr lang="ru-RU" dirty="0" smtClean="0"/>
-              <a:t>Демонстрация</a:t>
+              <a:t>обавлять </a:t>
+            </a:r>
+            <a:r>
+              <a:rPr lang="ru-RU" dirty="0"/>
+              <a:t>к сборке файлы с ресурсами и </a:t>
+            </a:r>
+            <a:r>
+              <a:rPr lang="ru-RU" dirty="0" smtClean="0"/>
+              <a:t>данными</a:t>
+            </a:r>
+          </a:p>
+          <a:p>
+            <a:r>
+              <a:rPr lang="ru-RU" dirty="0"/>
+              <a:t>Позволяют с</a:t>
+            </a:r>
+            <a:r>
+              <a:rPr lang="ru-RU" dirty="0" smtClean="0"/>
+              <a:t>оздавать </a:t>
+            </a:r>
+            <a:r>
+              <a:rPr lang="ru-RU" dirty="0"/>
+              <a:t>сборки, состоящие из типов, написанных на разных языках </a:t>
+            </a:r>
+            <a:r>
+              <a:rPr lang="en-US" dirty="0" smtClean="0"/>
+              <a:t>	</a:t>
+            </a:r>
+            <a:r>
+              <a:rPr lang="ru-RU" dirty="0" smtClean="0"/>
+              <a:t>программирования</a:t>
+            </a:r>
+          </a:p>
+          <a:p>
+            <a:r>
+              <a:rPr lang="ru-RU" dirty="0" smtClean="0"/>
+              <a:t>Создаются с помощью утилиты </a:t>
+            </a:r>
+            <a:r>
+              <a:rPr lang="en-US" dirty="0" smtClean="0"/>
+              <a:t>AL.exe</a:t>
             </a:r>
             <a:endParaRPr lang="ru-RU" dirty="0"/>
           </a:p>
@@ -8227,7 +8347,7 @@
     </p:spTree>
     <p:extLst>
       <p:ext uri="{BB962C8B-B14F-4D97-AF65-F5344CB8AC3E}">
-        <p14:creationId xmlns:p14="http://schemas.microsoft.com/office/powerpoint/2010/main" val="278552390"/>
+        <p14:creationId xmlns:p14="http://schemas.microsoft.com/office/powerpoint/2010/main" val="2692656914"/>
       </p:ext>
     </p:extLst>
   </p:cSld>
@@ -8271,98 +8391,28 @@
             <p:ph type="title"/>
           </p:nvPr>
         </p:nvSpPr>
-        <p:spPr/>
+        <p:spPr>
+          <a:xfrm>
+            <a:off x="457200" y="2857500"/>
+            <a:ext cx="8229600" cy="1143000"/>
+          </a:xfrm>
+        </p:spPr>
         <p:txBody>
-          <a:bodyPr/>
+          <a:bodyPr>
+            <a:normAutofit fontScale="90000"/>
+          </a:bodyPr>
           <a:lstStyle/>
           <a:p>
             <a:r>
-              <a:rPr lang="ru-RU" dirty="0"/>
-              <a:t>Добавление сборок к проекту</a:t>
-            </a:r>
-          </a:p>
-        </p:txBody>
-      </p:sp>
-      <p:sp>
-        <p:nvSpPr>
-          <p:cNvPr id="3" name="Content Placeholder 2"/>
-          <p:cNvSpPr>
-            <a:spLocks noGrp="1"/>
-          </p:cNvSpPr>
-          <p:nvPr>
-            <p:ph idx="1"/>
-          </p:nvPr>
-        </p:nvSpPr>
-        <p:spPr/>
-        <p:txBody>
-          <a:bodyPr/>
-          <a:lstStyle/>
-          <a:p>
-            <a:r>
               <a:rPr lang="ru-RU" dirty="0" smtClean="0"/>
-              <a:t>Из меню </a:t>
-            </a:r>
-            <a:r>
-              <a:rPr lang="en-US" dirty="0" smtClean="0"/>
-              <a:t>Project -&gt; Add Reference</a:t>
-            </a:r>
-            <a:r>
+              <a:t>Многофайловые сборки</a:t>
+            </a:r>
+            <a:br>
               <a:rPr lang="ru-RU" dirty="0" smtClean="0"/>
-              <a:t> ...</a:t>
-            </a:r>
-            <a:endParaRPr lang="en-US" dirty="0" smtClean="0"/>
-          </a:p>
-          <a:p>
+            </a:br>
             <a:r>
               <a:rPr lang="ru-RU" dirty="0" smtClean="0"/>
-              <a:t>В </a:t>
-            </a:r>
-            <a:r>
-              <a:rPr lang="en-US" dirty="0" smtClean="0"/>
-              <a:t>Solution Explorer, </a:t>
-            </a:r>
-            <a:r>
-              <a:rPr lang="ru-RU" dirty="0" smtClean="0"/>
-              <a:t>найти узел </a:t>
-            </a:r>
-            <a:r>
-              <a:rPr lang="en-US" dirty="0" smtClean="0"/>
-              <a:t>References </a:t>
-            </a:r>
-            <a:r>
-              <a:rPr lang="ru-RU" dirty="0" smtClean="0"/>
-              <a:t>нужного проекта</a:t>
-            </a:r>
-            <a:r>
-              <a:rPr lang="en-US" dirty="0" smtClean="0"/>
-              <a:t>,</a:t>
-            </a:r>
-            <a:r>
-              <a:rPr lang="ru-RU" dirty="0" smtClean="0"/>
-              <a:t> вызвать контестное меню и выбрать </a:t>
-            </a:r>
-            <a:r>
-              <a:rPr lang="en-US" dirty="0"/>
-              <a:t>Add Reference</a:t>
-            </a:r>
-            <a:r>
-              <a:rPr lang="ru-RU" dirty="0"/>
-              <a:t> </a:t>
-            </a:r>
-            <a:r>
-              <a:rPr lang="ru-RU" dirty="0" smtClean="0"/>
-              <a:t>...</a:t>
-            </a:r>
-            <a:endParaRPr lang="en-US" dirty="0" smtClean="0"/>
-          </a:p>
-          <a:p>
-            <a:r>
-              <a:rPr lang="ru-RU" dirty="0" smtClean="0"/>
-              <a:t>С помощью </a:t>
-            </a:r>
-            <a:r>
-              <a:rPr lang="en-US" dirty="0" err="1" smtClean="0"/>
-              <a:t>NuGet</a:t>
+              <a:t>Демонстрация</a:t>
             </a:r>
             <a:endParaRPr lang="ru-RU" dirty="0"/>
           </a:p>
@@ -8371,7 +8421,7 @@
     </p:spTree>
     <p:extLst>
       <p:ext uri="{BB962C8B-B14F-4D97-AF65-F5344CB8AC3E}">
-        <p14:creationId xmlns:p14="http://schemas.microsoft.com/office/powerpoint/2010/main" val="210700532"/>
+        <p14:creationId xmlns:p14="http://schemas.microsoft.com/office/powerpoint/2010/main" val="278552390"/>
       </p:ext>
     </p:extLst>
   </p:cSld>
@@ -8417,16 +8467,13 @@
         </p:nvSpPr>
         <p:spPr/>
         <p:txBody>
-          <a:bodyPr>
-            <a:normAutofit/>
-          </a:bodyPr>
+          <a:bodyPr/>
           <a:lstStyle/>
           <a:p>
             <a:r>
-              <a:rPr lang="ru-RU" dirty="0" smtClean="0"/>
-              <a:t>Номер версии сборки</a:t>
-            </a:r>
-            <a:endParaRPr lang="ru-RU" dirty="0"/>
+              <a:rPr lang="ru-RU" dirty="0"/>
+              <a:t>Добавление сборок к проекту</a:t>
+            </a:r>
           </a:p>
         </p:txBody>
       </p:sp>
@@ -8446,62 +8493,70 @@
           <a:lstStyle/>
           <a:p>
             <a:r>
+              <a:rPr lang="ru-RU" dirty="0" smtClean="0"/>
+              <a:t>Из меню </a:t>
+            </a:r>
+            <a:r>
               <a:rPr lang="en-US" dirty="0" smtClean="0"/>
-              <a:t>[assembly: </a:t>
+              <a:t>Project -&gt; Add Reference</a:t>
+            </a:r>
+            <a:r>
+              <a:rPr lang="ru-RU" dirty="0" smtClean="0"/>
+              <a:t> ...</a:t>
+            </a:r>
+            <a:endParaRPr lang="en-US" dirty="0" smtClean="0"/>
+          </a:p>
+          <a:p>
+            <a:r>
+              <a:rPr lang="ru-RU" dirty="0" smtClean="0"/>
+              <a:t>В </a:t>
+            </a:r>
+            <a:r>
+              <a:rPr lang="en-US" dirty="0" smtClean="0"/>
+              <a:t>Solution Explorer, </a:t>
+            </a:r>
+            <a:r>
+              <a:rPr lang="ru-RU" dirty="0" smtClean="0"/>
+              <a:t>найти узел </a:t>
+            </a:r>
+            <a:r>
+              <a:rPr lang="en-US" dirty="0" smtClean="0"/>
+              <a:t>References </a:t>
+            </a:r>
+            <a:r>
+              <a:rPr lang="ru-RU" dirty="0" smtClean="0"/>
+              <a:t>нужного проекта</a:t>
+            </a:r>
+            <a:r>
+              <a:rPr lang="en-US" dirty="0" smtClean="0"/>
+              <a:t>,</a:t>
+            </a:r>
+            <a:r>
+              <a:rPr lang="ru-RU" dirty="0" smtClean="0"/>
+              <a:t> вызвать контестное меню и выбрать </a:t>
+            </a:r>
+            <a:r>
+              <a:rPr lang="en-US" dirty="0"/>
+              <a:t>Add Reference</a:t>
+            </a:r>
+            <a:r>
+              <a:rPr lang="ru-RU" dirty="0"/>
+              <a:t> </a:t>
+            </a:r>
+            <a:r>
+              <a:rPr lang="ru-RU" dirty="0" smtClean="0"/>
+              <a:t>...</a:t>
+            </a:r>
+            <a:endParaRPr lang="en-US" dirty="0" smtClean="0"/>
+          </a:p>
+          <a:p>
+            <a:r>
+              <a:rPr lang="ru-RU" dirty="0" smtClean="0"/>
+              <a:t>С помощью </a:t>
             </a:r>
             <a:r>
               <a:rPr lang="en-US" dirty="0" err="1" smtClean="0"/>
-              <a:t>AssemblyVersion</a:t>
-            </a:r>
-            <a:r>
-              <a:rPr lang="en-US" dirty="0" smtClean="0"/>
-              <a:t>(“1.2.3.4”)]</a:t>
-            </a:r>
-          </a:p>
-          <a:p>
-            <a:r>
-              <a:rPr lang="en-US" dirty="0" err="1" smtClean="0"/>
-              <a:t>major.minor.build.revision</a:t>
-            </a:r>
-            <a:endParaRPr lang="ru-RU" dirty="0" smtClean="0"/>
-          </a:p>
-          <a:p>
-            <a:pPr lvl="1"/>
-            <a:r>
-              <a:rPr lang="ru-RU" dirty="0" smtClean="0"/>
-              <a:t>Старший номер</a:t>
-            </a:r>
-          </a:p>
-          <a:p>
-            <a:pPr lvl="1"/>
-            <a:r>
-              <a:rPr lang="ru-RU" dirty="0" smtClean="0"/>
-              <a:t>Младший номер</a:t>
-            </a:r>
-          </a:p>
-          <a:p>
-            <a:pPr lvl="1"/>
-            <a:r>
-              <a:rPr lang="ru-RU" dirty="0" smtClean="0"/>
-              <a:t>Номер билда</a:t>
-            </a:r>
-          </a:p>
-          <a:p>
-            <a:pPr lvl="1"/>
-            <a:r>
-              <a:rPr lang="ru-RU" dirty="0" smtClean="0"/>
-              <a:t>Номер ревизии</a:t>
-            </a:r>
-            <a:endParaRPr lang="en-US" dirty="0" smtClean="0"/>
-          </a:p>
-          <a:p>
-            <a:r>
-              <a:rPr lang="ru-RU" dirty="0" smtClean="0"/>
-              <a:t>Задается в </a:t>
-            </a:r>
-            <a:r>
-              <a:rPr lang="en-US" dirty="0" err="1" smtClean="0"/>
-              <a:t>AssemblyInfo.cs</a:t>
+              <a:t>NuGet</a:t>
             </a:r>
             <a:endParaRPr lang="ru-RU" dirty="0"/>
           </a:p>
@@ -8510,7 +8565,7 @@
     </p:spTree>
     <p:extLst>
       <p:ext uri="{BB962C8B-B14F-4D97-AF65-F5344CB8AC3E}">
-        <p14:creationId xmlns:p14="http://schemas.microsoft.com/office/powerpoint/2010/main" val="746042412"/>
+        <p14:creationId xmlns:p14="http://schemas.microsoft.com/office/powerpoint/2010/main" val="210700532"/>
       </p:ext>
     </p:extLst>
   </p:cSld>
@@ -8556,12 +8611,14 @@
         </p:nvSpPr>
         <p:spPr/>
         <p:txBody>
-          <a:bodyPr/>
+          <a:bodyPr>
+            <a:normAutofit/>
+          </a:bodyPr>
           <a:lstStyle/>
           <a:p>
             <a:r>
               <a:rPr lang="ru-RU" dirty="0" smtClean="0"/>
-              <a:t>Типы развертывания</a:t>
+              <a:t>Номер версии сборки</a:t>
             </a:r>
             <a:endParaRPr lang="ru-RU" dirty="0"/>
           </a:p>
@@ -8583,14 +8640,62 @@
           <a:lstStyle/>
           <a:p>
             <a:r>
+              <a:rPr lang="en-US" dirty="0" smtClean="0"/>
+              <a:t>[assembly: </a:t>
+            </a:r>
+            <a:r>
+              <a:rPr lang="en-US" dirty="0" err="1" smtClean="0"/>
+              <a:t>AssemblyVersion</a:t>
+            </a:r>
+            <a:r>
+              <a:rPr lang="en-US" dirty="0" smtClean="0"/>
+              <a:t>(“1.2.3.4”)]</a:t>
+            </a:r>
+          </a:p>
+          <a:p>
+            <a:r>
+              <a:rPr lang="en-US" dirty="0" err="1" smtClean="0"/>
+              <a:t>major.minor.build.revision</a:t>
+            </a:r>
+            <a:endParaRPr lang="ru-RU" dirty="0" smtClean="0"/>
+          </a:p>
+          <a:p>
+            <a:pPr lvl="1"/>
+            <a:r>
               <a:rPr lang="ru-RU" dirty="0" smtClean="0"/>
-              <a:t>Закрытое</a:t>
-            </a:r>
-          </a:p>
-          <a:p>
+              <a:t>Старший номер</a:t>
+            </a:r>
+          </a:p>
+          <a:p>
+            <a:pPr lvl="1"/>
             <a:r>
               <a:rPr lang="ru-RU" dirty="0" smtClean="0"/>
-              <a:t>Совместное</a:t>
+              <a:t>Младший номер</a:t>
+            </a:r>
+          </a:p>
+          <a:p>
+            <a:pPr lvl="1"/>
+            <a:r>
+              <a:rPr lang="ru-RU" dirty="0" smtClean="0"/>
+              <a:t>Номер билда</a:t>
+            </a:r>
+          </a:p>
+          <a:p>
+            <a:pPr lvl="1"/>
+            <a:r>
+              <a:rPr lang="ru-RU" dirty="0" smtClean="0"/>
+              <a:t>Номер ревизии</a:t>
+            </a:r>
+            <a:endParaRPr lang="en-US" dirty="0" smtClean="0"/>
+          </a:p>
+          <a:p>
+            <a:r>
+              <a:rPr lang="ru-RU" dirty="0" smtClean="0"/>
+              <a:t>Задается в </a:t>
+            </a:r>
+            <a:r>
+              <a:rPr lang="en-US" dirty="0" err="1" smtClean="0"/>
+              <a:t>AssemblyInfo.cs</a:t>
             </a:r>
             <a:endParaRPr lang="ru-RU" dirty="0"/>
           </a:p>
@@ -8599,7 +8704,7 @@
     </p:spTree>
     <p:extLst>
       <p:ext uri="{BB962C8B-B14F-4D97-AF65-F5344CB8AC3E}">
-        <p14:creationId xmlns:p14="http://schemas.microsoft.com/office/powerpoint/2010/main" val="3786467353"/>
+        <p14:creationId xmlns:p14="http://schemas.microsoft.com/office/powerpoint/2010/main" val="746042412"/>
       </p:ext>
     </p:extLst>
   </p:cSld>
@@ -8823,25 +8928,12 @@
         </p:nvSpPr>
         <p:spPr/>
         <p:txBody>
-          <a:bodyPr>
-            <a:normAutofit fontScale="90000"/>
-          </a:bodyPr>
+          <a:bodyPr/>
           <a:lstStyle/>
           <a:p>
             <a:r>
-              <a:rPr lang="ru-RU" dirty="0"/>
-              <a:t>Поиск </a:t>
-            </a:r>
-            <a:r>
               <a:rPr lang="ru-RU" dirty="0" smtClean="0"/>
-              <a:t>сборки</a:t>
-            </a:r>
-            <a:br>
-              <a:rPr lang="ru-RU" dirty="0" smtClean="0"/>
-            </a:br>
-            <a:r>
-              <a:rPr lang="ru-RU" dirty="0" smtClean="0"/>
-              <a:t>Закрытое развертывание</a:t>
+              <a:t>Типы развертывания</a:t>
             </a:r>
             <a:endParaRPr lang="ru-RU" dirty="0"/>
           </a:p>
@@ -8859,260 +8951,19 @@
         </p:nvSpPr>
         <p:spPr/>
         <p:txBody>
-          <a:bodyPr>
-            <a:normAutofit fontScale="70000" lnSpcReduction="20000"/>
-          </a:bodyPr>
+          <a:bodyPr/>
           <a:lstStyle/>
           <a:p>
             <a:r>
-              <a:rPr lang="en-US" dirty="0" err="1" smtClean="0"/>
-              <a:t>AppBase</a:t>
-            </a:r>
-            <a:r>
-              <a:rPr lang="en-US" dirty="0" smtClean="0"/>
-              <a:t>\AsmName.dll</a:t>
-            </a:r>
-          </a:p>
-          <a:p>
-            <a:r>
-              <a:rPr lang="en-US" dirty="0" err="1" smtClean="0"/>
-              <a:t>AppBase</a:t>
-            </a:r>
-            <a:r>
-              <a:rPr lang="en-US" dirty="0" smtClean="0"/>
-              <a:t>\</a:t>
-            </a:r>
-            <a:r>
-              <a:rPr lang="en-US" dirty="0" err="1" smtClean="0"/>
-              <a:t>AsmName</a:t>
-            </a:r>
-            <a:r>
-              <a:rPr lang="en-US" dirty="0" smtClean="0"/>
-              <a:t>\AsmName.dll</a:t>
-            </a:r>
-            <a:endParaRPr lang="en-US" dirty="0"/>
-          </a:p>
-          <a:p>
-            <a:r>
-              <a:rPr lang="en-US" dirty="0" err="1" smtClean="0"/>
-              <a:t>AppBase</a:t>
-            </a:r>
-            <a:r>
-              <a:rPr lang="en-US" dirty="0" smtClean="0"/>
-              <a:t>\privatePath1\</a:t>
-            </a:r>
-            <a:r>
-              <a:rPr lang="en-US" dirty="0" err="1" smtClean="0"/>
-              <a:t>AsmName</a:t>
-            </a:r>
-            <a:r>
-              <a:rPr lang="en-US" dirty="0" smtClean="0"/>
-              <a:t>. </a:t>
-            </a:r>
-            <a:r>
-              <a:rPr lang="en-US" dirty="0" err="1"/>
-              <a:t>dll</a:t>
-            </a:r>
-            <a:endParaRPr lang="en-US" dirty="0"/>
-          </a:p>
-          <a:p>
-            <a:r>
-              <a:rPr lang="en-US" dirty="0" err="1" smtClean="0"/>
-              <a:t>AppBase</a:t>
-            </a:r>
-            <a:r>
-              <a:rPr lang="en-US" dirty="0" smtClean="0"/>
-              <a:t>\privatePath1\</a:t>
-            </a:r>
-            <a:r>
-              <a:rPr lang="en-US" dirty="0" err="1" smtClean="0"/>
-              <a:t>AsmName</a:t>
-            </a:r>
-            <a:r>
-              <a:rPr lang="en-US" dirty="0" smtClean="0"/>
-              <a:t>\AsmName.dll</a:t>
-            </a:r>
-            <a:endParaRPr lang="en-US" dirty="0"/>
-          </a:p>
-          <a:p>
-            <a:r>
-              <a:rPr lang="en-US" dirty="0" err="1" smtClean="0"/>
-              <a:t>AppBase</a:t>
-            </a:r>
-            <a:r>
-              <a:rPr lang="en-US" dirty="0" smtClean="0"/>
-              <a:t>\privatePath2\AsmName.dll</a:t>
-            </a:r>
-            <a:endParaRPr lang="en-US" dirty="0"/>
-          </a:p>
-          <a:p>
-            <a:r>
-              <a:rPr lang="en-US" dirty="0" err="1" smtClean="0"/>
-              <a:t>AppBase</a:t>
-            </a:r>
-            <a:r>
-              <a:rPr lang="en-US" dirty="0" smtClean="0"/>
-              <a:t>\privatePath2\</a:t>
-            </a:r>
-            <a:r>
-              <a:rPr lang="en-US" dirty="0" err="1" smtClean="0"/>
-              <a:t>AsmName</a:t>
-            </a:r>
-            <a:r>
-              <a:rPr lang="en-US" dirty="0" smtClean="0"/>
-              <a:t>\AsmName.dll</a:t>
-            </a:r>
-          </a:p>
-          <a:p>
-            <a:endParaRPr lang="en-US" dirty="0" smtClean="0"/>
-          </a:p>
-          <a:p>
-            <a:r>
-              <a:rPr lang="en-US" dirty="0" err="1" smtClean="0"/>
-              <a:t>AppBase</a:t>
-            </a:r>
-            <a:r>
-              <a:rPr lang="en-US" dirty="0" smtClean="0"/>
-              <a:t>\en-US\AsmName.dll</a:t>
-            </a:r>
-            <a:endParaRPr lang="en-US" dirty="0"/>
-          </a:p>
-          <a:p>
-            <a:r>
-              <a:rPr lang="en-US" dirty="0" err="1" smtClean="0"/>
-              <a:t>AppBase</a:t>
-            </a:r>
-            <a:r>
-              <a:rPr lang="en-US" dirty="0" smtClean="0"/>
-              <a:t>\</a:t>
-            </a:r>
-            <a:r>
-              <a:rPr lang="en-US" dirty="0"/>
-              <a:t>en-US\</a:t>
-            </a:r>
-            <a:r>
-              <a:rPr lang="en-US" dirty="0" err="1" smtClean="0"/>
-              <a:t>AsmName</a:t>
-            </a:r>
-            <a:r>
-              <a:rPr lang="en-US" dirty="0" smtClean="0"/>
-              <a:t>\AsmName.dll</a:t>
-            </a:r>
-            <a:endParaRPr lang="en-US" dirty="0"/>
-          </a:p>
-          <a:p>
-            <a:r>
-              <a:rPr lang="en-US" dirty="0" err="1" smtClean="0"/>
-              <a:t>AppBase</a:t>
-            </a:r>
-            <a:r>
-              <a:rPr lang="en-US" dirty="0" smtClean="0"/>
-              <a:t>\</a:t>
-            </a:r>
-            <a:r>
-              <a:rPr lang="en-US" dirty="0"/>
-              <a:t>en-US\</a:t>
-            </a:r>
-            <a:r>
-              <a:rPr lang="en-US" dirty="0" smtClean="0"/>
-              <a:t>privatePath1\</a:t>
-            </a:r>
-            <a:r>
-              <a:rPr lang="en-US" dirty="0" err="1" smtClean="0"/>
-              <a:t>AsmName</a:t>
-            </a:r>
-            <a:r>
-              <a:rPr lang="en-US" dirty="0"/>
-              <a:t>. </a:t>
-            </a:r>
-            <a:r>
-              <a:rPr lang="en-US" dirty="0" err="1"/>
-              <a:t>dll</a:t>
-            </a:r>
-            <a:endParaRPr lang="en-US" dirty="0"/>
-          </a:p>
-          <a:p>
-            <a:r>
-              <a:rPr lang="en-US" dirty="0" err="1" smtClean="0"/>
-              <a:t>AppBase</a:t>
-            </a:r>
-            <a:r>
-              <a:rPr lang="en-US" dirty="0" smtClean="0"/>
-              <a:t>\</a:t>
-            </a:r>
-            <a:r>
-              <a:rPr lang="en-US" dirty="0"/>
-              <a:t>en-US\</a:t>
-            </a:r>
-            <a:r>
-              <a:rPr lang="en-US" dirty="0" smtClean="0"/>
-              <a:t>privatePath1\</a:t>
-            </a:r>
-            <a:r>
-              <a:rPr lang="en-US" dirty="0" err="1" smtClean="0"/>
-              <a:t>AsmName</a:t>
-            </a:r>
-            <a:r>
-              <a:rPr lang="en-US" dirty="0" smtClean="0"/>
-              <a:t>\AsmName.dll</a:t>
-            </a:r>
-            <a:endParaRPr lang="en-US" dirty="0"/>
-          </a:p>
-          <a:p>
-            <a:r>
-              <a:rPr lang="en-US" dirty="0" err="1" smtClean="0"/>
-              <a:t>AppBase</a:t>
-            </a:r>
-            <a:r>
-              <a:rPr lang="en-US" dirty="0" smtClean="0"/>
-              <a:t>\</a:t>
-            </a:r>
-            <a:r>
-              <a:rPr lang="en-US" dirty="0"/>
-              <a:t>en-US\</a:t>
-            </a:r>
-            <a:r>
-              <a:rPr lang="en-US" dirty="0" smtClean="0"/>
-              <a:t>privatePath2\AsmName.dll</a:t>
-            </a:r>
-            <a:endParaRPr lang="en-US" dirty="0"/>
-          </a:p>
-          <a:p>
-            <a:r>
-              <a:rPr lang="en-US" dirty="0" err="1" smtClean="0"/>
-              <a:t>AppBase</a:t>
-            </a:r>
-            <a:r>
-              <a:rPr lang="en-US" dirty="0" smtClean="0"/>
-              <a:t>\</a:t>
-            </a:r>
-            <a:r>
-              <a:rPr lang="en-US" dirty="0"/>
-              <a:t>en-US\</a:t>
-            </a:r>
-            <a:r>
-              <a:rPr lang="en-US" dirty="0" smtClean="0"/>
-              <a:t>privatePath2\</a:t>
-            </a:r>
-            <a:r>
-              <a:rPr lang="en-US" dirty="0" err="1" smtClean="0"/>
-              <a:t>AsmName</a:t>
-            </a:r>
-            <a:r>
-              <a:rPr lang="en-US" dirty="0" smtClean="0"/>
-              <a:t>\</a:t>
-            </a:r>
-            <a:r>
-              <a:rPr lang="en-US" dirty="0" err="1" smtClean="0"/>
-              <a:t>AsmName</a:t>
-            </a:r>
-            <a:r>
-              <a:rPr lang="en-US" dirty="0"/>
-              <a:t>.</a:t>
-            </a:r>
-            <a:endParaRPr lang="en-US" dirty="0" smtClean="0"/>
-          </a:p>
-          <a:p>
+              <a:rPr lang="ru-RU" dirty="0" smtClean="0"/>
+              <a:t>Закрытое</a:t>
+            </a:r>
+          </a:p>
+          <a:p>
+            <a:r>
+              <a:rPr lang="ru-RU" dirty="0" smtClean="0"/>
+              <a:t>Совместное</a:t>
+            </a:r>
             <a:endParaRPr lang="ru-RU" dirty="0"/>
           </a:p>
         </p:txBody>
@@ -9120,7 +8971,7 @@
     </p:spTree>
     <p:extLst>
       <p:ext uri="{BB962C8B-B14F-4D97-AF65-F5344CB8AC3E}">
-        <p14:creationId xmlns:p14="http://schemas.microsoft.com/office/powerpoint/2010/main" val="426700887"/>
+        <p14:creationId xmlns:p14="http://schemas.microsoft.com/office/powerpoint/2010/main" val="3786467353"/>
       </p:ext>
     </p:extLst>
   </p:cSld>
@@ -9166,12 +9017,25 @@
         </p:nvSpPr>
         <p:spPr/>
         <p:txBody>
-          <a:bodyPr/>
+          <a:bodyPr>
+            <a:normAutofit fontScale="90000"/>
+          </a:bodyPr>
           <a:lstStyle/>
           <a:p>
             <a:r>
-              <a:rPr lang="en-US" dirty="0" err="1" smtClean="0"/>
-              <a:t>App.config</a:t>
+              <a:rPr lang="ru-RU" dirty="0"/>
+              <a:t>Поиск </a:t>
+            </a:r>
+            <a:r>
+              <a:rPr lang="ru-RU" dirty="0" smtClean="0"/>
+              <a:t>сборки</a:t>
+            </a:r>
+            <a:br>
+              <a:rPr lang="ru-RU" dirty="0" smtClean="0"/>
+            </a:br>
+            <a:r>
+              <a:rPr lang="ru-RU" dirty="0" smtClean="0"/>
+              <a:t>Закрытое развертывание</a:t>
             </a:r>
             <a:endParaRPr lang="ru-RU" dirty="0"/>
           </a:p>
@@ -9187,320 +9051,270 @@
             <p:ph idx="1"/>
           </p:nvPr>
         </p:nvSpPr>
-        <p:spPr>
-          <a:xfrm>
-            <a:off x="457200" y="1600201"/>
-            <a:ext cx="8229600" cy="2332856"/>
-          </a:xfrm>
-        </p:spPr>
+        <p:spPr/>
         <p:txBody>
           <a:bodyPr>
-            <a:normAutofit/>
+            <a:normAutofit fontScale="70000" lnSpcReduction="20000"/>
           </a:bodyPr>
           <a:lstStyle/>
           <a:p>
-            <a:pPr marL="0" indent="0">
-              <a:buNone/>
-            </a:pPr>
-            <a:r>
-              <a:rPr lang="en-US" sz="1400" dirty="0">
-                <a:latin typeface="Courier New" pitchFamily="49" charset="0"/>
-                <a:cs typeface="Courier New" pitchFamily="49" charset="0"/>
-              </a:rPr>
-              <a:t>&lt;?xml version="1.0"?&gt;</a:t>
-            </a:r>
-          </a:p>
-          <a:p>
-            <a:pPr marL="0" indent="0">
-              <a:buNone/>
-            </a:pPr>
-            <a:r>
-              <a:rPr lang="en-US" sz="1400" dirty="0" smtClean="0">
-                <a:latin typeface="Courier New" pitchFamily="49" charset="0"/>
-                <a:cs typeface="Courier New" pitchFamily="49" charset="0"/>
-              </a:rPr>
-              <a:t>&lt;</a:t>
-            </a:r>
-            <a:r>
-              <a:rPr lang="en-US" sz="1400" dirty="0">
-                <a:latin typeface="Courier New" pitchFamily="49" charset="0"/>
-                <a:cs typeface="Courier New" pitchFamily="49" charset="0"/>
-              </a:rPr>
-              <a:t>configuration&gt;</a:t>
-            </a:r>
-          </a:p>
-          <a:p>
-            <a:pPr marL="0" indent="0">
-              <a:buNone/>
-            </a:pPr>
-            <a:r>
-              <a:rPr lang="en-US" sz="1400" dirty="0" smtClean="0">
-                <a:latin typeface="Courier New" pitchFamily="49" charset="0"/>
-                <a:cs typeface="Courier New" pitchFamily="49" charset="0"/>
-              </a:rPr>
-              <a:t>    &lt;</a:t>
-            </a:r>
-            <a:r>
-              <a:rPr lang="en-US" sz="1400" dirty="0">
-                <a:latin typeface="Courier New" pitchFamily="49" charset="0"/>
-                <a:cs typeface="Courier New" pitchFamily="49" charset="0"/>
-              </a:rPr>
-              <a:t>runtime&gt;</a:t>
-            </a:r>
-          </a:p>
-          <a:p>
-            <a:pPr marL="0" indent="0">
-              <a:buNone/>
-            </a:pPr>
-            <a:r>
-              <a:rPr lang="en-US" sz="1400" dirty="0" smtClean="0">
-                <a:latin typeface="Courier New" pitchFamily="49" charset="0"/>
-                <a:cs typeface="Courier New" pitchFamily="49" charset="0"/>
-              </a:rPr>
-              <a:t>        &lt;</a:t>
-            </a:r>
-            <a:r>
-              <a:rPr lang="en-US" sz="1400" dirty="0" err="1">
-                <a:latin typeface="Courier New" pitchFamily="49" charset="0"/>
-                <a:cs typeface="Courier New" pitchFamily="49" charset="0"/>
-              </a:rPr>
-              <a:t>assemblyBinding</a:t>
-            </a:r>
-            <a:r>
-              <a:rPr lang="en-US" sz="1400" dirty="0">
-                <a:latin typeface="Courier New" pitchFamily="49" charset="0"/>
-                <a:cs typeface="Courier New" pitchFamily="49" charset="0"/>
-              </a:rPr>
-              <a:t> </a:t>
-            </a:r>
-            <a:r>
-              <a:rPr lang="en-US" sz="1400" dirty="0" err="1">
-                <a:latin typeface="Courier New" pitchFamily="49" charset="0"/>
-                <a:cs typeface="Courier New" pitchFamily="49" charset="0"/>
-              </a:rPr>
-              <a:t>xmlns</a:t>
-            </a:r>
-            <a:r>
-              <a:rPr lang="en-US" sz="1400" dirty="0">
-                <a:latin typeface="Courier New" pitchFamily="49" charset="0"/>
-                <a:cs typeface="Courier New" pitchFamily="49" charset="0"/>
-              </a:rPr>
-              <a:t>="urn:schemas-microsoft-com:asm.v1"&gt;</a:t>
-            </a:r>
-          </a:p>
-          <a:p>
-            <a:pPr marL="0" indent="0">
-              <a:buNone/>
-            </a:pPr>
-            <a:r>
-              <a:rPr lang="en-US" sz="1400" dirty="0" smtClean="0">
-                <a:latin typeface="Courier New" pitchFamily="49" charset="0"/>
-                <a:cs typeface="Courier New" pitchFamily="49" charset="0"/>
-              </a:rPr>
-              <a:t>            </a:t>
-            </a:r>
-            <a:r>
-              <a:rPr lang="en-US" sz="1600" dirty="0" smtClean="0">
-                <a:solidFill>
-                  <a:srgbClr val="92D050"/>
-                </a:solidFill>
-                <a:latin typeface="Courier New" pitchFamily="49" charset="0"/>
-                <a:cs typeface="Courier New" pitchFamily="49" charset="0"/>
-              </a:rPr>
-              <a:t>&lt;</a:t>
-            </a:r>
-            <a:r>
-              <a:rPr lang="en-US" sz="1600" dirty="0">
-                <a:solidFill>
-                  <a:srgbClr val="92D050"/>
-                </a:solidFill>
-                <a:latin typeface="Courier New" pitchFamily="49" charset="0"/>
-                <a:cs typeface="Courier New" pitchFamily="49" charset="0"/>
-              </a:rPr>
-              <a:t>probing </a:t>
-            </a:r>
-            <a:r>
-              <a:rPr lang="en-US" sz="1600" dirty="0" err="1">
-                <a:solidFill>
-                  <a:srgbClr val="92D050"/>
-                </a:solidFill>
-                <a:latin typeface="Courier New" pitchFamily="49" charset="0"/>
-                <a:cs typeface="Courier New" pitchFamily="49" charset="0"/>
-              </a:rPr>
-              <a:t>privatePath</a:t>
-            </a:r>
-            <a:r>
-              <a:rPr lang="en-US" sz="1600" dirty="0">
-                <a:solidFill>
-                  <a:srgbClr val="92D050"/>
-                </a:solidFill>
-                <a:latin typeface="Courier New" pitchFamily="49" charset="0"/>
-                <a:cs typeface="Courier New" pitchFamily="49" charset="0"/>
-              </a:rPr>
-              <a:t>="privatePath1;privatePath2"/&gt;</a:t>
-            </a:r>
-          </a:p>
-          <a:p>
-            <a:pPr marL="0" indent="0">
-              <a:buNone/>
-            </a:pPr>
-            <a:r>
-              <a:rPr lang="en-US" sz="1400" dirty="0" smtClean="0">
-                <a:latin typeface="Courier New" pitchFamily="49" charset="0"/>
-                <a:cs typeface="Courier New" pitchFamily="49" charset="0"/>
-              </a:rPr>
-              <a:t>        &lt;/</a:t>
-            </a:r>
-            <a:r>
-              <a:rPr lang="en-US" sz="1400" dirty="0" err="1">
-                <a:latin typeface="Courier New" pitchFamily="49" charset="0"/>
-                <a:cs typeface="Courier New" pitchFamily="49" charset="0"/>
-              </a:rPr>
-              <a:t>assemblyBinding</a:t>
-            </a:r>
-            <a:r>
-              <a:rPr lang="en-US" sz="1400" dirty="0">
-                <a:latin typeface="Courier New" pitchFamily="49" charset="0"/>
-                <a:cs typeface="Courier New" pitchFamily="49" charset="0"/>
-              </a:rPr>
-              <a:t>&gt;</a:t>
-            </a:r>
-          </a:p>
-          <a:p>
-            <a:pPr marL="0" indent="0">
-              <a:buNone/>
-            </a:pPr>
-            <a:r>
-              <a:rPr lang="en-US" sz="1400" dirty="0" smtClean="0">
-                <a:latin typeface="Courier New" pitchFamily="49" charset="0"/>
-                <a:cs typeface="Courier New" pitchFamily="49" charset="0"/>
-              </a:rPr>
-              <a:t>    &lt;/</a:t>
-            </a:r>
-            <a:r>
-              <a:rPr lang="en-US" sz="1400" dirty="0">
-                <a:latin typeface="Courier New" pitchFamily="49" charset="0"/>
-                <a:cs typeface="Courier New" pitchFamily="49" charset="0"/>
-              </a:rPr>
-              <a:t>runtime&gt;</a:t>
-            </a:r>
-          </a:p>
-          <a:p>
-            <a:pPr marL="0" indent="0">
-              <a:buNone/>
-            </a:pPr>
-            <a:r>
-              <a:rPr lang="en-US" sz="1400" dirty="0">
-                <a:latin typeface="Courier New" pitchFamily="49" charset="0"/>
-                <a:cs typeface="Courier New" pitchFamily="49" charset="0"/>
-              </a:rPr>
-              <a:t>&lt;/configuration&gt;</a:t>
-            </a:r>
-          </a:p>
-          <a:p>
-            <a:pPr marL="0" indent="0">
-              <a:buNone/>
-            </a:pPr>
-            <a:endParaRPr lang="ru-RU" sz="1400" dirty="0"/>
-          </a:p>
-        </p:txBody>
-      </p:sp>
-      <p:sp>
-        <p:nvSpPr>
-          <p:cNvPr id="4" name="Title 1"/>
-          <p:cNvSpPr txBox="1">
-            <a:spLocks/>
-          </p:cNvSpPr>
-          <p:nvPr/>
-        </p:nvSpPr>
-        <p:spPr>
-          <a:xfrm>
-            <a:off x="457200" y="3798168"/>
-            <a:ext cx="8229600" cy="1143000"/>
-          </a:xfrm>
-          <a:prstGeom prst="rect">
-            <a:avLst/>
-          </a:prstGeom>
-        </p:spPr>
-        <p:txBody>
-          <a:bodyPr vert="horz" lIns="91440" tIns="45720" rIns="91440" bIns="45720" rtlCol="0" anchor="ctr">
-            <a:normAutofit/>
-          </a:bodyPr>
-          <a:lstStyle>
-            <a:lvl1pPr algn="ctr" defTabSz="914400" rtl="0" eaLnBrk="1" latinLnBrk="0" hangingPunct="1">
-              <a:spcBef>
-                <a:spcPct val="0"/>
-              </a:spcBef>
-              <a:buNone/>
-              <a:defRPr sz="4400" kern="1200">
-                <a:solidFill>
-                  <a:schemeClr val="tx1"/>
-                </a:solidFill>
-                <a:latin typeface="+mj-lt"/>
-                <a:ea typeface="+mj-ea"/>
-                <a:cs typeface="+mj-cs"/>
-              </a:defRPr>
-            </a:lvl1pPr>
-          </a:lstStyle>
-          <a:p>
             <a:r>
               <a:rPr lang="en-US" dirty="0" err="1" smtClean="0"/>
-              <a:t>Machine.config</a:t>
-            </a:r>
+              <a:t>AppBase</a:t>
+            </a:r>
+            <a:r>
+              <a:rPr lang="en-US" dirty="0" smtClean="0"/>
+              <a:t>\AsmName.dll</a:t>
+            </a:r>
+          </a:p>
+          <a:p>
+            <a:r>
+              <a:rPr lang="en-US" dirty="0" err="1" smtClean="0"/>
+              <a:t>AppBase</a:t>
+            </a:r>
+            <a:r>
+              <a:rPr lang="en-US" dirty="0" smtClean="0"/>
+              <a:t>\</a:t>
+            </a:r>
+            <a:r>
+              <a:rPr lang="en-US" dirty="0" err="1" smtClean="0"/>
+              <a:t>AsmName</a:t>
+            </a:r>
+            <a:r>
+              <a:rPr lang="en-US" dirty="0" smtClean="0"/>
+              <a:t>\AsmName.dll</a:t>
+            </a:r>
+            <a:endParaRPr lang="en-US" dirty="0"/>
+          </a:p>
+          <a:p>
+            <a:r>
+              <a:rPr lang="en-US" dirty="0" err="1" smtClean="0"/>
+              <a:t>AppBase</a:t>
+            </a:r>
+            <a:r>
+              <a:rPr lang="en-US" dirty="0" smtClean="0"/>
+              <a:t>\privatePath1\</a:t>
+            </a:r>
+            <a:r>
+              <a:rPr lang="en-US" dirty="0" err="1" smtClean="0"/>
+              <a:t>AsmName</a:t>
+            </a:r>
+            <a:r>
+              <a:rPr lang="en-US" dirty="0" smtClean="0"/>
+              <a:t>. </a:t>
+            </a:r>
+            <a:r>
+              <a:rPr lang="en-US" dirty="0" err="1"/>
+              <a:t>dll</a:t>
+            </a:r>
+            <a:endParaRPr lang="en-US" dirty="0"/>
+          </a:p>
+          <a:p>
+            <a:r>
+              <a:rPr lang="en-US" dirty="0" err="1" smtClean="0"/>
+              <a:t>AppBase</a:t>
+            </a:r>
+            <a:r>
+              <a:rPr lang="en-US" dirty="0" smtClean="0"/>
+              <a:t>\privatePath1\</a:t>
+            </a:r>
+            <a:r>
+              <a:rPr lang="en-US" dirty="0" err="1" smtClean="0"/>
+              <a:t>AsmName</a:t>
+            </a:r>
+            <a:r>
+              <a:rPr lang="en-US" dirty="0" smtClean="0"/>
+              <a:t>\AsmName.dll</a:t>
+            </a:r>
+            <a:endParaRPr lang="en-US" dirty="0"/>
+          </a:p>
+          <a:p>
+            <a:r>
+              <a:rPr lang="en-US" dirty="0" err="1" smtClean="0"/>
+              <a:t>AppBase</a:t>
+            </a:r>
+            <a:r>
+              <a:rPr lang="en-US" dirty="0" smtClean="0"/>
+              <a:t>\privatePath2\AsmName.dll</a:t>
+            </a:r>
+            <a:endParaRPr lang="en-US" dirty="0"/>
+          </a:p>
+          <a:p>
+            <a:r>
+              <a:rPr lang="en-US" dirty="0" err="1" smtClean="0"/>
+              <a:t>AppBase</a:t>
+            </a:r>
+            <a:r>
+              <a:rPr lang="en-US" dirty="0" smtClean="0"/>
+              <a:t>\privatePath2\</a:t>
+            </a:r>
+            <a:r>
+              <a:rPr lang="en-US" dirty="0" err="1" smtClean="0"/>
+              <a:t>AsmName</a:t>
+            </a:r>
+            <a:r>
+              <a:rPr lang="en-US" dirty="0" smtClean="0"/>
+              <a:t>\AsmName.dll</a:t>
+            </a:r>
+          </a:p>
+          <a:p>
+            <a:endParaRPr lang="en-US" dirty="0" smtClean="0"/>
+          </a:p>
+          <a:p>
+            <a:r>
+              <a:rPr lang="en-US" dirty="0" err="1" smtClean="0"/>
+              <a:t>AppBase</a:t>
+            </a:r>
+            <a:r>
+              <a:rPr lang="en-US" dirty="0" smtClean="0"/>
+              <a:t>\en-US\AsmName.dll</a:t>
+            </a:r>
+            <a:endParaRPr lang="en-US" dirty="0"/>
+          </a:p>
+          <a:p>
+            <a:r>
+              <a:rPr lang="en-US" dirty="0" err="1" smtClean="0"/>
+              <a:t>AppBase</a:t>
+            </a:r>
+            <a:r>
+              <a:rPr lang="en-US" dirty="0" smtClean="0"/>
+              <a:t>\</a:t>
+            </a:r>
+            <a:r>
+              <a:rPr lang="en-US" dirty="0"/>
+              <a:t>en-US\</a:t>
+            </a:r>
+            <a:r>
+              <a:rPr lang="en-US" dirty="0" err="1" smtClean="0"/>
+              <a:t>AsmName</a:t>
+            </a:r>
+            <a:r>
+              <a:rPr lang="en-US" dirty="0" smtClean="0"/>
+              <a:t>\AsmName.dll</a:t>
+            </a:r>
+            <a:endParaRPr lang="en-US" dirty="0"/>
+          </a:p>
+          <a:p>
+            <a:r>
+              <a:rPr lang="en-US" dirty="0" err="1" smtClean="0"/>
+              <a:t>AppBase</a:t>
+            </a:r>
+            <a:r>
+              <a:rPr lang="en-US" dirty="0" smtClean="0"/>
+              <a:t>\</a:t>
+            </a:r>
+            <a:r>
+              <a:rPr lang="en-US" dirty="0"/>
+              <a:t>en-US\</a:t>
+            </a:r>
+            <a:r>
+              <a:rPr lang="en-US" dirty="0" smtClean="0"/>
+              <a:t>privatePath1\</a:t>
+            </a:r>
+            <a:r>
+              <a:rPr lang="en-US" dirty="0" err="1" smtClean="0"/>
+              <a:t>AsmName</a:t>
+            </a:r>
+            <a:r>
+              <a:rPr lang="en-US" dirty="0"/>
+              <a:t>. </a:t>
+            </a:r>
+            <a:r>
+              <a:rPr lang="en-US" dirty="0" err="1"/>
+              <a:t>dll</a:t>
+            </a:r>
+            <a:endParaRPr lang="en-US" dirty="0"/>
+          </a:p>
+          <a:p>
+            <a:r>
+              <a:rPr lang="en-US" dirty="0" err="1" smtClean="0"/>
+              <a:t>AppBase</a:t>
+            </a:r>
+            <a:r>
+              <a:rPr lang="en-US" dirty="0" smtClean="0"/>
+              <a:t>\</a:t>
+            </a:r>
+            <a:r>
+              <a:rPr lang="en-US" dirty="0"/>
+              <a:t>en-US\</a:t>
+            </a:r>
+            <a:r>
+              <a:rPr lang="en-US" dirty="0" smtClean="0"/>
+              <a:t>privatePath1\</a:t>
+            </a:r>
+            <a:r>
+              <a:rPr lang="en-US" dirty="0" err="1" smtClean="0"/>
+              <a:t>AsmName</a:t>
+            </a:r>
+            <a:r>
+              <a:rPr lang="en-US" dirty="0" smtClean="0"/>
+              <a:t>\AsmName.dll</a:t>
+            </a:r>
+            <a:endParaRPr lang="en-US" dirty="0"/>
+          </a:p>
+          <a:p>
+            <a:r>
+              <a:rPr lang="en-US" dirty="0" err="1" smtClean="0"/>
+              <a:t>AppBase</a:t>
+            </a:r>
+            <a:r>
+              <a:rPr lang="en-US" dirty="0" smtClean="0"/>
+              <a:t>\</a:t>
+            </a:r>
+            <a:r>
+              <a:rPr lang="en-US" dirty="0"/>
+              <a:t>en-US\</a:t>
+            </a:r>
+            <a:r>
+              <a:rPr lang="en-US" dirty="0" smtClean="0"/>
+              <a:t>privatePath2\AsmName.dll</a:t>
+            </a:r>
+            <a:endParaRPr lang="en-US" dirty="0"/>
+          </a:p>
+          <a:p>
+            <a:r>
+              <a:rPr lang="en-US" dirty="0" err="1" smtClean="0"/>
+              <a:t>AppBase</a:t>
+            </a:r>
+            <a:r>
+              <a:rPr lang="en-US" dirty="0" smtClean="0"/>
+              <a:t>\</a:t>
+            </a:r>
+            <a:r>
+              <a:rPr lang="en-US" dirty="0"/>
+              <a:t>en-US\</a:t>
+            </a:r>
+            <a:r>
+              <a:rPr lang="en-US" dirty="0" smtClean="0"/>
+              <a:t>privatePath2\</a:t>
+            </a:r>
+            <a:r>
+              <a:rPr lang="en-US" dirty="0" err="1" smtClean="0"/>
+              <a:t>AsmName</a:t>
+            </a:r>
+            <a:r>
+              <a:rPr lang="en-US" dirty="0" smtClean="0"/>
+              <a:t>\</a:t>
+            </a:r>
+            <a:r>
+              <a:rPr lang="en-US" dirty="0" err="1" smtClean="0"/>
+              <a:t>AsmName</a:t>
+            </a:r>
+            <a:r>
+              <a:rPr lang="en-US" dirty="0"/>
+              <a:t>.</a:t>
+            </a:r>
+            <a:endParaRPr lang="en-US" dirty="0" smtClean="0"/>
+          </a:p>
+          <a:p>
             <a:endParaRPr lang="ru-RU" dirty="0"/>
-          </a:p>
-        </p:txBody>
-      </p:sp>
-      <p:sp>
-        <p:nvSpPr>
-          <p:cNvPr id="5" name="TextBox 4"/>
-          <p:cNvSpPr txBox="1"/>
-          <p:nvPr/>
-        </p:nvSpPr>
-        <p:spPr>
-          <a:xfrm>
-            <a:off x="457200" y="5085184"/>
-            <a:ext cx="8229600" cy="523220"/>
-          </a:xfrm>
-          <a:prstGeom prst="rect">
-            <a:avLst/>
-          </a:prstGeom>
-          <a:noFill/>
-        </p:spPr>
-        <p:txBody>
-          <a:bodyPr wrap="square" rtlCol="0">
-            <a:spAutoFit/>
-          </a:bodyPr>
-          <a:lstStyle/>
-          <a:p>
-            <a:r>
-              <a:rPr lang="ru-RU" sz="2800" dirty="0" smtClean="0"/>
-              <a:t>%</a:t>
-            </a:r>
-            <a:r>
-              <a:rPr lang="en-US" sz="2800" dirty="0" err="1" smtClean="0"/>
-              <a:t>windir</a:t>
-            </a:r>
-            <a:r>
-              <a:rPr lang="en-US" sz="2800" dirty="0" smtClean="0"/>
-              <a:t>%\Microsoft.NET\Framework\</a:t>
-            </a:r>
-            <a:r>
-              <a:rPr lang="en-US" sz="2800" dirty="0" err="1" smtClean="0"/>
-              <a:t>x.y.z</a:t>
-            </a:r>
-            <a:r>
-              <a:rPr lang="en-US" sz="2800" dirty="0" smtClean="0"/>
-              <a:t>\CONFIG</a:t>
-            </a:r>
-            <a:endParaRPr lang="ru-RU" sz="2800" dirty="0" smtClean="0"/>
           </a:p>
         </p:txBody>
       </p:sp>
     </p:spTree>
     <p:extLst>
       <p:ext uri="{BB962C8B-B14F-4D97-AF65-F5344CB8AC3E}">
-        <p14:creationId xmlns:p14="http://schemas.microsoft.com/office/powerpoint/2010/main" val="4163857979"/>
+        <p14:creationId xmlns:p14="http://schemas.microsoft.com/office/powerpoint/2010/main" val="426700887"/>
       </p:ext>
     </p:extLst>
   </p:cSld>
@@ -9546,14 +9360,12 @@
         </p:nvSpPr>
         <p:spPr/>
         <p:txBody>
-          <a:bodyPr>
-            <a:normAutofit fontScale="90000"/>
-          </a:bodyPr>
+          <a:bodyPr/>
           <a:lstStyle/>
           <a:p>
             <a:r>
-              <a:rPr lang="en-US" dirty="0"/>
-              <a:t>Fuslogvw.exe (Assembly Binding Log Viewer)</a:t>
+              <a:rPr lang="en-US" dirty="0" err="1" smtClean="0"/>
+              <a:t>App.config</a:t>
             </a:r>
             <a:endParaRPr lang="ru-RU" dirty="0"/>
           </a:p>
@@ -9569,10 +9381,15 @@
             <p:ph idx="1"/>
           </p:nvPr>
         </p:nvSpPr>
-        <p:spPr/>
+        <p:spPr>
+          <a:xfrm>
+            <a:off x="457200" y="1600201"/>
+            <a:ext cx="8229600" cy="2332856"/>
+          </a:xfrm>
+        </p:spPr>
         <p:txBody>
           <a:bodyPr>
-            <a:normAutofit fontScale="92500" lnSpcReduction="20000"/>
+            <a:normAutofit/>
           </a:bodyPr>
           <a:lstStyle/>
           <a:p>
@@ -9580,99 +9397,304 @@
               <a:buNone/>
             </a:pPr>
             <a:r>
-              <a:rPr lang="ru-RU" dirty="0" smtClean="0"/>
-              <a:t>Диагностика проблем с загрузкой сборок. </a:t>
-            </a:r>
-            <a:r>
-              <a:rPr lang="ru-RU" smtClean="0"/>
-              <a:t>Является частью </a:t>
-            </a:r>
-            <a:r>
-              <a:rPr lang="en-US" dirty="0" smtClean="0"/>
-              <a:t>Windows SDK</a:t>
-            </a:r>
-            <a:r>
-              <a:rPr lang="ru-RU" dirty="0" smtClean="0"/>
-              <a:t>.</a:t>
+              <a:rPr lang="en-US" sz="1400" dirty="0">
+                <a:latin typeface="Courier New" pitchFamily="49" charset="0"/>
+                <a:cs typeface="Courier New" pitchFamily="49" charset="0"/>
+              </a:rPr>
+              <a:t>&lt;?xml version="1.0"?&gt;</a:t>
             </a:r>
           </a:p>
           <a:p>
             <a:pPr marL="0" indent="0">
               <a:buNone/>
             </a:pPr>
-            <a:endParaRPr lang="ru-RU" dirty="0" smtClean="0"/>
-          </a:p>
-          <a:p>
-            <a:r>
-              <a:rPr lang="en-US" dirty="0" smtClean="0"/>
-              <a:t>HKLM\Software\Microsoft\Fusion</a:t>
-            </a:r>
-            <a:endParaRPr lang="ru-RU" dirty="0" smtClean="0"/>
-          </a:p>
-          <a:p>
-            <a:pPr lvl="1"/>
-            <a:r>
-              <a:rPr lang="en-US" dirty="0" err="1"/>
-              <a:t>ForceLog</a:t>
-            </a:r>
-            <a:r>
-              <a:rPr lang="en-US" dirty="0"/>
-              <a:t> </a:t>
-            </a:r>
-            <a:r>
-              <a:rPr lang="ru-RU" dirty="0" smtClean="0"/>
-              <a:t>= 1</a:t>
-            </a:r>
-          </a:p>
-          <a:p>
-            <a:pPr lvl="1"/>
-            <a:r>
-              <a:rPr lang="en-US" dirty="0" err="1" smtClean="0"/>
-              <a:t>LogPath</a:t>
-            </a:r>
-            <a:r>
-              <a:rPr lang="ru-RU" dirty="0" smtClean="0"/>
-              <a:t> – путь к существующей папке для протоколирования</a:t>
+            <a:r>
+              <a:rPr lang="en-US" sz="1400" dirty="0" smtClean="0">
+                <a:latin typeface="Courier New" pitchFamily="49" charset="0"/>
+                <a:cs typeface="Courier New" pitchFamily="49" charset="0"/>
+              </a:rPr>
+              <a:t>&lt;</a:t>
+            </a:r>
+            <a:r>
+              <a:rPr lang="en-US" sz="1400" dirty="0">
+                <a:latin typeface="Courier New" pitchFamily="49" charset="0"/>
+                <a:cs typeface="Courier New" pitchFamily="49" charset="0"/>
+              </a:rPr>
+              <a:t>configuration&gt;</a:t>
             </a:r>
           </a:p>
           <a:p>
             <a:pPr marL="0" indent="0">
               <a:buNone/>
             </a:pPr>
-            <a:endParaRPr lang="ru-RU" dirty="0" smtClean="0">
-              <a:hlinkClick r:id="rId2"/>
-            </a:endParaRPr>
+            <a:r>
+              <a:rPr lang="en-US" sz="1400" dirty="0" smtClean="0">
+                <a:latin typeface="Courier New" pitchFamily="49" charset="0"/>
+                <a:cs typeface="Courier New" pitchFamily="49" charset="0"/>
+              </a:rPr>
+              <a:t>    &lt;</a:t>
+            </a:r>
+            <a:r>
+              <a:rPr lang="en-US" sz="1400" dirty="0">
+                <a:latin typeface="Courier New" pitchFamily="49" charset="0"/>
+                <a:cs typeface="Courier New" pitchFamily="49" charset="0"/>
+              </a:rPr>
+              <a:t>runtime&gt;</a:t>
+            </a:r>
           </a:p>
           <a:p>
             <a:pPr marL="0" indent="0">
               <a:buNone/>
             </a:pPr>
             <a:r>
-              <a:rPr lang="en-US" dirty="0" smtClean="0">
-                <a:hlinkClick r:id="rId2"/>
-              </a:rPr>
-              <a:t>http</a:t>
-            </a:r>
-            <a:r>
-              <a:rPr lang="en-US" dirty="0">
-                <a:hlinkClick r:id="rId2"/>
-              </a:rPr>
-              <a:t>://</a:t>
-            </a:r>
-            <a:r>
-              <a:rPr lang="en-US" dirty="0" smtClean="0">
-                <a:hlinkClick r:id="rId2"/>
-              </a:rPr>
-              <a:t>msdn.microsoft.com/en-us/library/e74a18c4%28v=vs.110%29.aspx</a:t>
+              <a:rPr lang="en-US" sz="1400" dirty="0" smtClean="0">
+                <a:latin typeface="Courier New" pitchFamily="49" charset="0"/>
+                <a:cs typeface="Courier New" pitchFamily="49" charset="0"/>
+              </a:rPr>
+              <a:t>        &lt;</a:t>
+            </a:r>
+            <a:r>
+              <a:rPr lang="en-US" sz="1400" dirty="0" err="1">
+                <a:latin typeface="Courier New" pitchFamily="49" charset="0"/>
+                <a:cs typeface="Courier New" pitchFamily="49" charset="0"/>
+              </a:rPr>
+              <a:t>assemblyBinding</a:t>
+            </a:r>
+            <a:r>
+              <a:rPr lang="en-US" sz="1400" dirty="0">
+                <a:latin typeface="Courier New" pitchFamily="49" charset="0"/>
+                <a:cs typeface="Courier New" pitchFamily="49" charset="0"/>
+              </a:rPr>
+              <a:t> </a:t>
+            </a:r>
+            <a:r>
+              <a:rPr lang="en-US" sz="1400" dirty="0" err="1">
+                <a:latin typeface="Courier New" pitchFamily="49" charset="0"/>
+                <a:cs typeface="Courier New" pitchFamily="49" charset="0"/>
+              </a:rPr>
+              <a:t>xmlns</a:t>
+            </a:r>
+            <a:r>
+              <a:rPr lang="en-US" sz="1400" dirty="0">
+                <a:latin typeface="Courier New" pitchFamily="49" charset="0"/>
+                <a:cs typeface="Courier New" pitchFamily="49" charset="0"/>
+              </a:rPr>
+              <a:t>="urn:schemas-microsoft-com:asm.v1"&gt;</a:t>
+            </a:r>
+          </a:p>
+          <a:p>
+            <a:pPr marL="0" indent="0">
+              <a:buNone/>
+            </a:pPr>
+            <a:r>
+              <a:rPr lang="en-US" sz="1400" dirty="0" smtClean="0">
+                <a:latin typeface="Courier New" pitchFamily="49" charset="0"/>
+                <a:cs typeface="Courier New" pitchFamily="49" charset="0"/>
+              </a:rPr>
+              <a:t>            </a:t>
+            </a:r>
+            <a:r>
+              <a:rPr lang="en-US" sz="1600" dirty="0" smtClean="0">
+                <a:solidFill>
+                  <a:srgbClr val="92D050"/>
+                </a:solidFill>
+                <a:latin typeface="Courier New" pitchFamily="49" charset="0"/>
+                <a:cs typeface="Courier New" pitchFamily="49" charset="0"/>
+              </a:rPr>
+              <a:t>&lt;</a:t>
+            </a:r>
+            <a:r>
+              <a:rPr lang="en-US" sz="1600" dirty="0">
+                <a:solidFill>
+                  <a:srgbClr val="92D050"/>
+                </a:solidFill>
+                <a:latin typeface="Courier New" pitchFamily="49" charset="0"/>
+                <a:cs typeface="Courier New" pitchFamily="49" charset="0"/>
+              </a:rPr>
+              <a:t>probing </a:t>
+            </a:r>
+            <a:r>
+              <a:rPr lang="en-US" sz="1600" dirty="0" err="1">
+                <a:solidFill>
+                  <a:srgbClr val="92D050"/>
+                </a:solidFill>
+                <a:latin typeface="Courier New" pitchFamily="49" charset="0"/>
+                <a:cs typeface="Courier New" pitchFamily="49" charset="0"/>
+              </a:rPr>
+              <a:t>privatePath</a:t>
+            </a:r>
+            <a:r>
+              <a:rPr lang="en-US" sz="1600" dirty="0">
+                <a:solidFill>
+                  <a:srgbClr val="92D050"/>
+                </a:solidFill>
+                <a:latin typeface="Courier New" pitchFamily="49" charset="0"/>
+                <a:cs typeface="Courier New" pitchFamily="49" charset="0"/>
+              </a:rPr>
+              <a:t>="privatePath1;privatePath2"/&gt;</a:t>
+            </a:r>
+          </a:p>
+          <a:p>
+            <a:pPr marL="0" indent="0">
+              <a:buNone/>
+            </a:pPr>
+            <a:r>
+              <a:rPr lang="en-US" sz="1400" dirty="0" smtClean="0">
+                <a:latin typeface="Courier New" pitchFamily="49" charset="0"/>
+                <a:cs typeface="Courier New" pitchFamily="49" charset="0"/>
+              </a:rPr>
+              <a:t>        &lt;/</a:t>
+            </a:r>
+            <a:r>
+              <a:rPr lang="en-US" sz="1400" dirty="0" err="1">
+                <a:latin typeface="Courier New" pitchFamily="49" charset="0"/>
+                <a:cs typeface="Courier New" pitchFamily="49" charset="0"/>
+              </a:rPr>
+              <a:t>assemblyBinding</a:t>
+            </a:r>
+            <a:r>
+              <a:rPr lang="en-US" sz="1400" dirty="0">
+                <a:latin typeface="Courier New" pitchFamily="49" charset="0"/>
+                <a:cs typeface="Courier New" pitchFamily="49" charset="0"/>
+              </a:rPr>
+              <a:t>&gt;</a:t>
+            </a:r>
+          </a:p>
+          <a:p>
+            <a:pPr marL="0" indent="0">
+              <a:buNone/>
+            </a:pPr>
+            <a:r>
+              <a:rPr lang="en-US" sz="1400" dirty="0" smtClean="0">
+                <a:latin typeface="Courier New" pitchFamily="49" charset="0"/>
+                <a:cs typeface="Courier New" pitchFamily="49" charset="0"/>
+              </a:rPr>
+              <a:t>    &lt;/</a:t>
+            </a:r>
+            <a:r>
+              <a:rPr lang="en-US" sz="1400" dirty="0">
+                <a:latin typeface="Courier New" pitchFamily="49" charset="0"/>
+                <a:cs typeface="Courier New" pitchFamily="49" charset="0"/>
+              </a:rPr>
+              <a:t>runtime&gt;</a:t>
+            </a:r>
+          </a:p>
+          <a:p>
+            <a:pPr marL="0" indent="0">
+              <a:buNone/>
+            </a:pPr>
+            <a:r>
+              <a:rPr lang="en-US" sz="1400" dirty="0">
+                <a:latin typeface="Courier New" pitchFamily="49" charset="0"/>
+                <a:cs typeface="Courier New" pitchFamily="49" charset="0"/>
+              </a:rPr>
+              <a:t>&lt;/configuration&gt;</a:t>
+            </a:r>
+          </a:p>
+          <a:p>
+            <a:pPr marL="0" indent="0">
+              <a:buNone/>
+            </a:pPr>
+            <a:endParaRPr lang="ru-RU" sz="1400" dirty="0"/>
+          </a:p>
+        </p:txBody>
+      </p:sp>
+      <p:sp>
+        <p:nvSpPr>
+          <p:cNvPr id="4" name="Title 1"/>
+          <p:cNvSpPr txBox="1">
+            <a:spLocks/>
+          </p:cNvSpPr>
+          <p:nvPr/>
+        </p:nvSpPr>
+        <p:spPr>
+          <a:xfrm>
+            <a:off x="457200" y="3798168"/>
+            <a:ext cx="8229600" cy="1143000"/>
+          </a:xfrm>
+          <a:prstGeom prst="rect">
+            <a:avLst/>
+          </a:prstGeom>
+        </p:spPr>
+        <p:txBody>
+          <a:bodyPr vert="horz" lIns="91440" tIns="45720" rIns="91440" bIns="45720" rtlCol="0" anchor="ctr">
+            <a:normAutofit/>
+          </a:bodyPr>
+          <a:lstStyle>
+            <a:lvl1pPr algn="ctr" defTabSz="914400" rtl="0" eaLnBrk="1" latinLnBrk="0" hangingPunct="1">
+              <a:spcBef>
+                <a:spcPct val="0"/>
+              </a:spcBef>
+              <a:buNone/>
+              <a:defRPr sz="4400" kern="1200">
+                <a:solidFill>
+                  <a:schemeClr val="tx1"/>
+                </a:solidFill>
+                <a:latin typeface="+mj-lt"/>
+                <a:ea typeface="+mj-ea"/>
+                <a:cs typeface="+mj-cs"/>
+              </a:defRPr>
+            </a:lvl1pPr>
+          </a:lstStyle>
+          <a:p>
+            <a:r>
+              <a:rPr lang="en-US" dirty="0" err="1" smtClean="0"/>
+              <a:t>Machine.config</a:t>
             </a:r>
             <a:endParaRPr lang="ru-RU" dirty="0"/>
+          </a:p>
+        </p:txBody>
+      </p:sp>
+      <p:sp>
+        <p:nvSpPr>
+          <p:cNvPr id="5" name="TextBox 4"/>
+          <p:cNvSpPr txBox="1"/>
+          <p:nvPr/>
+        </p:nvSpPr>
+        <p:spPr>
+          <a:xfrm>
+            <a:off x="457200" y="5085184"/>
+            <a:ext cx="8229600" cy="523220"/>
+          </a:xfrm>
+          <a:prstGeom prst="rect">
+            <a:avLst/>
+          </a:prstGeom>
+          <a:noFill/>
+        </p:spPr>
+        <p:txBody>
+          <a:bodyPr wrap="square" rtlCol="0">
+            <a:spAutoFit/>
+          </a:bodyPr>
+          <a:lstStyle/>
+          <a:p>
+            <a:r>
+              <a:rPr lang="ru-RU" sz="2800" dirty="0" smtClean="0"/>
+              <a:t>%</a:t>
+            </a:r>
+            <a:r>
+              <a:rPr lang="en-US" sz="2800" dirty="0" err="1" smtClean="0"/>
+              <a:t>windir</a:t>
+            </a:r>
+            <a:r>
+              <a:rPr lang="en-US" sz="2800" dirty="0" smtClean="0"/>
+              <a:t>%\Microsoft.NET\Framework\</a:t>
+            </a:r>
+            <a:r>
+              <a:rPr lang="en-US" sz="2800" dirty="0" err="1" smtClean="0"/>
+              <a:t>x.y.z</a:t>
+            </a:r>
+            <a:r>
+              <a:rPr lang="en-US" sz="2800" dirty="0" smtClean="0"/>
+              <a:t>\CONFIG</a:t>
+            </a:r>
+            <a:endParaRPr lang="ru-RU" sz="2800" dirty="0" smtClean="0"/>
           </a:p>
         </p:txBody>
       </p:sp>
     </p:spTree>
     <p:extLst>
       <p:ext uri="{BB962C8B-B14F-4D97-AF65-F5344CB8AC3E}">
-        <p14:creationId xmlns:p14="http://schemas.microsoft.com/office/powerpoint/2010/main" val="3803663968"/>
+        <p14:creationId xmlns:p14="http://schemas.microsoft.com/office/powerpoint/2010/main" val="4163857979"/>
       </p:ext>
     </p:extLst>
   </p:cSld>
@@ -9724,16 +9746,8 @@
           <a:lstStyle/>
           <a:p>
             <a:r>
-              <a:rPr lang="ru-RU" dirty="0" smtClean="0"/>
-              <a:t>Строгое имя сборки (</a:t>
-            </a:r>
-            <a:r>
-              <a:rPr lang="en-US" dirty="0" smtClean="0"/>
-              <a:t>strong name</a:t>
-            </a:r>
-            <a:r>
-              <a:rPr lang="ru-RU" dirty="0" smtClean="0"/>
-              <a:t>)</a:t>
+              <a:rPr lang="en-US" dirty="0"/>
+              <a:t>Fuslogvw.exe (Assembly Binding Log Viewer)</a:t>
             </a:r>
             <a:endParaRPr lang="ru-RU" dirty="0"/>
           </a:p>
@@ -9752,7 +9766,7 @@
         <p:spPr/>
         <p:txBody>
           <a:bodyPr>
-            <a:normAutofit fontScale="62500" lnSpcReduction="20000"/>
+            <a:normAutofit fontScale="92500" lnSpcReduction="20000"/>
           </a:bodyPr>
           <a:lstStyle/>
           <a:p>
@@ -9760,232 +9774,91 @@
               <a:buNone/>
             </a:pPr>
             <a:r>
-              <a:rPr lang="ru-RU" dirty="0" smtClean="0">
-                <a:solidFill>
-                  <a:schemeClr val="bg1"/>
-                </a:solidFill>
-              </a:rPr>
-              <a:t>Для задания строгово имени сборки необходимы четыре составляющих:</a:t>
+              <a:rPr lang="ru-RU" dirty="0" smtClean="0"/>
+              <a:t>Диагностика проблем с загрузкой сборок. </a:t>
+            </a:r>
+            <a:r>
+              <a:rPr lang="ru-RU" smtClean="0"/>
+              <a:t>Является частью </a:t>
+            </a:r>
+            <a:r>
+              <a:rPr lang="en-US" dirty="0" smtClean="0"/>
+              <a:t>Windows SDK</a:t>
+            </a:r>
+            <a:r>
+              <a:rPr lang="ru-RU" dirty="0" smtClean="0"/>
+              <a:t>.</a:t>
             </a:r>
           </a:p>
           <a:p>
             <a:pPr marL="0" indent="0">
               <a:buNone/>
             </a:pPr>
-            <a:endParaRPr lang="en-US" dirty="0" smtClean="0">
-              <a:solidFill>
-                <a:schemeClr val="bg1"/>
-              </a:solidFill>
+            <a:endParaRPr lang="ru-RU" dirty="0" smtClean="0"/>
+          </a:p>
+          <a:p>
+            <a:r>
+              <a:rPr lang="en-US" dirty="0" smtClean="0"/>
+              <a:t>HKLM\Software\Microsoft\Fusion</a:t>
+            </a:r>
+            <a:endParaRPr lang="ru-RU" dirty="0" smtClean="0"/>
+          </a:p>
+          <a:p>
+            <a:pPr lvl="1"/>
+            <a:r>
+              <a:rPr lang="en-US" dirty="0" err="1"/>
+              <a:t>ForceLog</a:t>
+            </a:r>
+            <a:r>
+              <a:rPr lang="en-US" dirty="0"/>
+              <a:t> </a:t>
+            </a:r>
+            <a:r>
+              <a:rPr lang="ru-RU" dirty="0" smtClean="0"/>
+              <a:t>= 1</a:t>
+            </a:r>
+          </a:p>
+          <a:p>
+            <a:pPr lvl="1"/>
+            <a:r>
+              <a:rPr lang="en-US" dirty="0" err="1" smtClean="0"/>
+              <a:t>LogPath</a:t>
+            </a:r>
+            <a:r>
+              <a:rPr lang="ru-RU" dirty="0" smtClean="0"/>
+              <a:t> – путь к существующей папке для протоколирования</a:t>
+            </a:r>
+          </a:p>
+          <a:p>
+            <a:pPr marL="0" indent="0">
+              <a:buNone/>
+            </a:pPr>
+            <a:endParaRPr lang="ru-RU" dirty="0" smtClean="0">
+              <a:hlinkClick r:id="rId2"/>
             </a:endParaRPr>
           </a:p>
           <a:p>
-            <a:pPr marL="514350" indent="-514350">
-              <a:buFont typeface="+mj-lt"/>
-              <a:buAutoNum type="arabicPeriod"/>
-            </a:pPr>
-            <a:r>
-              <a:rPr lang="ru-RU" dirty="0" smtClean="0">
-                <a:solidFill>
-                  <a:srgbClr val="FFFF00"/>
-                </a:solidFill>
-              </a:rPr>
-              <a:t>Имя сборки</a:t>
-            </a:r>
-            <a:endParaRPr lang="en-US" dirty="0" smtClean="0">
-              <a:solidFill>
-                <a:srgbClr val="FFFF00"/>
-              </a:solidFill>
-            </a:endParaRPr>
-          </a:p>
-          <a:p>
-            <a:pPr lvl="1"/>
-            <a:r>
-              <a:rPr lang="ru-RU" dirty="0" smtClean="0"/>
-              <a:t>Задается в свойствах проекта</a:t>
-            </a:r>
-          </a:p>
-          <a:p>
-            <a:pPr marL="514350" indent="-514350">
-              <a:buFont typeface="+mj-lt"/>
-              <a:buAutoNum type="arabicPeriod"/>
-            </a:pPr>
-            <a:r>
-              <a:rPr lang="ru-RU" dirty="0" smtClean="0">
-                <a:solidFill>
-                  <a:srgbClr val="FFFF00"/>
-                </a:solidFill>
-              </a:rPr>
-              <a:t>Номер версии сборки</a:t>
-            </a:r>
-          </a:p>
-          <a:p>
-            <a:pPr lvl="1"/>
-            <a:r>
-              <a:rPr lang="ru-RU" dirty="0" smtClean="0"/>
-              <a:t>Атрибут </a:t>
-            </a:r>
-            <a:r>
-              <a:rPr lang="en-US" dirty="0" err="1" smtClean="0"/>
-              <a:t>AssemblyVersion</a:t>
-            </a:r>
-            <a:endParaRPr lang="ru-RU" dirty="0" smtClean="0"/>
-          </a:p>
-          <a:p>
-            <a:pPr marL="514350" indent="-514350">
-              <a:buFont typeface="+mj-lt"/>
-              <a:buAutoNum type="arabicPeriod"/>
-            </a:pPr>
-            <a:r>
-              <a:rPr lang="ru-RU" dirty="0" smtClean="0">
-                <a:solidFill>
-                  <a:srgbClr val="FFFF00"/>
-                </a:solidFill>
-              </a:rPr>
-              <a:t>Культура сборки</a:t>
-            </a:r>
-          </a:p>
-          <a:p>
-            <a:pPr lvl="1"/>
-            <a:r>
-              <a:rPr lang="ru-RU" dirty="0" smtClean="0"/>
-              <a:t>Атрибут </a:t>
-            </a:r>
-            <a:r>
-              <a:rPr lang="en-US" dirty="0" err="1" smtClean="0"/>
-              <a:t>AssemblyCulture</a:t>
-            </a:r>
-            <a:endParaRPr lang="ru-RU" dirty="0" smtClean="0"/>
-          </a:p>
-          <a:p>
-            <a:pPr marL="514350" indent="-514350">
-              <a:buFont typeface="+mj-lt"/>
-              <a:buAutoNum type="arabicPeriod"/>
-            </a:pPr>
-            <a:r>
-              <a:rPr lang="en-US" dirty="0" err="1" smtClean="0">
-                <a:solidFill>
-                  <a:srgbClr val="FFFF00"/>
-                </a:solidFill>
-              </a:rPr>
-              <a:t>PublicKeyToken</a:t>
-            </a:r>
-            <a:endParaRPr lang="ru-RU" dirty="0" smtClean="0">
-              <a:solidFill>
-                <a:srgbClr val="FFFF00"/>
-              </a:solidFill>
-            </a:endParaRPr>
-          </a:p>
-          <a:p>
-            <a:pPr lvl="1"/>
-            <a:r>
-              <a:rPr lang="ru-RU" dirty="0" smtClean="0"/>
-              <a:t>Часть </a:t>
-            </a:r>
-            <a:r>
-              <a:rPr lang="en-US" dirty="0" smtClean="0"/>
-              <a:t>public </a:t>
-            </a:r>
-            <a:r>
-              <a:rPr lang="ru-RU" dirty="0" smtClean="0"/>
-              <a:t>ключа из </a:t>
-            </a:r>
-            <a:r>
-              <a:rPr lang="en-US" dirty="0" err="1" smtClean="0"/>
-              <a:t>snk</a:t>
-            </a:r>
-            <a:r>
-              <a:rPr lang="en-US" dirty="0" smtClean="0"/>
-              <a:t> </a:t>
-            </a:r>
-            <a:r>
-              <a:rPr lang="ru-RU" dirty="0" smtClean="0"/>
-              <a:t>файла</a:t>
-            </a:r>
-            <a:endParaRPr lang="en-US" dirty="0" smtClean="0"/>
-          </a:p>
-          <a:p>
-            <a:endParaRPr lang="en-US" dirty="0"/>
-          </a:p>
-          <a:p>
-            <a:r>
-              <a:rPr lang="en-US" sz="2400" dirty="0" err="1"/>
-              <a:t>MyTypes</a:t>
-            </a:r>
-            <a:r>
-              <a:rPr lang="en-US" sz="2400" dirty="0"/>
-              <a:t>, </a:t>
-            </a:r>
-            <a:r>
-              <a:rPr lang="en-US" sz="2400" dirty="0" smtClean="0"/>
-              <a:t>Version=1.0.8123.</a:t>
-            </a:r>
-            <a:r>
-              <a:rPr lang="ru-RU" sz="2400" dirty="0" smtClean="0"/>
-              <a:t>О,</a:t>
-            </a:r>
-            <a:r>
-              <a:rPr lang="en-US" sz="2400" dirty="0" smtClean="0"/>
-              <a:t/>
-            </a:r>
-            <a:br>
-              <a:rPr lang="en-US" sz="2400" dirty="0" smtClean="0"/>
-            </a:br>
-            <a:r>
-              <a:rPr lang="en-US" sz="2400" dirty="0" smtClean="0"/>
-              <a:t>Culture=neutral</a:t>
-            </a:r>
-            <a:r>
-              <a:rPr lang="en-US" sz="2400" dirty="0"/>
-              <a:t>, </a:t>
-            </a:r>
-            <a:r>
-              <a:rPr lang="en-US" sz="2400" dirty="0" err="1" smtClean="0"/>
-              <a:t>PublicKeyToken</a:t>
-            </a:r>
-            <a:r>
-              <a:rPr lang="en-US" sz="2400" dirty="0" smtClean="0"/>
-              <a:t>=b77a5c561934e089</a:t>
-            </a:r>
-          </a:p>
-          <a:p>
-            <a:r>
-              <a:rPr lang="en-US" sz="2400" dirty="0" err="1"/>
-              <a:t>MyTypes</a:t>
-            </a:r>
-            <a:r>
-              <a:rPr lang="en-US" sz="2400" dirty="0"/>
-              <a:t>, </a:t>
-            </a:r>
-            <a:r>
-              <a:rPr lang="en-US" sz="2400" dirty="0" smtClean="0"/>
-              <a:t>Version=1.0.8123.</a:t>
-            </a:r>
-            <a:r>
-              <a:rPr lang="ru-RU" sz="2400" dirty="0"/>
-              <a:t>О,</a:t>
-            </a:r>
-            <a:r>
-              <a:rPr lang="en-US" sz="2400" dirty="0"/>
-              <a:t/>
-            </a:r>
-            <a:br>
-              <a:rPr lang="en-US" sz="2400" dirty="0"/>
-            </a:br>
-            <a:r>
-              <a:rPr lang="en-US" sz="2400" dirty="0" smtClean="0"/>
-              <a:t>Culture=en-US, </a:t>
-            </a:r>
-            <a:r>
-              <a:rPr lang="en-US" sz="2400" dirty="0" err="1"/>
-              <a:t>PublicKeyToken</a:t>
-            </a:r>
-            <a:r>
-              <a:rPr lang="en-US" sz="2400" dirty="0"/>
-              <a:t>=b77a5c561934e089</a:t>
-            </a:r>
-            <a:endParaRPr lang="ru-RU" sz="2400" dirty="0" smtClean="0"/>
-          </a:p>
-          <a:p>
+            <a:pPr marL="0" indent="0">
+              <a:buNone/>
+            </a:pPr>
+            <a:r>
+              <a:rPr lang="en-US" dirty="0" smtClean="0">
+                <a:hlinkClick r:id="rId2"/>
+              </a:rPr>
+              <a:t>http</a:t>
+            </a:r>
+            <a:r>
+              <a:rPr lang="en-US" dirty="0">
+                <a:hlinkClick r:id="rId2"/>
+              </a:rPr>
+              <a:t>://</a:t>
+            </a:r>
+            <a:r>
+              <a:rPr lang="en-US" dirty="0" smtClean="0">
+                <a:hlinkClick r:id="rId2"/>
+              </a:rPr>
+              <a:t>msdn.microsoft.com/en-us/library/e74a18c4%28v=vs.110%29.aspx</a:t>
+            </a:r>
             <a:endParaRPr lang="ru-RU" dirty="0"/>
           </a:p>
         </p:txBody>
@@ -9993,7 +9866,7 @@
     </p:spTree>
     <p:extLst>
       <p:ext uri="{BB962C8B-B14F-4D97-AF65-F5344CB8AC3E}">
-        <p14:creationId xmlns:p14="http://schemas.microsoft.com/office/powerpoint/2010/main" val="1579629595"/>
+        <p14:creationId xmlns:p14="http://schemas.microsoft.com/office/powerpoint/2010/main" val="3803663968"/>
       </p:ext>
     </p:extLst>
   </p:cSld>
@@ -10039,6 +9912,327 @@
         </p:nvSpPr>
         <p:spPr/>
         <p:txBody>
+          <a:bodyPr>
+            <a:normAutofit fontScale="90000"/>
+          </a:bodyPr>
+          <a:lstStyle/>
+          <a:p>
+            <a:r>
+              <a:rPr lang="ru-RU" dirty="0" smtClean="0"/>
+              <a:t>Строгое имя сборки (</a:t>
+            </a:r>
+            <a:r>
+              <a:rPr lang="en-US" dirty="0" smtClean="0"/>
+              <a:t>strong name</a:t>
+            </a:r>
+            <a:r>
+              <a:rPr lang="ru-RU" dirty="0" smtClean="0"/>
+              <a:t>)</a:t>
+            </a:r>
+            <a:endParaRPr lang="ru-RU" dirty="0"/>
+          </a:p>
+        </p:txBody>
+      </p:sp>
+      <p:sp>
+        <p:nvSpPr>
+          <p:cNvPr id="3" name="Content Placeholder 2"/>
+          <p:cNvSpPr>
+            <a:spLocks noGrp="1"/>
+          </p:cNvSpPr>
+          <p:nvPr>
+            <p:ph idx="1"/>
+          </p:nvPr>
+        </p:nvSpPr>
+        <p:spPr/>
+        <p:txBody>
+          <a:bodyPr>
+            <a:normAutofit fontScale="62500" lnSpcReduction="20000"/>
+          </a:bodyPr>
+          <a:lstStyle/>
+          <a:p>
+            <a:pPr marL="0" indent="0">
+              <a:buNone/>
+            </a:pPr>
+            <a:r>
+              <a:rPr lang="ru-RU" dirty="0" smtClean="0">
+                <a:solidFill>
+                  <a:schemeClr val="bg1"/>
+                </a:solidFill>
+              </a:rPr>
+              <a:t>Для задания строгово имени сборки необходимы четыре составляющих:</a:t>
+            </a:r>
+          </a:p>
+          <a:p>
+            <a:pPr marL="0" indent="0">
+              <a:buNone/>
+            </a:pPr>
+            <a:endParaRPr lang="en-US" dirty="0" smtClean="0">
+              <a:solidFill>
+                <a:schemeClr val="bg1"/>
+              </a:solidFill>
+            </a:endParaRPr>
+          </a:p>
+          <a:p>
+            <a:pPr marL="514350" indent="-514350">
+              <a:buFont typeface="+mj-lt"/>
+              <a:buAutoNum type="arabicPeriod"/>
+            </a:pPr>
+            <a:r>
+              <a:rPr lang="ru-RU" dirty="0" smtClean="0">
+                <a:solidFill>
+                  <a:srgbClr val="FFFF00"/>
+                </a:solidFill>
+              </a:rPr>
+              <a:t>Имя сборки</a:t>
+            </a:r>
+            <a:endParaRPr lang="en-US" dirty="0" smtClean="0">
+              <a:solidFill>
+                <a:srgbClr val="FFFF00"/>
+              </a:solidFill>
+            </a:endParaRPr>
+          </a:p>
+          <a:p>
+            <a:pPr lvl="1"/>
+            <a:r>
+              <a:rPr lang="ru-RU" dirty="0" smtClean="0"/>
+              <a:t>Задается в свойствах проекта</a:t>
+            </a:r>
+          </a:p>
+          <a:p>
+            <a:pPr marL="514350" indent="-514350">
+              <a:buFont typeface="+mj-lt"/>
+              <a:buAutoNum type="arabicPeriod"/>
+            </a:pPr>
+            <a:r>
+              <a:rPr lang="ru-RU" dirty="0" smtClean="0">
+                <a:solidFill>
+                  <a:srgbClr val="FFFF00"/>
+                </a:solidFill>
+              </a:rPr>
+              <a:t>Номер версии сборки</a:t>
+            </a:r>
+          </a:p>
+          <a:p>
+            <a:pPr lvl="1"/>
+            <a:r>
+              <a:rPr lang="ru-RU" dirty="0" smtClean="0"/>
+              <a:t>Атрибут </a:t>
+            </a:r>
+            <a:r>
+              <a:rPr lang="en-US" dirty="0" err="1" smtClean="0"/>
+              <a:t>AssemblyVersion</a:t>
+            </a:r>
+            <a:endParaRPr lang="ru-RU" dirty="0" smtClean="0"/>
+          </a:p>
+          <a:p>
+            <a:pPr marL="514350" indent="-514350">
+              <a:buFont typeface="+mj-lt"/>
+              <a:buAutoNum type="arabicPeriod"/>
+            </a:pPr>
+            <a:r>
+              <a:rPr lang="ru-RU" dirty="0" smtClean="0">
+                <a:solidFill>
+                  <a:srgbClr val="FFFF00"/>
+                </a:solidFill>
+              </a:rPr>
+              <a:t>Культура сборки</a:t>
+            </a:r>
+          </a:p>
+          <a:p>
+            <a:pPr lvl="1"/>
+            <a:r>
+              <a:rPr lang="ru-RU" dirty="0" smtClean="0"/>
+              <a:t>Атрибут </a:t>
+            </a:r>
+            <a:r>
+              <a:rPr lang="en-US" dirty="0" err="1" smtClean="0"/>
+              <a:t>AssemblyCulture</a:t>
+            </a:r>
+            <a:endParaRPr lang="ru-RU" dirty="0" smtClean="0"/>
+          </a:p>
+          <a:p>
+            <a:pPr marL="514350" indent="-514350">
+              <a:buFont typeface="+mj-lt"/>
+              <a:buAutoNum type="arabicPeriod"/>
+            </a:pPr>
+            <a:r>
+              <a:rPr lang="en-US" dirty="0" err="1" smtClean="0">
+                <a:solidFill>
+                  <a:srgbClr val="FFFF00"/>
+                </a:solidFill>
+              </a:rPr>
+              <a:t>PublicKeyToken</a:t>
+            </a:r>
+            <a:endParaRPr lang="ru-RU" dirty="0" smtClean="0">
+              <a:solidFill>
+                <a:srgbClr val="FFFF00"/>
+              </a:solidFill>
+            </a:endParaRPr>
+          </a:p>
+          <a:p>
+            <a:pPr lvl="1"/>
+            <a:r>
+              <a:rPr lang="ru-RU" dirty="0" smtClean="0"/>
+              <a:t>Часть </a:t>
+            </a:r>
+            <a:r>
+              <a:rPr lang="en-US" dirty="0" smtClean="0"/>
+              <a:t>public </a:t>
+            </a:r>
+            <a:r>
+              <a:rPr lang="ru-RU" dirty="0" smtClean="0"/>
+              <a:t>ключа из </a:t>
+            </a:r>
+            <a:r>
+              <a:rPr lang="en-US" dirty="0" err="1" smtClean="0"/>
+              <a:t>snk</a:t>
+            </a:r>
+            <a:r>
+              <a:rPr lang="en-US" dirty="0" smtClean="0"/>
+              <a:t> </a:t>
+            </a:r>
+            <a:r>
+              <a:rPr lang="ru-RU" dirty="0" smtClean="0"/>
+              <a:t>файла</a:t>
+            </a:r>
+            <a:endParaRPr lang="en-US" dirty="0" smtClean="0"/>
+          </a:p>
+          <a:p>
+            <a:endParaRPr lang="en-US" dirty="0"/>
+          </a:p>
+          <a:p>
+            <a:r>
+              <a:rPr lang="en-US" sz="2400" dirty="0" err="1"/>
+              <a:t>MyTypes</a:t>
+            </a:r>
+            <a:r>
+              <a:rPr lang="en-US" sz="2400" dirty="0"/>
+              <a:t>, </a:t>
+            </a:r>
+            <a:r>
+              <a:rPr lang="en-US" sz="2400" dirty="0" smtClean="0"/>
+              <a:t>Version=1.0.8123.</a:t>
+            </a:r>
+            <a:r>
+              <a:rPr lang="ru-RU" sz="2400" dirty="0" smtClean="0"/>
+              <a:t>О,</a:t>
+            </a:r>
+            <a:r>
+              <a:rPr lang="en-US" sz="2400" dirty="0" smtClean="0"/>
+              <a:t/>
+            </a:r>
+            <a:br>
+              <a:rPr lang="en-US" sz="2400" dirty="0" smtClean="0"/>
+            </a:br>
+            <a:r>
+              <a:rPr lang="en-US" sz="2400" dirty="0" smtClean="0"/>
+              <a:t>Culture=neutral</a:t>
+            </a:r>
+            <a:r>
+              <a:rPr lang="en-US" sz="2400" dirty="0"/>
+              <a:t>, </a:t>
+            </a:r>
+            <a:r>
+              <a:rPr lang="en-US" sz="2400" dirty="0" err="1" smtClean="0"/>
+              <a:t>PublicKeyToken</a:t>
+            </a:r>
+            <a:r>
+              <a:rPr lang="en-US" sz="2400" dirty="0" smtClean="0"/>
+              <a:t>=b77a5c561934e089</a:t>
+            </a:r>
+          </a:p>
+          <a:p>
+            <a:r>
+              <a:rPr lang="en-US" sz="2400" dirty="0" err="1"/>
+              <a:t>MyTypes</a:t>
+            </a:r>
+            <a:r>
+              <a:rPr lang="en-US" sz="2400" dirty="0"/>
+              <a:t>, </a:t>
+            </a:r>
+            <a:r>
+              <a:rPr lang="en-US" sz="2400" dirty="0" smtClean="0"/>
+              <a:t>Version=1.0.8123.</a:t>
+            </a:r>
+            <a:r>
+              <a:rPr lang="ru-RU" sz="2400" dirty="0"/>
+              <a:t>О,</a:t>
+            </a:r>
+            <a:r>
+              <a:rPr lang="en-US" sz="2400" dirty="0"/>
+              <a:t/>
+            </a:r>
+            <a:br>
+              <a:rPr lang="en-US" sz="2400" dirty="0"/>
+            </a:br>
+            <a:r>
+              <a:rPr lang="en-US" sz="2400" dirty="0" smtClean="0"/>
+              <a:t>Culture=en-US, </a:t>
+            </a:r>
+            <a:r>
+              <a:rPr lang="en-US" sz="2400" dirty="0" err="1"/>
+              <a:t>PublicKeyToken</a:t>
+            </a:r>
+            <a:r>
+              <a:rPr lang="en-US" sz="2400" dirty="0"/>
+              <a:t>=b77a5c561934e089</a:t>
+            </a:r>
+            <a:endParaRPr lang="ru-RU" sz="2400" dirty="0" smtClean="0"/>
+          </a:p>
+          <a:p>
+            <a:endParaRPr lang="ru-RU" dirty="0"/>
+          </a:p>
+        </p:txBody>
+      </p:sp>
+    </p:spTree>
+    <p:extLst>
+      <p:ext uri="{BB962C8B-B14F-4D97-AF65-F5344CB8AC3E}">
+        <p14:creationId xmlns:p14="http://schemas.microsoft.com/office/powerpoint/2010/main" val="1579629595"/>
+      </p:ext>
+    </p:extLst>
+  </p:cSld>
+  <p:clrMapOvr>
+    <a:masterClrMapping/>
+  </p:clrMapOvr>
+  <p:timing>
+    <p:tnLst>
+      <p:par>
+        <p:cTn id="1" dur="indefinite" restart="never" nodeType="tmRoot"/>
+      </p:par>
+    </p:tnLst>
+  </p:timing>
+</p:sld>
+</file>
+
+<file path=ppt/slides/slide25.xml><?xml version="1.0" encoding="utf-8"?>
+<p:sld xmlns:a="http://schemas.openxmlformats.org/drawingml/2006/main" xmlns:r="http://schemas.openxmlformats.org/officeDocument/2006/relationships" xmlns:p="http://schemas.openxmlformats.org/presentationml/2006/main">
+  <p:cSld>
+    <p:spTree>
+      <p:nvGrpSpPr>
+        <p:cNvPr id="1" name=""/>
+        <p:cNvGrpSpPr/>
+        <p:nvPr/>
+      </p:nvGrpSpPr>
+      <p:grpSpPr>
+        <a:xfrm>
+          <a:off x="0" y="0"/>
+          <a:ext cx="0" cy="0"/>
+          <a:chOff x="0" y="0"/>
+          <a:chExt cx="0" cy="0"/>
+        </a:xfrm>
+      </p:grpSpPr>
+      <p:sp>
+        <p:nvSpPr>
+          <p:cNvPr id="2" name="Title 1"/>
+          <p:cNvSpPr>
+            <a:spLocks noGrp="1"/>
+          </p:cNvSpPr>
+          <p:nvPr>
+            <p:ph type="title"/>
+          </p:nvPr>
+        </p:nvSpPr>
+        <p:spPr/>
+        <p:txBody>
           <a:bodyPr/>
           <a:lstStyle/>
           <a:p>
@@ -10469,7 +10663,7 @@
 </p:sld>
 </file>
 
-<file path=ppt/slides/slide25.xml><?xml version="1.0" encoding="utf-8"?>
+<file path=ppt/slides/slide26.xml><?xml version="1.0" encoding="utf-8"?>
 <p:sld xmlns:a="http://schemas.openxmlformats.org/drawingml/2006/main" xmlns:r="http://schemas.openxmlformats.org/officeDocument/2006/relationships" xmlns:p="http://schemas.openxmlformats.org/presentationml/2006/main">
   <p:cSld>
     <p:spTree>
@@ -10992,7 +11186,7 @@
 </p:sld>
 </file>
 
-<file path=ppt/slides/slide26.xml><?xml version="1.0" encoding="utf-8"?>
+<file path=ppt/slides/slide27.xml><?xml version="1.0" encoding="utf-8"?>
 <p:sld xmlns:a="http://schemas.openxmlformats.org/drawingml/2006/main" xmlns:r="http://schemas.openxmlformats.org/officeDocument/2006/relationships" xmlns:p="http://schemas.openxmlformats.org/presentationml/2006/main">
   <p:cSld>
     <p:spTree>
@@ -11140,7 +11334,7 @@
 </p:sld>
 </file>
 
-<file path=ppt/slides/slide27.xml><?xml version="1.0" encoding="utf-8"?>
+<file path=ppt/slides/slide28.xml><?xml version="1.0" encoding="utf-8"?>
 <p:sld xmlns:a="http://schemas.openxmlformats.org/drawingml/2006/main" xmlns:r="http://schemas.openxmlformats.org/officeDocument/2006/relationships" xmlns:p="http://schemas.openxmlformats.org/presentationml/2006/main">
   <p:cSld>
     <p:spTree>
@@ -11513,7 +11707,7 @@
 </p:sld>
 </file>
 
-<file path=ppt/slides/slide28.xml><?xml version="1.0" encoding="utf-8"?>
+<file path=ppt/slides/slide29.xml><?xml version="1.0" encoding="utf-8"?>
 <p:sld xmlns:a="http://schemas.openxmlformats.org/drawingml/2006/main" xmlns:r="http://schemas.openxmlformats.org/officeDocument/2006/relationships" xmlns:p="http://schemas.openxmlformats.org/presentationml/2006/main">
   <p:cSld>
     <p:spTree>
@@ -12208,159 +12402,6 @@
     <p:extLst>
       <p:ext uri="{BB962C8B-B14F-4D97-AF65-F5344CB8AC3E}">
         <p14:creationId xmlns:p14="http://schemas.microsoft.com/office/powerpoint/2010/main" val="3864391885"/>
-      </p:ext>
-    </p:extLst>
-  </p:cSld>
-  <p:clrMapOvr>
-    <a:masterClrMapping/>
-  </p:clrMapOvr>
-  <p:timing>
-    <p:tnLst>
-      <p:par>
-        <p:cTn id="1" dur="indefinite" restart="never" nodeType="tmRoot"/>
-      </p:par>
-    </p:tnLst>
-  </p:timing>
-</p:sld>
-</file>
-
-<file path=ppt/slides/slide29.xml><?xml version="1.0" encoding="utf-8"?>
-<p:sld xmlns:a="http://schemas.openxmlformats.org/drawingml/2006/main" xmlns:r="http://schemas.openxmlformats.org/officeDocument/2006/relationships" xmlns:p="http://schemas.openxmlformats.org/presentationml/2006/main">
-  <p:cSld>
-    <p:spTree>
-      <p:nvGrpSpPr>
-        <p:cNvPr id="1" name=""/>
-        <p:cNvGrpSpPr/>
-        <p:nvPr/>
-      </p:nvGrpSpPr>
-      <p:grpSpPr>
-        <a:xfrm>
-          <a:off x="0" y="0"/>
-          <a:ext cx="0" cy="0"/>
-          <a:chOff x="0" y="0"/>
-          <a:chExt cx="0" cy="0"/>
-        </a:xfrm>
-      </p:grpSpPr>
-      <p:sp>
-        <p:nvSpPr>
-          <p:cNvPr id="2" name="Title 1"/>
-          <p:cNvSpPr>
-            <a:spLocks noGrp="1"/>
-          </p:cNvSpPr>
-          <p:nvPr>
-            <p:ph type="title"/>
-          </p:nvPr>
-        </p:nvSpPr>
-        <p:spPr/>
-        <p:txBody>
-          <a:bodyPr/>
-          <a:lstStyle/>
-          <a:p>
-            <a:r>
-              <a:rPr lang="en-US" dirty="0" smtClean="0"/>
-              <a:t>Portable Class Library</a:t>
-            </a:r>
-            <a:endParaRPr lang="en-US" dirty="0"/>
-          </a:p>
-        </p:txBody>
-      </p:sp>
-      <p:sp>
-        <p:nvSpPr>
-          <p:cNvPr id="3" name="Content Placeholder 2"/>
-          <p:cNvSpPr>
-            <a:spLocks noGrp="1"/>
-          </p:cNvSpPr>
-          <p:nvPr>
-            <p:ph idx="1"/>
-          </p:nvPr>
-        </p:nvSpPr>
-        <p:spPr/>
-        <p:txBody>
-          <a:bodyPr>
-            <a:normAutofit fontScale="92500" lnSpcReduction="20000"/>
-          </a:bodyPr>
-          <a:lstStyle/>
-          <a:p>
-            <a:pPr marL="0" indent="0">
-              <a:buNone/>
-            </a:pPr>
-            <a:r>
-              <a:rPr lang="ru-RU" dirty="0" smtClean="0"/>
-              <a:t>Проекты </a:t>
-            </a:r>
-            <a:r>
-              <a:rPr lang="en-US" dirty="0"/>
-              <a:t>Portable Class </a:t>
-            </a:r>
-            <a:r>
-              <a:rPr lang="en-US" dirty="0" smtClean="0"/>
-              <a:t>Library</a:t>
-            </a:r>
-            <a:r>
-              <a:rPr lang="ru-RU" dirty="0" smtClean="0"/>
-              <a:t> позволяют создавать сборки переносимые между разными </a:t>
-            </a:r>
-            <a:r>
-              <a:rPr lang="en-US" dirty="0" smtClean="0"/>
-              <a:t>.NET </a:t>
-            </a:r>
-            <a:r>
-              <a:rPr lang="ru-RU" dirty="0" smtClean="0"/>
-              <a:t>платформами: </a:t>
-            </a:r>
-            <a:r>
-              <a:rPr lang="en-US" dirty="0" smtClean="0"/>
-              <a:t>Windows, Windows Store (Metro), Silverlight, Windows Phone, Xbox 360. </a:t>
-            </a:r>
-            <a:r>
-              <a:rPr lang="ru-RU" dirty="0" smtClean="0"/>
-              <a:t>При создании проекта мы вибираем под какие платформы мы создаем библиотеку и тем самым добровольно ограничиваем себе возможности ради переносимости.</a:t>
-            </a:r>
-          </a:p>
-          <a:p>
-            <a:pPr marL="0" indent="0">
-              <a:buNone/>
-            </a:pPr>
-            <a:endParaRPr lang="ru-RU" dirty="0"/>
-          </a:p>
-          <a:p>
-            <a:pPr marL="0" indent="0">
-              <a:buNone/>
-            </a:pPr>
-            <a:r>
-              <a:rPr lang="ru-RU" dirty="0" smtClean="0"/>
-              <a:t>Подробности смотрите в </a:t>
-            </a:r>
-            <a:r>
-              <a:rPr lang="en-US" dirty="0" smtClean="0">
-                <a:hlinkClick r:id="rId2"/>
-              </a:rPr>
-              <a:t>Cross-Platform </a:t>
-            </a:r>
-            <a:r>
-              <a:rPr lang="en-US" dirty="0">
-                <a:hlinkClick r:id="rId2"/>
-              </a:rPr>
-              <a:t>Development with the .NET </a:t>
-            </a:r>
-            <a:r>
-              <a:rPr lang="en-US" dirty="0" smtClean="0">
-                <a:hlinkClick r:id="rId2"/>
-              </a:rPr>
-              <a:t>Framework</a:t>
-            </a:r>
-            <a:r>
-              <a:rPr lang="ru-RU" dirty="0" smtClean="0"/>
-              <a:t>.</a:t>
-            </a:r>
-            <a:endParaRPr lang="en-US" dirty="0"/>
-          </a:p>
-        </p:txBody>
-      </p:sp>
-    </p:spTree>
-    <p:extLst>
-      <p:ext uri="{BB962C8B-B14F-4D97-AF65-F5344CB8AC3E}">
-        <p14:creationId xmlns:p14="http://schemas.microsoft.com/office/powerpoint/2010/main" val="2977831934"/>
       </p:ext>
     </p:extLst>
   </p:cSld>
@@ -13112,19 +13153,7 @@
           <a:p>
             <a:r>
               <a:rPr lang="en-US" dirty="0" smtClean="0"/>
-              <a:t>CLS</a:t>
-            </a:r>
-            <a:r>
-              <a:rPr lang="ru-RU" dirty="0" smtClean="0"/>
-              <a:t> совместимые</a:t>
-            </a:r>
-            <a:r>
-              <a:rPr lang="en-US" dirty="0" smtClean="0"/>
-              <a:t> </a:t>
-            </a:r>
-            <a:r>
-              <a:rPr lang="ru-RU" dirty="0" smtClean="0"/>
-              <a:t>сборки</a:t>
+              <a:t>Portable Class Library</a:t>
             </a:r>
             <a:endParaRPr lang="en-US" dirty="0"/>
           </a:p>
@@ -13140,15 +13169,10 @@
             <p:ph idx="1"/>
           </p:nvPr>
         </p:nvSpPr>
-        <p:spPr>
-          <a:xfrm>
-            <a:off x="242616" y="1556792"/>
-            <a:ext cx="8649864" cy="4061048"/>
-          </a:xfrm>
-        </p:spPr>
+        <p:spPr/>
         <p:txBody>
           <a:bodyPr>
-            <a:normAutofit fontScale="70000" lnSpcReduction="20000"/>
+            <a:normAutofit fontScale="92500" lnSpcReduction="20000"/>
           </a:bodyPr>
           <a:lstStyle/>
           <a:p>
@@ -13157,233 +13181,81 @@
             </a:pPr>
             <a:r>
               <a:rPr lang="ru-RU" dirty="0" smtClean="0"/>
-              <a:t>Если вы создает библиотеку (сборку) для внешнего использования и хотите быть уверенными что её можно будет использовать из программ написанных на других языках (таких как </a:t>
+              <a:t>Проекты </a:t>
+            </a:r>
+            <a:r>
+              <a:rPr lang="en-US" dirty="0"/>
+              <a:t>Portable Class </a:t>
             </a:r>
             <a:r>
               <a:rPr lang="en-US" dirty="0" smtClean="0"/>
-              <a:t>VB.NET, F# </a:t>
+              <a:t>Library</a:t>
             </a:r>
             <a:r>
               <a:rPr lang="ru-RU" dirty="0" smtClean="0"/>
-              <a:t>и других)</a:t>
+              <a:t> позволяют создавать сборки переносимые между разными </a:t>
             </a:r>
             <a:r>
               <a:rPr lang="en-US" dirty="0" smtClean="0"/>
-              <a:t>, </a:t>
+              <a:t>.NET </a:t>
             </a:r>
             <a:r>
               <a:rPr lang="ru-RU" dirty="0" smtClean="0"/>
-              <a:t>то добавьте к свой сборке атрибут </a:t>
-            </a:r>
-            <a:r>
-              <a:rPr lang="en-US" dirty="0" err="1" smtClean="0"/>
-              <a:t>System.CLSCompliantAttribute</a:t>
+              <a:t>платформами: </a:t>
             </a:r>
             <a:r>
               <a:rPr lang="en-US" dirty="0" smtClean="0"/>
-              <a:t>.</a:t>
+              <a:t>Windows, Windows Store (Metro), Silverlight, Windows Phone, Xbox 360. </a:t>
+            </a:r>
+            <a:r>
+              <a:rPr lang="ru-RU" dirty="0" smtClean="0"/>
+              <a:t>При создании проекта мы вибираем под какие платформы мы создаем библиотеку и тем самым добровольно ограничиваем себе возможности ради переносимости.</a:t>
             </a:r>
           </a:p>
           <a:p>
             <a:pPr marL="0" indent="0">
               <a:buNone/>
             </a:pPr>
-            <a:endParaRPr lang="en-US" dirty="0"/>
+            <a:endParaRPr lang="ru-RU" dirty="0"/>
           </a:p>
           <a:p>
             <a:pPr marL="0" indent="0">
               <a:buNone/>
             </a:pPr>
             <a:r>
-              <a:rPr lang="en-US" dirty="0" smtClean="0"/>
-              <a:t>CLS </a:t>
-            </a:r>
-            <a:r>
               <a:rPr lang="ru-RU" dirty="0" smtClean="0"/>
-              <a:t>(</a:t>
-            </a:r>
-            <a:r>
-              <a:rPr lang="en-US" dirty="0" smtClean="0"/>
-              <a:t>Common Language Specification</a:t>
-            </a:r>
-            <a:r>
-              <a:rPr lang="ru-RU" dirty="0" smtClean="0"/>
-              <a:t>)</a:t>
-            </a:r>
-            <a:r>
-              <a:rPr lang="en-US" dirty="0" smtClean="0"/>
-              <a:t> </a:t>
-            </a:r>
-            <a:r>
-              <a:rPr lang="ru-RU" dirty="0" smtClean="0"/>
-              <a:t>является набором требований (ограничений) к языку позволяющее ему «бесшовно» взаимодействовать с программами на других языках. Это необходимо так как, </a:t>
-            </a:r>
-            <a:r>
-              <a:rPr lang="ru-RU" dirty="0"/>
-              <a:t>н</a:t>
-            </a:r>
-            <a:r>
-              <a:rPr lang="ru-RU" dirty="0" smtClean="0"/>
-              <a:t>есмотря на наличие «общего знаменателя» в виде </a:t>
-            </a:r>
-            <a:r>
-              <a:rPr lang="en-US" dirty="0" smtClean="0"/>
-              <a:t>IL </a:t>
-            </a:r>
-            <a:r>
-              <a:rPr lang="ru-RU" dirty="0" smtClean="0"/>
-              <a:t>кода, языки могут иметь весьма сильные различия. Компилятор </a:t>
-            </a:r>
-            <a:r>
-              <a:rPr lang="en-US" dirty="0" smtClean="0"/>
-              <a:t>C# </a:t>
-            </a:r>
-            <a:r>
-              <a:rPr lang="ru-RU" smtClean="0"/>
-              <a:t>проверяет </a:t>
-            </a:r>
-            <a:r>
-              <a:rPr lang="ru-RU" dirty="0" smtClean="0"/>
-              <a:t>программу на соответствие этим требованиям, только при наличии атрибута </a:t>
-            </a:r>
-            <a:r>
-              <a:rPr lang="en-US" dirty="0" err="1" smtClean="0"/>
-              <a:t>CLSCompliant</a:t>
+              <a:t>Подробности смотрите в </a:t>
+            </a:r>
+            <a:r>
+              <a:rPr lang="en-US" dirty="0" smtClean="0">
+                <a:hlinkClick r:id="rId2"/>
+              </a:rPr>
+              <a:t>Cross-Platform </a:t>
+            </a:r>
+            <a:r>
+              <a:rPr lang="en-US" dirty="0">
+                <a:hlinkClick r:id="rId2"/>
+              </a:rPr>
+              <a:t>Development with the .NET </a:t>
+            </a:r>
+            <a:r>
+              <a:rPr lang="en-US" dirty="0" smtClean="0">
+                <a:hlinkClick r:id="rId2"/>
+              </a:rPr>
+              <a:t>Framework</a:t>
             </a:r>
             <a:r>
               <a:rPr lang="ru-RU" dirty="0" smtClean="0"/>
               <a:t>.</a:t>
             </a:r>
             <a:endParaRPr lang="en-US" dirty="0"/>
-          </a:p>
-        </p:txBody>
-      </p:sp>
-      <p:sp>
-        <p:nvSpPr>
-          <p:cNvPr id="4" name="TextBox 3"/>
-          <p:cNvSpPr txBox="1"/>
-          <p:nvPr/>
-        </p:nvSpPr>
-        <p:spPr>
-          <a:xfrm>
-            <a:off x="251520" y="5805264"/>
-            <a:ext cx="8640960" cy="307777"/>
-          </a:xfrm>
-          <a:prstGeom prst="rect">
-            <a:avLst/>
-          </a:prstGeom>
-          <a:solidFill>
-            <a:schemeClr val="bg1"/>
-          </a:solidFill>
-        </p:spPr>
-        <p:txBody>
-          <a:bodyPr wrap="square" rtlCol="0">
-            <a:spAutoFit/>
-          </a:bodyPr>
-          <a:lstStyle/>
-          <a:p>
-            <a:r>
-              <a:rPr lang="en-US" sz="1400" dirty="0" smtClean="0">
-                <a:solidFill>
-                  <a:srgbClr val="000000"/>
-                </a:solidFill>
-                <a:highlight>
-                  <a:srgbClr val="FFFFFF"/>
-                </a:highlight>
-                <a:latin typeface="Courier New" panose="02070309020205020404" pitchFamily="49" charset="0"/>
-                <a:cs typeface="Courier New" panose="02070309020205020404" pitchFamily="49" charset="0"/>
-              </a:rPr>
-              <a:t>[</a:t>
-            </a:r>
-            <a:r>
-              <a:rPr lang="en-US" sz="1400" dirty="0" smtClean="0">
-                <a:solidFill>
-                  <a:srgbClr val="0000FF"/>
-                </a:solidFill>
-                <a:highlight>
-                  <a:srgbClr val="FFFFFF"/>
-                </a:highlight>
-                <a:latin typeface="Courier New" panose="02070309020205020404" pitchFamily="49" charset="0"/>
-                <a:cs typeface="Courier New" panose="02070309020205020404" pitchFamily="49" charset="0"/>
-              </a:rPr>
-              <a:t>assembly</a:t>
-            </a:r>
-            <a:r>
-              <a:rPr lang="en-US" sz="1400" dirty="0">
-                <a:solidFill>
-                  <a:srgbClr val="000000"/>
-                </a:solidFill>
-                <a:highlight>
-                  <a:srgbClr val="FFFFFF"/>
-                </a:highlight>
-                <a:latin typeface="Courier New" panose="02070309020205020404" pitchFamily="49" charset="0"/>
-                <a:cs typeface="Courier New" panose="02070309020205020404" pitchFamily="49" charset="0"/>
-              </a:rPr>
-              <a:t>: </a:t>
-            </a:r>
-            <a:r>
-              <a:rPr lang="en-US" sz="1400" dirty="0" err="1">
-                <a:solidFill>
-                  <a:srgbClr val="2B91AF"/>
-                </a:solidFill>
-                <a:highlight>
-                  <a:srgbClr val="FFFFFF"/>
-                </a:highlight>
-                <a:latin typeface="Courier New" panose="02070309020205020404" pitchFamily="49" charset="0"/>
-                <a:cs typeface="Courier New" panose="02070309020205020404" pitchFamily="49" charset="0"/>
-              </a:rPr>
-              <a:t>CLSCompliant</a:t>
-            </a:r>
-            <a:r>
-              <a:rPr lang="en-US" sz="1400" dirty="0">
-                <a:solidFill>
-                  <a:srgbClr val="000000"/>
-                </a:solidFill>
-                <a:highlight>
-                  <a:srgbClr val="FFFFFF"/>
-                </a:highlight>
-                <a:latin typeface="Courier New" panose="02070309020205020404" pitchFamily="49" charset="0"/>
-                <a:cs typeface="Courier New" panose="02070309020205020404" pitchFamily="49" charset="0"/>
-              </a:rPr>
-              <a:t>(</a:t>
-            </a:r>
-            <a:r>
-              <a:rPr lang="en-US" sz="1400" dirty="0">
-                <a:solidFill>
-                  <a:srgbClr val="0000FF"/>
-                </a:solidFill>
-                <a:highlight>
-                  <a:srgbClr val="FFFFFF"/>
-                </a:highlight>
-                <a:latin typeface="Courier New" panose="02070309020205020404" pitchFamily="49" charset="0"/>
-                <a:cs typeface="Courier New" panose="02070309020205020404" pitchFamily="49" charset="0"/>
-              </a:rPr>
-              <a:t>true</a:t>
-            </a:r>
-            <a:r>
-              <a:rPr lang="en-US" sz="1400" dirty="0" smtClean="0">
-                <a:solidFill>
-                  <a:srgbClr val="000000"/>
-                </a:solidFill>
-                <a:highlight>
-                  <a:srgbClr val="FFFFFF"/>
-                </a:highlight>
-                <a:latin typeface="Courier New" panose="02070309020205020404" pitchFamily="49" charset="0"/>
-                <a:cs typeface="Courier New" panose="02070309020205020404" pitchFamily="49" charset="0"/>
-              </a:rPr>
-              <a:t>)]</a:t>
-            </a:r>
-            <a:endParaRPr lang="ru-RU" sz="1400" dirty="0" smtClean="0">
-              <a:latin typeface="Courier New" panose="02070309020205020404" pitchFamily="49" charset="0"/>
-              <a:cs typeface="Courier New" panose="02070309020205020404" pitchFamily="49" charset="0"/>
-            </a:endParaRPr>
           </a:p>
         </p:txBody>
       </p:sp>
     </p:spTree>
     <p:extLst>
       <p:ext uri="{BB962C8B-B14F-4D97-AF65-F5344CB8AC3E}">
-        <p14:creationId xmlns:p14="http://schemas.microsoft.com/office/powerpoint/2010/main" val="910520611"/>
+        <p14:creationId xmlns:p14="http://schemas.microsoft.com/office/powerpoint/2010/main" val="2977831934"/>
       </p:ext>
     </p:extLst>
   </p:cSld>
@@ -13433,6 +13305,328 @@
           <a:lstStyle/>
           <a:p>
             <a:r>
+              <a:rPr lang="en-US" dirty="0" smtClean="0"/>
+              <a:t>CLS</a:t>
+            </a:r>
+            <a:r>
+              <a:rPr lang="ru-RU" dirty="0" smtClean="0"/>
+              <a:t> совместимые</a:t>
+            </a:r>
+            <a:r>
+              <a:rPr lang="en-US" dirty="0" smtClean="0"/>
+              <a:t> </a:t>
+            </a:r>
+            <a:r>
+              <a:rPr lang="ru-RU" dirty="0" smtClean="0"/>
+              <a:t>сборки</a:t>
+            </a:r>
+            <a:endParaRPr lang="en-US" dirty="0"/>
+          </a:p>
+        </p:txBody>
+      </p:sp>
+      <p:sp>
+        <p:nvSpPr>
+          <p:cNvPr id="3" name="Content Placeholder 2"/>
+          <p:cNvSpPr>
+            <a:spLocks noGrp="1"/>
+          </p:cNvSpPr>
+          <p:nvPr>
+            <p:ph idx="1"/>
+          </p:nvPr>
+        </p:nvSpPr>
+        <p:spPr>
+          <a:xfrm>
+            <a:off x="242616" y="1556792"/>
+            <a:ext cx="8649864" cy="4061048"/>
+          </a:xfrm>
+        </p:spPr>
+        <p:txBody>
+          <a:bodyPr>
+            <a:normAutofit fontScale="70000" lnSpcReduction="20000"/>
+          </a:bodyPr>
+          <a:lstStyle/>
+          <a:p>
+            <a:pPr marL="0" indent="0">
+              <a:buNone/>
+            </a:pPr>
+            <a:r>
+              <a:rPr lang="ru-RU" dirty="0" smtClean="0"/>
+              <a:t>Если вы создает библиотеку (сборку) для внешнего использования и хотите быть уверенными что её можно будет использовать из программ написанных на других языках (таких как </a:t>
+            </a:r>
+            <a:r>
+              <a:rPr lang="en-US" dirty="0" smtClean="0"/>
+              <a:t>VB.NET, F# </a:t>
+            </a:r>
+            <a:r>
+              <a:rPr lang="ru-RU" dirty="0" smtClean="0"/>
+              <a:t>и других)</a:t>
+            </a:r>
+            <a:r>
+              <a:rPr lang="en-US" dirty="0" smtClean="0"/>
+              <a:t>, </a:t>
+            </a:r>
+            <a:r>
+              <a:rPr lang="ru-RU" dirty="0" smtClean="0"/>
+              <a:t>то добавьте к свой сборке атрибут </a:t>
+            </a:r>
+            <a:r>
+              <a:rPr lang="en-US" dirty="0" err="1" smtClean="0"/>
+              <a:t>System.CLSCompliantAttribute</a:t>
+            </a:r>
+            <a:r>
+              <a:rPr lang="en-US" dirty="0" smtClean="0"/>
+              <a:t>.</a:t>
+            </a:r>
+          </a:p>
+          <a:p>
+            <a:pPr marL="0" indent="0">
+              <a:buNone/>
+            </a:pPr>
+            <a:endParaRPr lang="en-US" dirty="0"/>
+          </a:p>
+          <a:p>
+            <a:pPr marL="0" indent="0">
+              <a:buNone/>
+            </a:pPr>
+            <a:r>
+              <a:rPr lang="en-US" dirty="0" smtClean="0"/>
+              <a:t>CLS </a:t>
+            </a:r>
+            <a:r>
+              <a:rPr lang="ru-RU" dirty="0" smtClean="0"/>
+              <a:t>(</a:t>
+            </a:r>
+            <a:r>
+              <a:rPr lang="en-US" dirty="0" smtClean="0"/>
+              <a:t>Common Language Specification</a:t>
+            </a:r>
+            <a:r>
+              <a:rPr lang="ru-RU" dirty="0" smtClean="0"/>
+              <a:t>)</a:t>
+            </a:r>
+            <a:r>
+              <a:rPr lang="en-US" dirty="0" smtClean="0"/>
+              <a:t> </a:t>
+            </a:r>
+            <a:r>
+              <a:rPr lang="ru-RU" dirty="0" smtClean="0"/>
+              <a:t>является набором требований (ограничений) к языку позволяющее ему «бесшовно» взаимодействовать с программами на других языках. Это необходимо так как, </a:t>
+            </a:r>
+            <a:r>
+              <a:rPr lang="ru-RU" dirty="0"/>
+              <a:t>н</a:t>
+            </a:r>
+            <a:r>
+              <a:rPr lang="ru-RU" dirty="0" smtClean="0"/>
+              <a:t>есмотря на наличие «общего знаменателя» в виде </a:t>
+            </a:r>
+            <a:r>
+              <a:rPr lang="en-US" dirty="0" smtClean="0"/>
+              <a:t>IL </a:t>
+            </a:r>
+            <a:r>
+              <a:rPr lang="ru-RU" dirty="0" smtClean="0"/>
+              <a:t>кода, языки могут иметь весьма сильные различия. Компилятор </a:t>
+            </a:r>
+            <a:r>
+              <a:rPr lang="en-US" dirty="0" smtClean="0"/>
+              <a:t>C# </a:t>
+            </a:r>
+            <a:r>
+              <a:rPr lang="ru-RU" smtClean="0"/>
+              <a:t>проверяет </a:t>
+            </a:r>
+            <a:r>
+              <a:rPr lang="ru-RU" dirty="0" smtClean="0"/>
+              <a:t>программу на соответствие этим требованиям, только при наличии атрибута </a:t>
+            </a:r>
+            <a:r>
+              <a:rPr lang="en-US" dirty="0" err="1" smtClean="0"/>
+              <a:t>CLSCompliant</a:t>
+            </a:r>
+            <a:r>
+              <a:rPr lang="ru-RU" dirty="0" smtClean="0"/>
+              <a:t>.</a:t>
+            </a:r>
+            <a:endParaRPr lang="en-US" dirty="0"/>
+          </a:p>
+        </p:txBody>
+      </p:sp>
+      <p:sp>
+        <p:nvSpPr>
+          <p:cNvPr id="4" name="TextBox 3"/>
+          <p:cNvSpPr txBox="1"/>
+          <p:nvPr/>
+        </p:nvSpPr>
+        <p:spPr>
+          <a:xfrm>
+            <a:off x="251520" y="5805264"/>
+            <a:ext cx="8640960" cy="307777"/>
+          </a:xfrm>
+          <a:prstGeom prst="rect">
+            <a:avLst/>
+          </a:prstGeom>
+          <a:solidFill>
+            <a:schemeClr val="bg1"/>
+          </a:solidFill>
+        </p:spPr>
+        <p:txBody>
+          <a:bodyPr wrap="square" rtlCol="0">
+            <a:spAutoFit/>
+          </a:bodyPr>
+          <a:lstStyle/>
+          <a:p>
+            <a:r>
+              <a:rPr lang="en-US" sz="1400" dirty="0" smtClean="0">
+                <a:solidFill>
+                  <a:srgbClr val="000000"/>
+                </a:solidFill>
+                <a:highlight>
+                  <a:srgbClr val="FFFFFF"/>
+                </a:highlight>
+                <a:latin typeface="Courier New" panose="02070309020205020404" pitchFamily="49" charset="0"/>
+                <a:cs typeface="Courier New" panose="02070309020205020404" pitchFamily="49" charset="0"/>
+              </a:rPr>
+              <a:t>[</a:t>
+            </a:r>
+            <a:r>
+              <a:rPr lang="en-US" sz="1400" dirty="0" smtClean="0">
+                <a:solidFill>
+                  <a:srgbClr val="0000FF"/>
+                </a:solidFill>
+                <a:highlight>
+                  <a:srgbClr val="FFFFFF"/>
+                </a:highlight>
+                <a:latin typeface="Courier New" panose="02070309020205020404" pitchFamily="49" charset="0"/>
+                <a:cs typeface="Courier New" panose="02070309020205020404" pitchFamily="49" charset="0"/>
+              </a:rPr>
+              <a:t>assembly</a:t>
+            </a:r>
+            <a:r>
+              <a:rPr lang="en-US" sz="1400" dirty="0">
+                <a:solidFill>
+                  <a:srgbClr val="000000"/>
+                </a:solidFill>
+                <a:highlight>
+                  <a:srgbClr val="FFFFFF"/>
+                </a:highlight>
+                <a:latin typeface="Courier New" panose="02070309020205020404" pitchFamily="49" charset="0"/>
+                <a:cs typeface="Courier New" panose="02070309020205020404" pitchFamily="49" charset="0"/>
+              </a:rPr>
+              <a:t>: </a:t>
+            </a:r>
+            <a:r>
+              <a:rPr lang="en-US" sz="1400" dirty="0" err="1">
+                <a:solidFill>
+                  <a:srgbClr val="2B91AF"/>
+                </a:solidFill>
+                <a:highlight>
+                  <a:srgbClr val="FFFFFF"/>
+                </a:highlight>
+                <a:latin typeface="Courier New" panose="02070309020205020404" pitchFamily="49" charset="0"/>
+                <a:cs typeface="Courier New" panose="02070309020205020404" pitchFamily="49" charset="0"/>
+              </a:rPr>
+              <a:t>CLSCompliant</a:t>
+            </a:r>
+            <a:r>
+              <a:rPr lang="en-US" sz="1400" dirty="0">
+                <a:solidFill>
+                  <a:srgbClr val="000000"/>
+                </a:solidFill>
+                <a:highlight>
+                  <a:srgbClr val="FFFFFF"/>
+                </a:highlight>
+                <a:latin typeface="Courier New" panose="02070309020205020404" pitchFamily="49" charset="0"/>
+                <a:cs typeface="Courier New" panose="02070309020205020404" pitchFamily="49" charset="0"/>
+              </a:rPr>
+              <a:t>(</a:t>
+            </a:r>
+            <a:r>
+              <a:rPr lang="en-US" sz="1400" dirty="0">
+                <a:solidFill>
+                  <a:srgbClr val="0000FF"/>
+                </a:solidFill>
+                <a:highlight>
+                  <a:srgbClr val="FFFFFF"/>
+                </a:highlight>
+                <a:latin typeface="Courier New" panose="02070309020205020404" pitchFamily="49" charset="0"/>
+                <a:cs typeface="Courier New" panose="02070309020205020404" pitchFamily="49" charset="0"/>
+              </a:rPr>
+              <a:t>true</a:t>
+            </a:r>
+            <a:r>
+              <a:rPr lang="en-US" sz="1400" dirty="0" smtClean="0">
+                <a:solidFill>
+                  <a:srgbClr val="000000"/>
+                </a:solidFill>
+                <a:highlight>
+                  <a:srgbClr val="FFFFFF"/>
+                </a:highlight>
+                <a:latin typeface="Courier New" panose="02070309020205020404" pitchFamily="49" charset="0"/>
+                <a:cs typeface="Courier New" panose="02070309020205020404" pitchFamily="49" charset="0"/>
+              </a:rPr>
+              <a:t>)]</a:t>
+            </a:r>
+            <a:endParaRPr lang="ru-RU" sz="1400" dirty="0" smtClean="0">
+              <a:latin typeface="Courier New" panose="02070309020205020404" pitchFamily="49" charset="0"/>
+              <a:cs typeface="Courier New" panose="02070309020205020404" pitchFamily="49" charset="0"/>
+            </a:endParaRPr>
+          </a:p>
+        </p:txBody>
+      </p:sp>
+    </p:spTree>
+    <p:extLst>
+      <p:ext uri="{BB962C8B-B14F-4D97-AF65-F5344CB8AC3E}">
+        <p14:creationId xmlns:p14="http://schemas.microsoft.com/office/powerpoint/2010/main" val="910520611"/>
+      </p:ext>
+    </p:extLst>
+  </p:cSld>
+  <p:clrMapOvr>
+    <a:masterClrMapping/>
+  </p:clrMapOvr>
+  <p:timing>
+    <p:tnLst>
+      <p:par>
+        <p:cTn id="1" dur="indefinite" restart="never" nodeType="tmRoot"/>
+      </p:par>
+    </p:tnLst>
+  </p:timing>
+</p:sld>
+</file>
+
+<file path=ppt/slides/slide32.xml><?xml version="1.0" encoding="utf-8"?>
+<p:sld xmlns:a="http://schemas.openxmlformats.org/drawingml/2006/main" xmlns:r="http://schemas.openxmlformats.org/officeDocument/2006/relationships" xmlns:p="http://schemas.openxmlformats.org/presentationml/2006/main">
+  <p:cSld>
+    <p:spTree>
+      <p:nvGrpSpPr>
+        <p:cNvPr id="1" name=""/>
+        <p:cNvGrpSpPr/>
+        <p:nvPr/>
+      </p:nvGrpSpPr>
+      <p:grpSpPr>
+        <a:xfrm>
+          <a:off x="0" y="0"/>
+          <a:ext cx="0" cy="0"/>
+          <a:chOff x="0" y="0"/>
+          <a:chExt cx="0" cy="0"/>
+        </a:xfrm>
+      </p:grpSpPr>
+      <p:sp>
+        <p:nvSpPr>
+          <p:cNvPr id="2" name="Title 1"/>
+          <p:cNvSpPr>
+            <a:spLocks noGrp="1"/>
+          </p:cNvSpPr>
+          <p:nvPr>
+            <p:ph type="title"/>
+          </p:nvPr>
+        </p:nvSpPr>
+        <p:spPr/>
+        <p:txBody>
+          <a:bodyPr/>
+          <a:lstStyle/>
+          <a:p>
+            <a:r>
               <a:rPr lang="ru-RU" dirty="0" smtClean="0"/>
               <a:t>Механизм </a:t>
             </a:r>
@@ -13494,7 +13688,7 @@
 </p:sld>
 </file>
 
-<file path=ppt/slides/slide32.xml><?xml version="1.0" encoding="utf-8"?>
+<file path=ppt/slides/slide33.xml><?xml version="1.0" encoding="utf-8"?>
 <p:sld xmlns:a="http://schemas.openxmlformats.org/drawingml/2006/main" xmlns:r="http://schemas.openxmlformats.org/officeDocument/2006/relationships" xmlns:p="http://schemas.openxmlformats.org/presentationml/2006/main">
   <p:cSld>
     <p:spTree>
@@ -14365,7 +14559,7 @@
 </p:sld>
 </file>
 
-<file path=ppt/slides/slide33.xml><?xml version="1.0" encoding="utf-8"?>
+<file path=ppt/slides/slide34.xml><?xml version="1.0" encoding="utf-8"?>
 <p:sld xmlns:a="http://schemas.openxmlformats.org/drawingml/2006/main" xmlns:r="http://schemas.openxmlformats.org/officeDocument/2006/relationships" xmlns:p="http://schemas.openxmlformats.org/presentationml/2006/main">
   <p:cSld>
     <p:spTree>
@@ -15224,7 +15418,7 @@
 </p:sld>
 </file>
 
-<file path=ppt/slides/slide34.xml><?xml version="1.0" encoding="utf-8"?>
+<file path=ppt/slides/slide35.xml><?xml version="1.0" encoding="utf-8"?>
 <p:sld xmlns:a="http://schemas.openxmlformats.org/drawingml/2006/main" xmlns:r="http://schemas.openxmlformats.org/officeDocument/2006/relationships" xmlns:p="http://schemas.openxmlformats.org/presentationml/2006/main">
   <p:cSld>
     <p:spTree>
@@ -15878,7 +16072,7 @@
 </p:sld>
 </file>
 
-<file path=ppt/slides/slide35.xml><?xml version="1.0" encoding="utf-8"?>
+<file path=ppt/slides/slide36.xml><?xml version="1.0" encoding="utf-8"?>
 <p:sld xmlns:a="http://schemas.openxmlformats.org/drawingml/2006/main" xmlns:r="http://schemas.openxmlformats.org/officeDocument/2006/relationships" xmlns:p="http://schemas.openxmlformats.org/presentationml/2006/main">
   <p:cSld>
     <p:spTree>

</xml_diff>

<commit_message>
More about Reflection scenarios
</commit_message>
<xml_diff>
--- a/Presentation/lesson-07-reflection.pptx
+++ b/Presentation/lesson-07-reflection.pptx
@@ -231,7 +231,7 @@
             <a:fld id="{B24A7054-7FFB-49F4-A126-5DF6E687FF53}" type="datetimeFigureOut">
               <a:rPr lang="ru-RU" smtClean="0"/>
               <a:pPr/>
-              <a:t>22.04.2014</a:t>
+              <a:t>03.06.2014</a:t>
             </a:fld>
             <a:endParaRPr lang="ru-RU"/>
           </a:p>
@@ -1515,7 +1515,7 @@
             <a:fld id="{8E6E6A2A-E9D3-4A0D-B04A-ABDD367A1E08}" type="datetimeFigureOut">
               <a:rPr lang="ru-RU" smtClean="0"/>
               <a:pPr/>
-              <a:t>22.04.2014</a:t>
+              <a:t>03.06.2014</a:t>
             </a:fld>
             <a:endParaRPr lang="ru-RU"/>
           </a:p>
@@ -1759,7 +1759,7 @@
             <a:fld id="{8E6E6A2A-E9D3-4A0D-B04A-ABDD367A1E08}" type="datetimeFigureOut">
               <a:rPr lang="ru-RU" smtClean="0"/>
               <a:pPr/>
-              <a:t>22.04.2014</a:t>
+              <a:t>03.06.2014</a:t>
             </a:fld>
             <a:endParaRPr lang="ru-RU"/>
           </a:p>
@@ -1931,7 +1931,7 @@
             <a:fld id="{8E6E6A2A-E9D3-4A0D-B04A-ABDD367A1E08}" type="datetimeFigureOut">
               <a:rPr lang="ru-RU" smtClean="0"/>
               <a:pPr/>
-              <a:t>22.04.2014</a:t>
+              <a:t>03.06.2014</a:t>
             </a:fld>
             <a:endParaRPr lang="ru-RU"/>
           </a:p>
@@ -2179,7 +2179,7 @@
             <a:fld id="{8E6E6A2A-E9D3-4A0D-B04A-ABDD367A1E08}" type="datetimeFigureOut">
               <a:rPr lang="ru-RU" smtClean="0"/>
               <a:pPr/>
-              <a:t>22.04.2014</a:t>
+              <a:t>03.06.2014</a:t>
             </a:fld>
             <a:endParaRPr lang="ru-RU"/>
           </a:p>
@@ -2469,7 +2469,7 @@
             <a:fld id="{8E6E6A2A-E9D3-4A0D-B04A-ABDD367A1E08}" type="datetimeFigureOut">
               <a:rPr lang="ru-RU" smtClean="0"/>
               <a:pPr/>
-              <a:t>22.04.2014</a:t>
+              <a:t>03.06.2014</a:t>
             </a:fld>
             <a:endParaRPr lang="ru-RU"/>
           </a:p>
@@ -2893,7 +2893,7 @@
             <a:fld id="{8E6E6A2A-E9D3-4A0D-B04A-ABDD367A1E08}" type="datetimeFigureOut">
               <a:rPr lang="ru-RU" smtClean="0"/>
               <a:pPr/>
-              <a:t>22.04.2014</a:t>
+              <a:t>03.06.2014</a:t>
             </a:fld>
             <a:endParaRPr lang="ru-RU"/>
           </a:p>
@@ -3222,7 +3222,7 @@
             <a:fld id="{8E6E6A2A-E9D3-4A0D-B04A-ABDD367A1E08}" type="datetimeFigureOut">
               <a:rPr lang="ru-RU" smtClean="0"/>
               <a:pPr/>
-              <a:t>22.04.2014</a:t>
+              <a:t>03.06.2014</a:t>
             </a:fld>
             <a:endParaRPr lang="ru-RU"/>
           </a:p>
@@ -3319,7 +3319,7 @@
             <a:fld id="{8E6E6A2A-E9D3-4A0D-B04A-ABDD367A1E08}" type="datetimeFigureOut">
               <a:rPr lang="ru-RU" smtClean="0"/>
               <a:pPr/>
-              <a:t>22.04.2014</a:t>
+              <a:t>03.06.2014</a:t>
             </a:fld>
             <a:endParaRPr lang="ru-RU"/>
           </a:p>
@@ -3598,7 +3598,7 @@
             <a:fld id="{8E6E6A2A-E9D3-4A0D-B04A-ABDD367A1E08}" type="datetimeFigureOut">
               <a:rPr lang="ru-RU" smtClean="0"/>
               <a:pPr/>
-              <a:t>22.04.2014</a:t>
+              <a:t>03.06.2014</a:t>
             </a:fld>
             <a:endParaRPr lang="ru-RU"/>
           </a:p>
@@ -3853,7 +3853,7 @@
             <a:fld id="{8E6E6A2A-E9D3-4A0D-B04A-ABDD367A1E08}" type="datetimeFigureOut">
               <a:rPr lang="ru-RU" smtClean="0"/>
               <a:pPr/>
-              <a:t>22.04.2014</a:t>
+              <a:t>03.06.2014</a:t>
             </a:fld>
             <a:endParaRPr lang="ru-RU"/>
           </a:p>
@@ -4025,7 +4025,7 @@
             <a:fld id="{8E6E6A2A-E9D3-4A0D-B04A-ABDD367A1E08}" type="datetimeFigureOut">
               <a:rPr lang="ru-RU" smtClean="0"/>
               <a:pPr/>
-              <a:t>22.04.2014</a:t>
+              <a:t>03.06.2014</a:t>
             </a:fld>
             <a:endParaRPr lang="ru-RU"/>
           </a:p>
@@ -4207,7 +4207,7 @@
             <a:fld id="{8E6E6A2A-E9D3-4A0D-B04A-ABDD367A1E08}" type="datetimeFigureOut">
               <a:rPr lang="ru-RU" smtClean="0"/>
               <a:pPr/>
-              <a:t>22.04.2014</a:t>
+              <a:t>03.06.2014</a:t>
             </a:fld>
             <a:endParaRPr lang="ru-RU"/>
           </a:p>
@@ -5445,7 +5445,7 @@
             <a:fld id="{AC3D3127-B7C4-45E3-9797-C527EC9FDD78}" type="datetimeFigureOut">
               <a:rPr lang="ru-RU" smtClean="0"/>
               <a:pPr/>
-              <a:t>22.04.2014</a:t>
+              <a:t>03.06.2014</a:t>
             </a:fld>
             <a:endParaRPr lang="ru-RU"/>
           </a:p>
@@ -5967,7 +5967,7 @@
             <a:fld id="{8E6E6A2A-E9D3-4A0D-B04A-ABDD367A1E08}" type="datetimeFigureOut">
               <a:rPr lang="ru-RU" smtClean="0"/>
               <a:pPr/>
-              <a:t>22.04.2014</a:t>
+              <a:t>03.06.2014</a:t>
             </a:fld>
             <a:endParaRPr lang="ru-RU"/>
           </a:p>
@@ -7685,7 +7685,7 @@
         </p:spPr>
         <p:txBody>
           <a:bodyPr numCol="1">
-            <a:normAutofit fontScale="92500" lnSpcReduction="10000"/>
+            <a:normAutofit fontScale="92500" lnSpcReduction="20000"/>
           </a:bodyPr>
           <a:lstStyle/>
           <a:p>
@@ -7703,7 +7703,15 @@
                   <a:schemeClr val="bg1"/>
                 </a:solidFill>
               </a:rPr>
-              <a:t>(</a:t>
+              <a:t>(VS Code Analysis </a:t>
+            </a:r>
+            <a:r>
+              <a:rPr lang="ru-RU" sz="2400" dirty="0" smtClean="0">
+                <a:solidFill>
+                  <a:schemeClr val="bg1"/>
+                </a:solidFill>
+              </a:rPr>
+              <a:t>и другие</a:t>
             </a:r>
             <a:r>
               <a:rPr lang="en-US" sz="2400" dirty="0" smtClean="0">
@@ -7711,7 +7719,17 @@
                   <a:schemeClr val="bg1"/>
                 </a:solidFill>
               </a:rPr>
-              <a:t>VS </a:t>
+              <a:t>)</a:t>
+            </a:r>
+          </a:p>
+          <a:p>
+            <a:r>
+              <a:rPr lang="ru-RU" sz="2400" dirty="0" smtClean="0">
+                <a:solidFill>
+                  <a:schemeClr val="bg1"/>
+                </a:solidFill>
+              </a:rPr>
+              <a:t>Возможность модификации кода после компиляции. (АОП, </a:t>
             </a:r>
             <a:r>
               <a:rPr lang="en-US" sz="2400" dirty="0" smtClean="0">
@@ -7719,33 +7737,15 @@
                   <a:schemeClr val="bg1"/>
                 </a:solidFill>
               </a:rPr>
-              <a:t>Code Analysis)</a:t>
-            </a:r>
-          </a:p>
-          <a:p>
+              <a:t>MS Code Contracts</a:t>
+            </a:r>
             <a:r>
               <a:rPr lang="ru-RU" sz="2400" dirty="0" smtClean="0">
                 <a:solidFill>
                   <a:schemeClr val="bg1"/>
                 </a:solidFill>
               </a:rPr>
-              <a:t>Возможность модификации кода после компиляции. (АОП и </a:t>
-            </a:r>
-            <a:r>
-              <a:rPr lang="en-US" sz="2400" dirty="0" smtClean="0">
-                <a:solidFill>
-                  <a:schemeClr val="bg1"/>
-                </a:solidFill>
-              </a:rPr>
-              <a:t>MS Code Contracts</a:t>
-            </a:r>
-            <a:r>
-              <a:rPr lang="ru-RU" sz="2400" dirty="0" smtClean="0">
-                <a:solidFill>
-                  <a:schemeClr val="bg1"/>
-                </a:solidFill>
-              </a:rPr>
-              <a:t>)</a:t>
+              <a:t> и т.д.)</a:t>
             </a:r>
             <a:endParaRPr lang="ru-RU" sz="2400" dirty="0">
               <a:solidFill>
@@ -7773,7 +7773,7 @@
           </a:p>
           <a:p>
             <a:r>
-              <a:rPr lang="ru-RU" sz="2400" smtClean="0">
+              <a:rPr lang="ru-RU" sz="2400" dirty="0" smtClean="0">
                 <a:solidFill>
                   <a:schemeClr val="bg1"/>
                 </a:solidFill>
@@ -7964,7 +7964,23 @@
                   <a:schemeClr val="bg1"/>
                 </a:solidFill>
               </a:rPr>
-              <a:t>-компиляция занимает время и дополнительную память </a:t>
+              <a:t>-компиляция занимает время и дополнительную память (станет меньшей проблемой после выхода </a:t>
+            </a:r>
+            <a:r>
+              <a:rPr lang="en-US" sz="2400" dirty="0" smtClean="0">
+                <a:solidFill>
+                  <a:schemeClr val="bg1"/>
+                </a:solidFill>
+              </a:rPr>
+              <a:t>.NET Native</a:t>
+            </a:r>
+            <a:r>
+              <a:rPr lang="ru-RU" sz="2400" dirty="0" smtClean="0">
+                <a:solidFill>
+                  <a:schemeClr val="bg1"/>
+                </a:solidFill>
+              </a:rPr>
+              <a:t>)</a:t>
             </a:r>
             <a:endParaRPr lang="en-US" sz="2400" dirty="0" smtClean="0">
               <a:solidFill>
@@ -14167,7 +14183,9 @@
         </p:nvSpPr>
         <p:spPr/>
         <p:txBody>
-          <a:bodyPr/>
+          <a:bodyPr>
+            <a:normAutofit fontScale="70000" lnSpcReduction="20000"/>
+          </a:bodyPr>
           <a:lstStyle/>
           <a:p>
             <a:pPr marL="0" indent="0">
@@ -14175,11 +14193,166 @@
             </a:pPr>
             <a:r>
               <a:rPr lang="ru-RU" dirty="0" smtClean="0"/>
+              <a:t>Реализация механизма </a:t>
+            </a:r>
+            <a:r>
+              <a:rPr lang="en-US" dirty="0" smtClean="0"/>
+              <a:t>RTTI </a:t>
+            </a:r>
+            <a:r>
+              <a:rPr lang="ru-RU" dirty="0" smtClean="0"/>
+              <a:t>(</a:t>
+            </a:r>
+            <a:r>
+              <a:rPr lang="en-US" dirty="0" smtClean="0"/>
+              <a:t>Run-time Type Information). </a:t>
+            </a:r>
+            <a:r>
+              <a:rPr lang="ru-RU" dirty="0" smtClean="0"/>
               <a:t>Пространство имен </a:t>
             </a:r>
             <a:r>
               <a:rPr lang="en-US" dirty="0" err="1" smtClean="0"/>
               <a:t>System.Reflection</a:t>
+            </a:r>
+            <a:r>
+              <a:rPr lang="en-US" dirty="0" smtClean="0"/>
+              <a:t>.</a:t>
+            </a:r>
+          </a:p>
+          <a:p>
+            <a:pPr marL="0" indent="0">
+              <a:buNone/>
+            </a:pPr>
+            <a:endParaRPr lang="en-US" dirty="0" smtClean="0"/>
+          </a:p>
+          <a:p>
+            <a:r>
+              <a:rPr lang="ru-RU" b="1" dirty="0" smtClean="0"/>
+              <a:t>Генерация кода. </a:t>
+            </a:r>
+            <a:r>
+              <a:rPr lang="ru-RU" dirty="0" smtClean="0"/>
+              <a:t>Иногда в паре с </a:t>
+            </a:r>
+            <a:r>
+              <a:rPr lang="en-US" dirty="0" smtClean="0"/>
+              <a:t>T4 </a:t>
+            </a:r>
+            <a:r>
+              <a:rPr lang="ru-RU" dirty="0" smtClean="0"/>
+              <a:t>шаблонами</a:t>
+            </a:r>
+            <a:r>
+              <a:rPr lang="en-US" dirty="0" smtClean="0"/>
+              <a:t>.</a:t>
+            </a:r>
+            <a:endParaRPr lang="en-US" dirty="0" smtClean="0"/>
+          </a:p>
+          <a:p>
+            <a:r>
+              <a:rPr lang="ru-RU" b="1" dirty="0" smtClean="0"/>
+              <a:t>Автоматическая </a:t>
+            </a:r>
+            <a:r>
+              <a:rPr lang="ru-RU" b="1" dirty="0" smtClean="0"/>
+              <a:t>генерация </a:t>
+            </a:r>
+            <a:r>
+              <a:rPr lang="en-US" b="1" dirty="0" smtClean="0"/>
+              <a:t>UI</a:t>
+            </a:r>
+            <a:r>
+              <a:rPr lang="en-US" dirty="0" smtClean="0"/>
+              <a:t> (</a:t>
+            </a:r>
+            <a:r>
+              <a:rPr lang="ru-RU" dirty="0" smtClean="0"/>
+              <a:t>например</a:t>
+            </a:r>
+            <a:r>
+              <a:rPr lang="en-US" dirty="0" smtClean="0"/>
+              <a:t>, property </a:t>
+            </a:r>
+            <a:r>
+              <a:rPr lang="en-US" dirty="0"/>
+              <a:t>editor</a:t>
+            </a:r>
+            <a:r>
+              <a:rPr lang="en-US" dirty="0" smtClean="0"/>
+              <a:t>).</a:t>
+            </a:r>
+            <a:endParaRPr lang="en-US" dirty="0"/>
+          </a:p>
+          <a:p>
+            <a:r>
+              <a:rPr lang="ru-RU" b="1" dirty="0" smtClean="0"/>
+              <a:t>Сериализация</a:t>
+            </a:r>
+            <a:r>
+              <a:rPr lang="en-US" dirty="0" smtClean="0"/>
+              <a:t>. </a:t>
+            </a:r>
+            <a:r>
+              <a:rPr lang="ru-RU" dirty="0" smtClean="0"/>
+              <a:t>Определение списка членов класса подлежащих сериализации и последующее восстановление.</a:t>
+            </a:r>
+            <a:endParaRPr lang="en-US" dirty="0"/>
+          </a:p>
+          <a:p>
+            <a:r>
+              <a:rPr lang="ru-RU" b="1" dirty="0" smtClean="0"/>
+              <a:t>Веб-сервисы</a:t>
+            </a:r>
+            <a:r>
+              <a:rPr lang="en-US" dirty="0" smtClean="0"/>
+              <a:t>. </a:t>
+            </a:r>
+            <a:r>
+              <a:rPr lang="ru-RU" dirty="0" smtClean="0"/>
+              <a:t>Близко к сериализации. Генерация классов на основе </a:t>
+            </a:r>
+            <a:r>
+              <a:rPr lang="en-US" dirty="0" smtClean="0"/>
+              <a:t>WSDL.</a:t>
+            </a:r>
+            <a:endParaRPr lang="en-US" dirty="0"/>
+          </a:p>
+          <a:p>
+            <a:r>
+              <a:rPr lang="ru-RU" b="1" dirty="0" smtClean="0"/>
+              <a:t>Предметно-ориентированные языки</a:t>
+            </a:r>
+            <a:r>
+              <a:rPr lang="en-US" b="1" dirty="0" smtClean="0"/>
+              <a:t> (DSL)</a:t>
+            </a:r>
+            <a:r>
+              <a:rPr lang="en-US" dirty="0" smtClean="0"/>
+              <a:t>. </a:t>
+            </a:r>
+            <a:r>
+              <a:rPr lang="ru-RU" dirty="0" smtClean="0"/>
+              <a:t>Интерпретированные скриптовые языки могут работать с слабо-типизированными объектами с помощью </a:t>
+            </a:r>
+            <a:r>
+              <a:rPr lang="en-US" dirty="0" smtClean="0"/>
+              <a:t>reflection.</a:t>
+            </a:r>
+            <a:endParaRPr lang="en-US" dirty="0"/>
+          </a:p>
+          <a:p>
+            <a:r>
+              <a:rPr lang="ru-RU" b="1" dirty="0" smtClean="0"/>
+              <a:t>Средства отладки</a:t>
+            </a:r>
+            <a:r>
+              <a:rPr lang="en-US" dirty="0" smtClean="0"/>
+              <a:t>. </a:t>
+            </a:r>
+            <a:r>
+              <a:rPr lang="ru-RU" dirty="0" smtClean="0"/>
+              <a:t>Исследование состояния любого объекта.</a:t>
             </a:r>
             <a:endParaRPr lang="en-US" dirty="0"/>
           </a:p>

</xml_diff>

<commit_message>
How to add to GAC
</commit_message>
<xml_diff>
--- a/Presentation/lesson-07-reflection.pptx
+++ b/Presentation/lesson-07-reflection.pptx
@@ -235,7 +235,7 @@
             <a:fld id="{B24A7054-7FFB-49F4-A126-5DF6E687FF53}" type="datetimeFigureOut">
               <a:rPr lang="ru-RU" smtClean="0"/>
               <a:pPr/>
-              <a:t>04.09.2014</a:t>
+              <a:t>11.09.2014</a:t>
             </a:fld>
             <a:endParaRPr lang="ru-RU"/>
           </a:p>
@@ -1519,7 +1519,7 @@
             <a:fld id="{8E6E6A2A-E9D3-4A0D-B04A-ABDD367A1E08}" type="datetimeFigureOut">
               <a:rPr lang="ru-RU" smtClean="0"/>
               <a:pPr/>
-              <a:t>04.09.2014</a:t>
+              <a:t>11.09.2014</a:t>
             </a:fld>
             <a:endParaRPr lang="ru-RU"/>
           </a:p>
@@ -1763,7 +1763,7 @@
             <a:fld id="{8E6E6A2A-E9D3-4A0D-B04A-ABDD367A1E08}" type="datetimeFigureOut">
               <a:rPr lang="ru-RU" smtClean="0"/>
               <a:pPr/>
-              <a:t>04.09.2014</a:t>
+              <a:t>11.09.2014</a:t>
             </a:fld>
             <a:endParaRPr lang="ru-RU"/>
           </a:p>
@@ -1935,7 +1935,7 @@
             <a:fld id="{8E6E6A2A-E9D3-4A0D-B04A-ABDD367A1E08}" type="datetimeFigureOut">
               <a:rPr lang="ru-RU" smtClean="0"/>
               <a:pPr/>
-              <a:t>04.09.2014</a:t>
+              <a:t>11.09.2014</a:t>
             </a:fld>
             <a:endParaRPr lang="ru-RU"/>
           </a:p>
@@ -2183,7 +2183,7 @@
             <a:fld id="{8E6E6A2A-E9D3-4A0D-B04A-ABDD367A1E08}" type="datetimeFigureOut">
               <a:rPr lang="ru-RU" smtClean="0"/>
               <a:pPr/>
-              <a:t>04.09.2014</a:t>
+              <a:t>11.09.2014</a:t>
             </a:fld>
             <a:endParaRPr lang="ru-RU"/>
           </a:p>
@@ -2473,7 +2473,7 @@
             <a:fld id="{8E6E6A2A-E9D3-4A0D-B04A-ABDD367A1E08}" type="datetimeFigureOut">
               <a:rPr lang="ru-RU" smtClean="0"/>
               <a:pPr/>
-              <a:t>04.09.2014</a:t>
+              <a:t>11.09.2014</a:t>
             </a:fld>
             <a:endParaRPr lang="ru-RU"/>
           </a:p>
@@ -2897,7 +2897,7 @@
             <a:fld id="{8E6E6A2A-E9D3-4A0D-B04A-ABDD367A1E08}" type="datetimeFigureOut">
               <a:rPr lang="ru-RU" smtClean="0"/>
               <a:pPr/>
-              <a:t>04.09.2014</a:t>
+              <a:t>11.09.2014</a:t>
             </a:fld>
             <a:endParaRPr lang="ru-RU"/>
           </a:p>
@@ -3226,7 +3226,7 @@
             <a:fld id="{8E6E6A2A-E9D3-4A0D-B04A-ABDD367A1E08}" type="datetimeFigureOut">
               <a:rPr lang="ru-RU" smtClean="0"/>
               <a:pPr/>
-              <a:t>04.09.2014</a:t>
+              <a:t>11.09.2014</a:t>
             </a:fld>
             <a:endParaRPr lang="ru-RU"/>
           </a:p>
@@ -3323,7 +3323,7 @@
             <a:fld id="{8E6E6A2A-E9D3-4A0D-B04A-ABDD367A1E08}" type="datetimeFigureOut">
               <a:rPr lang="ru-RU" smtClean="0"/>
               <a:pPr/>
-              <a:t>04.09.2014</a:t>
+              <a:t>11.09.2014</a:t>
             </a:fld>
             <a:endParaRPr lang="ru-RU"/>
           </a:p>
@@ -3602,7 +3602,7 @@
             <a:fld id="{8E6E6A2A-E9D3-4A0D-B04A-ABDD367A1E08}" type="datetimeFigureOut">
               <a:rPr lang="ru-RU" smtClean="0"/>
               <a:pPr/>
-              <a:t>04.09.2014</a:t>
+              <a:t>11.09.2014</a:t>
             </a:fld>
             <a:endParaRPr lang="ru-RU"/>
           </a:p>
@@ -3857,7 +3857,7 @@
             <a:fld id="{8E6E6A2A-E9D3-4A0D-B04A-ABDD367A1E08}" type="datetimeFigureOut">
               <a:rPr lang="ru-RU" smtClean="0"/>
               <a:pPr/>
-              <a:t>04.09.2014</a:t>
+              <a:t>11.09.2014</a:t>
             </a:fld>
             <a:endParaRPr lang="ru-RU"/>
           </a:p>
@@ -4029,7 +4029,7 @@
             <a:fld id="{8E6E6A2A-E9D3-4A0D-B04A-ABDD367A1E08}" type="datetimeFigureOut">
               <a:rPr lang="ru-RU" smtClean="0"/>
               <a:pPr/>
-              <a:t>04.09.2014</a:t>
+              <a:t>11.09.2014</a:t>
             </a:fld>
             <a:endParaRPr lang="ru-RU"/>
           </a:p>
@@ -4211,7 +4211,7 @@
             <a:fld id="{8E6E6A2A-E9D3-4A0D-B04A-ABDD367A1E08}" type="datetimeFigureOut">
               <a:rPr lang="ru-RU" smtClean="0"/>
               <a:pPr/>
-              <a:t>04.09.2014</a:t>
+              <a:t>11.09.2014</a:t>
             </a:fld>
             <a:endParaRPr lang="ru-RU"/>
           </a:p>
@@ -5449,7 +5449,7 @@
             <a:fld id="{AC3D3127-B7C4-45E3-9797-C527EC9FDD78}" type="datetimeFigureOut">
               <a:rPr lang="ru-RU" smtClean="0"/>
               <a:pPr/>
-              <a:t>04.09.2014</a:t>
+              <a:t>11.09.2014</a:t>
             </a:fld>
             <a:endParaRPr lang="ru-RU"/>
           </a:p>
@@ -5971,7 +5971,7 @@
             <a:fld id="{8E6E6A2A-E9D3-4A0D-B04A-ABDD367A1E08}" type="datetimeFigureOut">
               <a:rPr lang="ru-RU" smtClean="0"/>
               <a:pPr/>
-              <a:t>04.09.2014</a:t>
+              <a:t>11.09.2014</a:t>
             </a:fld>
             <a:endParaRPr lang="ru-RU"/>
           </a:p>
@@ -7714,15 +7714,7 @@
                   <a:schemeClr val="bg1"/>
                 </a:solidFill>
               </a:rPr>
-              <a:t>Возможность </a:t>
-            </a:r>
-            <a:r>
-              <a:rPr lang="ru-RU" sz="2400" dirty="0" smtClean="0">
-                <a:solidFill>
-                  <a:schemeClr val="bg1"/>
-                </a:solidFill>
-              </a:rPr>
-              <a:t>статического анализа уже откомпилированного кода. </a:t>
+              <a:t>Возможность статического анализа уже откомпилированного кода. </a:t>
             </a:r>
             <a:r>
               <a:rPr lang="en-US" sz="2400" dirty="0" smtClean="0">
@@ -13691,7 +13683,9 @@
         </p:nvSpPr>
         <p:spPr/>
         <p:txBody>
-          <a:bodyPr/>
+          <a:bodyPr>
+            <a:normAutofit fontScale="92500"/>
+          </a:bodyPr>
           <a:lstStyle/>
           <a:p>
             <a:r>
@@ -13735,8 +13729,21 @@
             </a:r>
             <a:r>
               <a:rPr lang="en-US" dirty="0" smtClean="0"/>
-              <a:t>.NET 4+)</a:t>
-            </a:r>
+              <a:t>.NET </a:t>
+            </a:r>
+            <a:r>
+              <a:rPr lang="en-US" dirty="0" smtClean="0"/>
+              <a:t>4 </a:t>
+            </a:r>
+            <a:r>
+              <a:rPr lang="ru-RU" dirty="0" smtClean="0"/>
+              <a:t>и выше</a:t>
+            </a:r>
+            <a:r>
+              <a:rPr lang="en-US" dirty="0" smtClean="0"/>
+              <a:t>)</a:t>
+            </a:r>
+            <a:endParaRPr lang="en-US" dirty="0" smtClean="0"/>
           </a:p>
           <a:p>
             <a:r>
@@ -13744,9 +13751,74 @@
               <a:t>Добавление сборки в </a:t>
             </a:r>
             <a:r>
-              <a:rPr lang="en-US" smtClean="0"/>
+              <a:rPr lang="en-US" dirty="0" smtClean="0"/>
               <a:t>GAC</a:t>
             </a:r>
+          </a:p>
+          <a:p>
+            <a:pPr lvl="1"/>
+            <a:r>
+              <a:rPr lang="ru-RU" dirty="0" smtClean="0"/>
+              <a:t>На компьютере разработчика</a:t>
+            </a:r>
+          </a:p>
+          <a:p>
+            <a:pPr lvl="2"/>
+            <a:r>
+              <a:rPr lang="en-US" dirty="0" err="1" smtClean="0"/>
+              <a:t>gacutil</a:t>
+            </a:r>
+            <a:r>
+              <a:rPr lang="ru-RU" dirty="0" smtClean="0"/>
+              <a:t> из </a:t>
+            </a:r>
+            <a:r>
+              <a:rPr lang="en-US" dirty="0" smtClean="0"/>
+              <a:t>Windows SDK</a:t>
+            </a:r>
+          </a:p>
+          <a:p>
+            <a:pPr lvl="2"/>
+            <a:r>
+              <a:rPr lang="ru-RU" dirty="0" smtClean="0"/>
+              <a:t>Для </a:t>
+            </a:r>
+            <a:r>
+              <a:rPr lang="en-US" dirty="0" smtClean="0"/>
+              <a:t>.NET 1.0 - 3.5 drag-n-drop </a:t>
+            </a:r>
+            <a:r>
+              <a:rPr lang="ru-RU" dirty="0" smtClean="0"/>
+              <a:t>в папку </a:t>
+            </a:r>
+            <a:r>
+              <a:rPr lang="en-US" dirty="0" smtClean="0"/>
+              <a:t>%</a:t>
+            </a:r>
+            <a:r>
+              <a:rPr lang="en-US" dirty="0" err="1" smtClean="0"/>
+              <a:t>windir</a:t>
+            </a:r>
+            <a:r>
+              <a:rPr lang="en-US" dirty="0" smtClean="0"/>
+              <a:t>%\assembly</a:t>
+            </a:r>
+          </a:p>
+          <a:p>
+            <a:pPr lvl="1"/>
+            <a:r>
+              <a:rPr lang="ru-RU" dirty="0" smtClean="0"/>
+              <a:t>На компьютере клиента</a:t>
+            </a:r>
+            <a:endParaRPr lang="en-US" dirty="0" smtClean="0"/>
+          </a:p>
+          <a:p>
+            <a:pPr lvl="2"/>
+            <a:r>
+              <a:rPr lang="ru-RU" dirty="0" smtClean="0"/>
+              <a:t>Программа установки</a:t>
+            </a:r>
+            <a:endParaRPr lang="en-US" dirty="0" smtClean="0"/>
           </a:p>
           <a:p>
             <a:pPr lvl="1"/>

</xml_diff>

<commit_message>
More details about assemblies
IL and references from strong name assemblies
</commit_message>
<xml_diff>
--- a/Presentation/lesson-07-reflection.pptx
+++ b/Presentation/lesson-07-reflection.pptx
@@ -6,7 +6,7 @@
     <p:sldMasterId id="2147483663" r:id="rId2"/>
   </p:sldMasterIdLst>
   <p:notesMasterIdLst>
-    <p:notesMasterId r:id="rId46"/>
+    <p:notesMasterId r:id="rId47"/>
   </p:notesMasterIdLst>
   <p:sldIdLst>
     <p:sldId id="257" r:id="rId3"/>
@@ -39,19 +39,20 @@
     <p:sldId id="281" r:id="rId30"/>
     <p:sldId id="282" r:id="rId31"/>
     <p:sldId id="292" r:id="rId32"/>
-    <p:sldId id="284" r:id="rId33"/>
-    <p:sldId id="262" r:id="rId34"/>
-    <p:sldId id="261" r:id="rId35"/>
-    <p:sldId id="300" r:id="rId36"/>
-    <p:sldId id="306" r:id="rId37"/>
-    <p:sldId id="310" r:id="rId38"/>
-    <p:sldId id="312" r:id="rId39"/>
-    <p:sldId id="311" r:id="rId40"/>
-    <p:sldId id="299" r:id="rId41"/>
-    <p:sldId id="263" r:id="rId42"/>
-    <p:sldId id="264" r:id="rId43"/>
-    <p:sldId id="265" r:id="rId44"/>
-    <p:sldId id="271" r:id="rId45"/>
+    <p:sldId id="315" r:id="rId33"/>
+    <p:sldId id="284" r:id="rId34"/>
+    <p:sldId id="262" r:id="rId35"/>
+    <p:sldId id="261" r:id="rId36"/>
+    <p:sldId id="300" r:id="rId37"/>
+    <p:sldId id="306" r:id="rId38"/>
+    <p:sldId id="310" r:id="rId39"/>
+    <p:sldId id="312" r:id="rId40"/>
+    <p:sldId id="311" r:id="rId41"/>
+    <p:sldId id="299" r:id="rId42"/>
+    <p:sldId id="263" r:id="rId43"/>
+    <p:sldId id="264" r:id="rId44"/>
+    <p:sldId id="265" r:id="rId45"/>
+    <p:sldId id="271" r:id="rId46"/>
   </p:sldIdLst>
   <p:sldSz cx="9144000" cy="6858000" type="screen4x3"/>
   <p:notesSz cx="6858000" cy="9144000"/>
@@ -236,7 +237,7 @@
             <a:fld id="{B24A7054-7FFB-49F4-A126-5DF6E687FF53}" type="datetimeFigureOut">
               <a:rPr lang="ru-RU" smtClean="0"/>
               <a:pPr/>
-              <a:t>11.09.2014</a:t>
+              <a:t>12.09.2014</a:t>
             </a:fld>
             <a:endParaRPr lang="ru-RU"/>
           </a:p>
@@ -1520,7 +1521,7 @@
             <a:fld id="{8E6E6A2A-E9D3-4A0D-B04A-ABDD367A1E08}" type="datetimeFigureOut">
               <a:rPr lang="ru-RU" smtClean="0"/>
               <a:pPr/>
-              <a:t>11.09.2014</a:t>
+              <a:t>12.09.2014</a:t>
             </a:fld>
             <a:endParaRPr lang="ru-RU"/>
           </a:p>
@@ -1764,7 +1765,7 @@
             <a:fld id="{8E6E6A2A-E9D3-4A0D-B04A-ABDD367A1E08}" type="datetimeFigureOut">
               <a:rPr lang="ru-RU" smtClean="0"/>
               <a:pPr/>
-              <a:t>11.09.2014</a:t>
+              <a:t>12.09.2014</a:t>
             </a:fld>
             <a:endParaRPr lang="ru-RU"/>
           </a:p>
@@ -1936,7 +1937,7 @@
             <a:fld id="{8E6E6A2A-E9D3-4A0D-B04A-ABDD367A1E08}" type="datetimeFigureOut">
               <a:rPr lang="ru-RU" smtClean="0"/>
               <a:pPr/>
-              <a:t>11.09.2014</a:t>
+              <a:t>12.09.2014</a:t>
             </a:fld>
             <a:endParaRPr lang="ru-RU"/>
           </a:p>
@@ -2184,7 +2185,7 @@
             <a:fld id="{8E6E6A2A-E9D3-4A0D-B04A-ABDD367A1E08}" type="datetimeFigureOut">
               <a:rPr lang="ru-RU" smtClean="0"/>
               <a:pPr/>
-              <a:t>11.09.2014</a:t>
+              <a:t>12.09.2014</a:t>
             </a:fld>
             <a:endParaRPr lang="ru-RU"/>
           </a:p>
@@ -2474,7 +2475,7 @@
             <a:fld id="{8E6E6A2A-E9D3-4A0D-B04A-ABDD367A1E08}" type="datetimeFigureOut">
               <a:rPr lang="ru-RU" smtClean="0"/>
               <a:pPr/>
-              <a:t>11.09.2014</a:t>
+              <a:t>12.09.2014</a:t>
             </a:fld>
             <a:endParaRPr lang="ru-RU"/>
           </a:p>
@@ -2898,7 +2899,7 @@
             <a:fld id="{8E6E6A2A-E9D3-4A0D-B04A-ABDD367A1E08}" type="datetimeFigureOut">
               <a:rPr lang="ru-RU" smtClean="0"/>
               <a:pPr/>
-              <a:t>11.09.2014</a:t>
+              <a:t>12.09.2014</a:t>
             </a:fld>
             <a:endParaRPr lang="ru-RU"/>
           </a:p>
@@ -3227,7 +3228,7 @@
             <a:fld id="{8E6E6A2A-E9D3-4A0D-B04A-ABDD367A1E08}" type="datetimeFigureOut">
               <a:rPr lang="ru-RU" smtClean="0"/>
               <a:pPr/>
-              <a:t>11.09.2014</a:t>
+              <a:t>12.09.2014</a:t>
             </a:fld>
             <a:endParaRPr lang="ru-RU"/>
           </a:p>
@@ -3324,7 +3325,7 @@
             <a:fld id="{8E6E6A2A-E9D3-4A0D-B04A-ABDD367A1E08}" type="datetimeFigureOut">
               <a:rPr lang="ru-RU" smtClean="0"/>
               <a:pPr/>
-              <a:t>11.09.2014</a:t>
+              <a:t>12.09.2014</a:t>
             </a:fld>
             <a:endParaRPr lang="ru-RU"/>
           </a:p>
@@ -3603,7 +3604,7 @@
             <a:fld id="{8E6E6A2A-E9D3-4A0D-B04A-ABDD367A1E08}" type="datetimeFigureOut">
               <a:rPr lang="ru-RU" smtClean="0"/>
               <a:pPr/>
-              <a:t>11.09.2014</a:t>
+              <a:t>12.09.2014</a:t>
             </a:fld>
             <a:endParaRPr lang="ru-RU"/>
           </a:p>
@@ -3858,7 +3859,7 @@
             <a:fld id="{8E6E6A2A-E9D3-4A0D-B04A-ABDD367A1E08}" type="datetimeFigureOut">
               <a:rPr lang="ru-RU" smtClean="0"/>
               <a:pPr/>
-              <a:t>11.09.2014</a:t>
+              <a:t>12.09.2014</a:t>
             </a:fld>
             <a:endParaRPr lang="ru-RU"/>
           </a:p>
@@ -4030,7 +4031,7 @@
             <a:fld id="{8E6E6A2A-E9D3-4A0D-B04A-ABDD367A1E08}" type="datetimeFigureOut">
               <a:rPr lang="ru-RU" smtClean="0"/>
               <a:pPr/>
-              <a:t>11.09.2014</a:t>
+              <a:t>12.09.2014</a:t>
             </a:fld>
             <a:endParaRPr lang="ru-RU"/>
           </a:p>
@@ -4212,7 +4213,7 @@
             <a:fld id="{8E6E6A2A-E9D3-4A0D-B04A-ABDD367A1E08}" type="datetimeFigureOut">
               <a:rPr lang="ru-RU" smtClean="0"/>
               <a:pPr/>
-              <a:t>11.09.2014</a:t>
+              <a:t>12.09.2014</a:t>
             </a:fld>
             <a:endParaRPr lang="ru-RU"/>
           </a:p>
@@ -5450,7 +5451,7 @@
             <a:fld id="{AC3D3127-B7C4-45E3-9797-C527EC9FDD78}" type="datetimeFigureOut">
               <a:rPr lang="ru-RU" smtClean="0"/>
               <a:pPr/>
-              <a:t>11.09.2014</a:t>
+              <a:t>12.09.2014</a:t>
             </a:fld>
             <a:endParaRPr lang="ru-RU"/>
           </a:p>
@@ -5972,7 +5973,7 @@
             <a:fld id="{8E6E6A2A-E9D3-4A0D-B04A-ABDD367A1E08}" type="datetimeFigureOut">
               <a:rPr lang="ru-RU" smtClean="0"/>
               <a:pPr/>
-              <a:t>11.09.2014</a:t>
+              <a:t>12.09.2014</a:t>
             </a:fld>
             <a:endParaRPr lang="ru-RU"/>
           </a:p>
@@ -13835,6 +13836,94 @@
           <a:p>
             <a:r>
               <a:rPr lang="ru-RU" dirty="0" smtClean="0"/>
+              <a:t>Строгое имя и ссылки на</a:t>
+            </a:r>
+            <a:br>
+              <a:rPr lang="ru-RU" dirty="0" smtClean="0"/>
+            </a:br>
+            <a:r>
+              <a:rPr lang="ru-RU" dirty="0" smtClean="0"/>
+              <a:t>другие сборки</a:t>
+            </a:r>
+            <a:endParaRPr lang="ru-RU" dirty="0"/>
+          </a:p>
+        </p:txBody>
+      </p:sp>
+      <p:sp>
+        <p:nvSpPr>
+          <p:cNvPr id="3" name="Content Placeholder 2"/>
+          <p:cNvSpPr>
+            <a:spLocks noGrp="1"/>
+          </p:cNvSpPr>
+          <p:nvPr>
+            <p:ph idx="1"/>
+          </p:nvPr>
+        </p:nvSpPr>
+        <p:spPr/>
+        <p:txBody>
+          <a:bodyPr/>
+          <a:lstStyle/>
+          <a:p>
+            <a:pPr marL="0" indent="0">
+              <a:buNone/>
+            </a:pPr>
+            <a:r>
+              <a:rPr lang="ru-RU" dirty="0" smtClean="0"/>
+              <a:t>Чтобы сборку получила строгое имя она также должна ссылаться только на сборки со строгим именем. Это необходимо из соображений беопасности чтобы нельзя было подменить неподписанную сборку.</a:t>
+            </a:r>
+            <a:endParaRPr lang="ru-RU" dirty="0"/>
+          </a:p>
+        </p:txBody>
+      </p:sp>
+    </p:spTree>
+    <p:extLst>
+      <p:ext uri="{BB962C8B-B14F-4D97-AF65-F5344CB8AC3E}">
+        <p14:creationId xmlns:p14="http://schemas.microsoft.com/office/powerpoint/2010/main" val="1023611748"/>
+      </p:ext>
+    </p:extLst>
+  </p:cSld>
+  <p:clrMapOvr>
+    <a:masterClrMapping/>
+  </p:clrMapOvr>
+</p:sld>
+</file>
+
+<file path=ppt/slides/slide32.xml><?xml version="1.0" encoding="utf-8"?>
+<p:sld xmlns:a="http://schemas.openxmlformats.org/drawingml/2006/main" xmlns:r="http://schemas.openxmlformats.org/officeDocument/2006/relationships" xmlns:p="http://schemas.openxmlformats.org/presentationml/2006/main">
+  <p:cSld>
+    <p:spTree>
+      <p:nvGrpSpPr>
+        <p:cNvPr id="1" name=""/>
+        <p:cNvGrpSpPr/>
+        <p:nvPr/>
+      </p:nvGrpSpPr>
+      <p:grpSpPr>
+        <a:xfrm>
+          <a:off x="0" y="0"/>
+          <a:ext cx="0" cy="0"/>
+          <a:chOff x="0" y="0"/>
+          <a:chExt cx="0" cy="0"/>
+        </a:xfrm>
+      </p:grpSpPr>
+      <p:sp>
+        <p:nvSpPr>
+          <p:cNvPr id="2" name="Title 1"/>
+          <p:cNvSpPr>
+            <a:spLocks noGrp="1"/>
+          </p:cNvSpPr>
+          <p:nvPr>
+            <p:ph type="title"/>
+          </p:nvPr>
+        </p:nvSpPr>
+        <p:spPr/>
+        <p:txBody>
+          <a:bodyPr>
+            <a:normAutofit fontScale="90000"/>
+          </a:bodyPr>
+          <a:lstStyle/>
+          <a:p>
+            <a:r>
+              <a:rPr lang="ru-RU" dirty="0" smtClean="0"/>
               <a:t>Глобальный кеш сборок</a:t>
             </a:r>
             <a:r>
@@ -14022,7 +14111,7 @@
 </p:sld>
 </file>
 
-<file path=ppt/slides/slide32.xml><?xml version="1.0" encoding="utf-8"?>
+<file path=ppt/slides/slide33.xml><?xml version="1.0" encoding="utf-8"?>
 <p:sld xmlns:a="http://schemas.openxmlformats.org/drawingml/2006/main" xmlns:r="http://schemas.openxmlformats.org/officeDocument/2006/relationships" xmlns:p="http://schemas.openxmlformats.org/presentationml/2006/main">
   <p:cSld>
     <p:spTree>
@@ -14395,7 +14484,7 @@
 </p:sld>
 </file>
 
-<file path=ppt/slides/slide33.xml><?xml version="1.0" encoding="utf-8"?>
+<file path=ppt/slides/slide34.xml><?xml version="1.0" encoding="utf-8"?>
 <p:sld xmlns:a="http://schemas.openxmlformats.org/drawingml/2006/main" xmlns:r="http://schemas.openxmlformats.org/officeDocument/2006/relationships" xmlns:p="http://schemas.openxmlformats.org/presentationml/2006/main">
   <p:cSld>
     <p:spTree>
@@ -15090,159 +15179,6 @@
     <p:extLst>
       <p:ext uri="{BB962C8B-B14F-4D97-AF65-F5344CB8AC3E}">
         <p14:creationId xmlns:p14="http://schemas.microsoft.com/office/powerpoint/2010/main" val="3864391885"/>
-      </p:ext>
-    </p:extLst>
-  </p:cSld>
-  <p:clrMapOvr>
-    <a:masterClrMapping/>
-  </p:clrMapOvr>
-  <p:timing>
-    <p:tnLst>
-      <p:par>
-        <p:cTn id="1" dur="indefinite" restart="never" nodeType="tmRoot"/>
-      </p:par>
-    </p:tnLst>
-  </p:timing>
-</p:sld>
-</file>
-
-<file path=ppt/slides/slide34.xml><?xml version="1.0" encoding="utf-8"?>
-<p:sld xmlns:a="http://schemas.openxmlformats.org/drawingml/2006/main" xmlns:r="http://schemas.openxmlformats.org/officeDocument/2006/relationships" xmlns:p="http://schemas.openxmlformats.org/presentationml/2006/main">
-  <p:cSld>
-    <p:spTree>
-      <p:nvGrpSpPr>
-        <p:cNvPr id="1" name=""/>
-        <p:cNvGrpSpPr/>
-        <p:nvPr/>
-      </p:nvGrpSpPr>
-      <p:grpSpPr>
-        <a:xfrm>
-          <a:off x="0" y="0"/>
-          <a:ext cx="0" cy="0"/>
-          <a:chOff x="0" y="0"/>
-          <a:chExt cx="0" cy="0"/>
-        </a:xfrm>
-      </p:grpSpPr>
-      <p:sp>
-        <p:nvSpPr>
-          <p:cNvPr id="2" name="Title 1"/>
-          <p:cNvSpPr>
-            <a:spLocks noGrp="1"/>
-          </p:cNvSpPr>
-          <p:nvPr>
-            <p:ph type="title"/>
-          </p:nvPr>
-        </p:nvSpPr>
-        <p:spPr/>
-        <p:txBody>
-          <a:bodyPr/>
-          <a:lstStyle/>
-          <a:p>
-            <a:r>
-              <a:rPr lang="en-US" dirty="0" smtClean="0"/>
-              <a:t>Portable Class Library</a:t>
-            </a:r>
-            <a:endParaRPr lang="en-US" dirty="0"/>
-          </a:p>
-        </p:txBody>
-      </p:sp>
-      <p:sp>
-        <p:nvSpPr>
-          <p:cNvPr id="3" name="Content Placeholder 2"/>
-          <p:cNvSpPr>
-            <a:spLocks noGrp="1"/>
-          </p:cNvSpPr>
-          <p:nvPr>
-            <p:ph idx="1"/>
-          </p:nvPr>
-        </p:nvSpPr>
-        <p:spPr/>
-        <p:txBody>
-          <a:bodyPr>
-            <a:normAutofit fontScale="92500" lnSpcReduction="20000"/>
-          </a:bodyPr>
-          <a:lstStyle/>
-          <a:p>
-            <a:pPr marL="0" indent="0">
-              <a:buNone/>
-            </a:pPr>
-            <a:r>
-              <a:rPr lang="ru-RU" dirty="0" smtClean="0"/>
-              <a:t>Проекты </a:t>
-            </a:r>
-            <a:r>
-              <a:rPr lang="en-US" dirty="0"/>
-              <a:t>Portable Class </a:t>
-            </a:r>
-            <a:r>
-              <a:rPr lang="en-US" dirty="0" smtClean="0"/>
-              <a:t>Library</a:t>
-            </a:r>
-            <a:r>
-              <a:rPr lang="ru-RU" dirty="0" smtClean="0"/>
-              <a:t> позволяют создавать сборки переносимые между разными </a:t>
-            </a:r>
-            <a:r>
-              <a:rPr lang="en-US" dirty="0" smtClean="0"/>
-              <a:t>.NET </a:t>
-            </a:r>
-            <a:r>
-              <a:rPr lang="ru-RU" dirty="0" smtClean="0"/>
-              <a:t>платформами: </a:t>
-            </a:r>
-            <a:r>
-              <a:rPr lang="en-US" dirty="0" smtClean="0"/>
-              <a:t>Windows, Windows Store (Metro), Silverlight, Windows Phone, Xbox 360. </a:t>
-            </a:r>
-            <a:r>
-              <a:rPr lang="ru-RU" dirty="0" smtClean="0"/>
-              <a:t>При создании проекта мы вибираем под какие платформы мы создаем библиотеку и тем самым добровольно ограничиваем себе возможности ради переносимости.</a:t>
-            </a:r>
-          </a:p>
-          <a:p>
-            <a:pPr marL="0" indent="0">
-              <a:buNone/>
-            </a:pPr>
-            <a:endParaRPr lang="ru-RU" dirty="0"/>
-          </a:p>
-          <a:p>
-            <a:pPr marL="0" indent="0">
-              <a:buNone/>
-            </a:pPr>
-            <a:r>
-              <a:rPr lang="ru-RU" dirty="0" smtClean="0"/>
-              <a:t>Подробности смотрите в </a:t>
-            </a:r>
-            <a:r>
-              <a:rPr lang="en-US" dirty="0" smtClean="0">
-                <a:hlinkClick r:id="rId2"/>
-              </a:rPr>
-              <a:t>Cross-Platform </a:t>
-            </a:r>
-            <a:r>
-              <a:rPr lang="en-US" dirty="0">
-                <a:hlinkClick r:id="rId2"/>
-              </a:rPr>
-              <a:t>Development with the .NET </a:t>
-            </a:r>
-            <a:r>
-              <a:rPr lang="en-US" dirty="0" smtClean="0">
-                <a:hlinkClick r:id="rId2"/>
-              </a:rPr>
-              <a:t>Framework</a:t>
-            </a:r>
-            <a:r>
-              <a:rPr lang="ru-RU" dirty="0" smtClean="0"/>
-              <a:t>.</a:t>
-            </a:r>
-            <a:endParaRPr lang="en-US" dirty="0"/>
-          </a:p>
-        </p:txBody>
-      </p:sp>
-    </p:spTree>
-    <p:extLst>
-      <p:ext uri="{BB962C8B-B14F-4D97-AF65-F5344CB8AC3E}">
-        <p14:creationId xmlns:p14="http://schemas.microsoft.com/office/powerpoint/2010/main" val="2977831934"/>
       </p:ext>
     </p:extLst>
   </p:cSld>
@@ -15293,19 +15229,7 @@
           <a:p>
             <a:r>
               <a:rPr lang="en-US" dirty="0" smtClean="0"/>
-              <a:t>CLS</a:t>
-            </a:r>
-            <a:r>
-              <a:rPr lang="ru-RU" dirty="0" smtClean="0"/>
-              <a:t> совместимые</a:t>
-            </a:r>
-            <a:r>
-              <a:rPr lang="en-US" dirty="0" smtClean="0"/>
-              <a:t> </a:t>
-            </a:r>
-            <a:r>
-              <a:rPr lang="ru-RU" dirty="0" smtClean="0"/>
-              <a:t>сборки</a:t>
+              <a:t>Portable Class Library</a:t>
             </a:r>
             <a:endParaRPr lang="en-US" dirty="0"/>
           </a:p>
@@ -15321,15 +15245,10 @@
             <p:ph idx="1"/>
           </p:nvPr>
         </p:nvSpPr>
-        <p:spPr>
-          <a:xfrm>
-            <a:off x="242616" y="1556792"/>
-            <a:ext cx="8649864" cy="4061048"/>
-          </a:xfrm>
-        </p:spPr>
+        <p:spPr/>
         <p:txBody>
           <a:bodyPr>
-            <a:normAutofit fontScale="70000" lnSpcReduction="20000"/>
+            <a:normAutofit fontScale="92500" lnSpcReduction="20000"/>
           </a:bodyPr>
           <a:lstStyle/>
           <a:p>
@@ -15338,233 +15257,81 @@
             </a:pPr>
             <a:r>
               <a:rPr lang="ru-RU" dirty="0" smtClean="0"/>
-              <a:t>Если вы создает библиотеку (сборку) для внешнего использования и хотите быть уверенными что её можно будет использовать из программ написанных на других языках (таких как </a:t>
+              <a:t>Проекты </a:t>
+            </a:r>
+            <a:r>
+              <a:rPr lang="en-US" dirty="0"/>
+              <a:t>Portable Class </a:t>
             </a:r>
             <a:r>
               <a:rPr lang="en-US" dirty="0" smtClean="0"/>
-              <a:t>VB.NET, F# </a:t>
+              <a:t>Library</a:t>
             </a:r>
             <a:r>
               <a:rPr lang="ru-RU" dirty="0" smtClean="0"/>
-              <a:t>и других)</a:t>
+              <a:t> позволяют создавать сборки переносимые между разными </a:t>
             </a:r>
             <a:r>
               <a:rPr lang="en-US" dirty="0" smtClean="0"/>
-              <a:t>, </a:t>
+              <a:t>.NET </a:t>
             </a:r>
             <a:r>
               <a:rPr lang="ru-RU" dirty="0" smtClean="0"/>
-              <a:t>то добавьте к свой сборке атрибут </a:t>
-            </a:r>
-            <a:r>
-              <a:rPr lang="en-US" dirty="0" err="1" smtClean="0"/>
-              <a:t>System.CLSCompliantAttribute</a:t>
+              <a:t>платформами: </a:t>
             </a:r>
             <a:r>
               <a:rPr lang="en-US" dirty="0" smtClean="0"/>
-              <a:t>.</a:t>
+              <a:t>Windows, Windows Store (Metro), Silverlight, Windows Phone, Xbox 360. </a:t>
+            </a:r>
+            <a:r>
+              <a:rPr lang="ru-RU" dirty="0" smtClean="0"/>
+              <a:t>При создании проекта мы вибираем под какие платформы мы создаем библиотеку и тем самым добровольно ограничиваем себе возможности ради переносимости.</a:t>
             </a:r>
           </a:p>
           <a:p>
             <a:pPr marL="0" indent="0">
               <a:buNone/>
             </a:pPr>
-            <a:endParaRPr lang="en-US" dirty="0"/>
+            <a:endParaRPr lang="ru-RU" dirty="0"/>
           </a:p>
           <a:p>
             <a:pPr marL="0" indent="0">
               <a:buNone/>
             </a:pPr>
             <a:r>
-              <a:rPr lang="en-US" dirty="0" smtClean="0"/>
-              <a:t>CLS </a:t>
-            </a:r>
-            <a:r>
               <a:rPr lang="ru-RU" dirty="0" smtClean="0"/>
-              <a:t>(</a:t>
-            </a:r>
-            <a:r>
-              <a:rPr lang="en-US" dirty="0" smtClean="0"/>
-              <a:t>Common Language Specification</a:t>
-            </a:r>
-            <a:r>
-              <a:rPr lang="ru-RU" dirty="0" smtClean="0"/>
-              <a:t>)</a:t>
-            </a:r>
-            <a:r>
-              <a:rPr lang="en-US" dirty="0" smtClean="0"/>
-              <a:t> </a:t>
-            </a:r>
-            <a:r>
-              <a:rPr lang="ru-RU" dirty="0" smtClean="0"/>
-              <a:t>является набором требований (ограничений) к языку позволяющее ему «бесшовно» взаимодействовать с программами на других языках. Это необходимо так как, </a:t>
-            </a:r>
-            <a:r>
-              <a:rPr lang="ru-RU" dirty="0"/>
-              <a:t>н</a:t>
-            </a:r>
-            <a:r>
-              <a:rPr lang="ru-RU" dirty="0" smtClean="0"/>
-              <a:t>есмотря на наличие «общего знаменателя» в виде </a:t>
-            </a:r>
-            <a:r>
-              <a:rPr lang="en-US" dirty="0" smtClean="0"/>
-              <a:t>IL </a:t>
-            </a:r>
-            <a:r>
-              <a:rPr lang="ru-RU" dirty="0" smtClean="0"/>
-              <a:t>кода, языки могут иметь весьма сильные различия. Компилятор </a:t>
-            </a:r>
-            <a:r>
-              <a:rPr lang="en-US" dirty="0" smtClean="0"/>
-              <a:t>C# </a:t>
-            </a:r>
-            <a:r>
-              <a:rPr lang="ru-RU" smtClean="0"/>
-              <a:t>проверяет </a:t>
-            </a:r>
-            <a:r>
-              <a:rPr lang="ru-RU" dirty="0" smtClean="0"/>
-              <a:t>программу на соответствие этим требованиям, только при наличии атрибута </a:t>
-            </a:r>
-            <a:r>
-              <a:rPr lang="en-US" dirty="0" err="1" smtClean="0"/>
-              <a:t>CLSCompliant</a:t>
+              <a:t>Подробности смотрите в </a:t>
+            </a:r>
+            <a:r>
+              <a:rPr lang="en-US" dirty="0" smtClean="0">
+                <a:hlinkClick r:id="rId2"/>
+              </a:rPr>
+              <a:t>Cross-Platform </a:t>
+            </a:r>
+            <a:r>
+              <a:rPr lang="en-US" dirty="0">
+                <a:hlinkClick r:id="rId2"/>
+              </a:rPr>
+              <a:t>Development with the .NET </a:t>
+            </a:r>
+            <a:r>
+              <a:rPr lang="en-US" dirty="0" smtClean="0">
+                <a:hlinkClick r:id="rId2"/>
+              </a:rPr>
+              <a:t>Framework</a:t>
             </a:r>
             <a:r>
               <a:rPr lang="ru-RU" dirty="0" smtClean="0"/>
               <a:t>.</a:t>
             </a:r>
             <a:endParaRPr lang="en-US" dirty="0"/>
-          </a:p>
-        </p:txBody>
-      </p:sp>
-      <p:sp>
-        <p:nvSpPr>
-          <p:cNvPr id="4" name="TextBox 3"/>
-          <p:cNvSpPr txBox="1"/>
-          <p:nvPr/>
-        </p:nvSpPr>
-        <p:spPr>
-          <a:xfrm>
-            <a:off x="251520" y="5805264"/>
-            <a:ext cx="8640960" cy="307777"/>
-          </a:xfrm>
-          <a:prstGeom prst="rect">
-            <a:avLst/>
-          </a:prstGeom>
-          <a:solidFill>
-            <a:schemeClr val="bg1"/>
-          </a:solidFill>
-        </p:spPr>
-        <p:txBody>
-          <a:bodyPr wrap="square" rtlCol="0">
-            <a:spAutoFit/>
-          </a:bodyPr>
-          <a:lstStyle/>
-          <a:p>
-            <a:r>
-              <a:rPr lang="en-US" sz="1400" dirty="0" smtClean="0">
-                <a:solidFill>
-                  <a:srgbClr val="000000"/>
-                </a:solidFill>
-                <a:highlight>
-                  <a:srgbClr val="FFFFFF"/>
-                </a:highlight>
-                <a:latin typeface="Courier New" panose="02070309020205020404" pitchFamily="49" charset="0"/>
-                <a:cs typeface="Courier New" panose="02070309020205020404" pitchFamily="49" charset="0"/>
-              </a:rPr>
-              <a:t>[</a:t>
-            </a:r>
-            <a:r>
-              <a:rPr lang="en-US" sz="1400" dirty="0" smtClean="0">
-                <a:solidFill>
-                  <a:srgbClr val="0000FF"/>
-                </a:solidFill>
-                <a:highlight>
-                  <a:srgbClr val="FFFFFF"/>
-                </a:highlight>
-                <a:latin typeface="Courier New" panose="02070309020205020404" pitchFamily="49" charset="0"/>
-                <a:cs typeface="Courier New" panose="02070309020205020404" pitchFamily="49" charset="0"/>
-              </a:rPr>
-              <a:t>assembly</a:t>
-            </a:r>
-            <a:r>
-              <a:rPr lang="en-US" sz="1400" dirty="0">
-                <a:solidFill>
-                  <a:srgbClr val="000000"/>
-                </a:solidFill>
-                <a:highlight>
-                  <a:srgbClr val="FFFFFF"/>
-                </a:highlight>
-                <a:latin typeface="Courier New" panose="02070309020205020404" pitchFamily="49" charset="0"/>
-                <a:cs typeface="Courier New" panose="02070309020205020404" pitchFamily="49" charset="0"/>
-              </a:rPr>
-              <a:t>: </a:t>
-            </a:r>
-            <a:r>
-              <a:rPr lang="en-US" sz="1400" dirty="0" err="1">
-                <a:solidFill>
-                  <a:srgbClr val="2B91AF"/>
-                </a:solidFill>
-                <a:highlight>
-                  <a:srgbClr val="FFFFFF"/>
-                </a:highlight>
-                <a:latin typeface="Courier New" panose="02070309020205020404" pitchFamily="49" charset="0"/>
-                <a:cs typeface="Courier New" panose="02070309020205020404" pitchFamily="49" charset="0"/>
-              </a:rPr>
-              <a:t>CLSCompliant</a:t>
-            </a:r>
-            <a:r>
-              <a:rPr lang="en-US" sz="1400" dirty="0">
-                <a:solidFill>
-                  <a:srgbClr val="000000"/>
-                </a:solidFill>
-                <a:highlight>
-                  <a:srgbClr val="FFFFFF"/>
-                </a:highlight>
-                <a:latin typeface="Courier New" panose="02070309020205020404" pitchFamily="49" charset="0"/>
-                <a:cs typeface="Courier New" panose="02070309020205020404" pitchFamily="49" charset="0"/>
-              </a:rPr>
-              <a:t>(</a:t>
-            </a:r>
-            <a:r>
-              <a:rPr lang="en-US" sz="1400" dirty="0">
-                <a:solidFill>
-                  <a:srgbClr val="0000FF"/>
-                </a:solidFill>
-                <a:highlight>
-                  <a:srgbClr val="FFFFFF"/>
-                </a:highlight>
-                <a:latin typeface="Courier New" panose="02070309020205020404" pitchFamily="49" charset="0"/>
-                <a:cs typeface="Courier New" panose="02070309020205020404" pitchFamily="49" charset="0"/>
-              </a:rPr>
-              <a:t>true</a:t>
-            </a:r>
-            <a:r>
-              <a:rPr lang="en-US" sz="1400" dirty="0" smtClean="0">
-                <a:solidFill>
-                  <a:srgbClr val="000000"/>
-                </a:solidFill>
-                <a:highlight>
-                  <a:srgbClr val="FFFFFF"/>
-                </a:highlight>
-                <a:latin typeface="Courier New" panose="02070309020205020404" pitchFamily="49" charset="0"/>
-                <a:cs typeface="Courier New" panose="02070309020205020404" pitchFamily="49" charset="0"/>
-              </a:rPr>
-              <a:t>)]</a:t>
-            </a:r>
-            <a:endParaRPr lang="ru-RU" sz="1400" dirty="0" smtClean="0">
-              <a:latin typeface="Courier New" panose="02070309020205020404" pitchFamily="49" charset="0"/>
-              <a:cs typeface="Courier New" panose="02070309020205020404" pitchFamily="49" charset="0"/>
-            </a:endParaRPr>
           </a:p>
         </p:txBody>
       </p:sp>
     </p:spTree>
     <p:extLst>
       <p:ext uri="{BB962C8B-B14F-4D97-AF65-F5344CB8AC3E}">
-        <p14:creationId xmlns:p14="http://schemas.microsoft.com/office/powerpoint/2010/main" val="910520611"/>
+        <p14:creationId xmlns:p14="http://schemas.microsoft.com/office/powerpoint/2010/main" val="2977831934"/>
       </p:ext>
     </p:extLst>
   </p:cSld>
@@ -15608,27 +15375,28 @@
             <p:ph type="title"/>
           </p:nvPr>
         </p:nvSpPr>
-        <p:spPr>
-          <a:xfrm>
-            <a:off x="457200" y="274638"/>
-            <a:ext cx="8229600" cy="778098"/>
-          </a:xfrm>
-        </p:spPr>
+        <p:spPr/>
         <p:txBody>
-          <a:bodyPr>
-            <a:normAutofit/>
-          </a:bodyPr>
+          <a:bodyPr/>
           <a:lstStyle/>
           <a:p>
             <a:r>
-              <a:rPr lang="ru-RU" sz="3600" dirty="0" smtClean="0"/>
-              <a:t>Добавление ссылок с помощью </a:t>
-            </a:r>
-            <a:r>
-              <a:rPr lang="en-US" sz="3600" dirty="0" smtClean="0"/>
-              <a:t>NuGet</a:t>
-            </a:r>
-            <a:endParaRPr lang="ru-RU" sz="3600" dirty="0"/>
+              <a:rPr lang="en-US" dirty="0" smtClean="0"/>
+              <a:t>CLS</a:t>
+            </a:r>
+            <a:r>
+              <a:rPr lang="ru-RU" dirty="0" smtClean="0"/>
+              <a:t> совместимые</a:t>
+            </a:r>
+            <a:r>
+              <a:rPr lang="en-US" dirty="0" smtClean="0"/>
+              <a:t> </a:t>
+            </a:r>
+            <a:r>
+              <a:rPr lang="ru-RU" dirty="0" smtClean="0"/>
+              <a:t>сборки</a:t>
+            </a:r>
+            <a:endParaRPr lang="en-US" dirty="0"/>
           </a:p>
         </p:txBody>
       </p:sp>
@@ -15644,13 +15412,13 @@
         </p:nvSpPr>
         <p:spPr>
           <a:xfrm>
-            <a:off x="457200" y="1124744"/>
-            <a:ext cx="8229600" cy="5001419"/>
+            <a:off x="242616" y="1556792"/>
+            <a:ext cx="8649864" cy="4061048"/>
           </a:xfrm>
         </p:spPr>
         <p:txBody>
           <a:bodyPr>
-            <a:normAutofit lnSpcReduction="10000"/>
+            <a:normAutofit fontScale="70000" lnSpcReduction="20000"/>
           </a:bodyPr>
           <a:lstStyle/>
           <a:p>
@@ -15659,30 +15427,38 @@
             </a:pPr>
             <a:r>
               <a:rPr lang="ru-RU" dirty="0" smtClean="0"/>
-              <a:t>Расширение </a:t>
+              <a:t>Если вы создает библиотеку (сборку) для внешнего использования и хотите быть уверенными что её можно будет использовать из программ написанных на других языках (таких как </a:t>
             </a:r>
             <a:r>
               <a:rPr lang="en-US" dirty="0" smtClean="0"/>
-              <a:t>NuGet </a:t>
+              <a:t>VB.NET, F# </a:t>
             </a:r>
             <a:r>
               <a:rPr lang="ru-RU" dirty="0" smtClean="0"/>
-              <a:t>упрощает работу с зависимостями в </a:t>
+              <a:t>и других)</a:t>
             </a:r>
             <a:r>
               <a:rPr lang="en-US" dirty="0" smtClean="0"/>
-              <a:t>.NET </a:t>
+              <a:t>, </a:t>
             </a:r>
             <a:r>
               <a:rPr lang="ru-RU" dirty="0" smtClean="0"/>
-              <a:t>проектах.</a:t>
+              <a:t>то добавьте к свой сборке атрибут </a:t>
+            </a:r>
+            <a:r>
+              <a:rPr lang="en-US" dirty="0" err="1" smtClean="0"/>
+              <a:t>System.CLSCompliantAttribute</a:t>
+            </a:r>
+            <a:r>
+              <a:rPr lang="en-US" dirty="0" smtClean="0"/>
+              <a:t>.</a:t>
             </a:r>
           </a:p>
           <a:p>
             <a:pPr marL="0" indent="0">
               <a:buNone/>
             </a:pPr>
-            <a:endParaRPr lang="en-US" dirty="0" smtClean="0"/>
+            <a:endParaRPr lang="en-US" dirty="0"/>
           </a:p>
           <a:p>
             <a:pPr marL="0" indent="0">
@@ -15690,94 +15466,194 @@
             </a:pPr>
             <a:r>
               <a:rPr lang="en-US" dirty="0" smtClean="0"/>
-              <a:t>NuGet </a:t>
+              <a:t>CLS </a:t>
             </a:r>
             <a:r>
               <a:rPr lang="ru-RU" dirty="0" smtClean="0"/>
-              <a:t>входит в состав </a:t>
+              <a:t>(</a:t>
             </a:r>
             <a:r>
               <a:rPr lang="en-US" dirty="0" smtClean="0"/>
-              <a:t>VS 2012 </a:t>
+              <a:t>Common Language Specification</a:t>
             </a:r>
             <a:r>
               <a:rPr lang="ru-RU" dirty="0" smtClean="0"/>
-              <a:t>и выше. Для </a:t>
+              <a:t>)</a:t>
             </a:r>
             <a:r>
               <a:rPr lang="en-US" dirty="0" smtClean="0"/>
-              <a:t>VS 2010 </a:t>
+              <a:t> </a:t>
             </a:r>
             <a:r>
               <a:rPr lang="ru-RU" dirty="0" smtClean="0"/>
-              <a:t>его нужно скачать с помощью </a:t>
+              <a:t>является набором требований (ограничений) к языку позволяющее ему «бесшовно» взаимодействовать с программами на других языках. Это необходимо так как, </a:t>
+            </a:r>
+            <a:r>
+              <a:rPr lang="ru-RU" dirty="0"/>
+              <a:t>н</a:t>
+            </a:r>
+            <a:r>
+              <a:rPr lang="ru-RU" dirty="0" smtClean="0"/>
+              <a:t>есмотря на наличие «общего знаменателя» в виде </a:t>
             </a:r>
             <a:r>
               <a:rPr lang="en-US" dirty="0" smtClean="0"/>
-              <a:t>Tools -&gt; Extension Manager </a:t>
+              <a:t>IL </a:t>
             </a:r>
             <a:r>
               <a:rPr lang="ru-RU" dirty="0" smtClean="0"/>
-              <a:t>или с сайта </a:t>
-            </a:r>
-            <a:r>
-              <a:rPr lang="en-US" dirty="0" smtClean="0">
-                <a:hlinkClick r:id="rId2"/>
-              </a:rPr>
-              <a:t>nuget.org</a:t>
+              <a:t>кода, языки могут иметь весьма сильные различия. Компилятор </a:t>
+            </a:r>
+            <a:r>
+              <a:rPr lang="en-US" dirty="0" smtClean="0"/>
+              <a:t>C# </a:t>
+            </a:r>
+            <a:r>
+              <a:rPr lang="ru-RU" smtClean="0"/>
+              <a:t>проверяет </a:t>
             </a:r>
             <a:r>
               <a:rPr lang="ru-RU" dirty="0" smtClean="0"/>
-              <a:t>. После установки в контекстном меню </a:t>
-            </a:r>
-            <a:r>
-              <a:rPr lang="en-US" dirty="0" smtClean="0"/>
-              <a:t>References </a:t>
+              <a:t>программу на соответствие этим требованиям, только при наличии атрибута </a:t>
+            </a:r>
+            <a:r>
+              <a:rPr lang="en-US" dirty="0" err="1" smtClean="0"/>
+              <a:t>CLSCompliant</a:t>
             </a:r>
             <a:r>
               <a:rPr lang="ru-RU" dirty="0" smtClean="0"/>
-              <a:t>появится команда </a:t>
-            </a:r>
-            <a:r>
-              <a:rPr lang="en-US" dirty="0" smtClean="0"/>
-              <a:t>“Manage NuGet Packages …”. </a:t>
-            </a:r>
-            <a:r>
-              <a:rPr lang="ru-RU" dirty="0" smtClean="0"/>
-              <a:t>Также в меню </a:t>
-            </a:r>
-            <a:r>
-              <a:rPr lang="en-US" dirty="0" smtClean="0"/>
-              <a:t>Tools </a:t>
-            </a:r>
-            <a:r>
-              <a:rPr lang="ru-RU" dirty="0" smtClean="0"/>
-              <a:t>появится меню </a:t>
-            </a:r>
-            <a:r>
-              <a:rPr lang="en-US" dirty="0" smtClean="0"/>
-              <a:t>“NuGet Package Manager”.</a:t>
-            </a:r>
-            <a:endParaRPr lang="ru-RU" dirty="0" smtClean="0"/>
-          </a:p>
-          <a:p>
-            <a:pPr marL="0" indent="0">
-              <a:buNone/>
-            </a:pPr>
-            <a:endParaRPr lang="ru-RU" dirty="0" smtClean="0"/>
-          </a:p>
-          <a:p>
-            <a:pPr marL="0" indent="0">
-              <a:buNone/>
-            </a:pPr>
-            <a:endParaRPr lang="ru-RU" dirty="0"/>
+              <a:t>.</a:t>
+            </a:r>
+            <a:endParaRPr lang="en-US" dirty="0"/>
+          </a:p>
+        </p:txBody>
+      </p:sp>
+      <p:sp>
+        <p:nvSpPr>
+          <p:cNvPr id="4" name="TextBox 3"/>
+          <p:cNvSpPr txBox="1"/>
+          <p:nvPr/>
+        </p:nvSpPr>
+        <p:spPr>
+          <a:xfrm>
+            <a:off x="251520" y="5805264"/>
+            <a:ext cx="8640960" cy="307777"/>
+          </a:xfrm>
+          <a:prstGeom prst="rect">
+            <a:avLst/>
+          </a:prstGeom>
+          <a:solidFill>
+            <a:schemeClr val="bg1"/>
+          </a:solidFill>
+        </p:spPr>
+        <p:txBody>
+          <a:bodyPr wrap="square" rtlCol="0">
+            <a:spAutoFit/>
+          </a:bodyPr>
+          <a:lstStyle/>
+          <a:p>
+            <a:r>
+              <a:rPr lang="en-US" sz="1400" dirty="0" smtClean="0">
+                <a:solidFill>
+                  <a:srgbClr val="000000"/>
+                </a:solidFill>
+                <a:highlight>
+                  <a:srgbClr val="FFFFFF"/>
+                </a:highlight>
+                <a:latin typeface="Courier New" panose="02070309020205020404" pitchFamily="49" charset="0"/>
+                <a:cs typeface="Courier New" panose="02070309020205020404" pitchFamily="49" charset="0"/>
+              </a:rPr>
+              <a:t>[</a:t>
+            </a:r>
+            <a:r>
+              <a:rPr lang="en-US" sz="1400" dirty="0" smtClean="0">
+                <a:solidFill>
+                  <a:srgbClr val="0000FF"/>
+                </a:solidFill>
+                <a:highlight>
+                  <a:srgbClr val="FFFFFF"/>
+                </a:highlight>
+                <a:latin typeface="Courier New" panose="02070309020205020404" pitchFamily="49" charset="0"/>
+                <a:cs typeface="Courier New" panose="02070309020205020404" pitchFamily="49" charset="0"/>
+              </a:rPr>
+              <a:t>assembly</a:t>
+            </a:r>
+            <a:r>
+              <a:rPr lang="en-US" sz="1400" dirty="0">
+                <a:solidFill>
+                  <a:srgbClr val="000000"/>
+                </a:solidFill>
+                <a:highlight>
+                  <a:srgbClr val="FFFFFF"/>
+                </a:highlight>
+                <a:latin typeface="Courier New" panose="02070309020205020404" pitchFamily="49" charset="0"/>
+                <a:cs typeface="Courier New" panose="02070309020205020404" pitchFamily="49" charset="0"/>
+              </a:rPr>
+              <a:t>: </a:t>
+            </a:r>
+            <a:r>
+              <a:rPr lang="en-US" sz="1400" dirty="0" err="1">
+                <a:solidFill>
+                  <a:srgbClr val="2B91AF"/>
+                </a:solidFill>
+                <a:highlight>
+                  <a:srgbClr val="FFFFFF"/>
+                </a:highlight>
+                <a:latin typeface="Courier New" panose="02070309020205020404" pitchFamily="49" charset="0"/>
+                <a:cs typeface="Courier New" panose="02070309020205020404" pitchFamily="49" charset="0"/>
+              </a:rPr>
+              <a:t>CLSCompliant</a:t>
+            </a:r>
+            <a:r>
+              <a:rPr lang="en-US" sz="1400" dirty="0">
+                <a:solidFill>
+                  <a:srgbClr val="000000"/>
+                </a:solidFill>
+                <a:highlight>
+                  <a:srgbClr val="FFFFFF"/>
+                </a:highlight>
+                <a:latin typeface="Courier New" panose="02070309020205020404" pitchFamily="49" charset="0"/>
+                <a:cs typeface="Courier New" panose="02070309020205020404" pitchFamily="49" charset="0"/>
+              </a:rPr>
+              <a:t>(</a:t>
+            </a:r>
+            <a:r>
+              <a:rPr lang="en-US" sz="1400" dirty="0">
+                <a:solidFill>
+                  <a:srgbClr val="0000FF"/>
+                </a:solidFill>
+                <a:highlight>
+                  <a:srgbClr val="FFFFFF"/>
+                </a:highlight>
+                <a:latin typeface="Courier New" panose="02070309020205020404" pitchFamily="49" charset="0"/>
+                <a:cs typeface="Courier New" panose="02070309020205020404" pitchFamily="49" charset="0"/>
+              </a:rPr>
+              <a:t>true</a:t>
+            </a:r>
+            <a:r>
+              <a:rPr lang="en-US" sz="1400" dirty="0" smtClean="0">
+                <a:solidFill>
+                  <a:srgbClr val="000000"/>
+                </a:solidFill>
+                <a:highlight>
+                  <a:srgbClr val="FFFFFF"/>
+                </a:highlight>
+                <a:latin typeface="Courier New" panose="02070309020205020404" pitchFamily="49" charset="0"/>
+                <a:cs typeface="Courier New" panose="02070309020205020404" pitchFamily="49" charset="0"/>
+              </a:rPr>
+              <a:t>)]</a:t>
+            </a:r>
+            <a:endParaRPr lang="ru-RU" sz="1400" dirty="0" smtClean="0">
+              <a:latin typeface="Courier New" panose="02070309020205020404" pitchFamily="49" charset="0"/>
+              <a:cs typeface="Courier New" panose="02070309020205020404" pitchFamily="49" charset="0"/>
+            </a:endParaRPr>
           </a:p>
         </p:txBody>
       </p:sp>
     </p:spTree>
     <p:extLst>
       <p:ext uri="{BB962C8B-B14F-4D97-AF65-F5344CB8AC3E}">
-        <p14:creationId xmlns:p14="http://schemas.microsoft.com/office/powerpoint/2010/main" val="861195078"/>
+        <p14:creationId xmlns:p14="http://schemas.microsoft.com/office/powerpoint/2010/main" val="910520611"/>
       </p:ext>
     </p:extLst>
   </p:cSld>
@@ -15821,16 +15697,27 @@
             <p:ph type="title"/>
           </p:nvPr>
         </p:nvSpPr>
-        <p:spPr/>
+        <p:spPr>
+          <a:xfrm>
+            <a:off x="457200" y="274638"/>
+            <a:ext cx="8229600" cy="778098"/>
+          </a:xfrm>
+        </p:spPr>
         <p:txBody>
-          <a:bodyPr/>
+          <a:bodyPr>
+            <a:normAutofit/>
+          </a:bodyPr>
           <a:lstStyle/>
           <a:p>
             <a:r>
-              <a:rPr lang="en-US" dirty="0" smtClean="0"/>
-              <a:t>Package Manager Console</a:t>
-            </a:r>
-            <a:endParaRPr lang="ru-RU" dirty="0"/>
+              <a:rPr lang="ru-RU" sz="3600" dirty="0" smtClean="0"/>
+              <a:t>Добавление ссылок с помощью </a:t>
+            </a:r>
+            <a:r>
+              <a:rPr lang="en-US" sz="3600" dirty="0" smtClean="0"/>
+              <a:t>NuGet</a:t>
+            </a:r>
+            <a:endParaRPr lang="ru-RU" sz="3600" dirty="0"/>
           </a:p>
         </p:txBody>
       </p:sp>
@@ -15844,10 +15731,15 @@
             <p:ph idx="1"/>
           </p:nvPr>
         </p:nvSpPr>
-        <p:spPr/>
+        <p:spPr>
+          <a:xfrm>
+            <a:off x="457200" y="1124744"/>
+            <a:ext cx="8229600" cy="5001419"/>
+          </a:xfrm>
+        </p:spPr>
         <p:txBody>
           <a:bodyPr>
-            <a:normAutofit fontScale="77500" lnSpcReduction="20000"/>
+            <a:normAutofit lnSpcReduction="10000"/>
           </a:bodyPr>
           <a:lstStyle/>
           <a:p>
@@ -15856,23 +15748,7 @@
             </a:pPr>
             <a:r>
               <a:rPr lang="ru-RU" dirty="0" smtClean="0"/>
-              <a:t>Окно </a:t>
-            </a:r>
-            <a:r>
-              <a:rPr lang="en-US" dirty="0" smtClean="0"/>
-              <a:t>Package </a:t>
-            </a:r>
-            <a:r>
-              <a:rPr lang="en-US" dirty="0"/>
-              <a:t>Manager </a:t>
-            </a:r>
-            <a:r>
-              <a:rPr lang="en-US" dirty="0" smtClean="0"/>
-              <a:t>Console</a:t>
-            </a:r>
-            <a:r>
-              <a:rPr lang="ru-RU" dirty="0" smtClean="0"/>
-              <a:t> позволяет управлять </a:t>
+              <a:t>Расширение </a:t>
             </a:r>
             <a:r>
               <a:rPr lang="en-US" dirty="0" smtClean="0"/>
@@ -15880,87 +15756,109 @@
             </a:r>
             <a:r>
               <a:rPr lang="ru-RU" dirty="0" smtClean="0"/>
-              <a:t>пакетами с помощью </a:t>
+              <a:t>упрощает работу с зависимостями в </a:t>
             </a:r>
             <a:r>
               <a:rPr lang="en-US" dirty="0" smtClean="0"/>
-              <a:t>PowerShell </a:t>
+              <a:t>.NET </a:t>
             </a:r>
             <a:r>
               <a:rPr lang="ru-RU" dirty="0" smtClean="0"/>
-              <a:t>команд прямо из </a:t>
-            </a:r>
+              <a:t>проектах.</a:t>
+            </a:r>
+          </a:p>
+          <a:p>
+            <a:pPr marL="0" indent="0">
+              <a:buNone/>
+            </a:pPr>
+            <a:endParaRPr lang="en-US" dirty="0" smtClean="0"/>
+          </a:p>
+          <a:p>
+            <a:pPr marL="0" indent="0">
+              <a:buNone/>
+            </a:pPr>
             <a:r>
               <a:rPr lang="en-US" dirty="0" smtClean="0"/>
-              <a:t>Visual Studio.</a:t>
+              <a:t>NuGet </a:t>
+            </a:r>
+            <a:r>
+              <a:rPr lang="ru-RU" dirty="0" smtClean="0"/>
+              <a:t>входит в состав </a:t>
+            </a:r>
+            <a:r>
+              <a:rPr lang="en-US" dirty="0" smtClean="0"/>
+              <a:t>VS 2012 </a:t>
+            </a:r>
+            <a:r>
+              <a:rPr lang="ru-RU" dirty="0" smtClean="0"/>
+              <a:t>и выше. Для </a:t>
+            </a:r>
+            <a:r>
+              <a:rPr lang="en-US" dirty="0" smtClean="0"/>
+              <a:t>VS 2010 </a:t>
+            </a:r>
+            <a:r>
+              <a:rPr lang="ru-RU" dirty="0" smtClean="0"/>
+              <a:t>его нужно скачать с помощью </a:t>
+            </a:r>
+            <a:r>
+              <a:rPr lang="en-US" dirty="0" smtClean="0"/>
+              <a:t>Tools -&gt; Extension Manager </a:t>
+            </a:r>
+            <a:r>
+              <a:rPr lang="ru-RU" dirty="0" smtClean="0"/>
+              <a:t>или с сайта </a:t>
+            </a:r>
+            <a:r>
+              <a:rPr lang="en-US" dirty="0" smtClean="0">
+                <a:hlinkClick r:id="rId2"/>
+              </a:rPr>
+              <a:t>nuget.org</a:t>
+            </a:r>
+            <a:r>
+              <a:rPr lang="ru-RU" dirty="0" smtClean="0"/>
+              <a:t>. После установки в контекстном меню </a:t>
+            </a:r>
+            <a:r>
+              <a:rPr lang="en-US" dirty="0" smtClean="0"/>
+              <a:t>References </a:t>
+            </a:r>
+            <a:r>
+              <a:rPr lang="ru-RU" dirty="0" smtClean="0"/>
+              <a:t>появится команда </a:t>
+            </a:r>
+            <a:r>
+              <a:rPr lang="en-US" dirty="0" smtClean="0"/>
+              <a:t>“Manage NuGet Packages …”. </a:t>
+            </a:r>
+            <a:r>
+              <a:rPr lang="ru-RU" dirty="0" smtClean="0"/>
+              <a:t>Также в меню </a:t>
+            </a:r>
+            <a:r>
+              <a:rPr lang="en-US" dirty="0" smtClean="0"/>
+              <a:t>Tools </a:t>
+            </a:r>
+            <a:r>
+              <a:rPr lang="ru-RU" dirty="0" smtClean="0"/>
+              <a:t>появится меню </a:t>
+            </a:r>
+            <a:r>
+              <a:rPr lang="en-US" dirty="0" smtClean="0"/>
+              <a:t>“NuGet Package Manager”.</a:t>
             </a:r>
             <a:endParaRPr lang="ru-RU" dirty="0" smtClean="0"/>
           </a:p>
           <a:p>
-            <a:r>
-              <a:rPr lang="en-US" dirty="0" smtClean="0"/>
-              <a:t>Add-</a:t>
-            </a:r>
-            <a:r>
-              <a:rPr lang="en-US" dirty="0" err="1" smtClean="0"/>
-              <a:t>BindingRedirect</a:t>
-            </a:r>
-            <a:endParaRPr lang="en-US" dirty="0" smtClean="0"/>
-          </a:p>
-          <a:p>
-            <a:r>
-              <a:rPr lang="en-US" dirty="0" smtClean="0"/>
-              <a:t>Get-Package</a:t>
-            </a:r>
-          </a:p>
-          <a:p>
-            <a:r>
-              <a:rPr lang="en-US" dirty="0"/>
-              <a:t>Get-Project</a:t>
-            </a:r>
-          </a:p>
-          <a:p>
-            <a:r>
-              <a:rPr lang="en-US" dirty="0" smtClean="0"/>
-              <a:t>Install-Package </a:t>
-            </a:r>
-            <a:r>
-              <a:rPr lang="ru-RU" dirty="0" smtClean="0"/>
-              <a:t>: установка пакета. Позволяет установить пакет определенной версии, что </a:t>
-            </a:r>
-            <a:r>
-              <a:rPr lang="ru-RU" smtClean="0"/>
-              <a:t>невозможно сделать через </a:t>
-            </a:r>
-            <a:r>
-              <a:rPr lang="en-US" dirty="0" smtClean="0"/>
-              <a:t>GUI.</a:t>
-            </a:r>
+            <a:pPr marL="0" indent="0">
+              <a:buNone/>
+            </a:pPr>
             <a:endParaRPr lang="ru-RU" dirty="0" smtClean="0"/>
           </a:p>
           <a:p>
-            <a:r>
-              <a:rPr lang="en-US" dirty="0" smtClean="0"/>
-              <a:t>Open-</a:t>
-            </a:r>
-            <a:r>
-              <a:rPr lang="en-US" dirty="0" err="1" smtClean="0"/>
-              <a:t>PackagePage</a:t>
-            </a:r>
-            <a:endParaRPr lang="ru-RU" dirty="0" smtClean="0"/>
-          </a:p>
-          <a:p>
-            <a:r>
-              <a:rPr lang="en-US" dirty="0" smtClean="0"/>
-              <a:t>Uninstall-Package</a:t>
-            </a:r>
-            <a:endParaRPr lang="ru-RU" dirty="0" smtClean="0"/>
-          </a:p>
-          <a:p>
-            <a:r>
-              <a:rPr lang="en-US" dirty="0"/>
-              <a:t>Update-Package</a:t>
-            </a:r>
+            <a:pPr marL="0" indent="0">
+              <a:buNone/>
+            </a:pPr>
             <a:endParaRPr lang="ru-RU" dirty="0"/>
           </a:p>
         </p:txBody>
@@ -15968,7 +15866,7 @@
     </p:spTree>
     <p:extLst>
       <p:ext uri="{BB962C8B-B14F-4D97-AF65-F5344CB8AC3E}">
-        <p14:creationId xmlns:p14="http://schemas.microsoft.com/office/powerpoint/2010/main" val="2572407753"/>
+        <p14:creationId xmlns:p14="http://schemas.microsoft.com/office/powerpoint/2010/main" val="861195078"/>
       </p:ext>
     </p:extLst>
   </p:cSld>
@@ -16018,12 +15916,8 @@
           <a:lstStyle/>
           <a:p>
             <a:r>
-              <a:rPr lang="ru-RU" dirty="0" smtClean="0"/>
-              <a:t>Утилиты для </a:t>
-            </a:r>
-            <a:r>
               <a:rPr lang="en-US" dirty="0" smtClean="0"/>
-              <a:t>NuGet</a:t>
+              <a:t>Package Manager Console</a:t>
             </a:r>
             <a:endParaRPr lang="ru-RU" dirty="0"/>
           </a:p>
@@ -16042,66 +15936,128 @@
         <p:spPr/>
         <p:txBody>
           <a:bodyPr>
-            <a:normAutofit/>
+            <a:normAutofit fontScale="77500" lnSpcReduction="20000"/>
           </a:bodyPr>
           <a:lstStyle/>
           <a:p>
-            <a:r>
-              <a:rPr lang="en-US" sz="2400" dirty="0" smtClean="0"/>
+            <a:pPr marL="0" indent="0">
+              <a:buNone/>
+            </a:pPr>
+            <a:r>
+              <a:rPr lang="ru-RU" dirty="0" smtClean="0"/>
+              <a:t>Окно </a:t>
+            </a:r>
+            <a:r>
+              <a:rPr lang="en-US" dirty="0" smtClean="0"/>
+              <a:t>Package </a:t>
+            </a:r>
+            <a:r>
+              <a:rPr lang="en-US" dirty="0"/>
+              <a:t>Manager </a:t>
+            </a:r>
+            <a:r>
+              <a:rPr lang="en-US" dirty="0" smtClean="0"/>
+              <a:t>Console</a:t>
+            </a:r>
+            <a:r>
+              <a:rPr lang="ru-RU" dirty="0" smtClean="0"/>
+              <a:t> позволяет управлять </a:t>
+            </a:r>
+            <a:r>
+              <a:rPr lang="en-US" dirty="0" smtClean="0"/>
               <a:t>NuGet </a:t>
             </a:r>
             <a:r>
-              <a:rPr lang="en-US" sz="2400" dirty="0"/>
-              <a:t>Package Explorer</a:t>
-            </a:r>
-            <a:br>
-              <a:rPr lang="en-US" sz="2400" dirty="0"/>
-            </a:br>
-            <a:r>
-              <a:rPr lang="en-US" sz="2400" dirty="0">
-                <a:hlinkClick r:id="rId2"/>
-              </a:rPr>
-              <a:t>http://npe.codeplex.com</a:t>
-            </a:r>
-            <a:r>
-              <a:rPr lang="en-US" sz="2400" dirty="0" smtClean="0">
-                <a:hlinkClick r:id="rId2"/>
-              </a:rPr>
-              <a:t>/</a:t>
-            </a:r>
-            <a:endParaRPr lang="en-US" sz="2400" dirty="0" smtClean="0"/>
-          </a:p>
-          <a:p>
-            <a:endParaRPr lang="ru-RU" sz="2400" dirty="0" smtClean="0"/>
-          </a:p>
-          <a:p>
-            <a:r>
-              <a:rPr lang="ru-RU" sz="2400" dirty="0" smtClean="0"/>
-              <a:t>Утилита командной строки</a:t>
-            </a:r>
-            <a:br>
-              <a:rPr lang="ru-RU" sz="2400" dirty="0" smtClean="0"/>
-            </a:br>
-            <a:r>
-              <a:rPr lang="en-US" sz="2400" dirty="0">
-                <a:hlinkClick r:id="rId3"/>
-              </a:rPr>
-              <a:t>http://</a:t>
-            </a:r>
-            <a:r>
-              <a:rPr lang="en-US" sz="2400" dirty="0" smtClean="0">
-                <a:hlinkClick r:id="rId3"/>
-              </a:rPr>
-              <a:t>docs.nuget.org/docs/start-here/installing-nuget</a:t>
-            </a:r>
-            <a:endParaRPr lang="ru-RU" sz="2400" dirty="0"/>
+              <a:rPr lang="ru-RU" dirty="0" smtClean="0"/>
+              <a:t>пакетами с помощью </a:t>
+            </a:r>
+            <a:r>
+              <a:rPr lang="en-US" dirty="0" smtClean="0"/>
+              <a:t>PowerShell </a:t>
+            </a:r>
+            <a:r>
+              <a:rPr lang="ru-RU" dirty="0" smtClean="0"/>
+              <a:t>команд прямо из </a:t>
+            </a:r>
+            <a:r>
+              <a:rPr lang="en-US" dirty="0" smtClean="0"/>
+              <a:t>Visual Studio.</a:t>
+            </a:r>
+            <a:endParaRPr lang="ru-RU" dirty="0" smtClean="0"/>
+          </a:p>
+          <a:p>
+            <a:r>
+              <a:rPr lang="en-US" dirty="0" smtClean="0"/>
+              <a:t>Add-</a:t>
+            </a:r>
+            <a:r>
+              <a:rPr lang="en-US" dirty="0" err="1" smtClean="0"/>
+              <a:t>BindingRedirect</a:t>
+            </a:r>
+            <a:endParaRPr lang="en-US" dirty="0" smtClean="0"/>
+          </a:p>
+          <a:p>
+            <a:r>
+              <a:rPr lang="en-US" dirty="0" smtClean="0"/>
+              <a:t>Get-Package</a:t>
+            </a:r>
+          </a:p>
+          <a:p>
+            <a:r>
+              <a:rPr lang="en-US" dirty="0"/>
+              <a:t>Get-Project</a:t>
+            </a:r>
+          </a:p>
+          <a:p>
+            <a:r>
+              <a:rPr lang="en-US" dirty="0" smtClean="0"/>
+              <a:t>Install-Package </a:t>
+            </a:r>
+            <a:r>
+              <a:rPr lang="ru-RU" dirty="0" smtClean="0"/>
+              <a:t>: установка пакета. Позволяет установить пакет определенной версии, что </a:t>
+            </a:r>
+            <a:r>
+              <a:rPr lang="ru-RU" smtClean="0"/>
+              <a:t>невозможно сделать через </a:t>
+            </a:r>
+            <a:r>
+              <a:rPr lang="en-US" dirty="0" smtClean="0"/>
+              <a:t>GUI.</a:t>
+            </a:r>
+            <a:endParaRPr lang="ru-RU" dirty="0" smtClean="0"/>
+          </a:p>
+          <a:p>
+            <a:r>
+              <a:rPr lang="en-US" dirty="0" smtClean="0"/>
+              <a:t>Open-</a:t>
+            </a:r>
+            <a:r>
+              <a:rPr lang="en-US" dirty="0" err="1" smtClean="0"/>
+              <a:t>PackagePage</a:t>
+            </a:r>
+            <a:endParaRPr lang="ru-RU" dirty="0" smtClean="0"/>
+          </a:p>
+          <a:p>
+            <a:r>
+              <a:rPr lang="en-US" dirty="0" smtClean="0"/>
+              <a:t>Uninstall-Package</a:t>
+            </a:r>
+            <a:endParaRPr lang="ru-RU" dirty="0" smtClean="0"/>
+          </a:p>
+          <a:p>
+            <a:r>
+              <a:rPr lang="en-US" dirty="0"/>
+              <a:t>Update-Package</a:t>
+            </a:r>
+            <a:endParaRPr lang="ru-RU" dirty="0"/>
           </a:p>
         </p:txBody>
       </p:sp>
     </p:spTree>
     <p:extLst>
       <p:ext uri="{BB962C8B-B14F-4D97-AF65-F5344CB8AC3E}">
-        <p14:creationId xmlns:p14="http://schemas.microsoft.com/office/powerpoint/2010/main" val="2426017902"/>
+        <p14:creationId xmlns:p14="http://schemas.microsoft.com/office/powerpoint/2010/main" val="2572407753"/>
       </p:ext>
     </p:extLst>
   </p:cSld>
@@ -16152,13 +16108,13 @@
           <a:p>
             <a:r>
               <a:rPr lang="ru-RU" dirty="0" smtClean="0"/>
-              <a:t>Механизм </a:t>
+              <a:t>Утилиты для </a:t>
             </a:r>
             <a:r>
               <a:rPr lang="en-US" dirty="0" smtClean="0"/>
-              <a:t>Reflection</a:t>
-            </a:r>
-            <a:endParaRPr lang="en-US" dirty="0"/>
+              <a:t>NuGet</a:t>
+            </a:r>
+            <a:endParaRPr lang="ru-RU" dirty="0"/>
           </a:p>
         </p:txBody>
       </p:sp>
@@ -16175,179 +16131,66 @@
         <p:spPr/>
         <p:txBody>
           <a:bodyPr>
-            <a:normAutofit fontScale="70000" lnSpcReduction="20000"/>
+            <a:normAutofit/>
           </a:bodyPr>
           <a:lstStyle/>
           <a:p>
-            <a:pPr marL="0" indent="0">
-              <a:buNone/>
-            </a:pPr>
-            <a:r>
-              <a:rPr lang="ru-RU" dirty="0" smtClean="0"/>
-              <a:t>Реализация механизма </a:t>
-            </a:r>
-            <a:r>
-              <a:rPr lang="en-US" dirty="0" smtClean="0"/>
-              <a:t>RTTI </a:t>
-            </a:r>
-            <a:r>
-              <a:rPr lang="ru-RU" dirty="0" smtClean="0"/>
-              <a:t>(</a:t>
-            </a:r>
-            <a:r>
-              <a:rPr lang="en-US" dirty="0" smtClean="0"/>
-              <a:t>Run-time Type Information). </a:t>
-            </a:r>
-            <a:r>
-              <a:rPr lang="ru-RU" dirty="0" smtClean="0"/>
-              <a:t>Пространство имен </a:t>
-            </a:r>
-            <a:r>
-              <a:rPr lang="en-US" dirty="0" err="1" smtClean="0"/>
-              <a:t>System.Reflection</a:t>
-            </a:r>
-            <a:r>
-              <a:rPr lang="en-US" dirty="0" smtClean="0"/>
-              <a:t>.</a:t>
-            </a:r>
-          </a:p>
-          <a:p>
-            <a:pPr marL="0" indent="0">
-              <a:buNone/>
-            </a:pPr>
-            <a:endParaRPr lang="en-US" dirty="0" smtClean="0"/>
-          </a:p>
-          <a:p>
-            <a:r>
-              <a:rPr lang="ru-RU" b="1" dirty="0" smtClean="0"/>
-              <a:t>Генерация кода. </a:t>
-            </a:r>
-            <a:r>
-              <a:rPr lang="ru-RU" dirty="0" smtClean="0"/>
-              <a:t>Иногда в паре с </a:t>
-            </a:r>
-            <a:r>
-              <a:rPr lang="en-US" dirty="0" smtClean="0"/>
-              <a:t>T4 </a:t>
-            </a:r>
-            <a:r>
-              <a:rPr lang="ru-RU" dirty="0" smtClean="0"/>
-              <a:t>шаблонами</a:t>
-            </a:r>
-            <a:r>
-              <a:rPr lang="en-US" dirty="0" smtClean="0"/>
-              <a:t>.</a:t>
-            </a:r>
-          </a:p>
-          <a:p>
-            <a:r>
-              <a:rPr lang="ru-RU" b="1" dirty="0" smtClean="0"/>
-              <a:t>Автоматическая генерация </a:t>
-            </a:r>
-            <a:r>
-              <a:rPr lang="en-US" b="1" dirty="0" smtClean="0"/>
-              <a:t>UI</a:t>
-            </a:r>
-            <a:r>
-              <a:rPr lang="en-US" dirty="0" smtClean="0"/>
-              <a:t> (</a:t>
-            </a:r>
-            <a:r>
-              <a:rPr lang="ru-RU" dirty="0" smtClean="0"/>
-              <a:t>например</a:t>
-            </a:r>
-            <a:r>
-              <a:rPr lang="en-US" dirty="0" smtClean="0"/>
-              <a:t>, property </a:t>
-            </a:r>
-            <a:r>
-              <a:rPr lang="en-US" dirty="0"/>
-              <a:t>editor</a:t>
-            </a:r>
-            <a:r>
-              <a:rPr lang="en-US" dirty="0" smtClean="0"/>
-              <a:t>).</a:t>
-            </a:r>
-            <a:endParaRPr lang="en-US" dirty="0"/>
-          </a:p>
-          <a:p>
-            <a:r>
-              <a:rPr lang="ru-RU" b="1" dirty="0" smtClean="0"/>
-              <a:t>Сериализация</a:t>
-            </a:r>
-            <a:r>
-              <a:rPr lang="en-US" dirty="0" smtClean="0"/>
-              <a:t>. </a:t>
-            </a:r>
-            <a:r>
-              <a:rPr lang="ru-RU" dirty="0" smtClean="0"/>
-              <a:t>Определение списка членов класса подлежащих сериализации и последующее восстановление.</a:t>
-            </a:r>
-            <a:endParaRPr lang="en-US" dirty="0"/>
-          </a:p>
-          <a:p>
-            <a:r>
-              <a:rPr lang="ru-RU" b="1" dirty="0" smtClean="0"/>
-              <a:t>Веб-сервисы</a:t>
-            </a:r>
-            <a:r>
-              <a:rPr lang="en-US" dirty="0" smtClean="0"/>
-              <a:t>. </a:t>
-            </a:r>
-            <a:r>
-              <a:rPr lang="ru-RU" dirty="0" smtClean="0"/>
-              <a:t>Близко к сериализации. Генерация классов на основе </a:t>
-            </a:r>
-            <a:r>
-              <a:rPr lang="en-US" dirty="0" smtClean="0"/>
-              <a:t>WSDL.</a:t>
-            </a:r>
-            <a:endParaRPr lang="en-US" dirty="0"/>
-          </a:p>
-          <a:p>
-            <a:r>
-              <a:rPr lang="ru-RU" b="1" dirty="0" smtClean="0"/>
-              <a:t>Предметно-ориентированные языки</a:t>
-            </a:r>
-            <a:r>
-              <a:rPr lang="en-US" b="1" dirty="0" smtClean="0"/>
-              <a:t> (DSL)</a:t>
-            </a:r>
-            <a:r>
-              <a:rPr lang="en-US" dirty="0" smtClean="0"/>
-              <a:t>. </a:t>
-            </a:r>
-            <a:r>
-              <a:rPr lang="ru-RU" dirty="0" smtClean="0"/>
-              <a:t>Интерпретированные скриптовые языки могут работать с слабо-типизированными объектами с помощью </a:t>
-            </a:r>
-            <a:r>
-              <a:rPr lang="en-US" dirty="0" smtClean="0"/>
-              <a:t>reflection.</a:t>
-            </a:r>
-            <a:endParaRPr lang="en-US" dirty="0"/>
-          </a:p>
-          <a:p>
-            <a:r>
-              <a:rPr lang="ru-RU" b="1" dirty="0" smtClean="0"/>
-              <a:t>Средства отладки</a:t>
-            </a:r>
-            <a:r>
-              <a:rPr lang="en-US" dirty="0" smtClean="0"/>
-              <a:t>. </a:t>
-            </a:r>
-            <a:r>
-              <a:rPr lang="ru-RU" dirty="0" smtClean="0"/>
-              <a:t>Исследование состояния любого объекта.</a:t>
-            </a:r>
-            <a:endParaRPr lang="en-US" dirty="0"/>
+            <a:r>
+              <a:rPr lang="en-US" sz="2400" dirty="0" smtClean="0"/>
+              <a:t>NuGet </a:t>
+            </a:r>
+            <a:r>
+              <a:rPr lang="en-US" sz="2400" dirty="0"/>
+              <a:t>Package Explorer</a:t>
+            </a:r>
+            <a:br>
+              <a:rPr lang="en-US" sz="2400" dirty="0"/>
+            </a:br>
+            <a:r>
+              <a:rPr lang="en-US" sz="2400" dirty="0">
+                <a:hlinkClick r:id="rId2"/>
+              </a:rPr>
+              <a:t>http://npe.codeplex.com</a:t>
+            </a:r>
+            <a:r>
+              <a:rPr lang="en-US" sz="2400" dirty="0" smtClean="0">
+                <a:hlinkClick r:id="rId2"/>
+              </a:rPr>
+              <a:t>/</a:t>
+            </a:r>
+            <a:endParaRPr lang="en-US" sz="2400" dirty="0" smtClean="0"/>
+          </a:p>
+          <a:p>
+            <a:endParaRPr lang="ru-RU" sz="2400" dirty="0" smtClean="0"/>
+          </a:p>
+          <a:p>
+            <a:r>
+              <a:rPr lang="ru-RU" sz="2400" dirty="0" smtClean="0"/>
+              <a:t>Утилита командной строки</a:t>
+            </a:r>
+            <a:br>
+              <a:rPr lang="ru-RU" sz="2400" dirty="0" smtClean="0"/>
+            </a:br>
+            <a:r>
+              <a:rPr lang="en-US" sz="2400" dirty="0">
+                <a:hlinkClick r:id="rId3"/>
+              </a:rPr>
+              <a:t>http://</a:t>
+            </a:r>
+            <a:r>
+              <a:rPr lang="en-US" sz="2400" dirty="0" smtClean="0">
+                <a:hlinkClick r:id="rId3"/>
+              </a:rPr>
+              <a:t>docs.nuget.org/docs/start-here/installing-nuget</a:t>
+            </a:r>
+            <a:endParaRPr lang="ru-RU" sz="2400" dirty="0"/>
           </a:p>
         </p:txBody>
       </p:sp>
     </p:spTree>
     <p:extLst>
       <p:ext uri="{BB962C8B-B14F-4D97-AF65-F5344CB8AC3E}">
-        <p14:creationId xmlns:p14="http://schemas.microsoft.com/office/powerpoint/2010/main" val="2096666648"/>
+        <p14:creationId xmlns:p14="http://schemas.microsoft.com/office/powerpoint/2010/main" val="2426017902"/>
       </p:ext>
     </p:extLst>
   </p:cSld>
@@ -16699,6 +16542,252 @@
       </p:grpSpPr>
       <p:sp>
         <p:nvSpPr>
+          <p:cNvPr id="2" name="Title 1"/>
+          <p:cNvSpPr>
+            <a:spLocks noGrp="1"/>
+          </p:cNvSpPr>
+          <p:nvPr>
+            <p:ph type="title"/>
+          </p:nvPr>
+        </p:nvSpPr>
+        <p:spPr/>
+        <p:txBody>
+          <a:bodyPr/>
+          <a:lstStyle/>
+          <a:p>
+            <a:r>
+              <a:rPr lang="ru-RU" dirty="0" smtClean="0"/>
+              <a:t>Механизм </a:t>
+            </a:r>
+            <a:r>
+              <a:rPr lang="en-US" dirty="0" smtClean="0"/>
+              <a:t>Reflection</a:t>
+            </a:r>
+            <a:endParaRPr lang="en-US" dirty="0"/>
+          </a:p>
+        </p:txBody>
+      </p:sp>
+      <p:sp>
+        <p:nvSpPr>
+          <p:cNvPr id="3" name="Content Placeholder 2"/>
+          <p:cNvSpPr>
+            <a:spLocks noGrp="1"/>
+          </p:cNvSpPr>
+          <p:nvPr>
+            <p:ph idx="1"/>
+          </p:nvPr>
+        </p:nvSpPr>
+        <p:spPr/>
+        <p:txBody>
+          <a:bodyPr>
+            <a:normAutofit fontScale="70000" lnSpcReduction="20000"/>
+          </a:bodyPr>
+          <a:lstStyle/>
+          <a:p>
+            <a:pPr marL="0" indent="0">
+              <a:buNone/>
+            </a:pPr>
+            <a:r>
+              <a:rPr lang="ru-RU" dirty="0" smtClean="0"/>
+              <a:t>Реализация механизма </a:t>
+            </a:r>
+            <a:r>
+              <a:rPr lang="en-US" dirty="0" smtClean="0"/>
+              <a:t>RTTI </a:t>
+            </a:r>
+            <a:r>
+              <a:rPr lang="ru-RU" dirty="0" smtClean="0"/>
+              <a:t>(</a:t>
+            </a:r>
+            <a:r>
+              <a:rPr lang="en-US" dirty="0" smtClean="0"/>
+              <a:t>Run-time Type Information). </a:t>
+            </a:r>
+            <a:r>
+              <a:rPr lang="ru-RU" dirty="0" smtClean="0"/>
+              <a:t>Пространство имен </a:t>
+            </a:r>
+            <a:r>
+              <a:rPr lang="en-US" dirty="0" err="1" smtClean="0"/>
+              <a:t>System.Reflection</a:t>
+            </a:r>
+            <a:r>
+              <a:rPr lang="en-US" dirty="0" smtClean="0"/>
+              <a:t>.</a:t>
+            </a:r>
+          </a:p>
+          <a:p>
+            <a:pPr marL="0" indent="0">
+              <a:buNone/>
+            </a:pPr>
+            <a:endParaRPr lang="en-US" dirty="0" smtClean="0"/>
+          </a:p>
+          <a:p>
+            <a:r>
+              <a:rPr lang="ru-RU" b="1" dirty="0" smtClean="0"/>
+              <a:t>Генерация кода. </a:t>
+            </a:r>
+            <a:r>
+              <a:rPr lang="ru-RU" dirty="0" smtClean="0"/>
+              <a:t>Иногда в паре с </a:t>
+            </a:r>
+            <a:r>
+              <a:rPr lang="en-US" dirty="0" smtClean="0"/>
+              <a:t>T4 </a:t>
+            </a:r>
+            <a:r>
+              <a:rPr lang="ru-RU" dirty="0" smtClean="0"/>
+              <a:t>шаблонами</a:t>
+            </a:r>
+            <a:r>
+              <a:rPr lang="en-US" dirty="0" smtClean="0"/>
+              <a:t>.</a:t>
+            </a:r>
+          </a:p>
+          <a:p>
+            <a:r>
+              <a:rPr lang="ru-RU" b="1" dirty="0" smtClean="0"/>
+              <a:t>Автоматическая генерация </a:t>
+            </a:r>
+            <a:r>
+              <a:rPr lang="en-US" b="1" dirty="0" smtClean="0"/>
+              <a:t>UI</a:t>
+            </a:r>
+            <a:r>
+              <a:rPr lang="en-US" dirty="0" smtClean="0"/>
+              <a:t> (</a:t>
+            </a:r>
+            <a:r>
+              <a:rPr lang="ru-RU" dirty="0" smtClean="0"/>
+              <a:t>например</a:t>
+            </a:r>
+            <a:r>
+              <a:rPr lang="en-US" dirty="0" smtClean="0"/>
+              <a:t>, property </a:t>
+            </a:r>
+            <a:r>
+              <a:rPr lang="en-US" dirty="0"/>
+              <a:t>editor</a:t>
+            </a:r>
+            <a:r>
+              <a:rPr lang="en-US" dirty="0" smtClean="0"/>
+              <a:t>).</a:t>
+            </a:r>
+            <a:endParaRPr lang="en-US" dirty="0"/>
+          </a:p>
+          <a:p>
+            <a:r>
+              <a:rPr lang="ru-RU" b="1" dirty="0" smtClean="0"/>
+              <a:t>Сериализация</a:t>
+            </a:r>
+            <a:r>
+              <a:rPr lang="en-US" dirty="0" smtClean="0"/>
+              <a:t>. </a:t>
+            </a:r>
+            <a:r>
+              <a:rPr lang="ru-RU" dirty="0" smtClean="0"/>
+              <a:t>Определение списка членов класса подлежащих сериализации и последующее восстановление.</a:t>
+            </a:r>
+            <a:endParaRPr lang="en-US" dirty="0"/>
+          </a:p>
+          <a:p>
+            <a:r>
+              <a:rPr lang="ru-RU" b="1" dirty="0" smtClean="0"/>
+              <a:t>Веб-сервисы</a:t>
+            </a:r>
+            <a:r>
+              <a:rPr lang="en-US" dirty="0" smtClean="0"/>
+              <a:t>. </a:t>
+            </a:r>
+            <a:r>
+              <a:rPr lang="ru-RU" dirty="0" smtClean="0"/>
+              <a:t>Близко к сериализации. Генерация классов на основе </a:t>
+            </a:r>
+            <a:r>
+              <a:rPr lang="en-US" dirty="0" smtClean="0"/>
+              <a:t>WSDL.</a:t>
+            </a:r>
+            <a:endParaRPr lang="en-US" dirty="0"/>
+          </a:p>
+          <a:p>
+            <a:r>
+              <a:rPr lang="ru-RU" b="1" dirty="0" smtClean="0"/>
+              <a:t>Предметно-ориентированные языки</a:t>
+            </a:r>
+            <a:r>
+              <a:rPr lang="en-US" b="1" dirty="0" smtClean="0"/>
+              <a:t> (DSL)</a:t>
+            </a:r>
+            <a:r>
+              <a:rPr lang="en-US" dirty="0" smtClean="0"/>
+              <a:t>. </a:t>
+            </a:r>
+            <a:r>
+              <a:rPr lang="ru-RU" dirty="0" smtClean="0"/>
+              <a:t>Интерпретированные скриптовые языки могут работать с слабо-типизированными объектами с помощью </a:t>
+            </a:r>
+            <a:r>
+              <a:rPr lang="en-US" dirty="0" smtClean="0"/>
+              <a:t>reflection.</a:t>
+            </a:r>
+            <a:endParaRPr lang="en-US" dirty="0"/>
+          </a:p>
+          <a:p>
+            <a:r>
+              <a:rPr lang="ru-RU" b="1" dirty="0" smtClean="0"/>
+              <a:t>Средства отладки</a:t>
+            </a:r>
+            <a:r>
+              <a:rPr lang="en-US" dirty="0" smtClean="0"/>
+              <a:t>. </a:t>
+            </a:r>
+            <a:r>
+              <a:rPr lang="ru-RU" dirty="0" smtClean="0"/>
+              <a:t>Исследование состояния любого объекта.</a:t>
+            </a:r>
+            <a:endParaRPr lang="en-US" dirty="0"/>
+          </a:p>
+        </p:txBody>
+      </p:sp>
+    </p:spTree>
+    <p:extLst>
+      <p:ext uri="{BB962C8B-B14F-4D97-AF65-F5344CB8AC3E}">
+        <p14:creationId xmlns:p14="http://schemas.microsoft.com/office/powerpoint/2010/main" val="2096666648"/>
+      </p:ext>
+    </p:extLst>
+  </p:cSld>
+  <p:clrMapOvr>
+    <a:masterClrMapping/>
+  </p:clrMapOvr>
+  <p:timing>
+    <p:tnLst>
+      <p:par>
+        <p:cTn id="1" dur="indefinite" restart="never" nodeType="tmRoot"/>
+      </p:par>
+    </p:tnLst>
+  </p:timing>
+</p:sld>
+</file>
+
+<file path=ppt/slides/slide41.xml><?xml version="1.0" encoding="utf-8"?>
+<p:sld xmlns:a="http://schemas.openxmlformats.org/drawingml/2006/main" xmlns:r="http://schemas.openxmlformats.org/officeDocument/2006/relationships" xmlns:p="http://schemas.openxmlformats.org/presentationml/2006/main">
+  <p:cSld>
+    <p:spTree>
+      <p:nvGrpSpPr>
+        <p:cNvPr id="1" name=""/>
+        <p:cNvGrpSpPr/>
+        <p:nvPr/>
+      </p:nvGrpSpPr>
+      <p:grpSpPr>
+        <a:xfrm>
+          <a:off x="0" y="0"/>
+          <a:ext cx="0" cy="0"/>
+          <a:chOff x="0" y="0"/>
+          <a:chExt cx="0" cy="0"/>
+        </a:xfrm>
+      </p:grpSpPr>
+      <p:sp>
+        <p:nvSpPr>
           <p:cNvPr id="7170" name="Rectangle 3"/>
           <p:cNvSpPr>
             <a:spLocks noChangeArrowheads="1"/>
@@ -17551,7 +17640,7 @@
 </p:sld>
 </file>
 
-<file path=ppt/slides/slide41.xml><?xml version="1.0" encoding="utf-8"?>
+<file path=ppt/slides/slide42.xml><?xml version="1.0" encoding="utf-8"?>
 <p:sld xmlns:a="http://schemas.openxmlformats.org/drawingml/2006/main" xmlns:r="http://schemas.openxmlformats.org/officeDocument/2006/relationships" xmlns:p="http://schemas.openxmlformats.org/presentationml/2006/main">
   <p:cSld>
     <p:spTree>
@@ -18410,7 +18499,7 @@
 </p:sld>
 </file>
 
-<file path=ppt/slides/slide42.xml><?xml version="1.0" encoding="utf-8"?>
+<file path=ppt/slides/slide43.xml><?xml version="1.0" encoding="utf-8"?>
 <p:sld xmlns:a="http://schemas.openxmlformats.org/drawingml/2006/main" xmlns:r="http://schemas.openxmlformats.org/officeDocument/2006/relationships" xmlns:p="http://schemas.openxmlformats.org/presentationml/2006/main">
   <p:cSld>
     <p:spTree>
@@ -19064,7 +19153,7 @@
 </p:sld>
 </file>
 
-<file path=ppt/slides/slide43.xml><?xml version="1.0" encoding="utf-8"?>
+<file path=ppt/slides/slide44.xml><?xml version="1.0" encoding="utf-8"?>
 <p:sld xmlns:a="http://schemas.openxmlformats.org/drawingml/2006/main" xmlns:r="http://schemas.openxmlformats.org/officeDocument/2006/relationships" xmlns:p="http://schemas.openxmlformats.org/presentationml/2006/main">
   <p:cSld>
     <p:spTree>

</xml_diff>

<commit_message>
Debugging with .NET reference source
</commit_message>
<xml_diff>
--- a/Presentation/lesson-07-reflection.pptx
+++ b/Presentation/lesson-07-reflection.pptx
@@ -6,7 +6,7 @@
     <p:sldMasterId id="2147483663" r:id="rId2"/>
   </p:sldMasterIdLst>
   <p:notesMasterIdLst>
-    <p:notesMasterId r:id="rId47"/>
+    <p:notesMasterId r:id="rId48"/>
   </p:notesMasterIdLst>
   <p:sldIdLst>
     <p:sldId id="257" r:id="rId3"/>
@@ -48,11 +48,12 @@
     <p:sldId id="310" r:id="rId39"/>
     <p:sldId id="312" r:id="rId40"/>
     <p:sldId id="311" r:id="rId41"/>
-    <p:sldId id="299" r:id="rId42"/>
-    <p:sldId id="263" r:id="rId43"/>
-    <p:sldId id="264" r:id="rId44"/>
-    <p:sldId id="265" r:id="rId45"/>
-    <p:sldId id="271" r:id="rId46"/>
+    <p:sldId id="318" r:id="rId42"/>
+    <p:sldId id="299" r:id="rId43"/>
+    <p:sldId id="263" r:id="rId44"/>
+    <p:sldId id="264" r:id="rId45"/>
+    <p:sldId id="265" r:id="rId46"/>
+    <p:sldId id="271" r:id="rId47"/>
   </p:sldIdLst>
   <p:sldSz cx="9144000" cy="6858000" type="screen4x3"/>
   <p:notesSz cx="6858000" cy="9144000"/>
@@ -237,7 +238,7 @@
             <a:fld id="{B24A7054-7FFB-49F4-A126-5DF6E687FF53}" type="datetimeFigureOut">
               <a:rPr lang="ru-RU" smtClean="0"/>
               <a:pPr/>
-              <a:t>12.09.2014</a:t>
+              <a:t>13.09.2014</a:t>
             </a:fld>
             <a:endParaRPr lang="ru-RU"/>
           </a:p>
@@ -1521,7 +1522,7 @@
             <a:fld id="{8E6E6A2A-E9D3-4A0D-B04A-ABDD367A1E08}" type="datetimeFigureOut">
               <a:rPr lang="ru-RU" smtClean="0"/>
               <a:pPr/>
-              <a:t>12.09.2014</a:t>
+              <a:t>13.09.2014</a:t>
             </a:fld>
             <a:endParaRPr lang="ru-RU"/>
           </a:p>
@@ -1765,7 +1766,7 @@
             <a:fld id="{8E6E6A2A-E9D3-4A0D-B04A-ABDD367A1E08}" type="datetimeFigureOut">
               <a:rPr lang="ru-RU" smtClean="0"/>
               <a:pPr/>
-              <a:t>12.09.2014</a:t>
+              <a:t>13.09.2014</a:t>
             </a:fld>
             <a:endParaRPr lang="ru-RU"/>
           </a:p>
@@ -1937,7 +1938,7 @@
             <a:fld id="{8E6E6A2A-E9D3-4A0D-B04A-ABDD367A1E08}" type="datetimeFigureOut">
               <a:rPr lang="ru-RU" smtClean="0"/>
               <a:pPr/>
-              <a:t>12.09.2014</a:t>
+              <a:t>13.09.2014</a:t>
             </a:fld>
             <a:endParaRPr lang="ru-RU"/>
           </a:p>
@@ -2185,7 +2186,7 @@
             <a:fld id="{8E6E6A2A-E9D3-4A0D-B04A-ABDD367A1E08}" type="datetimeFigureOut">
               <a:rPr lang="ru-RU" smtClean="0"/>
               <a:pPr/>
-              <a:t>12.09.2014</a:t>
+              <a:t>13.09.2014</a:t>
             </a:fld>
             <a:endParaRPr lang="ru-RU"/>
           </a:p>
@@ -2475,7 +2476,7 @@
             <a:fld id="{8E6E6A2A-E9D3-4A0D-B04A-ABDD367A1E08}" type="datetimeFigureOut">
               <a:rPr lang="ru-RU" smtClean="0"/>
               <a:pPr/>
-              <a:t>12.09.2014</a:t>
+              <a:t>13.09.2014</a:t>
             </a:fld>
             <a:endParaRPr lang="ru-RU"/>
           </a:p>
@@ -2899,7 +2900,7 @@
             <a:fld id="{8E6E6A2A-E9D3-4A0D-B04A-ABDD367A1E08}" type="datetimeFigureOut">
               <a:rPr lang="ru-RU" smtClean="0"/>
               <a:pPr/>
-              <a:t>12.09.2014</a:t>
+              <a:t>13.09.2014</a:t>
             </a:fld>
             <a:endParaRPr lang="ru-RU"/>
           </a:p>
@@ -3228,7 +3229,7 @@
             <a:fld id="{8E6E6A2A-E9D3-4A0D-B04A-ABDD367A1E08}" type="datetimeFigureOut">
               <a:rPr lang="ru-RU" smtClean="0"/>
               <a:pPr/>
-              <a:t>12.09.2014</a:t>
+              <a:t>13.09.2014</a:t>
             </a:fld>
             <a:endParaRPr lang="ru-RU"/>
           </a:p>
@@ -3325,7 +3326,7 @@
             <a:fld id="{8E6E6A2A-E9D3-4A0D-B04A-ABDD367A1E08}" type="datetimeFigureOut">
               <a:rPr lang="ru-RU" smtClean="0"/>
               <a:pPr/>
-              <a:t>12.09.2014</a:t>
+              <a:t>13.09.2014</a:t>
             </a:fld>
             <a:endParaRPr lang="ru-RU"/>
           </a:p>
@@ -3604,7 +3605,7 @@
             <a:fld id="{8E6E6A2A-E9D3-4A0D-B04A-ABDD367A1E08}" type="datetimeFigureOut">
               <a:rPr lang="ru-RU" smtClean="0"/>
               <a:pPr/>
-              <a:t>12.09.2014</a:t>
+              <a:t>13.09.2014</a:t>
             </a:fld>
             <a:endParaRPr lang="ru-RU"/>
           </a:p>
@@ -3859,7 +3860,7 @@
             <a:fld id="{8E6E6A2A-E9D3-4A0D-B04A-ABDD367A1E08}" type="datetimeFigureOut">
               <a:rPr lang="ru-RU" smtClean="0"/>
               <a:pPr/>
-              <a:t>12.09.2014</a:t>
+              <a:t>13.09.2014</a:t>
             </a:fld>
             <a:endParaRPr lang="ru-RU"/>
           </a:p>
@@ -4031,7 +4032,7 @@
             <a:fld id="{8E6E6A2A-E9D3-4A0D-B04A-ABDD367A1E08}" type="datetimeFigureOut">
               <a:rPr lang="ru-RU" smtClean="0"/>
               <a:pPr/>
-              <a:t>12.09.2014</a:t>
+              <a:t>13.09.2014</a:t>
             </a:fld>
             <a:endParaRPr lang="ru-RU"/>
           </a:p>
@@ -4213,7 +4214,7 @@
             <a:fld id="{8E6E6A2A-E9D3-4A0D-B04A-ABDD367A1E08}" type="datetimeFigureOut">
               <a:rPr lang="ru-RU" smtClean="0"/>
               <a:pPr/>
-              <a:t>12.09.2014</a:t>
+              <a:t>13.09.2014</a:t>
             </a:fld>
             <a:endParaRPr lang="ru-RU"/>
           </a:p>
@@ -5451,7 +5452,7 @@
             <a:fld id="{AC3D3127-B7C4-45E3-9797-C527EC9FDD78}" type="datetimeFigureOut">
               <a:rPr lang="ru-RU" smtClean="0"/>
               <a:pPr/>
-              <a:t>12.09.2014</a:t>
+              <a:t>13.09.2014</a:t>
             </a:fld>
             <a:endParaRPr lang="ru-RU"/>
           </a:p>
@@ -5973,7 +5974,7 @@
             <a:fld id="{8E6E6A2A-E9D3-4A0D-B04A-ABDD367A1E08}" type="datetimeFigureOut">
               <a:rPr lang="ru-RU" smtClean="0"/>
               <a:pPr/>
-              <a:t>12.09.2014</a:t>
+              <a:t>13.09.2014</a:t>
             </a:fld>
             <a:endParaRPr lang="ru-RU"/>
           </a:p>
@@ -16550,6 +16551,365 @@
             <p:ph type="title"/>
           </p:nvPr>
         </p:nvSpPr>
+        <p:spPr>
+          <a:xfrm>
+            <a:off x="457200" y="274638"/>
+            <a:ext cx="8229600" cy="706090"/>
+          </a:xfrm>
+        </p:spPr>
+        <p:txBody>
+          <a:bodyPr>
+            <a:normAutofit/>
+          </a:bodyPr>
+          <a:lstStyle/>
+          <a:p>
+            <a:r>
+              <a:rPr lang="ru-RU" sz="3200" dirty="0" smtClean="0"/>
+              <a:t>Отладка </a:t>
+            </a:r>
+            <a:r>
+              <a:rPr lang="en-US" sz="3200" dirty="0" smtClean="0"/>
+              <a:t>.NET </a:t>
+            </a:r>
+            <a:r>
+              <a:rPr lang="ru-RU" sz="3200" dirty="0" smtClean="0"/>
+              <a:t>с помощью </a:t>
+            </a:r>
+            <a:r>
+              <a:rPr lang="en-US" sz="3200" dirty="0" smtClean="0"/>
+              <a:t>reference source</a:t>
+            </a:r>
+            <a:endParaRPr lang="ru-RU" sz="3200" dirty="0"/>
+          </a:p>
+        </p:txBody>
+      </p:sp>
+      <p:sp>
+        <p:nvSpPr>
+          <p:cNvPr id="3" name="Content Placeholder 2"/>
+          <p:cNvSpPr>
+            <a:spLocks noGrp="1"/>
+          </p:cNvSpPr>
+          <p:nvPr>
+            <p:ph idx="1"/>
+          </p:nvPr>
+        </p:nvSpPr>
+        <p:spPr>
+          <a:xfrm>
+            <a:off x="457200" y="980728"/>
+            <a:ext cx="8229600" cy="864096"/>
+          </a:xfrm>
+        </p:spPr>
+        <p:txBody>
+          <a:bodyPr>
+            <a:noAutofit/>
+          </a:bodyPr>
+          <a:lstStyle/>
+          <a:p>
+            <a:pPr marL="0" indent="0">
+              <a:buNone/>
+            </a:pPr>
+            <a:r>
+              <a:rPr lang="ru-RU" sz="2400" dirty="0" smtClean="0"/>
+              <a:t>Работает только для </a:t>
+            </a:r>
+            <a:r>
+              <a:rPr lang="en-US" sz="2400" dirty="0" smtClean="0"/>
+              <a:t>.NET 4.5.1 </a:t>
+            </a:r>
+            <a:r>
+              <a:rPr lang="ru-RU" sz="2400" dirty="0" smtClean="0"/>
+              <a:t>в </a:t>
+            </a:r>
+            <a:r>
+              <a:rPr lang="en-US" sz="2400" dirty="0" smtClean="0"/>
+              <a:t>VS 2012 </a:t>
+            </a:r>
+            <a:r>
+              <a:rPr lang="ru-RU" sz="2400" dirty="0" smtClean="0"/>
+              <a:t>и выше</a:t>
+            </a:r>
+            <a:r>
+              <a:rPr lang="en-US" sz="2400" dirty="0" smtClean="0"/>
+              <a:t>!</a:t>
+            </a:r>
+            <a:endParaRPr lang="ru-RU" sz="2400" dirty="0"/>
+          </a:p>
+          <a:p>
+            <a:pPr marL="0" indent="0">
+              <a:buNone/>
+            </a:pPr>
+            <a:r>
+              <a:rPr lang="ru-RU" sz="2400" dirty="0" smtClean="0"/>
+              <a:t>Необходимые настройки:</a:t>
+            </a:r>
+            <a:endParaRPr lang="ru-RU" sz="2400" dirty="0"/>
+          </a:p>
+        </p:txBody>
+      </p:sp>
+      <p:pic>
+        <p:nvPicPr>
+          <p:cNvPr id="1027" name="Picture 3"/>
+          <p:cNvPicPr>
+            <a:picLocks noChangeAspect="1" noChangeArrowheads="1"/>
+          </p:cNvPicPr>
+          <p:nvPr/>
+        </p:nvPicPr>
+        <p:blipFill>
+          <a:blip r:embed="rId2">
+            <a:extLst>
+              <a:ext uri="{28A0092B-C50C-407E-A947-70E740481C1C}">
+                <a14:useLocalDpi xmlns:a14="http://schemas.microsoft.com/office/drawing/2010/main" val="0"/>
+              </a:ext>
+            </a:extLst>
+          </a:blip>
+          <a:srcRect/>
+          <a:stretch>
+            <a:fillRect/>
+          </a:stretch>
+        </p:blipFill>
+        <p:spPr bwMode="auto">
+          <a:xfrm>
+            <a:off x="3995936" y="1459979"/>
+            <a:ext cx="4200525" cy="2905125"/>
+          </a:xfrm>
+          <a:prstGeom prst="rect">
+            <a:avLst/>
+          </a:prstGeom>
+          <a:noFill/>
+          <a:ln>
+            <a:noFill/>
+          </a:ln>
+          <a:effectLst/>
+          <a:extLst>
+            <a:ext uri="{909E8E84-426E-40DD-AFC4-6F175D3DCCD1}">
+              <a14:hiddenFill xmlns:a14="http://schemas.microsoft.com/office/drawing/2010/main">
+                <a:solidFill>
+                  <a:schemeClr val="accent1"/>
+                </a:solidFill>
+              </a14:hiddenFill>
+            </a:ext>
+            <a:ext uri="{91240B29-F687-4F45-9708-019B960494DF}">
+              <a14:hiddenLine xmlns:a14="http://schemas.microsoft.com/office/drawing/2010/main" w="9525">
+                <a:solidFill>
+                  <a:schemeClr val="tx1"/>
+                </a:solidFill>
+                <a:miter lim="800000"/>
+                <a:headEnd/>
+                <a:tailEnd/>
+              </a14:hiddenLine>
+            </a:ext>
+            <a:ext uri="{AF507438-7753-43E0-B8FC-AC1667EBCBE1}">
+              <a14:hiddenEffects xmlns:a14="http://schemas.microsoft.com/office/drawing/2010/main">
+                <a:effectLst>
+                  <a:outerShdw dist="35921" dir="2700000" algn="ctr" rotWithShape="0">
+                    <a:schemeClr val="bg2"/>
+                  </a:outerShdw>
+                </a:effectLst>
+              </a14:hiddenEffects>
+            </a:ext>
+          </a:extLst>
+        </p:spPr>
+      </p:pic>
+      <p:sp>
+        <p:nvSpPr>
+          <p:cNvPr id="4" name="TextBox 3"/>
+          <p:cNvSpPr txBox="1"/>
+          <p:nvPr/>
+        </p:nvSpPr>
+        <p:spPr>
+          <a:xfrm>
+            <a:off x="543158" y="2597756"/>
+            <a:ext cx="2722669" cy="461665"/>
+          </a:xfrm>
+          <a:prstGeom prst="rect">
+            <a:avLst/>
+          </a:prstGeom>
+          <a:noFill/>
+        </p:spPr>
+        <p:txBody>
+          <a:bodyPr wrap="none" rtlCol="0">
+            <a:spAutoFit/>
+          </a:bodyPr>
+          <a:lstStyle/>
+          <a:p>
+            <a:pPr algn="ctr"/>
+            <a:r>
+              <a:rPr lang="en-US" sz="2400" dirty="0" smtClean="0"/>
+              <a:t>Debugger \ General:</a:t>
+            </a:r>
+            <a:endParaRPr lang="ru-RU" sz="2400" dirty="0" smtClean="0"/>
+          </a:p>
+        </p:txBody>
+      </p:sp>
+      <p:pic>
+        <p:nvPicPr>
+          <p:cNvPr id="1028" name="Picture 4"/>
+          <p:cNvPicPr>
+            <a:picLocks noChangeAspect="1" noChangeArrowheads="1"/>
+          </p:cNvPicPr>
+          <p:nvPr/>
+        </p:nvPicPr>
+        <p:blipFill>
+          <a:blip r:embed="rId3">
+            <a:extLst>
+              <a:ext uri="{28A0092B-C50C-407E-A947-70E740481C1C}">
+                <a14:useLocalDpi xmlns:a14="http://schemas.microsoft.com/office/drawing/2010/main" val="0"/>
+              </a:ext>
+            </a:extLst>
+          </a:blip>
+          <a:srcRect/>
+          <a:stretch>
+            <a:fillRect/>
+          </a:stretch>
+        </p:blipFill>
+        <p:spPr bwMode="auto">
+          <a:xfrm>
+            <a:off x="3995936" y="5085184"/>
+            <a:ext cx="4381500" cy="1352550"/>
+          </a:xfrm>
+          <a:prstGeom prst="rect">
+            <a:avLst/>
+          </a:prstGeom>
+          <a:noFill/>
+          <a:ln>
+            <a:noFill/>
+          </a:ln>
+          <a:effectLst/>
+          <a:extLst>
+            <a:ext uri="{909E8E84-426E-40DD-AFC4-6F175D3DCCD1}">
+              <a14:hiddenFill xmlns:a14="http://schemas.microsoft.com/office/drawing/2010/main">
+                <a:solidFill>
+                  <a:schemeClr val="accent1"/>
+                </a:solidFill>
+              </a14:hiddenFill>
+            </a:ext>
+            <a:ext uri="{91240B29-F687-4F45-9708-019B960494DF}">
+              <a14:hiddenLine xmlns:a14="http://schemas.microsoft.com/office/drawing/2010/main" w="9525">
+                <a:solidFill>
+                  <a:schemeClr val="tx1"/>
+                </a:solidFill>
+                <a:miter lim="800000"/>
+                <a:headEnd/>
+                <a:tailEnd/>
+              </a14:hiddenLine>
+            </a:ext>
+            <a:ext uri="{AF507438-7753-43E0-B8FC-AC1667EBCBE1}">
+              <a14:hiddenEffects xmlns:a14="http://schemas.microsoft.com/office/drawing/2010/main">
+                <a:effectLst>
+                  <a:outerShdw dist="35921" dir="2700000" algn="ctr" rotWithShape="0">
+                    <a:schemeClr val="bg2"/>
+                  </a:outerShdw>
+                </a:effectLst>
+              </a14:hiddenEffects>
+            </a:ext>
+          </a:extLst>
+        </p:spPr>
+      </p:pic>
+      <p:sp>
+        <p:nvSpPr>
+          <p:cNvPr id="8" name="TextBox 7"/>
+          <p:cNvSpPr txBox="1"/>
+          <p:nvPr/>
+        </p:nvSpPr>
+        <p:spPr>
+          <a:xfrm>
+            <a:off x="516260" y="5085184"/>
+            <a:ext cx="2776466" cy="461665"/>
+          </a:xfrm>
+          <a:prstGeom prst="rect">
+            <a:avLst/>
+          </a:prstGeom>
+          <a:noFill/>
+        </p:spPr>
+        <p:txBody>
+          <a:bodyPr wrap="none" rtlCol="0">
+            <a:spAutoFit/>
+          </a:bodyPr>
+          <a:lstStyle/>
+          <a:p>
+            <a:pPr algn="ctr"/>
+            <a:r>
+              <a:rPr lang="en-US" sz="2400" dirty="0" smtClean="0"/>
+              <a:t>Debugger \ Symbols:</a:t>
+            </a:r>
+          </a:p>
+        </p:txBody>
+      </p:sp>
+      <p:sp>
+        <p:nvSpPr>
+          <p:cNvPr id="5" name="TextBox 4"/>
+          <p:cNvSpPr txBox="1"/>
+          <p:nvPr/>
+        </p:nvSpPr>
+        <p:spPr>
+          <a:xfrm>
+            <a:off x="2483768" y="4581128"/>
+            <a:ext cx="6192593" cy="369332"/>
+          </a:xfrm>
+          <a:prstGeom prst="rect">
+            <a:avLst/>
+          </a:prstGeom>
+          <a:noFill/>
+        </p:spPr>
+        <p:txBody>
+          <a:bodyPr wrap="none" rtlCol="0">
+            <a:spAutoFit/>
+          </a:bodyPr>
+          <a:lstStyle/>
+          <a:p>
+            <a:pPr algn="ctr"/>
+            <a:r>
+              <a:rPr lang="ru-RU" dirty="0" smtClean="0"/>
+              <a:t>Добавьте адрес </a:t>
+            </a:r>
+            <a:r>
+              <a:rPr lang="en-US" dirty="0"/>
+              <a:t>http://referencesource.microsoft.com/symbols</a:t>
+            </a:r>
+            <a:endParaRPr lang="ru-RU" dirty="0" smtClean="0"/>
+          </a:p>
+        </p:txBody>
+      </p:sp>
+    </p:spTree>
+    <p:extLst>
+      <p:ext uri="{BB962C8B-B14F-4D97-AF65-F5344CB8AC3E}">
+        <p14:creationId xmlns:p14="http://schemas.microsoft.com/office/powerpoint/2010/main" val="2605966343"/>
+      </p:ext>
+    </p:extLst>
+  </p:cSld>
+  <p:clrMapOvr>
+    <a:masterClrMapping/>
+  </p:clrMapOvr>
+</p:sld>
+</file>
+
+<file path=ppt/slides/slide41.xml><?xml version="1.0" encoding="utf-8"?>
+<p:sld xmlns:a="http://schemas.openxmlformats.org/drawingml/2006/main" xmlns:r="http://schemas.openxmlformats.org/officeDocument/2006/relationships" xmlns:p="http://schemas.openxmlformats.org/presentationml/2006/main">
+  <p:cSld>
+    <p:spTree>
+      <p:nvGrpSpPr>
+        <p:cNvPr id="1" name=""/>
+        <p:cNvGrpSpPr/>
+        <p:nvPr/>
+      </p:nvGrpSpPr>
+      <p:grpSpPr>
+        <a:xfrm>
+          <a:off x="0" y="0"/>
+          <a:ext cx="0" cy="0"/>
+          <a:chOff x="0" y="0"/>
+          <a:chExt cx="0" cy="0"/>
+        </a:xfrm>
+      </p:grpSpPr>
+      <p:sp>
+        <p:nvSpPr>
+          <p:cNvPr id="2" name="Title 1"/>
+          <p:cNvSpPr>
+            <a:spLocks noGrp="1"/>
+          </p:cNvSpPr>
+          <p:nvPr>
+            <p:ph type="title"/>
+          </p:nvPr>
+        </p:nvSpPr>
         <p:spPr/>
         <p:txBody>
           <a:bodyPr/>
@@ -16769,7 +17129,7 @@
 </p:sld>
 </file>
 
-<file path=ppt/slides/slide41.xml><?xml version="1.0" encoding="utf-8"?>
+<file path=ppt/slides/slide42.xml><?xml version="1.0" encoding="utf-8"?>
 <p:sld xmlns:a="http://schemas.openxmlformats.org/drawingml/2006/main" xmlns:r="http://schemas.openxmlformats.org/officeDocument/2006/relationships" xmlns:p="http://schemas.openxmlformats.org/presentationml/2006/main">
   <p:cSld>
     <p:spTree>
@@ -17640,7 +18000,7 @@
 </p:sld>
 </file>
 
-<file path=ppt/slides/slide42.xml><?xml version="1.0" encoding="utf-8"?>
+<file path=ppt/slides/slide43.xml><?xml version="1.0" encoding="utf-8"?>
 <p:sld xmlns:a="http://schemas.openxmlformats.org/drawingml/2006/main" xmlns:r="http://schemas.openxmlformats.org/officeDocument/2006/relationships" xmlns:p="http://schemas.openxmlformats.org/presentationml/2006/main">
   <p:cSld>
     <p:spTree>
@@ -18499,7 +18859,7 @@
 </p:sld>
 </file>
 
-<file path=ppt/slides/slide43.xml><?xml version="1.0" encoding="utf-8"?>
+<file path=ppt/slides/slide44.xml><?xml version="1.0" encoding="utf-8"?>
 <p:sld xmlns:a="http://schemas.openxmlformats.org/drawingml/2006/main" xmlns:r="http://schemas.openxmlformats.org/officeDocument/2006/relationships" xmlns:p="http://schemas.openxmlformats.org/presentationml/2006/main">
   <p:cSld>
     <p:spTree>
@@ -19153,7 +19513,7 @@
 </p:sld>
 </file>
 
-<file path=ppt/slides/slide44.xml><?xml version="1.0" encoding="utf-8"?>
+<file path=ppt/slides/slide45.xml><?xml version="1.0" encoding="utf-8"?>
 <p:sld xmlns:a="http://schemas.openxmlformats.org/drawingml/2006/main" xmlns:r="http://schemas.openxmlformats.org/officeDocument/2006/relationships" xmlns:p="http://schemas.openxmlformats.org/presentationml/2006/main">
   <p:cSld>
     <p:spTree>

</xml_diff>

<commit_message>
How to distribute .NET libraries
</commit_message>
<xml_diff>
--- a/Presentation/lesson-07-reflection.pptx
+++ b/Presentation/lesson-07-reflection.pptx
@@ -6,7 +6,7 @@
     <p:sldMasterId id="2147483663" r:id="rId2"/>
   </p:sldMasterIdLst>
   <p:notesMasterIdLst>
-    <p:notesMasterId r:id="rId51"/>
+    <p:notesMasterId r:id="rId52"/>
   </p:notesMasterIdLst>
   <p:sldIdLst>
     <p:sldId id="257" r:id="rId3"/>
@@ -50,13 +50,14 @@
     <p:sldId id="310" r:id="rId41"/>
     <p:sldId id="312" r:id="rId42"/>
     <p:sldId id="311" r:id="rId43"/>
-    <p:sldId id="318" r:id="rId44"/>
-    <p:sldId id="319" r:id="rId45"/>
-    <p:sldId id="299" r:id="rId46"/>
-    <p:sldId id="263" r:id="rId47"/>
-    <p:sldId id="264" r:id="rId48"/>
-    <p:sldId id="265" r:id="rId49"/>
-    <p:sldId id="271" r:id="rId50"/>
+    <p:sldId id="322" r:id="rId44"/>
+    <p:sldId id="318" r:id="rId45"/>
+    <p:sldId id="319" r:id="rId46"/>
+    <p:sldId id="299" r:id="rId47"/>
+    <p:sldId id="263" r:id="rId48"/>
+    <p:sldId id="264" r:id="rId49"/>
+    <p:sldId id="265" r:id="rId50"/>
+    <p:sldId id="271" r:id="rId51"/>
   </p:sldIdLst>
   <p:sldSz cx="9144000" cy="6858000" type="screen4x3"/>
   <p:notesSz cx="6858000" cy="9144000"/>
@@ -241,7 +242,7 @@
             <a:fld id="{B24A7054-7FFB-49F4-A126-5DF6E687FF53}" type="datetimeFigureOut">
               <a:rPr lang="ru-RU" smtClean="0"/>
               <a:pPr/>
-              <a:t>14.10.2014</a:t>
+              <a:t>23.01.2015</a:t>
             </a:fld>
             <a:endParaRPr lang="ru-RU"/>
           </a:p>
@@ -1525,7 +1526,7 @@
             <a:fld id="{8E6E6A2A-E9D3-4A0D-B04A-ABDD367A1E08}" type="datetimeFigureOut">
               <a:rPr lang="ru-RU" smtClean="0"/>
               <a:pPr/>
-              <a:t>14.10.2014</a:t>
+              <a:t>23.01.2015</a:t>
             </a:fld>
             <a:endParaRPr lang="ru-RU"/>
           </a:p>
@@ -1769,7 +1770,7 @@
             <a:fld id="{8E6E6A2A-E9D3-4A0D-B04A-ABDD367A1E08}" type="datetimeFigureOut">
               <a:rPr lang="ru-RU" smtClean="0"/>
               <a:pPr/>
-              <a:t>14.10.2014</a:t>
+              <a:t>23.01.2015</a:t>
             </a:fld>
             <a:endParaRPr lang="ru-RU"/>
           </a:p>
@@ -1941,7 +1942,7 @@
             <a:fld id="{8E6E6A2A-E9D3-4A0D-B04A-ABDD367A1E08}" type="datetimeFigureOut">
               <a:rPr lang="ru-RU" smtClean="0"/>
               <a:pPr/>
-              <a:t>14.10.2014</a:t>
+              <a:t>23.01.2015</a:t>
             </a:fld>
             <a:endParaRPr lang="ru-RU"/>
           </a:p>
@@ -2189,7 +2190,7 @@
             <a:fld id="{8E6E6A2A-E9D3-4A0D-B04A-ABDD367A1E08}" type="datetimeFigureOut">
               <a:rPr lang="ru-RU" smtClean="0"/>
               <a:pPr/>
-              <a:t>14.10.2014</a:t>
+              <a:t>23.01.2015</a:t>
             </a:fld>
             <a:endParaRPr lang="ru-RU"/>
           </a:p>
@@ -2479,7 +2480,7 @@
             <a:fld id="{8E6E6A2A-E9D3-4A0D-B04A-ABDD367A1E08}" type="datetimeFigureOut">
               <a:rPr lang="ru-RU" smtClean="0"/>
               <a:pPr/>
-              <a:t>14.10.2014</a:t>
+              <a:t>23.01.2015</a:t>
             </a:fld>
             <a:endParaRPr lang="ru-RU"/>
           </a:p>
@@ -2903,7 +2904,7 @@
             <a:fld id="{8E6E6A2A-E9D3-4A0D-B04A-ABDD367A1E08}" type="datetimeFigureOut">
               <a:rPr lang="ru-RU" smtClean="0"/>
               <a:pPr/>
-              <a:t>14.10.2014</a:t>
+              <a:t>23.01.2015</a:t>
             </a:fld>
             <a:endParaRPr lang="ru-RU"/>
           </a:p>
@@ -3232,7 +3233,7 @@
             <a:fld id="{8E6E6A2A-E9D3-4A0D-B04A-ABDD367A1E08}" type="datetimeFigureOut">
               <a:rPr lang="ru-RU" smtClean="0"/>
               <a:pPr/>
-              <a:t>14.10.2014</a:t>
+              <a:t>23.01.2015</a:t>
             </a:fld>
             <a:endParaRPr lang="ru-RU"/>
           </a:p>
@@ -3329,7 +3330,7 @@
             <a:fld id="{8E6E6A2A-E9D3-4A0D-B04A-ABDD367A1E08}" type="datetimeFigureOut">
               <a:rPr lang="ru-RU" smtClean="0"/>
               <a:pPr/>
-              <a:t>14.10.2014</a:t>
+              <a:t>23.01.2015</a:t>
             </a:fld>
             <a:endParaRPr lang="ru-RU"/>
           </a:p>
@@ -3608,7 +3609,7 @@
             <a:fld id="{8E6E6A2A-E9D3-4A0D-B04A-ABDD367A1E08}" type="datetimeFigureOut">
               <a:rPr lang="ru-RU" smtClean="0"/>
               <a:pPr/>
-              <a:t>14.10.2014</a:t>
+              <a:t>23.01.2015</a:t>
             </a:fld>
             <a:endParaRPr lang="ru-RU"/>
           </a:p>
@@ -3863,7 +3864,7 @@
             <a:fld id="{8E6E6A2A-E9D3-4A0D-B04A-ABDD367A1E08}" type="datetimeFigureOut">
               <a:rPr lang="ru-RU" smtClean="0"/>
               <a:pPr/>
-              <a:t>14.10.2014</a:t>
+              <a:t>23.01.2015</a:t>
             </a:fld>
             <a:endParaRPr lang="ru-RU"/>
           </a:p>
@@ -4035,7 +4036,7 @@
             <a:fld id="{8E6E6A2A-E9D3-4A0D-B04A-ABDD367A1E08}" type="datetimeFigureOut">
               <a:rPr lang="ru-RU" smtClean="0"/>
               <a:pPr/>
-              <a:t>14.10.2014</a:t>
+              <a:t>23.01.2015</a:t>
             </a:fld>
             <a:endParaRPr lang="ru-RU"/>
           </a:p>
@@ -4217,7 +4218,7 @@
             <a:fld id="{8E6E6A2A-E9D3-4A0D-B04A-ABDD367A1E08}" type="datetimeFigureOut">
               <a:rPr lang="ru-RU" smtClean="0"/>
               <a:pPr/>
-              <a:t>14.10.2014</a:t>
+              <a:t>23.01.2015</a:t>
             </a:fld>
             <a:endParaRPr lang="ru-RU"/>
           </a:p>
@@ -5455,7 +5456,7 @@
             <a:fld id="{AC3D3127-B7C4-45E3-9797-C527EC9FDD78}" type="datetimeFigureOut">
               <a:rPr lang="ru-RU" smtClean="0"/>
               <a:pPr/>
-              <a:t>14.10.2014</a:t>
+              <a:t>23.01.2015</a:t>
             </a:fld>
             <a:endParaRPr lang="ru-RU"/>
           </a:p>
@@ -5977,7 +5978,7 @@
             <a:fld id="{8E6E6A2A-E9D3-4A0D-B04A-ABDD367A1E08}" type="datetimeFigureOut">
               <a:rPr lang="ru-RU" smtClean="0"/>
               <a:pPr/>
-              <a:t>14.10.2014</a:t>
+              <a:t>23.01.2015</a:t>
             </a:fld>
             <a:endParaRPr lang="ru-RU"/>
           </a:p>
@@ -16947,35 +16948,18 @@
             <p:ph type="title"/>
           </p:nvPr>
         </p:nvSpPr>
-        <p:spPr>
-          <a:xfrm>
-            <a:off x="457200" y="274638"/>
-            <a:ext cx="8229600" cy="706090"/>
-          </a:xfrm>
-        </p:spPr>
+        <p:spPr/>
         <p:txBody>
           <a:bodyPr>
-            <a:normAutofit/>
+            <a:normAutofit fontScale="90000"/>
           </a:bodyPr>
           <a:lstStyle/>
           <a:p>
             <a:r>
-              <a:rPr lang="ru-RU" sz="3200" dirty="0" smtClean="0"/>
-              <a:t>Отладка </a:t>
-            </a:r>
-            <a:r>
-              <a:rPr lang="en-US" sz="3200" dirty="0" smtClean="0"/>
-              <a:t>.NET </a:t>
-            </a:r>
-            <a:r>
-              <a:rPr lang="ru-RU" sz="3200" dirty="0" smtClean="0"/>
-              <a:t>с помощью </a:t>
-            </a:r>
-            <a:r>
-              <a:rPr lang="en-US" sz="3200" dirty="0" smtClean="0"/>
-              <a:t>reference source</a:t>
-            </a:r>
-            <a:endParaRPr lang="ru-RU" sz="3200" dirty="0"/>
+              <a:rPr lang="ru-RU" dirty="0" smtClean="0"/>
+              <a:t>Распространение своих библиотек</a:t>
+            </a:r>
+            <a:endParaRPr lang="ru-RU" dirty="0"/>
           </a:p>
         </p:txBody>
       </p:sp>
@@ -16989,15 +16973,10 @@
             <p:ph idx="1"/>
           </p:nvPr>
         </p:nvSpPr>
-        <p:spPr>
-          <a:xfrm>
-            <a:off x="457200" y="980728"/>
-            <a:ext cx="8229600" cy="864096"/>
-          </a:xfrm>
-        </p:spPr>
+        <p:spPr/>
         <p:txBody>
           <a:bodyPr>
-            <a:noAutofit/>
+            <a:normAutofit fontScale="70000" lnSpcReduction="20000"/>
           </a:bodyPr>
           <a:lstStyle/>
           <a:p>
@@ -17005,271 +16984,102 @@
               <a:buNone/>
             </a:pPr>
             <a:r>
-              <a:rPr lang="ru-RU" sz="2400" dirty="0" smtClean="0"/>
-              <a:t>Работает только для </a:t>
-            </a:r>
-            <a:r>
-              <a:rPr lang="en-US" sz="2400" dirty="0" smtClean="0"/>
-              <a:t>.NET 4.5.1 </a:t>
-            </a:r>
-            <a:r>
-              <a:rPr lang="ru-RU" sz="2400" dirty="0" smtClean="0"/>
-              <a:t>в </a:t>
-            </a:r>
-            <a:r>
-              <a:rPr lang="en-US" sz="2400" dirty="0" smtClean="0"/>
-              <a:t>VS 2012 </a:t>
-            </a:r>
-            <a:r>
-              <a:rPr lang="ru-RU" sz="2400" dirty="0" smtClean="0"/>
-              <a:t>и выше</a:t>
-            </a:r>
-            <a:r>
-              <a:rPr lang="en-US" sz="2400" dirty="0" smtClean="0"/>
-              <a:t>!</a:t>
-            </a:r>
-            <a:endParaRPr lang="ru-RU" sz="2400" dirty="0"/>
+              <a:rPr lang="ru-RU" dirty="0" smtClean="0"/>
+              <a:t>Хорошими библиотеками следует делиться с сообществом! Проекты с открытым исходны</a:t>
+            </a:r>
+            <a:r>
+              <a:rPr lang="ru-RU" dirty="0"/>
+              <a:t>м</a:t>
+            </a:r>
+            <a:r>
+              <a:rPr lang="ru-RU" dirty="0" smtClean="0"/>
+              <a:t> кодом можно размещать на специальных сайтах:</a:t>
+            </a:r>
+          </a:p>
+          <a:p>
+            <a:endParaRPr lang="ru-RU" dirty="0" smtClean="0">
+              <a:hlinkClick r:id="rId2"/>
+            </a:endParaRPr>
+          </a:p>
+          <a:p>
+            <a:r>
+              <a:rPr lang="en-US" dirty="0" smtClean="0">
+                <a:hlinkClick r:id="rId2"/>
+              </a:rPr>
+              <a:t>www.codeplex.com</a:t>
+            </a:r>
+            <a:endParaRPr lang="ru-RU" dirty="0" smtClean="0"/>
+          </a:p>
+          <a:p>
+            <a:r>
+              <a:rPr lang="en-US" dirty="0" smtClean="0">
+                <a:hlinkClick r:id="rId3"/>
+              </a:rPr>
+              <a:t>github.com</a:t>
+            </a:r>
+            <a:endParaRPr lang="ru-RU" dirty="0" smtClean="0"/>
+          </a:p>
+          <a:p>
+            <a:r>
+              <a:rPr lang="en-US" dirty="0" smtClean="0">
+                <a:hlinkClick r:id="rId4"/>
+              </a:rPr>
+              <a:t>code.google.com</a:t>
+            </a:r>
+            <a:endParaRPr lang="ru-RU" dirty="0" smtClean="0"/>
+          </a:p>
+          <a:p>
+            <a:r>
+              <a:rPr lang="ru-RU" dirty="0" smtClean="0"/>
+              <a:t>и других ...</a:t>
+            </a:r>
+            <a:endParaRPr lang="en-US" dirty="0" smtClean="0"/>
+          </a:p>
+          <a:p>
+            <a:endParaRPr lang="en-US" dirty="0" smtClean="0"/>
           </a:p>
           <a:p>
             <a:pPr marL="0" indent="0">
               <a:buNone/>
             </a:pPr>
             <a:r>
-              <a:rPr lang="ru-RU" sz="2400" dirty="0" smtClean="0"/>
-              <a:t>Необходимые настройки:</a:t>
-            </a:r>
-            <a:endParaRPr lang="ru-RU" sz="2400" dirty="0"/>
-          </a:p>
-        </p:txBody>
-      </p:sp>
-      <p:pic>
-        <p:nvPicPr>
-          <p:cNvPr id="1027" name="Picture 3"/>
-          <p:cNvPicPr>
-            <a:picLocks noChangeAspect="1" noChangeArrowheads="1"/>
-          </p:cNvPicPr>
-          <p:nvPr/>
-        </p:nvPicPr>
-        <p:blipFill>
-          <a:blip r:embed="rId2">
-            <a:extLst>
-              <a:ext uri="{28A0092B-C50C-407E-A947-70E740481C1C}">
-                <a14:useLocalDpi xmlns:a14="http://schemas.microsoft.com/office/drawing/2010/main" val="0"/>
-              </a:ext>
-            </a:extLst>
-          </a:blip>
-          <a:srcRect/>
-          <a:stretch>
-            <a:fillRect/>
-          </a:stretch>
-        </p:blipFill>
-        <p:spPr bwMode="auto">
-          <a:xfrm>
-            <a:off x="3995936" y="1459979"/>
-            <a:ext cx="4200525" cy="2905125"/>
-          </a:xfrm>
-          <a:prstGeom prst="rect">
-            <a:avLst/>
-          </a:prstGeom>
-          <a:noFill/>
-          <a:ln>
-            <a:noFill/>
-          </a:ln>
-          <a:effectLst/>
-          <a:extLst>
-            <a:ext uri="{909E8E84-426E-40DD-AFC4-6F175D3DCCD1}">
-              <a14:hiddenFill xmlns:a14="http://schemas.microsoft.com/office/drawing/2010/main">
-                <a:solidFill>
-                  <a:schemeClr val="accent1"/>
-                </a:solidFill>
-              </a14:hiddenFill>
-            </a:ext>
-            <a:ext uri="{91240B29-F687-4F45-9708-019B960494DF}">
-              <a14:hiddenLine xmlns:a14="http://schemas.microsoft.com/office/drawing/2010/main" w="9525">
-                <a:solidFill>
-                  <a:schemeClr val="tx1"/>
-                </a:solidFill>
-                <a:miter lim="800000"/>
-                <a:headEnd/>
-                <a:tailEnd/>
-              </a14:hiddenLine>
-            </a:ext>
-            <a:ext uri="{AF507438-7753-43E0-B8FC-AC1667EBCBE1}">
-              <a14:hiddenEffects xmlns:a14="http://schemas.microsoft.com/office/drawing/2010/main">
-                <a:effectLst>
-                  <a:outerShdw dist="35921" dir="2700000" algn="ctr" rotWithShape="0">
-                    <a:schemeClr val="bg2"/>
-                  </a:outerShdw>
-                </a:effectLst>
-              </a14:hiddenEffects>
-            </a:ext>
-          </a:extLst>
-        </p:spPr>
-      </p:pic>
-      <p:sp>
-        <p:nvSpPr>
-          <p:cNvPr id="4" name="TextBox 3"/>
-          <p:cNvSpPr txBox="1"/>
-          <p:nvPr/>
-        </p:nvSpPr>
-        <p:spPr>
-          <a:xfrm>
-            <a:off x="543158" y="2597756"/>
-            <a:ext cx="2722669" cy="461665"/>
-          </a:xfrm>
-          <a:prstGeom prst="rect">
-            <a:avLst/>
-          </a:prstGeom>
-          <a:noFill/>
-        </p:spPr>
-        <p:txBody>
-          <a:bodyPr wrap="none" rtlCol="0">
-            <a:spAutoFit/>
-          </a:bodyPr>
-          <a:lstStyle/>
-          <a:p>
-            <a:pPr algn="ctr"/>
-            <a:r>
-              <a:rPr lang="en-US" sz="2400" dirty="0" smtClean="0"/>
-              <a:t>Debugger \ General:</a:t>
-            </a:r>
-            <a:endParaRPr lang="ru-RU" sz="2400" dirty="0" smtClean="0"/>
-          </a:p>
-        </p:txBody>
-      </p:sp>
-      <p:pic>
-        <p:nvPicPr>
-          <p:cNvPr id="1028" name="Picture 4"/>
-          <p:cNvPicPr>
-            <a:picLocks noChangeAspect="1" noChangeArrowheads="1"/>
-          </p:cNvPicPr>
-          <p:nvPr/>
-        </p:nvPicPr>
-        <p:blipFill>
-          <a:blip r:embed="rId3">
-            <a:extLst>
-              <a:ext uri="{28A0092B-C50C-407E-A947-70E740481C1C}">
-                <a14:useLocalDpi xmlns:a14="http://schemas.microsoft.com/office/drawing/2010/main" val="0"/>
-              </a:ext>
-            </a:extLst>
-          </a:blip>
-          <a:srcRect/>
-          <a:stretch>
-            <a:fillRect/>
-          </a:stretch>
-        </p:blipFill>
-        <p:spPr bwMode="auto">
-          <a:xfrm>
-            <a:off x="3995936" y="5085184"/>
-            <a:ext cx="4381500" cy="1352550"/>
-          </a:xfrm>
-          <a:prstGeom prst="rect">
-            <a:avLst/>
-          </a:prstGeom>
-          <a:noFill/>
-          <a:ln>
-            <a:noFill/>
-          </a:ln>
-          <a:effectLst/>
-          <a:extLst>
-            <a:ext uri="{909E8E84-426E-40DD-AFC4-6F175D3DCCD1}">
-              <a14:hiddenFill xmlns:a14="http://schemas.microsoft.com/office/drawing/2010/main">
-                <a:solidFill>
-                  <a:schemeClr val="accent1"/>
-                </a:solidFill>
-              </a14:hiddenFill>
-            </a:ext>
-            <a:ext uri="{91240B29-F687-4F45-9708-019B960494DF}">
-              <a14:hiddenLine xmlns:a14="http://schemas.microsoft.com/office/drawing/2010/main" w="9525">
-                <a:solidFill>
-                  <a:schemeClr val="tx1"/>
-                </a:solidFill>
-                <a:miter lim="800000"/>
-                <a:headEnd/>
-                <a:tailEnd/>
-              </a14:hiddenLine>
-            </a:ext>
-            <a:ext uri="{AF507438-7753-43E0-B8FC-AC1667EBCBE1}">
-              <a14:hiddenEffects xmlns:a14="http://schemas.microsoft.com/office/drawing/2010/main">
-                <a:effectLst>
-                  <a:outerShdw dist="35921" dir="2700000" algn="ctr" rotWithShape="0">
-                    <a:schemeClr val="bg2"/>
-                  </a:outerShdw>
-                </a:effectLst>
-              </a14:hiddenEffects>
-            </a:ext>
-          </a:extLst>
-        </p:spPr>
-      </p:pic>
-      <p:sp>
-        <p:nvSpPr>
-          <p:cNvPr id="8" name="TextBox 7"/>
-          <p:cNvSpPr txBox="1"/>
-          <p:nvPr/>
-        </p:nvSpPr>
-        <p:spPr>
-          <a:xfrm>
-            <a:off x="516260" y="5085184"/>
-            <a:ext cx="2776466" cy="461665"/>
-          </a:xfrm>
-          <a:prstGeom prst="rect">
-            <a:avLst/>
-          </a:prstGeom>
-          <a:noFill/>
-        </p:spPr>
-        <p:txBody>
-          <a:bodyPr wrap="none" rtlCol="0">
-            <a:spAutoFit/>
-          </a:bodyPr>
-          <a:lstStyle/>
-          <a:p>
-            <a:pPr algn="ctr"/>
-            <a:r>
-              <a:rPr lang="en-US" sz="2400" dirty="0" smtClean="0"/>
-              <a:t>Debugger \ Symbols:</a:t>
-            </a:r>
-          </a:p>
-        </p:txBody>
-      </p:sp>
-      <p:sp>
-        <p:nvSpPr>
-          <p:cNvPr id="5" name="TextBox 4"/>
-          <p:cNvSpPr txBox="1"/>
-          <p:nvPr/>
-        </p:nvSpPr>
-        <p:spPr>
-          <a:xfrm>
-            <a:off x="2483768" y="4581128"/>
-            <a:ext cx="6192593" cy="369332"/>
-          </a:xfrm>
-          <a:prstGeom prst="rect">
-            <a:avLst/>
-          </a:prstGeom>
-          <a:noFill/>
-        </p:spPr>
-        <p:txBody>
-          <a:bodyPr wrap="none" rtlCol="0">
-            <a:spAutoFit/>
-          </a:bodyPr>
-          <a:lstStyle/>
-          <a:p>
-            <a:pPr algn="ctr"/>
-            <a:r>
               <a:rPr lang="ru-RU" dirty="0" smtClean="0"/>
-              <a:t>Добавьте адрес </a:t>
-            </a:r>
-            <a:r>
-              <a:rPr lang="en-US" dirty="0"/>
-              <a:t>http://referencesource.microsoft.com/symbols</a:t>
+              <a:t>Выбрать лицензию можно с помощью сайта </a:t>
+            </a:r>
+            <a:r>
+              <a:rPr lang="en-US" dirty="0" smtClean="0">
+                <a:hlinkClick r:id="rId5"/>
+              </a:rPr>
+              <a:t>choosealicense.com</a:t>
             </a:r>
             <a:endParaRPr lang="ru-RU" dirty="0" smtClean="0"/>
+          </a:p>
+          <a:p>
+            <a:pPr marL="0" indent="0">
+              <a:buNone/>
+            </a:pPr>
+            <a:endParaRPr lang="ru-RU" dirty="0" smtClean="0"/>
+          </a:p>
+          <a:p>
+            <a:pPr marL="0" indent="0">
+              <a:buNone/>
+            </a:pPr>
+            <a:r>
+              <a:rPr lang="ru-RU" dirty="0" smtClean="0"/>
+              <a:t>Откомпилированную версию не забудьте разместить на </a:t>
+            </a:r>
+            <a:r>
+              <a:rPr lang="en-US" dirty="0" smtClean="0"/>
+              <a:t>nuget.org.</a:t>
+            </a:r>
+            <a:endParaRPr lang="ru-RU" dirty="0"/>
           </a:p>
         </p:txBody>
       </p:sp>
     </p:spTree>
     <p:extLst>
       <p:ext uri="{BB962C8B-B14F-4D97-AF65-F5344CB8AC3E}">
-        <p14:creationId xmlns:p14="http://schemas.microsoft.com/office/powerpoint/2010/main" val="2605966343"/>
+        <p14:creationId xmlns:p14="http://schemas.microsoft.com/office/powerpoint/2010/main" val="4107856204"/>
       </p:ext>
     </p:extLst>
   </p:cSld>
@@ -17338,12 +17148,8 @@
               <a:t>с помощью </a:t>
             </a:r>
             <a:r>
-              <a:rPr lang="en-US" sz="3200" dirty="0" err="1" smtClean="0"/>
-              <a:t>dotPeek</a:t>
-            </a:r>
-            <a:r>
               <a:rPr lang="en-US" sz="3200" dirty="0" smtClean="0"/>
-              <a:t> 1.2+</a:t>
+              <a:t>reference source</a:t>
             </a:r>
             <a:endParaRPr lang="ru-RU" sz="3200" dirty="0"/>
           </a:p>
@@ -17362,7 +17168,7 @@
         <p:spPr>
           <a:xfrm>
             <a:off x="457200" y="980728"/>
-            <a:ext cx="8229600" cy="2520280"/>
+            <a:ext cx="8229600" cy="864096"/>
           </a:xfrm>
         </p:spPr>
         <p:txBody>
@@ -17376,88 +17182,270 @@
             </a:pPr>
             <a:r>
               <a:rPr lang="ru-RU" sz="2400" dirty="0" smtClean="0"/>
-              <a:t>В </a:t>
-            </a:r>
-            <a:r>
-              <a:rPr lang="en-US" sz="2400" dirty="0" err="1" smtClean="0"/>
-              <a:t>dotPeek</a:t>
+              <a:t>Работает только для </a:t>
             </a:r>
             <a:r>
               <a:rPr lang="en-US" sz="2400" dirty="0" smtClean="0"/>
-              <a:t> 1.2 </a:t>
+              <a:t>.NET 4.5.1 </a:t>
             </a:r>
             <a:r>
               <a:rPr lang="ru-RU" sz="2400" dirty="0" smtClean="0"/>
-              <a:t>была добавлена команда «</a:t>
+              <a:t>в </a:t>
             </a:r>
             <a:r>
               <a:rPr lang="en-US" sz="2400" dirty="0" smtClean="0"/>
-              <a:t>Generate PDB</a:t>
+              <a:t>VS 2012 </a:t>
             </a:r>
             <a:r>
               <a:rPr lang="ru-RU" sz="2400" dirty="0" smtClean="0"/>
-              <a:t>» и поддержка </a:t>
+              <a:t>и выше</a:t>
             </a:r>
             <a:r>
               <a:rPr lang="en-US" sz="2400" dirty="0" smtClean="0"/>
-              <a:t>Symbol Server. </a:t>
-            </a:r>
-            <a:r>
-              <a:rPr lang="ru-RU" sz="2400" dirty="0" smtClean="0"/>
-              <a:t>С их помощью можно отлаживать </a:t>
-            </a:r>
-            <a:r>
-              <a:rPr lang="en-US" sz="2400" dirty="0" smtClean="0"/>
-              <a:t>.NET </a:t>
-            </a:r>
-            <a:r>
-              <a:rPr lang="ru-RU" sz="2400" dirty="0" smtClean="0"/>
-              <a:t>и чужие сборки. Подробности читайте на сайте </a:t>
-            </a:r>
-            <a:r>
-              <a:rPr lang="en-US" sz="2400" dirty="0" smtClean="0"/>
-              <a:t>JetBrains:</a:t>
-            </a:r>
-            <a:endParaRPr lang="ru-RU" sz="2400" dirty="0" smtClean="0">
-              <a:hlinkClick r:id="rId2"/>
-            </a:endParaRPr>
+              <a:t>!</a:t>
+            </a:r>
+            <a:endParaRPr lang="ru-RU" sz="2400" dirty="0"/>
           </a:p>
           <a:p>
             <a:pPr marL="0" indent="0">
               <a:buNone/>
             </a:pPr>
-            <a:endParaRPr lang="en-US" sz="2400" dirty="0" smtClean="0"/>
-          </a:p>
-          <a:p>
-            <a:pPr marL="0" indent="0">
-              <a:buNone/>
-            </a:pPr>
-            <a:r>
-              <a:rPr lang="en-US" sz="2400" dirty="0" smtClean="0">
-                <a:hlinkClick r:id="rId2"/>
-              </a:rPr>
-              <a:t>http</a:t>
-            </a:r>
-            <a:r>
-              <a:rPr lang="en-US" sz="2400" dirty="0">
-                <a:hlinkClick r:id="rId2"/>
-              </a:rPr>
-              <a:t>://</a:t>
-            </a:r>
-            <a:r>
-              <a:rPr lang="en-US" sz="2400" dirty="0" smtClean="0">
-                <a:hlinkClick r:id="rId2"/>
-              </a:rPr>
-              <a:t>confluence.jetbrains.com/display/NETCOM/dotPeek+Symbol+Server+and+PDB+Generation</a:t>
+            <a:r>
+              <a:rPr lang="ru-RU" sz="2400" dirty="0" smtClean="0"/>
+              <a:t>Необходимые настройки:</a:t>
             </a:r>
             <a:endParaRPr lang="ru-RU" sz="2400" dirty="0"/>
+          </a:p>
+        </p:txBody>
+      </p:sp>
+      <p:pic>
+        <p:nvPicPr>
+          <p:cNvPr id="1027" name="Picture 3"/>
+          <p:cNvPicPr>
+            <a:picLocks noChangeAspect="1" noChangeArrowheads="1"/>
+          </p:cNvPicPr>
+          <p:nvPr/>
+        </p:nvPicPr>
+        <p:blipFill>
+          <a:blip r:embed="rId2">
+            <a:extLst>
+              <a:ext uri="{28A0092B-C50C-407E-A947-70E740481C1C}">
+                <a14:useLocalDpi xmlns:a14="http://schemas.microsoft.com/office/drawing/2010/main" val="0"/>
+              </a:ext>
+            </a:extLst>
+          </a:blip>
+          <a:srcRect/>
+          <a:stretch>
+            <a:fillRect/>
+          </a:stretch>
+        </p:blipFill>
+        <p:spPr bwMode="auto">
+          <a:xfrm>
+            <a:off x="3995936" y="1459979"/>
+            <a:ext cx="4200525" cy="2905125"/>
+          </a:xfrm>
+          <a:prstGeom prst="rect">
+            <a:avLst/>
+          </a:prstGeom>
+          <a:noFill/>
+          <a:ln>
+            <a:noFill/>
+          </a:ln>
+          <a:effectLst/>
+          <a:extLst>
+            <a:ext uri="{909E8E84-426E-40DD-AFC4-6F175D3DCCD1}">
+              <a14:hiddenFill xmlns:a14="http://schemas.microsoft.com/office/drawing/2010/main">
+                <a:solidFill>
+                  <a:schemeClr val="accent1"/>
+                </a:solidFill>
+              </a14:hiddenFill>
+            </a:ext>
+            <a:ext uri="{91240B29-F687-4F45-9708-019B960494DF}">
+              <a14:hiddenLine xmlns:a14="http://schemas.microsoft.com/office/drawing/2010/main" w="9525">
+                <a:solidFill>
+                  <a:schemeClr val="tx1"/>
+                </a:solidFill>
+                <a:miter lim="800000"/>
+                <a:headEnd/>
+                <a:tailEnd/>
+              </a14:hiddenLine>
+            </a:ext>
+            <a:ext uri="{AF507438-7753-43E0-B8FC-AC1667EBCBE1}">
+              <a14:hiddenEffects xmlns:a14="http://schemas.microsoft.com/office/drawing/2010/main">
+                <a:effectLst>
+                  <a:outerShdw dist="35921" dir="2700000" algn="ctr" rotWithShape="0">
+                    <a:schemeClr val="bg2"/>
+                  </a:outerShdw>
+                </a:effectLst>
+              </a14:hiddenEffects>
+            </a:ext>
+          </a:extLst>
+        </p:spPr>
+      </p:pic>
+      <p:sp>
+        <p:nvSpPr>
+          <p:cNvPr id="4" name="TextBox 3"/>
+          <p:cNvSpPr txBox="1"/>
+          <p:nvPr/>
+        </p:nvSpPr>
+        <p:spPr>
+          <a:xfrm>
+            <a:off x="543158" y="2597756"/>
+            <a:ext cx="2722669" cy="461665"/>
+          </a:xfrm>
+          <a:prstGeom prst="rect">
+            <a:avLst/>
+          </a:prstGeom>
+          <a:noFill/>
+        </p:spPr>
+        <p:txBody>
+          <a:bodyPr wrap="none" rtlCol="0">
+            <a:spAutoFit/>
+          </a:bodyPr>
+          <a:lstStyle/>
+          <a:p>
+            <a:pPr algn="ctr"/>
+            <a:r>
+              <a:rPr lang="en-US" sz="2400" dirty="0" smtClean="0"/>
+              <a:t>Debugger \ General:</a:t>
+            </a:r>
+            <a:endParaRPr lang="ru-RU" sz="2400" dirty="0" smtClean="0"/>
+          </a:p>
+        </p:txBody>
+      </p:sp>
+      <p:pic>
+        <p:nvPicPr>
+          <p:cNvPr id="1028" name="Picture 4"/>
+          <p:cNvPicPr>
+            <a:picLocks noChangeAspect="1" noChangeArrowheads="1"/>
+          </p:cNvPicPr>
+          <p:nvPr/>
+        </p:nvPicPr>
+        <p:blipFill>
+          <a:blip r:embed="rId3">
+            <a:extLst>
+              <a:ext uri="{28A0092B-C50C-407E-A947-70E740481C1C}">
+                <a14:useLocalDpi xmlns:a14="http://schemas.microsoft.com/office/drawing/2010/main" val="0"/>
+              </a:ext>
+            </a:extLst>
+          </a:blip>
+          <a:srcRect/>
+          <a:stretch>
+            <a:fillRect/>
+          </a:stretch>
+        </p:blipFill>
+        <p:spPr bwMode="auto">
+          <a:xfrm>
+            <a:off x="3995936" y="5085184"/>
+            <a:ext cx="4381500" cy="1352550"/>
+          </a:xfrm>
+          <a:prstGeom prst="rect">
+            <a:avLst/>
+          </a:prstGeom>
+          <a:noFill/>
+          <a:ln>
+            <a:noFill/>
+          </a:ln>
+          <a:effectLst/>
+          <a:extLst>
+            <a:ext uri="{909E8E84-426E-40DD-AFC4-6F175D3DCCD1}">
+              <a14:hiddenFill xmlns:a14="http://schemas.microsoft.com/office/drawing/2010/main">
+                <a:solidFill>
+                  <a:schemeClr val="accent1"/>
+                </a:solidFill>
+              </a14:hiddenFill>
+            </a:ext>
+            <a:ext uri="{91240B29-F687-4F45-9708-019B960494DF}">
+              <a14:hiddenLine xmlns:a14="http://schemas.microsoft.com/office/drawing/2010/main" w="9525">
+                <a:solidFill>
+                  <a:schemeClr val="tx1"/>
+                </a:solidFill>
+                <a:miter lim="800000"/>
+                <a:headEnd/>
+                <a:tailEnd/>
+              </a14:hiddenLine>
+            </a:ext>
+            <a:ext uri="{AF507438-7753-43E0-B8FC-AC1667EBCBE1}">
+              <a14:hiddenEffects xmlns:a14="http://schemas.microsoft.com/office/drawing/2010/main">
+                <a:effectLst>
+                  <a:outerShdw dist="35921" dir="2700000" algn="ctr" rotWithShape="0">
+                    <a:schemeClr val="bg2"/>
+                  </a:outerShdw>
+                </a:effectLst>
+              </a14:hiddenEffects>
+            </a:ext>
+          </a:extLst>
+        </p:spPr>
+      </p:pic>
+      <p:sp>
+        <p:nvSpPr>
+          <p:cNvPr id="8" name="TextBox 7"/>
+          <p:cNvSpPr txBox="1"/>
+          <p:nvPr/>
+        </p:nvSpPr>
+        <p:spPr>
+          <a:xfrm>
+            <a:off x="516260" y="5085184"/>
+            <a:ext cx="2776466" cy="461665"/>
+          </a:xfrm>
+          <a:prstGeom prst="rect">
+            <a:avLst/>
+          </a:prstGeom>
+          <a:noFill/>
+        </p:spPr>
+        <p:txBody>
+          <a:bodyPr wrap="none" rtlCol="0">
+            <a:spAutoFit/>
+          </a:bodyPr>
+          <a:lstStyle/>
+          <a:p>
+            <a:pPr algn="ctr"/>
+            <a:r>
+              <a:rPr lang="en-US" sz="2400" dirty="0" smtClean="0"/>
+              <a:t>Debugger \ Symbols:</a:t>
+            </a:r>
+          </a:p>
+        </p:txBody>
+      </p:sp>
+      <p:sp>
+        <p:nvSpPr>
+          <p:cNvPr id="5" name="TextBox 4"/>
+          <p:cNvSpPr txBox="1"/>
+          <p:nvPr/>
+        </p:nvSpPr>
+        <p:spPr>
+          <a:xfrm>
+            <a:off x="2483768" y="4581128"/>
+            <a:ext cx="6192593" cy="369332"/>
+          </a:xfrm>
+          <a:prstGeom prst="rect">
+            <a:avLst/>
+          </a:prstGeom>
+          <a:noFill/>
+        </p:spPr>
+        <p:txBody>
+          <a:bodyPr wrap="none" rtlCol="0">
+            <a:spAutoFit/>
+          </a:bodyPr>
+          <a:lstStyle/>
+          <a:p>
+            <a:pPr algn="ctr"/>
+            <a:r>
+              <a:rPr lang="ru-RU" dirty="0" smtClean="0"/>
+              <a:t>Добавьте адрес </a:t>
+            </a:r>
+            <a:r>
+              <a:rPr lang="en-US" dirty="0"/>
+              <a:t>http://referencesource.microsoft.com/symbols</a:t>
+            </a:r>
+            <a:endParaRPr lang="ru-RU" dirty="0" smtClean="0"/>
           </a:p>
         </p:txBody>
       </p:sp>
     </p:spTree>
     <p:extLst>
       <p:ext uri="{BB962C8B-B14F-4D97-AF65-F5344CB8AC3E}">
-        <p14:creationId xmlns:p14="http://schemas.microsoft.com/office/powerpoint/2010/main" val="3583458690"/>
+        <p14:creationId xmlns:p14="http://schemas.microsoft.com/office/powerpoint/2010/main" val="2605966343"/>
       </p:ext>
     </p:extLst>
   </p:cSld>
@@ -17501,6 +17489,194 @@
             <p:ph type="title"/>
           </p:nvPr>
         </p:nvSpPr>
+        <p:spPr>
+          <a:xfrm>
+            <a:off x="457200" y="274638"/>
+            <a:ext cx="8229600" cy="706090"/>
+          </a:xfrm>
+        </p:spPr>
+        <p:txBody>
+          <a:bodyPr>
+            <a:normAutofit/>
+          </a:bodyPr>
+          <a:lstStyle/>
+          <a:p>
+            <a:r>
+              <a:rPr lang="ru-RU" sz="3200" dirty="0" smtClean="0"/>
+              <a:t>Отладка </a:t>
+            </a:r>
+            <a:r>
+              <a:rPr lang="en-US" sz="3200" dirty="0" smtClean="0"/>
+              <a:t>.NET </a:t>
+            </a:r>
+            <a:r>
+              <a:rPr lang="ru-RU" sz="3200" dirty="0" smtClean="0"/>
+              <a:t>с помощью </a:t>
+            </a:r>
+            <a:r>
+              <a:rPr lang="en-US" sz="3200" dirty="0" err="1" smtClean="0"/>
+              <a:t>dotPeek</a:t>
+            </a:r>
+            <a:r>
+              <a:rPr lang="en-US" sz="3200" dirty="0" smtClean="0"/>
+              <a:t> 1.2+</a:t>
+            </a:r>
+            <a:endParaRPr lang="ru-RU" sz="3200" dirty="0"/>
+          </a:p>
+        </p:txBody>
+      </p:sp>
+      <p:sp>
+        <p:nvSpPr>
+          <p:cNvPr id="3" name="Content Placeholder 2"/>
+          <p:cNvSpPr>
+            <a:spLocks noGrp="1"/>
+          </p:cNvSpPr>
+          <p:nvPr>
+            <p:ph idx="1"/>
+          </p:nvPr>
+        </p:nvSpPr>
+        <p:spPr>
+          <a:xfrm>
+            <a:off x="457200" y="980728"/>
+            <a:ext cx="8229600" cy="2520280"/>
+          </a:xfrm>
+        </p:spPr>
+        <p:txBody>
+          <a:bodyPr>
+            <a:noAutofit/>
+          </a:bodyPr>
+          <a:lstStyle/>
+          <a:p>
+            <a:pPr marL="0" indent="0">
+              <a:buNone/>
+            </a:pPr>
+            <a:r>
+              <a:rPr lang="ru-RU" sz="2400" dirty="0" smtClean="0"/>
+              <a:t>В </a:t>
+            </a:r>
+            <a:r>
+              <a:rPr lang="en-US" sz="2400" dirty="0" err="1" smtClean="0"/>
+              <a:t>dotPeek</a:t>
+            </a:r>
+            <a:r>
+              <a:rPr lang="en-US" sz="2400" dirty="0" smtClean="0"/>
+              <a:t> 1.2 </a:t>
+            </a:r>
+            <a:r>
+              <a:rPr lang="ru-RU" sz="2400" dirty="0" smtClean="0"/>
+              <a:t>была добавлена команда «</a:t>
+            </a:r>
+            <a:r>
+              <a:rPr lang="en-US" sz="2400" dirty="0" smtClean="0"/>
+              <a:t>Generate PDB</a:t>
+            </a:r>
+            <a:r>
+              <a:rPr lang="ru-RU" sz="2400" dirty="0" smtClean="0"/>
+              <a:t>» и поддержка </a:t>
+            </a:r>
+            <a:r>
+              <a:rPr lang="en-US" sz="2400" dirty="0" smtClean="0"/>
+              <a:t>Symbol Server. </a:t>
+            </a:r>
+            <a:r>
+              <a:rPr lang="ru-RU" sz="2400" dirty="0" smtClean="0"/>
+              <a:t>С их помощью можно отлаживать </a:t>
+            </a:r>
+            <a:r>
+              <a:rPr lang="en-US" sz="2400" dirty="0" smtClean="0"/>
+              <a:t>.NET </a:t>
+            </a:r>
+            <a:r>
+              <a:rPr lang="ru-RU" sz="2400" dirty="0" smtClean="0"/>
+              <a:t>и чужие сборки. Подробности читайте на сайте </a:t>
+            </a:r>
+            <a:r>
+              <a:rPr lang="en-US" sz="2400" dirty="0" smtClean="0"/>
+              <a:t>JetBrains:</a:t>
+            </a:r>
+            <a:endParaRPr lang="ru-RU" sz="2400" dirty="0" smtClean="0">
+              <a:hlinkClick r:id="rId2"/>
+            </a:endParaRPr>
+          </a:p>
+          <a:p>
+            <a:pPr marL="0" indent="0">
+              <a:buNone/>
+            </a:pPr>
+            <a:endParaRPr lang="en-US" sz="2400" dirty="0" smtClean="0"/>
+          </a:p>
+          <a:p>
+            <a:pPr marL="0" indent="0">
+              <a:buNone/>
+            </a:pPr>
+            <a:r>
+              <a:rPr lang="en-US" sz="2400" dirty="0" smtClean="0">
+                <a:hlinkClick r:id="rId2"/>
+              </a:rPr>
+              <a:t>http</a:t>
+            </a:r>
+            <a:r>
+              <a:rPr lang="en-US" sz="2400" dirty="0">
+                <a:hlinkClick r:id="rId2"/>
+              </a:rPr>
+              <a:t>://</a:t>
+            </a:r>
+            <a:r>
+              <a:rPr lang="en-US" sz="2400" dirty="0" smtClean="0">
+                <a:hlinkClick r:id="rId2"/>
+              </a:rPr>
+              <a:t>confluence.jetbrains.com/display/NETCOM/dotPeek+Symbol+Server+and+PDB+Generation</a:t>
+            </a:r>
+            <a:endParaRPr lang="ru-RU" sz="2400" dirty="0"/>
+          </a:p>
+        </p:txBody>
+      </p:sp>
+    </p:spTree>
+    <p:extLst>
+      <p:ext uri="{BB962C8B-B14F-4D97-AF65-F5344CB8AC3E}">
+        <p14:creationId xmlns:p14="http://schemas.microsoft.com/office/powerpoint/2010/main" val="3583458690"/>
+      </p:ext>
+    </p:extLst>
+  </p:cSld>
+  <p:clrMapOvr>
+    <a:masterClrMapping/>
+  </p:clrMapOvr>
+  <p:timing>
+    <p:tnLst>
+      <p:par>
+        <p:cTn id="1" dur="indefinite" restart="never" nodeType="tmRoot"/>
+      </p:par>
+    </p:tnLst>
+  </p:timing>
+</p:sld>
+</file>
+
+<file path=ppt/slides/slide45.xml><?xml version="1.0" encoding="utf-8"?>
+<p:sld xmlns:a="http://schemas.openxmlformats.org/drawingml/2006/main" xmlns:r="http://schemas.openxmlformats.org/officeDocument/2006/relationships" xmlns:p="http://schemas.openxmlformats.org/presentationml/2006/main">
+  <p:cSld>
+    <p:spTree>
+      <p:nvGrpSpPr>
+        <p:cNvPr id="1" name=""/>
+        <p:cNvGrpSpPr/>
+        <p:nvPr/>
+      </p:nvGrpSpPr>
+      <p:grpSpPr>
+        <a:xfrm>
+          <a:off x="0" y="0"/>
+          <a:ext cx="0" cy="0"/>
+          <a:chOff x="0" y="0"/>
+          <a:chExt cx="0" cy="0"/>
+        </a:xfrm>
+      </p:grpSpPr>
+      <p:sp>
+        <p:nvSpPr>
+          <p:cNvPr id="2" name="Title 1"/>
+          <p:cNvSpPr>
+            <a:spLocks noGrp="1"/>
+          </p:cNvSpPr>
+          <p:nvPr>
+            <p:ph type="title"/>
+          </p:nvPr>
+        </p:nvSpPr>
         <p:spPr/>
         <p:txBody>
           <a:bodyPr/>
@@ -17720,7 +17896,7 @@
 </p:sld>
 </file>
 
-<file path=ppt/slides/slide45.xml><?xml version="1.0" encoding="utf-8"?>
+<file path=ppt/slides/slide46.xml><?xml version="1.0" encoding="utf-8"?>
 <p:sld xmlns:a="http://schemas.openxmlformats.org/drawingml/2006/main" xmlns:r="http://schemas.openxmlformats.org/officeDocument/2006/relationships" xmlns:p="http://schemas.openxmlformats.org/presentationml/2006/main">
   <p:cSld>
     <p:spTree>
@@ -18591,7 +18767,7 @@
 </p:sld>
 </file>
 
-<file path=ppt/slides/slide46.xml><?xml version="1.0" encoding="utf-8"?>
+<file path=ppt/slides/slide47.xml><?xml version="1.0" encoding="utf-8"?>
 <p:sld xmlns:a="http://schemas.openxmlformats.org/drawingml/2006/main" xmlns:r="http://schemas.openxmlformats.org/officeDocument/2006/relationships" xmlns:p="http://schemas.openxmlformats.org/presentationml/2006/main">
   <p:cSld>
     <p:spTree>
@@ -19450,7 +19626,7 @@
 </p:sld>
 </file>
 
-<file path=ppt/slides/slide47.xml><?xml version="1.0" encoding="utf-8"?>
+<file path=ppt/slides/slide48.xml><?xml version="1.0" encoding="utf-8"?>
 <p:sld xmlns:a="http://schemas.openxmlformats.org/drawingml/2006/main" xmlns:r="http://schemas.openxmlformats.org/officeDocument/2006/relationships" xmlns:p="http://schemas.openxmlformats.org/presentationml/2006/main">
   <p:cSld>
     <p:spTree>
@@ -20104,7 +20280,7 @@
 </p:sld>
 </file>
 
-<file path=ppt/slides/slide48.xml><?xml version="1.0" encoding="utf-8"?>
+<file path=ppt/slides/slide49.xml><?xml version="1.0" encoding="utf-8"?>
 <p:sld xmlns:a="http://schemas.openxmlformats.org/drawingml/2006/main" xmlns:r="http://schemas.openxmlformats.org/officeDocument/2006/relationships" xmlns:p="http://schemas.openxmlformats.org/presentationml/2006/main">
   <p:cSld>
     <p:spTree>

</xml_diff>

<commit_message>
How to organize solutions
</commit_message>
<xml_diff>
--- a/Presentation/lesson-07-reflection.pptx
+++ b/Presentation/lesson-07-reflection.pptx
@@ -6,7 +6,7 @@
     <p:sldMasterId id="2147483663" r:id="rId2"/>
   </p:sldMasterIdLst>
   <p:notesMasterIdLst>
-    <p:notesMasterId r:id="rId52"/>
+    <p:notesMasterId r:id="rId53"/>
   </p:notesMasterIdLst>
   <p:sldIdLst>
     <p:sldId id="257" r:id="rId3"/>
@@ -47,17 +47,18 @@
     <p:sldId id="261" r:id="rId38"/>
     <p:sldId id="300" r:id="rId39"/>
     <p:sldId id="306" r:id="rId40"/>
-    <p:sldId id="310" r:id="rId41"/>
-    <p:sldId id="312" r:id="rId42"/>
-    <p:sldId id="311" r:id="rId43"/>
-    <p:sldId id="322" r:id="rId44"/>
-    <p:sldId id="318" r:id="rId45"/>
-    <p:sldId id="319" r:id="rId46"/>
-    <p:sldId id="299" r:id="rId47"/>
-    <p:sldId id="263" r:id="rId48"/>
-    <p:sldId id="264" r:id="rId49"/>
-    <p:sldId id="265" r:id="rId50"/>
-    <p:sldId id="271" r:id="rId51"/>
+    <p:sldId id="323" r:id="rId41"/>
+    <p:sldId id="310" r:id="rId42"/>
+    <p:sldId id="312" r:id="rId43"/>
+    <p:sldId id="311" r:id="rId44"/>
+    <p:sldId id="322" r:id="rId45"/>
+    <p:sldId id="318" r:id="rId46"/>
+    <p:sldId id="319" r:id="rId47"/>
+    <p:sldId id="299" r:id="rId48"/>
+    <p:sldId id="263" r:id="rId49"/>
+    <p:sldId id="264" r:id="rId50"/>
+    <p:sldId id="265" r:id="rId51"/>
+    <p:sldId id="271" r:id="rId52"/>
   </p:sldIdLst>
   <p:sldSz cx="9144000" cy="6858000" type="screen4x3"/>
   <p:notesSz cx="6858000" cy="9144000"/>
@@ -242,7 +243,7 @@
             <a:fld id="{B24A7054-7FFB-49F4-A126-5DF6E687FF53}" type="datetimeFigureOut">
               <a:rPr lang="ru-RU" smtClean="0"/>
               <a:pPr/>
-              <a:t>23.01.2015</a:t>
+              <a:t>01.02.2015</a:t>
             </a:fld>
             <a:endParaRPr lang="ru-RU"/>
           </a:p>
@@ -1526,7 +1527,7 @@
             <a:fld id="{8E6E6A2A-E9D3-4A0D-B04A-ABDD367A1E08}" type="datetimeFigureOut">
               <a:rPr lang="ru-RU" smtClean="0"/>
               <a:pPr/>
-              <a:t>23.01.2015</a:t>
+              <a:t>01.02.2015</a:t>
             </a:fld>
             <a:endParaRPr lang="ru-RU"/>
           </a:p>
@@ -1770,7 +1771,7 @@
             <a:fld id="{8E6E6A2A-E9D3-4A0D-B04A-ABDD367A1E08}" type="datetimeFigureOut">
               <a:rPr lang="ru-RU" smtClean="0"/>
               <a:pPr/>
-              <a:t>23.01.2015</a:t>
+              <a:t>01.02.2015</a:t>
             </a:fld>
             <a:endParaRPr lang="ru-RU"/>
           </a:p>
@@ -1942,7 +1943,7 @@
             <a:fld id="{8E6E6A2A-E9D3-4A0D-B04A-ABDD367A1E08}" type="datetimeFigureOut">
               <a:rPr lang="ru-RU" smtClean="0"/>
               <a:pPr/>
-              <a:t>23.01.2015</a:t>
+              <a:t>01.02.2015</a:t>
             </a:fld>
             <a:endParaRPr lang="ru-RU"/>
           </a:p>
@@ -2190,7 +2191,7 @@
             <a:fld id="{8E6E6A2A-E9D3-4A0D-B04A-ABDD367A1E08}" type="datetimeFigureOut">
               <a:rPr lang="ru-RU" smtClean="0"/>
               <a:pPr/>
-              <a:t>23.01.2015</a:t>
+              <a:t>01.02.2015</a:t>
             </a:fld>
             <a:endParaRPr lang="ru-RU"/>
           </a:p>
@@ -2480,7 +2481,7 @@
             <a:fld id="{8E6E6A2A-E9D3-4A0D-B04A-ABDD367A1E08}" type="datetimeFigureOut">
               <a:rPr lang="ru-RU" smtClean="0"/>
               <a:pPr/>
-              <a:t>23.01.2015</a:t>
+              <a:t>01.02.2015</a:t>
             </a:fld>
             <a:endParaRPr lang="ru-RU"/>
           </a:p>
@@ -2904,7 +2905,7 @@
             <a:fld id="{8E6E6A2A-E9D3-4A0D-B04A-ABDD367A1E08}" type="datetimeFigureOut">
               <a:rPr lang="ru-RU" smtClean="0"/>
               <a:pPr/>
-              <a:t>23.01.2015</a:t>
+              <a:t>01.02.2015</a:t>
             </a:fld>
             <a:endParaRPr lang="ru-RU"/>
           </a:p>
@@ -3233,7 +3234,7 @@
             <a:fld id="{8E6E6A2A-E9D3-4A0D-B04A-ABDD367A1E08}" type="datetimeFigureOut">
               <a:rPr lang="ru-RU" smtClean="0"/>
               <a:pPr/>
-              <a:t>23.01.2015</a:t>
+              <a:t>01.02.2015</a:t>
             </a:fld>
             <a:endParaRPr lang="ru-RU"/>
           </a:p>
@@ -3330,7 +3331,7 @@
             <a:fld id="{8E6E6A2A-E9D3-4A0D-B04A-ABDD367A1E08}" type="datetimeFigureOut">
               <a:rPr lang="ru-RU" smtClean="0"/>
               <a:pPr/>
-              <a:t>23.01.2015</a:t>
+              <a:t>01.02.2015</a:t>
             </a:fld>
             <a:endParaRPr lang="ru-RU"/>
           </a:p>
@@ -3609,7 +3610,7 @@
             <a:fld id="{8E6E6A2A-E9D3-4A0D-B04A-ABDD367A1E08}" type="datetimeFigureOut">
               <a:rPr lang="ru-RU" smtClean="0"/>
               <a:pPr/>
-              <a:t>23.01.2015</a:t>
+              <a:t>01.02.2015</a:t>
             </a:fld>
             <a:endParaRPr lang="ru-RU"/>
           </a:p>
@@ -3864,7 +3865,7 @@
             <a:fld id="{8E6E6A2A-E9D3-4A0D-B04A-ABDD367A1E08}" type="datetimeFigureOut">
               <a:rPr lang="ru-RU" smtClean="0"/>
               <a:pPr/>
-              <a:t>23.01.2015</a:t>
+              <a:t>01.02.2015</a:t>
             </a:fld>
             <a:endParaRPr lang="ru-RU"/>
           </a:p>
@@ -4036,7 +4037,7 @@
             <a:fld id="{8E6E6A2A-E9D3-4A0D-B04A-ABDD367A1E08}" type="datetimeFigureOut">
               <a:rPr lang="ru-RU" smtClean="0"/>
               <a:pPr/>
-              <a:t>23.01.2015</a:t>
+              <a:t>01.02.2015</a:t>
             </a:fld>
             <a:endParaRPr lang="ru-RU"/>
           </a:p>
@@ -4218,7 +4219,7 @@
             <a:fld id="{8E6E6A2A-E9D3-4A0D-B04A-ABDD367A1E08}" type="datetimeFigureOut">
               <a:rPr lang="ru-RU" smtClean="0"/>
               <a:pPr/>
-              <a:t>23.01.2015</a:t>
+              <a:t>01.02.2015</a:t>
             </a:fld>
             <a:endParaRPr lang="ru-RU"/>
           </a:p>
@@ -5456,7 +5457,7 @@
             <a:fld id="{AC3D3127-B7C4-45E3-9797-C527EC9FDD78}" type="datetimeFigureOut">
               <a:rPr lang="ru-RU" smtClean="0"/>
               <a:pPr/>
-              <a:t>23.01.2015</a:t>
+              <a:t>01.02.2015</a:t>
             </a:fld>
             <a:endParaRPr lang="ru-RU"/>
           </a:p>
@@ -5978,7 +5979,7 @@
             <a:fld id="{8E6E6A2A-E9D3-4A0D-B04A-ABDD367A1E08}" type="datetimeFigureOut">
               <a:rPr lang="ru-RU" smtClean="0"/>
               <a:pPr/>
-              <a:t>23.01.2015</a:t>
+              <a:t>01.02.2015</a:t>
             </a:fld>
             <a:endParaRPr lang="ru-RU"/>
           </a:p>
@@ -16095,27 +16096,18 @@
             <p:ph type="title"/>
           </p:nvPr>
         </p:nvSpPr>
-        <p:spPr>
-          <a:xfrm>
-            <a:off x="457200" y="274638"/>
-            <a:ext cx="8229600" cy="778098"/>
-          </a:xfrm>
-        </p:spPr>
+        <p:spPr/>
         <p:txBody>
           <a:bodyPr>
-            <a:normAutofit/>
+            <a:normAutofit fontScale="90000"/>
           </a:bodyPr>
           <a:lstStyle/>
           <a:p>
             <a:r>
-              <a:rPr lang="ru-RU" sz="3600" dirty="0" smtClean="0"/>
-              <a:t>Добавление ссылок с помощью </a:t>
-            </a:r>
-            <a:r>
-              <a:rPr lang="en-US" sz="3600" dirty="0" smtClean="0"/>
-              <a:t>NuGet</a:t>
-            </a:r>
-            <a:endParaRPr lang="ru-RU" sz="3600" dirty="0"/>
+              <a:rPr lang="ru-RU" dirty="0" smtClean="0"/>
+              <a:t>Организация проекта с внешними зависимостями</a:t>
+            </a:r>
+            <a:endParaRPr lang="ru-RU" dirty="0"/>
           </a:p>
         </p:txBody>
       </p:sp>
@@ -16129,15 +16121,10 @@
             <p:ph idx="1"/>
           </p:nvPr>
         </p:nvSpPr>
-        <p:spPr>
-          <a:xfrm>
-            <a:off x="457200" y="1124744"/>
-            <a:ext cx="8229600" cy="5001419"/>
-          </a:xfrm>
-        </p:spPr>
+        <p:spPr/>
         <p:txBody>
           <a:bodyPr>
-            <a:normAutofit lnSpcReduction="10000"/>
+            <a:normAutofit fontScale="77500" lnSpcReduction="20000"/>
           </a:bodyPr>
           <a:lstStyle/>
           <a:p>
@@ -16146,117 +16133,69 @@
             </a:pPr>
             <a:r>
               <a:rPr lang="ru-RU" dirty="0" smtClean="0"/>
-              <a:t>Расширение </a:t>
+              <a:t>Стремитесь организовывать проекты </a:t>
             </a:r>
             <a:r>
               <a:rPr lang="en-US" dirty="0" smtClean="0"/>
-              <a:t>NuGet </a:t>
+              <a:t>Visual Studio</a:t>
             </a:r>
             <a:r>
               <a:rPr lang="ru-RU" dirty="0" smtClean="0"/>
-              <a:t>упрощает работу с зависимостями в </a:t>
+              <a:t> так чтобы их можно было переносить из одной папки в другую и на другой компьютер без ошибок компиляции.</a:t>
+            </a:r>
+          </a:p>
+          <a:p>
+            <a:endParaRPr lang="ru-RU" dirty="0" smtClean="0"/>
+          </a:p>
+          <a:p>
+            <a:r>
+              <a:rPr lang="ru-RU" dirty="0" smtClean="0"/>
+              <a:t>При создании нового проекта не забудьте установить переключатель «</a:t>
             </a:r>
             <a:r>
               <a:rPr lang="en-US" dirty="0" smtClean="0"/>
-              <a:t>.NET </a:t>
+              <a:t>Create directory for solution</a:t>
             </a:r>
             <a:r>
               <a:rPr lang="ru-RU" dirty="0" smtClean="0"/>
-              <a:t>проектах.</a:t>
-            </a:r>
-          </a:p>
-          <a:p>
-            <a:pPr marL="0" indent="0">
-              <a:buNone/>
-            </a:pPr>
-            <a:endParaRPr lang="en-US" dirty="0" smtClean="0"/>
-          </a:p>
-          <a:p>
-            <a:pPr marL="0" indent="0">
-              <a:buNone/>
-            </a:pPr>
+              <a:t>»</a:t>
+            </a:r>
+          </a:p>
+          <a:p>
+            <a:r>
+              <a:rPr lang="ru-RU" dirty="0" smtClean="0"/>
+              <a:t>Все внешние зависимости и утилиты необходимые для компиляции проекта должно находиться в папке проекта:</a:t>
+            </a:r>
+          </a:p>
+          <a:p>
+            <a:pPr lvl="1"/>
+            <a:r>
+              <a:rPr lang="ru-RU" dirty="0" smtClean="0"/>
+              <a:t>Библиотеки можно разместить в папке </a:t>
+            </a:r>
             <a:r>
               <a:rPr lang="en-US" dirty="0" smtClean="0"/>
-              <a:t>NuGet </a:t>
+              <a:t>libs </a:t>
             </a:r>
             <a:r>
               <a:rPr lang="ru-RU" dirty="0" smtClean="0"/>
-              <a:t>входит в состав </a:t>
+              <a:t>в папке с решением;</a:t>
+            </a:r>
+          </a:p>
+          <a:p>
+            <a:pPr lvl="1"/>
+            <a:r>
+              <a:rPr lang="ru-RU" dirty="0" smtClean="0"/>
+              <a:t>Внешние утилиты в папке </a:t>
             </a:r>
             <a:r>
               <a:rPr lang="en-US" dirty="0" smtClean="0"/>
-              <a:t>VS 2012 </a:t>
+              <a:t>tools </a:t>
             </a:r>
             <a:r>
               <a:rPr lang="ru-RU" dirty="0" smtClean="0"/>
-              <a:t>и выше. Для </a:t>
-            </a:r>
-            <a:r>
-              <a:rPr lang="en-US" dirty="0" smtClean="0"/>
-              <a:t>VS 2010 </a:t>
-            </a:r>
-            <a:r>
-              <a:rPr lang="ru-RU" dirty="0" smtClean="0"/>
-              <a:t>его нужно скачать с помощью </a:t>
-            </a:r>
-            <a:r>
-              <a:rPr lang="en-US" dirty="0" smtClean="0"/>
-              <a:t>Tools -&gt; Extension Manager </a:t>
-            </a:r>
-            <a:r>
-              <a:rPr lang="ru-RU" dirty="0" smtClean="0"/>
-              <a:t>или с сайта </a:t>
-            </a:r>
-            <a:r>
-              <a:rPr lang="en-US" dirty="0" smtClean="0">
-                <a:hlinkClick r:id="rId2"/>
-              </a:rPr>
-              <a:t>nuget.org</a:t>
-            </a:r>
-            <a:r>
-              <a:rPr lang="ru-RU" dirty="0" smtClean="0"/>
-              <a:t>. После установки в контекстном меню </a:t>
-            </a:r>
-            <a:r>
-              <a:rPr lang="en-US" dirty="0" smtClean="0"/>
-              <a:t>References </a:t>
-            </a:r>
-            <a:r>
-              <a:rPr lang="ru-RU" dirty="0" smtClean="0"/>
-              <a:t>появится команда </a:t>
-            </a:r>
-            <a:r>
-              <a:rPr lang="en-US" dirty="0" smtClean="0"/>
-              <a:t>“Manage NuGet Packages …”. </a:t>
-            </a:r>
-            <a:r>
-              <a:rPr lang="ru-RU" dirty="0" smtClean="0"/>
-              <a:t>Также в меню </a:t>
-            </a:r>
-            <a:r>
-              <a:rPr lang="en-US" dirty="0" smtClean="0"/>
-              <a:t>Tools </a:t>
-            </a:r>
-            <a:r>
-              <a:rPr lang="ru-RU" dirty="0" smtClean="0"/>
-              <a:t>появится меню </a:t>
-            </a:r>
-            <a:r>
-              <a:rPr lang="en-US" dirty="0" smtClean="0"/>
-              <a:t>“NuGet Package Manager”.</a:t>
-            </a:r>
-            <a:endParaRPr lang="ru-RU" dirty="0" smtClean="0"/>
-          </a:p>
-          <a:p>
-            <a:pPr marL="0" indent="0">
-              <a:buNone/>
-            </a:pPr>
-            <a:endParaRPr lang="ru-RU" dirty="0" smtClean="0"/>
-          </a:p>
-          <a:p>
-            <a:pPr marL="0" indent="0">
-              <a:buNone/>
-            </a:pPr>
+              <a:t>в папке с решением.</a:t>
+            </a:r>
             <a:endParaRPr lang="ru-RU" dirty="0"/>
           </a:p>
         </p:txBody>
@@ -16264,20 +16203,13 @@
     </p:spTree>
     <p:extLst>
       <p:ext uri="{BB962C8B-B14F-4D97-AF65-F5344CB8AC3E}">
-        <p14:creationId xmlns:p14="http://schemas.microsoft.com/office/powerpoint/2010/main" val="861195078"/>
+        <p14:creationId xmlns:p14="http://schemas.microsoft.com/office/powerpoint/2010/main" val="572115315"/>
       </p:ext>
     </p:extLst>
   </p:cSld>
   <p:clrMapOvr>
     <a:masterClrMapping/>
   </p:clrMapOvr>
-  <p:timing>
-    <p:tnLst>
-      <p:par>
-        <p:cTn id="1" dur="indefinite" restart="never" nodeType="tmRoot"/>
-      </p:par>
-    </p:tnLst>
-  </p:timing>
 </p:sld>
 </file>
 
@@ -16624,16 +16556,27 @@
             <p:ph type="title"/>
           </p:nvPr>
         </p:nvSpPr>
-        <p:spPr/>
+        <p:spPr>
+          <a:xfrm>
+            <a:off x="457200" y="274638"/>
+            <a:ext cx="8229600" cy="778098"/>
+          </a:xfrm>
+        </p:spPr>
         <p:txBody>
-          <a:bodyPr/>
+          <a:bodyPr>
+            <a:normAutofit/>
+          </a:bodyPr>
           <a:lstStyle/>
           <a:p>
             <a:r>
-              <a:rPr lang="en-US" dirty="0" smtClean="0"/>
-              <a:t>Package Manager Console</a:t>
-            </a:r>
-            <a:endParaRPr lang="ru-RU" dirty="0"/>
+              <a:rPr lang="ru-RU" sz="3600" dirty="0" smtClean="0"/>
+              <a:t>Добавление ссылок с помощью </a:t>
+            </a:r>
+            <a:r>
+              <a:rPr lang="en-US" sz="3600" dirty="0" smtClean="0"/>
+              <a:t>NuGet</a:t>
+            </a:r>
+            <a:endParaRPr lang="ru-RU" sz="3600" dirty="0"/>
           </a:p>
         </p:txBody>
       </p:sp>
@@ -16647,10 +16590,15 @@
             <p:ph idx="1"/>
           </p:nvPr>
         </p:nvSpPr>
-        <p:spPr/>
+        <p:spPr>
+          <a:xfrm>
+            <a:off x="457200" y="1124744"/>
+            <a:ext cx="8229600" cy="5001419"/>
+          </a:xfrm>
+        </p:spPr>
         <p:txBody>
           <a:bodyPr>
-            <a:normAutofit fontScale="77500" lnSpcReduction="20000"/>
+            <a:normAutofit lnSpcReduction="10000"/>
           </a:bodyPr>
           <a:lstStyle/>
           <a:p>
@@ -16659,23 +16607,7 @@
             </a:pPr>
             <a:r>
               <a:rPr lang="ru-RU" dirty="0" smtClean="0"/>
-              <a:t>Окно </a:t>
-            </a:r>
-            <a:r>
-              <a:rPr lang="en-US" dirty="0" smtClean="0"/>
-              <a:t>Package </a:t>
-            </a:r>
-            <a:r>
-              <a:rPr lang="en-US" dirty="0"/>
-              <a:t>Manager </a:t>
-            </a:r>
-            <a:r>
-              <a:rPr lang="en-US" dirty="0" smtClean="0"/>
-              <a:t>Console</a:t>
-            </a:r>
-            <a:r>
-              <a:rPr lang="ru-RU" dirty="0" smtClean="0"/>
-              <a:t> позволяет управлять </a:t>
+              <a:t>Расширение </a:t>
             </a:r>
             <a:r>
               <a:rPr lang="en-US" dirty="0" smtClean="0"/>
@@ -16683,87 +16615,109 @@
             </a:r>
             <a:r>
               <a:rPr lang="ru-RU" dirty="0" smtClean="0"/>
-              <a:t>пакетами с помощью </a:t>
+              <a:t>упрощает работу с зависимостями в </a:t>
             </a:r>
             <a:r>
               <a:rPr lang="en-US" dirty="0" smtClean="0"/>
-              <a:t>PowerShell </a:t>
+              <a:t>.NET </a:t>
             </a:r>
             <a:r>
               <a:rPr lang="ru-RU" dirty="0" smtClean="0"/>
-              <a:t>команд прямо из </a:t>
-            </a:r>
+              <a:t>проектах.</a:t>
+            </a:r>
+          </a:p>
+          <a:p>
+            <a:pPr marL="0" indent="0">
+              <a:buNone/>
+            </a:pPr>
+            <a:endParaRPr lang="en-US" dirty="0" smtClean="0"/>
+          </a:p>
+          <a:p>
+            <a:pPr marL="0" indent="0">
+              <a:buNone/>
+            </a:pPr>
             <a:r>
               <a:rPr lang="en-US" dirty="0" smtClean="0"/>
-              <a:t>Visual Studio.</a:t>
+              <a:t>NuGet </a:t>
+            </a:r>
+            <a:r>
+              <a:rPr lang="ru-RU" dirty="0" smtClean="0"/>
+              <a:t>входит в состав </a:t>
+            </a:r>
+            <a:r>
+              <a:rPr lang="en-US" dirty="0" smtClean="0"/>
+              <a:t>VS 2012 </a:t>
+            </a:r>
+            <a:r>
+              <a:rPr lang="ru-RU" dirty="0" smtClean="0"/>
+              <a:t>и выше. Для </a:t>
+            </a:r>
+            <a:r>
+              <a:rPr lang="en-US" dirty="0" smtClean="0"/>
+              <a:t>VS 2010 </a:t>
+            </a:r>
+            <a:r>
+              <a:rPr lang="ru-RU" dirty="0" smtClean="0"/>
+              <a:t>его нужно скачать с помощью </a:t>
+            </a:r>
+            <a:r>
+              <a:rPr lang="en-US" dirty="0" smtClean="0"/>
+              <a:t>Tools -&gt; Extension Manager </a:t>
+            </a:r>
+            <a:r>
+              <a:rPr lang="ru-RU" dirty="0" smtClean="0"/>
+              <a:t>или с сайта </a:t>
+            </a:r>
+            <a:r>
+              <a:rPr lang="en-US" dirty="0" smtClean="0">
+                <a:hlinkClick r:id="rId2"/>
+              </a:rPr>
+              <a:t>nuget.org</a:t>
+            </a:r>
+            <a:r>
+              <a:rPr lang="ru-RU" dirty="0" smtClean="0"/>
+              <a:t>. После установки в контекстном меню </a:t>
+            </a:r>
+            <a:r>
+              <a:rPr lang="en-US" dirty="0" smtClean="0"/>
+              <a:t>References </a:t>
+            </a:r>
+            <a:r>
+              <a:rPr lang="ru-RU" dirty="0" smtClean="0"/>
+              <a:t>появится команда </a:t>
+            </a:r>
+            <a:r>
+              <a:rPr lang="en-US" dirty="0" smtClean="0"/>
+              <a:t>“Manage NuGet Packages …”. </a:t>
+            </a:r>
+            <a:r>
+              <a:rPr lang="ru-RU" dirty="0" smtClean="0"/>
+              <a:t>Также в меню </a:t>
+            </a:r>
+            <a:r>
+              <a:rPr lang="en-US" dirty="0" smtClean="0"/>
+              <a:t>Tools </a:t>
+            </a:r>
+            <a:r>
+              <a:rPr lang="ru-RU" dirty="0" smtClean="0"/>
+              <a:t>появится меню </a:t>
+            </a:r>
+            <a:r>
+              <a:rPr lang="en-US" dirty="0" smtClean="0"/>
+              <a:t>“NuGet Package Manager”.</a:t>
             </a:r>
             <a:endParaRPr lang="ru-RU" dirty="0" smtClean="0"/>
           </a:p>
           <a:p>
-            <a:r>
-              <a:rPr lang="en-US" dirty="0" smtClean="0"/>
-              <a:t>Add-</a:t>
-            </a:r>
-            <a:r>
-              <a:rPr lang="en-US" dirty="0" err="1" smtClean="0"/>
-              <a:t>BindingRedirect</a:t>
-            </a:r>
-            <a:endParaRPr lang="en-US" dirty="0" smtClean="0"/>
-          </a:p>
-          <a:p>
-            <a:r>
-              <a:rPr lang="en-US" dirty="0" smtClean="0"/>
-              <a:t>Get-Package</a:t>
-            </a:r>
-          </a:p>
-          <a:p>
-            <a:r>
-              <a:rPr lang="en-US" dirty="0"/>
-              <a:t>Get-Project</a:t>
-            </a:r>
-          </a:p>
-          <a:p>
-            <a:r>
-              <a:rPr lang="en-US" dirty="0" smtClean="0"/>
-              <a:t>Install-Package </a:t>
-            </a:r>
-            <a:r>
-              <a:rPr lang="ru-RU" dirty="0" smtClean="0"/>
-              <a:t>: установка пакета. Позволяет установить пакет определенной версии, что </a:t>
-            </a:r>
-            <a:r>
-              <a:rPr lang="ru-RU" smtClean="0"/>
-              <a:t>невозможно сделать через </a:t>
-            </a:r>
-            <a:r>
-              <a:rPr lang="en-US" dirty="0" smtClean="0"/>
-              <a:t>GUI.</a:t>
-            </a:r>
+            <a:pPr marL="0" indent="0">
+              <a:buNone/>
+            </a:pPr>
             <a:endParaRPr lang="ru-RU" dirty="0" smtClean="0"/>
           </a:p>
           <a:p>
-            <a:r>
-              <a:rPr lang="en-US" dirty="0" smtClean="0"/>
-              <a:t>Open-</a:t>
-            </a:r>
-            <a:r>
-              <a:rPr lang="en-US" dirty="0" err="1" smtClean="0"/>
-              <a:t>PackagePage</a:t>
-            </a:r>
-            <a:endParaRPr lang="ru-RU" dirty="0" smtClean="0"/>
-          </a:p>
-          <a:p>
-            <a:r>
-              <a:rPr lang="en-US" dirty="0" smtClean="0"/>
-              <a:t>Uninstall-Package</a:t>
-            </a:r>
-            <a:endParaRPr lang="ru-RU" dirty="0" smtClean="0"/>
-          </a:p>
-          <a:p>
-            <a:r>
-              <a:rPr lang="en-US" dirty="0"/>
-              <a:t>Update-Package</a:t>
-            </a:r>
+            <a:pPr marL="0" indent="0">
+              <a:buNone/>
+            </a:pPr>
             <a:endParaRPr lang="ru-RU" dirty="0"/>
           </a:p>
         </p:txBody>
@@ -16771,7 +16725,7 @@
     </p:spTree>
     <p:extLst>
       <p:ext uri="{BB962C8B-B14F-4D97-AF65-F5344CB8AC3E}">
-        <p14:creationId xmlns:p14="http://schemas.microsoft.com/office/powerpoint/2010/main" val="2572407753"/>
+        <p14:creationId xmlns:p14="http://schemas.microsoft.com/office/powerpoint/2010/main" val="861195078"/>
       </p:ext>
     </p:extLst>
   </p:cSld>
@@ -16821,12 +16775,8 @@
           <a:lstStyle/>
           <a:p>
             <a:r>
-              <a:rPr lang="ru-RU" dirty="0" smtClean="0"/>
-              <a:t>Утилиты для </a:t>
-            </a:r>
-            <a:r>
               <a:rPr lang="en-US" dirty="0" smtClean="0"/>
-              <a:t>NuGet</a:t>
+              <a:t>Package Manager Console</a:t>
             </a:r>
             <a:endParaRPr lang="ru-RU" dirty="0"/>
           </a:p>
@@ -16845,66 +16795,128 @@
         <p:spPr/>
         <p:txBody>
           <a:bodyPr>
-            <a:normAutofit/>
+            <a:normAutofit fontScale="77500" lnSpcReduction="20000"/>
           </a:bodyPr>
           <a:lstStyle/>
           <a:p>
-            <a:r>
-              <a:rPr lang="en-US" sz="2400" dirty="0" smtClean="0"/>
+            <a:pPr marL="0" indent="0">
+              <a:buNone/>
+            </a:pPr>
+            <a:r>
+              <a:rPr lang="ru-RU" dirty="0" smtClean="0"/>
+              <a:t>Окно </a:t>
+            </a:r>
+            <a:r>
+              <a:rPr lang="en-US" dirty="0" smtClean="0"/>
+              <a:t>Package </a:t>
+            </a:r>
+            <a:r>
+              <a:rPr lang="en-US" dirty="0"/>
+              <a:t>Manager </a:t>
+            </a:r>
+            <a:r>
+              <a:rPr lang="en-US" dirty="0" smtClean="0"/>
+              <a:t>Console</a:t>
+            </a:r>
+            <a:r>
+              <a:rPr lang="ru-RU" dirty="0" smtClean="0"/>
+              <a:t> позволяет управлять </a:t>
+            </a:r>
+            <a:r>
+              <a:rPr lang="en-US" dirty="0" smtClean="0"/>
               <a:t>NuGet </a:t>
             </a:r>
             <a:r>
-              <a:rPr lang="en-US" sz="2400" dirty="0"/>
-              <a:t>Package Explorer</a:t>
-            </a:r>
-            <a:br>
-              <a:rPr lang="en-US" sz="2400" dirty="0"/>
-            </a:br>
-            <a:r>
-              <a:rPr lang="en-US" sz="2400" dirty="0">
-                <a:hlinkClick r:id="rId2"/>
-              </a:rPr>
-              <a:t>http://npe.codeplex.com</a:t>
-            </a:r>
-            <a:r>
-              <a:rPr lang="en-US" sz="2400" dirty="0" smtClean="0">
-                <a:hlinkClick r:id="rId2"/>
-              </a:rPr>
-              <a:t>/</a:t>
-            </a:r>
-            <a:endParaRPr lang="en-US" sz="2400" dirty="0" smtClean="0"/>
-          </a:p>
-          <a:p>
-            <a:endParaRPr lang="ru-RU" sz="2400" dirty="0" smtClean="0"/>
-          </a:p>
-          <a:p>
-            <a:r>
-              <a:rPr lang="ru-RU" sz="2400" dirty="0" smtClean="0"/>
-              <a:t>Утилита командной строки</a:t>
-            </a:r>
-            <a:br>
-              <a:rPr lang="ru-RU" sz="2400" dirty="0" smtClean="0"/>
-            </a:br>
-            <a:r>
-              <a:rPr lang="en-US" sz="2400" dirty="0">
-                <a:hlinkClick r:id="rId3"/>
-              </a:rPr>
-              <a:t>http://</a:t>
-            </a:r>
-            <a:r>
-              <a:rPr lang="en-US" sz="2400" dirty="0" smtClean="0">
-                <a:hlinkClick r:id="rId3"/>
-              </a:rPr>
-              <a:t>docs.nuget.org/docs/start-here/installing-nuget</a:t>
-            </a:r>
-            <a:endParaRPr lang="ru-RU" sz="2400" dirty="0"/>
+              <a:rPr lang="ru-RU" dirty="0" smtClean="0"/>
+              <a:t>пакетами с помощью </a:t>
+            </a:r>
+            <a:r>
+              <a:rPr lang="en-US" dirty="0" smtClean="0"/>
+              <a:t>PowerShell </a:t>
+            </a:r>
+            <a:r>
+              <a:rPr lang="ru-RU" dirty="0" smtClean="0"/>
+              <a:t>команд прямо из </a:t>
+            </a:r>
+            <a:r>
+              <a:rPr lang="en-US" dirty="0" smtClean="0"/>
+              <a:t>Visual Studio.</a:t>
+            </a:r>
+            <a:endParaRPr lang="ru-RU" dirty="0" smtClean="0"/>
+          </a:p>
+          <a:p>
+            <a:r>
+              <a:rPr lang="en-US" dirty="0" smtClean="0"/>
+              <a:t>Add-</a:t>
+            </a:r>
+            <a:r>
+              <a:rPr lang="en-US" dirty="0" err="1" smtClean="0"/>
+              <a:t>BindingRedirect</a:t>
+            </a:r>
+            <a:endParaRPr lang="en-US" dirty="0" smtClean="0"/>
+          </a:p>
+          <a:p>
+            <a:r>
+              <a:rPr lang="en-US" dirty="0" smtClean="0"/>
+              <a:t>Get-Package</a:t>
+            </a:r>
+          </a:p>
+          <a:p>
+            <a:r>
+              <a:rPr lang="en-US" dirty="0"/>
+              <a:t>Get-Project</a:t>
+            </a:r>
+          </a:p>
+          <a:p>
+            <a:r>
+              <a:rPr lang="en-US" dirty="0" smtClean="0"/>
+              <a:t>Install-Package </a:t>
+            </a:r>
+            <a:r>
+              <a:rPr lang="ru-RU" dirty="0" smtClean="0"/>
+              <a:t>: установка пакета. Позволяет установить пакет определенной версии, что </a:t>
+            </a:r>
+            <a:r>
+              <a:rPr lang="ru-RU" smtClean="0"/>
+              <a:t>невозможно сделать через </a:t>
+            </a:r>
+            <a:r>
+              <a:rPr lang="en-US" dirty="0" smtClean="0"/>
+              <a:t>GUI.</a:t>
+            </a:r>
+            <a:endParaRPr lang="ru-RU" dirty="0" smtClean="0"/>
+          </a:p>
+          <a:p>
+            <a:r>
+              <a:rPr lang="en-US" dirty="0" smtClean="0"/>
+              <a:t>Open-</a:t>
+            </a:r>
+            <a:r>
+              <a:rPr lang="en-US" dirty="0" err="1" smtClean="0"/>
+              <a:t>PackagePage</a:t>
+            </a:r>
+            <a:endParaRPr lang="ru-RU" dirty="0" smtClean="0"/>
+          </a:p>
+          <a:p>
+            <a:r>
+              <a:rPr lang="en-US" dirty="0" smtClean="0"/>
+              <a:t>Uninstall-Package</a:t>
+            </a:r>
+            <a:endParaRPr lang="ru-RU" dirty="0" smtClean="0"/>
+          </a:p>
+          <a:p>
+            <a:r>
+              <a:rPr lang="en-US" dirty="0"/>
+              <a:t>Update-Package</a:t>
+            </a:r>
+            <a:endParaRPr lang="ru-RU" dirty="0"/>
           </a:p>
         </p:txBody>
       </p:sp>
     </p:spTree>
     <p:extLst>
       <p:ext uri="{BB962C8B-B14F-4D97-AF65-F5344CB8AC3E}">
-        <p14:creationId xmlns:p14="http://schemas.microsoft.com/office/powerpoint/2010/main" val="2426017902"/>
+        <p14:creationId xmlns:p14="http://schemas.microsoft.com/office/powerpoint/2010/main" val="2572407753"/>
       </p:ext>
     </p:extLst>
   </p:cSld>
@@ -16950,14 +16962,16 @@
         </p:nvSpPr>
         <p:spPr/>
         <p:txBody>
-          <a:bodyPr>
-            <a:normAutofit fontScale="90000"/>
-          </a:bodyPr>
+          <a:bodyPr/>
           <a:lstStyle/>
           <a:p>
             <a:r>
               <a:rPr lang="ru-RU" dirty="0" smtClean="0"/>
-              <a:t>Распространение своих библиотек</a:t>
+              <a:t>Утилиты для </a:t>
+            </a:r>
+            <a:r>
+              <a:rPr lang="en-US" dirty="0" smtClean="0"/>
+              <a:t>NuGet</a:t>
             </a:r>
             <a:endParaRPr lang="ru-RU" dirty="0"/>
           </a:p>
@@ -16976,110 +16990,66 @@
         <p:spPr/>
         <p:txBody>
           <a:bodyPr>
-            <a:normAutofit fontScale="70000" lnSpcReduction="20000"/>
+            <a:normAutofit/>
           </a:bodyPr>
           <a:lstStyle/>
           <a:p>
-            <a:pPr marL="0" indent="0">
-              <a:buNone/>
-            </a:pPr>
-            <a:r>
-              <a:rPr lang="ru-RU" dirty="0" smtClean="0"/>
-              <a:t>Хорошими библиотеками следует делиться с сообществом! Проекты с открытым исходны</a:t>
-            </a:r>
-            <a:r>
-              <a:rPr lang="ru-RU" dirty="0"/>
-              <a:t>м</a:t>
-            </a:r>
-            <a:r>
-              <a:rPr lang="ru-RU" dirty="0" smtClean="0"/>
-              <a:t> кодом можно размещать на специальных сайтах:</a:t>
-            </a:r>
-          </a:p>
-          <a:p>
-            <a:endParaRPr lang="ru-RU" dirty="0" smtClean="0">
-              <a:hlinkClick r:id="rId2"/>
-            </a:endParaRPr>
-          </a:p>
-          <a:p>
-            <a:r>
-              <a:rPr lang="en-US" dirty="0" smtClean="0">
+            <a:r>
+              <a:rPr lang="en-US" sz="2400" dirty="0" smtClean="0"/>
+              <a:t>NuGet </a:t>
+            </a:r>
+            <a:r>
+              <a:rPr lang="en-US" sz="2400" dirty="0"/>
+              <a:t>Package Explorer</a:t>
+            </a:r>
+            <a:br>
+              <a:rPr lang="en-US" sz="2400" dirty="0"/>
+            </a:br>
+            <a:r>
+              <a:rPr lang="en-US" sz="2400" dirty="0">
                 <a:hlinkClick r:id="rId2"/>
               </a:rPr>
-              <a:t>www.codeplex.com</a:t>
-            </a:r>
-            <a:endParaRPr lang="ru-RU" dirty="0" smtClean="0"/>
-          </a:p>
-          <a:p>
-            <a:r>
-              <a:rPr lang="en-US" dirty="0" smtClean="0">
+              <a:t>http://npe.codeplex.com</a:t>
+            </a:r>
+            <a:r>
+              <a:rPr lang="en-US" sz="2400" dirty="0" smtClean="0">
+                <a:hlinkClick r:id="rId2"/>
+              </a:rPr>
+              <a:t>/</a:t>
+            </a:r>
+            <a:endParaRPr lang="en-US" sz="2400" dirty="0" smtClean="0"/>
+          </a:p>
+          <a:p>
+            <a:endParaRPr lang="ru-RU" sz="2400" dirty="0" smtClean="0"/>
+          </a:p>
+          <a:p>
+            <a:r>
+              <a:rPr lang="ru-RU" sz="2400" dirty="0" smtClean="0"/>
+              <a:t>Утилита командной строки</a:t>
+            </a:r>
+            <a:br>
+              <a:rPr lang="ru-RU" sz="2400" dirty="0" smtClean="0"/>
+            </a:br>
+            <a:r>
+              <a:rPr lang="en-US" sz="2400" dirty="0">
                 <a:hlinkClick r:id="rId3"/>
               </a:rPr>
-              <a:t>github.com</a:t>
-            </a:r>
-            <a:endParaRPr lang="ru-RU" dirty="0" smtClean="0"/>
-          </a:p>
-          <a:p>
-            <a:r>
-              <a:rPr lang="en-US" dirty="0" smtClean="0">
-                <a:hlinkClick r:id="rId4"/>
-              </a:rPr>
-              <a:t>code.google.com</a:t>
-            </a:r>
-            <a:endParaRPr lang="ru-RU" dirty="0" smtClean="0"/>
-          </a:p>
-          <a:p>
-            <a:r>
-              <a:rPr lang="ru-RU" dirty="0" smtClean="0"/>
-              <a:t>и других ...</a:t>
-            </a:r>
-            <a:endParaRPr lang="en-US" dirty="0" smtClean="0"/>
-          </a:p>
-          <a:p>
-            <a:endParaRPr lang="en-US" dirty="0" smtClean="0"/>
-          </a:p>
-          <a:p>
-            <a:pPr marL="0" indent="0">
-              <a:buNone/>
-            </a:pPr>
-            <a:r>
-              <a:rPr lang="ru-RU" dirty="0" smtClean="0"/>
-              <a:t>Выбрать лицензию можно с помощью сайта </a:t>
-            </a:r>
-            <a:r>
-              <a:rPr lang="en-US" dirty="0" smtClean="0">
-                <a:hlinkClick r:id="rId5"/>
-              </a:rPr>
-              <a:t>choosealicense.com</a:t>
-            </a:r>
-            <a:endParaRPr lang="ru-RU" dirty="0" smtClean="0"/>
-          </a:p>
-          <a:p>
-            <a:pPr marL="0" indent="0">
-              <a:buNone/>
-            </a:pPr>
-            <a:endParaRPr lang="ru-RU" dirty="0" smtClean="0"/>
-          </a:p>
-          <a:p>
-            <a:pPr marL="0" indent="0">
-              <a:buNone/>
-            </a:pPr>
-            <a:r>
-              <a:rPr lang="ru-RU" dirty="0" smtClean="0"/>
-              <a:t>Откомпилированную версию не забудьте разместить на </a:t>
-            </a:r>
-            <a:r>
-              <a:rPr lang="en-US" dirty="0" smtClean="0"/>
-              <a:t>nuget.org.</a:t>
-            </a:r>
-            <a:endParaRPr lang="ru-RU" dirty="0"/>
+              <a:t>http://</a:t>
+            </a:r>
+            <a:r>
+              <a:rPr lang="en-US" sz="2400" dirty="0" smtClean="0">
+                <a:hlinkClick r:id="rId3"/>
+              </a:rPr>
+              <a:t>docs.nuget.org/docs/start-here/installing-nuget</a:t>
+            </a:r>
+            <a:endParaRPr lang="ru-RU" sz="2400" dirty="0"/>
           </a:p>
         </p:txBody>
       </p:sp>
     </p:spTree>
     <p:extLst>
       <p:ext uri="{BB962C8B-B14F-4D97-AF65-F5344CB8AC3E}">
-        <p14:creationId xmlns:p14="http://schemas.microsoft.com/office/powerpoint/2010/main" val="4107856204"/>
+        <p14:creationId xmlns:p14="http://schemas.microsoft.com/office/powerpoint/2010/main" val="2426017902"/>
       </p:ext>
     </p:extLst>
   </p:cSld>
@@ -17123,35 +17093,18 @@
             <p:ph type="title"/>
           </p:nvPr>
         </p:nvSpPr>
-        <p:spPr>
-          <a:xfrm>
-            <a:off x="457200" y="274638"/>
-            <a:ext cx="8229600" cy="706090"/>
-          </a:xfrm>
-        </p:spPr>
+        <p:spPr/>
         <p:txBody>
           <a:bodyPr>
-            <a:normAutofit/>
+            <a:normAutofit fontScale="90000"/>
           </a:bodyPr>
           <a:lstStyle/>
           <a:p>
             <a:r>
-              <a:rPr lang="ru-RU" sz="3200" dirty="0" smtClean="0"/>
-              <a:t>Отладка </a:t>
-            </a:r>
-            <a:r>
-              <a:rPr lang="en-US" sz="3200" dirty="0" smtClean="0"/>
-              <a:t>.NET </a:t>
-            </a:r>
-            <a:r>
-              <a:rPr lang="ru-RU" sz="3200" dirty="0" smtClean="0"/>
-              <a:t>с помощью </a:t>
-            </a:r>
-            <a:r>
-              <a:rPr lang="en-US" sz="3200" dirty="0" smtClean="0"/>
-              <a:t>reference source</a:t>
-            </a:r>
-            <a:endParaRPr lang="ru-RU" sz="3200" dirty="0"/>
+              <a:rPr lang="ru-RU" dirty="0" smtClean="0"/>
+              <a:t>Распространение своих библиотек</a:t>
+            </a:r>
+            <a:endParaRPr lang="ru-RU" dirty="0"/>
           </a:p>
         </p:txBody>
       </p:sp>
@@ -17165,15 +17118,10 @@
             <p:ph idx="1"/>
           </p:nvPr>
         </p:nvSpPr>
-        <p:spPr>
-          <a:xfrm>
-            <a:off x="457200" y="980728"/>
-            <a:ext cx="8229600" cy="864096"/>
-          </a:xfrm>
-        </p:spPr>
+        <p:spPr/>
         <p:txBody>
           <a:bodyPr>
-            <a:noAutofit/>
+            <a:normAutofit fontScale="70000" lnSpcReduction="20000"/>
           </a:bodyPr>
           <a:lstStyle/>
           <a:p>
@@ -17181,271 +17129,102 @@
               <a:buNone/>
             </a:pPr>
             <a:r>
-              <a:rPr lang="ru-RU" sz="2400" dirty="0" smtClean="0"/>
-              <a:t>Работает только для </a:t>
-            </a:r>
-            <a:r>
-              <a:rPr lang="en-US" sz="2400" dirty="0" smtClean="0"/>
-              <a:t>.NET 4.5.1 </a:t>
-            </a:r>
-            <a:r>
-              <a:rPr lang="ru-RU" sz="2400" dirty="0" smtClean="0"/>
-              <a:t>в </a:t>
-            </a:r>
-            <a:r>
-              <a:rPr lang="en-US" sz="2400" dirty="0" smtClean="0"/>
-              <a:t>VS 2012 </a:t>
-            </a:r>
-            <a:r>
-              <a:rPr lang="ru-RU" sz="2400" dirty="0" smtClean="0"/>
-              <a:t>и выше</a:t>
-            </a:r>
-            <a:r>
-              <a:rPr lang="en-US" sz="2400" dirty="0" smtClean="0"/>
-              <a:t>!</a:t>
-            </a:r>
-            <a:endParaRPr lang="ru-RU" sz="2400" dirty="0"/>
+              <a:rPr lang="ru-RU" dirty="0" smtClean="0"/>
+              <a:t>Хорошими библиотеками следует делиться с сообществом! Проекты с открытым исходны</a:t>
+            </a:r>
+            <a:r>
+              <a:rPr lang="ru-RU" dirty="0"/>
+              <a:t>м</a:t>
+            </a:r>
+            <a:r>
+              <a:rPr lang="ru-RU" dirty="0" smtClean="0"/>
+              <a:t> кодом можно размещать на специальных сайтах:</a:t>
+            </a:r>
+          </a:p>
+          <a:p>
+            <a:endParaRPr lang="ru-RU" dirty="0" smtClean="0">
+              <a:hlinkClick r:id="rId2"/>
+            </a:endParaRPr>
+          </a:p>
+          <a:p>
+            <a:r>
+              <a:rPr lang="en-US" dirty="0" smtClean="0">
+                <a:hlinkClick r:id="rId2"/>
+              </a:rPr>
+              <a:t>www.codeplex.com</a:t>
+            </a:r>
+            <a:endParaRPr lang="ru-RU" dirty="0" smtClean="0"/>
+          </a:p>
+          <a:p>
+            <a:r>
+              <a:rPr lang="en-US" dirty="0" smtClean="0">
+                <a:hlinkClick r:id="rId3"/>
+              </a:rPr>
+              <a:t>github.com</a:t>
+            </a:r>
+            <a:endParaRPr lang="ru-RU" dirty="0" smtClean="0"/>
+          </a:p>
+          <a:p>
+            <a:r>
+              <a:rPr lang="en-US" dirty="0" smtClean="0">
+                <a:hlinkClick r:id="rId4"/>
+              </a:rPr>
+              <a:t>code.google.com</a:t>
+            </a:r>
+            <a:endParaRPr lang="ru-RU" dirty="0" smtClean="0"/>
+          </a:p>
+          <a:p>
+            <a:r>
+              <a:rPr lang="ru-RU" dirty="0" smtClean="0"/>
+              <a:t>и других ...</a:t>
+            </a:r>
+            <a:endParaRPr lang="en-US" dirty="0" smtClean="0"/>
+          </a:p>
+          <a:p>
+            <a:endParaRPr lang="en-US" dirty="0" smtClean="0"/>
           </a:p>
           <a:p>
             <a:pPr marL="0" indent="0">
               <a:buNone/>
             </a:pPr>
             <a:r>
-              <a:rPr lang="ru-RU" sz="2400" dirty="0" smtClean="0"/>
-              <a:t>Необходимые настройки:</a:t>
-            </a:r>
-            <a:endParaRPr lang="ru-RU" sz="2400" dirty="0"/>
-          </a:p>
-        </p:txBody>
-      </p:sp>
-      <p:pic>
-        <p:nvPicPr>
-          <p:cNvPr id="1027" name="Picture 3"/>
-          <p:cNvPicPr>
-            <a:picLocks noChangeAspect="1" noChangeArrowheads="1"/>
-          </p:cNvPicPr>
-          <p:nvPr/>
-        </p:nvPicPr>
-        <p:blipFill>
-          <a:blip r:embed="rId2">
-            <a:extLst>
-              <a:ext uri="{28A0092B-C50C-407E-A947-70E740481C1C}">
-                <a14:useLocalDpi xmlns:a14="http://schemas.microsoft.com/office/drawing/2010/main" val="0"/>
-              </a:ext>
-            </a:extLst>
-          </a:blip>
-          <a:srcRect/>
-          <a:stretch>
-            <a:fillRect/>
-          </a:stretch>
-        </p:blipFill>
-        <p:spPr bwMode="auto">
-          <a:xfrm>
-            <a:off x="3995936" y="1459979"/>
-            <a:ext cx="4200525" cy="2905125"/>
-          </a:xfrm>
-          <a:prstGeom prst="rect">
-            <a:avLst/>
-          </a:prstGeom>
-          <a:noFill/>
-          <a:ln>
-            <a:noFill/>
-          </a:ln>
-          <a:effectLst/>
-          <a:extLst>
-            <a:ext uri="{909E8E84-426E-40DD-AFC4-6F175D3DCCD1}">
-              <a14:hiddenFill xmlns:a14="http://schemas.microsoft.com/office/drawing/2010/main">
-                <a:solidFill>
-                  <a:schemeClr val="accent1"/>
-                </a:solidFill>
-              </a14:hiddenFill>
-            </a:ext>
-            <a:ext uri="{91240B29-F687-4F45-9708-019B960494DF}">
-              <a14:hiddenLine xmlns:a14="http://schemas.microsoft.com/office/drawing/2010/main" w="9525">
-                <a:solidFill>
-                  <a:schemeClr val="tx1"/>
-                </a:solidFill>
-                <a:miter lim="800000"/>
-                <a:headEnd/>
-                <a:tailEnd/>
-              </a14:hiddenLine>
-            </a:ext>
-            <a:ext uri="{AF507438-7753-43E0-B8FC-AC1667EBCBE1}">
-              <a14:hiddenEffects xmlns:a14="http://schemas.microsoft.com/office/drawing/2010/main">
-                <a:effectLst>
-                  <a:outerShdw dist="35921" dir="2700000" algn="ctr" rotWithShape="0">
-                    <a:schemeClr val="bg2"/>
-                  </a:outerShdw>
-                </a:effectLst>
-              </a14:hiddenEffects>
-            </a:ext>
-          </a:extLst>
-        </p:spPr>
-      </p:pic>
-      <p:sp>
-        <p:nvSpPr>
-          <p:cNvPr id="4" name="TextBox 3"/>
-          <p:cNvSpPr txBox="1"/>
-          <p:nvPr/>
-        </p:nvSpPr>
-        <p:spPr>
-          <a:xfrm>
-            <a:off x="543158" y="2597756"/>
-            <a:ext cx="2722669" cy="461665"/>
-          </a:xfrm>
-          <a:prstGeom prst="rect">
-            <a:avLst/>
-          </a:prstGeom>
-          <a:noFill/>
-        </p:spPr>
-        <p:txBody>
-          <a:bodyPr wrap="none" rtlCol="0">
-            <a:spAutoFit/>
-          </a:bodyPr>
-          <a:lstStyle/>
-          <a:p>
-            <a:pPr algn="ctr"/>
-            <a:r>
-              <a:rPr lang="en-US" sz="2400" dirty="0" smtClean="0"/>
-              <a:t>Debugger \ General:</a:t>
-            </a:r>
-            <a:endParaRPr lang="ru-RU" sz="2400" dirty="0" smtClean="0"/>
-          </a:p>
-        </p:txBody>
-      </p:sp>
-      <p:pic>
-        <p:nvPicPr>
-          <p:cNvPr id="1028" name="Picture 4"/>
-          <p:cNvPicPr>
-            <a:picLocks noChangeAspect="1" noChangeArrowheads="1"/>
-          </p:cNvPicPr>
-          <p:nvPr/>
-        </p:nvPicPr>
-        <p:blipFill>
-          <a:blip r:embed="rId3">
-            <a:extLst>
-              <a:ext uri="{28A0092B-C50C-407E-A947-70E740481C1C}">
-                <a14:useLocalDpi xmlns:a14="http://schemas.microsoft.com/office/drawing/2010/main" val="0"/>
-              </a:ext>
-            </a:extLst>
-          </a:blip>
-          <a:srcRect/>
-          <a:stretch>
-            <a:fillRect/>
-          </a:stretch>
-        </p:blipFill>
-        <p:spPr bwMode="auto">
-          <a:xfrm>
-            <a:off x="3995936" y="5085184"/>
-            <a:ext cx="4381500" cy="1352550"/>
-          </a:xfrm>
-          <a:prstGeom prst="rect">
-            <a:avLst/>
-          </a:prstGeom>
-          <a:noFill/>
-          <a:ln>
-            <a:noFill/>
-          </a:ln>
-          <a:effectLst/>
-          <a:extLst>
-            <a:ext uri="{909E8E84-426E-40DD-AFC4-6F175D3DCCD1}">
-              <a14:hiddenFill xmlns:a14="http://schemas.microsoft.com/office/drawing/2010/main">
-                <a:solidFill>
-                  <a:schemeClr val="accent1"/>
-                </a:solidFill>
-              </a14:hiddenFill>
-            </a:ext>
-            <a:ext uri="{91240B29-F687-4F45-9708-019B960494DF}">
-              <a14:hiddenLine xmlns:a14="http://schemas.microsoft.com/office/drawing/2010/main" w="9525">
-                <a:solidFill>
-                  <a:schemeClr val="tx1"/>
-                </a:solidFill>
-                <a:miter lim="800000"/>
-                <a:headEnd/>
-                <a:tailEnd/>
-              </a14:hiddenLine>
-            </a:ext>
-            <a:ext uri="{AF507438-7753-43E0-B8FC-AC1667EBCBE1}">
-              <a14:hiddenEffects xmlns:a14="http://schemas.microsoft.com/office/drawing/2010/main">
-                <a:effectLst>
-                  <a:outerShdw dist="35921" dir="2700000" algn="ctr" rotWithShape="0">
-                    <a:schemeClr val="bg2"/>
-                  </a:outerShdw>
-                </a:effectLst>
-              </a14:hiddenEffects>
-            </a:ext>
-          </a:extLst>
-        </p:spPr>
-      </p:pic>
-      <p:sp>
-        <p:nvSpPr>
-          <p:cNvPr id="8" name="TextBox 7"/>
-          <p:cNvSpPr txBox="1"/>
-          <p:nvPr/>
-        </p:nvSpPr>
-        <p:spPr>
-          <a:xfrm>
-            <a:off x="516260" y="5085184"/>
-            <a:ext cx="2776466" cy="461665"/>
-          </a:xfrm>
-          <a:prstGeom prst="rect">
-            <a:avLst/>
-          </a:prstGeom>
-          <a:noFill/>
-        </p:spPr>
-        <p:txBody>
-          <a:bodyPr wrap="none" rtlCol="0">
-            <a:spAutoFit/>
-          </a:bodyPr>
-          <a:lstStyle/>
-          <a:p>
-            <a:pPr algn="ctr"/>
-            <a:r>
-              <a:rPr lang="en-US" sz="2400" dirty="0" smtClean="0"/>
-              <a:t>Debugger \ Symbols:</a:t>
-            </a:r>
-          </a:p>
-        </p:txBody>
-      </p:sp>
-      <p:sp>
-        <p:nvSpPr>
-          <p:cNvPr id="5" name="TextBox 4"/>
-          <p:cNvSpPr txBox="1"/>
-          <p:nvPr/>
-        </p:nvSpPr>
-        <p:spPr>
-          <a:xfrm>
-            <a:off x="2483768" y="4581128"/>
-            <a:ext cx="6192593" cy="369332"/>
-          </a:xfrm>
-          <a:prstGeom prst="rect">
-            <a:avLst/>
-          </a:prstGeom>
-          <a:noFill/>
-        </p:spPr>
-        <p:txBody>
-          <a:bodyPr wrap="none" rtlCol="0">
-            <a:spAutoFit/>
-          </a:bodyPr>
-          <a:lstStyle/>
-          <a:p>
-            <a:pPr algn="ctr"/>
-            <a:r>
               <a:rPr lang="ru-RU" dirty="0" smtClean="0"/>
-              <a:t>Добавьте адрес </a:t>
-            </a:r>
-            <a:r>
-              <a:rPr lang="en-US" dirty="0"/>
-              <a:t>http://referencesource.microsoft.com/symbols</a:t>
+              <a:t>Выбрать лицензию можно с помощью сайта </a:t>
+            </a:r>
+            <a:r>
+              <a:rPr lang="en-US" dirty="0" smtClean="0">
+                <a:hlinkClick r:id="rId5"/>
+              </a:rPr>
+              <a:t>choosealicense.com</a:t>
             </a:r>
             <a:endParaRPr lang="ru-RU" dirty="0" smtClean="0"/>
+          </a:p>
+          <a:p>
+            <a:pPr marL="0" indent="0">
+              <a:buNone/>
+            </a:pPr>
+            <a:endParaRPr lang="ru-RU" dirty="0" smtClean="0"/>
+          </a:p>
+          <a:p>
+            <a:pPr marL="0" indent="0">
+              <a:buNone/>
+            </a:pPr>
+            <a:r>
+              <a:rPr lang="ru-RU" dirty="0" smtClean="0"/>
+              <a:t>Откомпилированную версию не забудьте разместить на </a:t>
+            </a:r>
+            <a:r>
+              <a:rPr lang="en-US" dirty="0" smtClean="0"/>
+              <a:t>nuget.org.</a:t>
+            </a:r>
+            <a:endParaRPr lang="ru-RU" dirty="0"/>
           </a:p>
         </p:txBody>
       </p:sp>
     </p:spTree>
     <p:extLst>
       <p:ext uri="{BB962C8B-B14F-4D97-AF65-F5344CB8AC3E}">
-        <p14:creationId xmlns:p14="http://schemas.microsoft.com/office/powerpoint/2010/main" val="2605966343"/>
+        <p14:creationId xmlns:p14="http://schemas.microsoft.com/office/powerpoint/2010/main" val="4107856204"/>
       </p:ext>
     </p:extLst>
   </p:cSld>
@@ -17514,12 +17293,8 @@
               <a:t>с помощью </a:t>
             </a:r>
             <a:r>
-              <a:rPr lang="en-US" sz="3200" dirty="0" err="1" smtClean="0"/>
-              <a:t>dotPeek</a:t>
-            </a:r>
-            <a:r>
               <a:rPr lang="en-US" sz="3200" dirty="0" smtClean="0"/>
-              <a:t> 1.2+</a:t>
+              <a:t>reference source</a:t>
             </a:r>
             <a:endParaRPr lang="ru-RU" sz="3200" dirty="0"/>
           </a:p>
@@ -17538,7 +17313,7 @@
         <p:spPr>
           <a:xfrm>
             <a:off x="457200" y="980728"/>
-            <a:ext cx="8229600" cy="2520280"/>
+            <a:ext cx="8229600" cy="864096"/>
           </a:xfrm>
         </p:spPr>
         <p:txBody>
@@ -17552,88 +17327,270 @@
             </a:pPr>
             <a:r>
               <a:rPr lang="ru-RU" sz="2400" dirty="0" smtClean="0"/>
-              <a:t>В </a:t>
-            </a:r>
-            <a:r>
-              <a:rPr lang="en-US" sz="2400" dirty="0" err="1" smtClean="0"/>
-              <a:t>dotPeek</a:t>
+              <a:t>Работает только для </a:t>
             </a:r>
             <a:r>
               <a:rPr lang="en-US" sz="2400" dirty="0" smtClean="0"/>
-              <a:t> 1.2 </a:t>
+              <a:t>.NET 4.5.1 </a:t>
             </a:r>
             <a:r>
               <a:rPr lang="ru-RU" sz="2400" dirty="0" smtClean="0"/>
-              <a:t>была добавлена команда «</a:t>
+              <a:t>в </a:t>
             </a:r>
             <a:r>
               <a:rPr lang="en-US" sz="2400" dirty="0" smtClean="0"/>
-              <a:t>Generate PDB</a:t>
+              <a:t>VS 2012 </a:t>
             </a:r>
             <a:r>
               <a:rPr lang="ru-RU" sz="2400" dirty="0" smtClean="0"/>
-              <a:t>» и поддержка </a:t>
+              <a:t>и выше</a:t>
             </a:r>
             <a:r>
               <a:rPr lang="en-US" sz="2400" dirty="0" smtClean="0"/>
-              <a:t>Symbol Server. </a:t>
-            </a:r>
-            <a:r>
-              <a:rPr lang="ru-RU" sz="2400" dirty="0" smtClean="0"/>
-              <a:t>С их помощью можно отлаживать </a:t>
-            </a:r>
-            <a:r>
-              <a:rPr lang="en-US" sz="2400" dirty="0" smtClean="0"/>
-              <a:t>.NET </a:t>
-            </a:r>
-            <a:r>
-              <a:rPr lang="ru-RU" sz="2400" dirty="0" smtClean="0"/>
-              <a:t>и чужие сборки. Подробности читайте на сайте </a:t>
-            </a:r>
-            <a:r>
-              <a:rPr lang="en-US" sz="2400" dirty="0" smtClean="0"/>
-              <a:t>JetBrains:</a:t>
-            </a:r>
-            <a:endParaRPr lang="ru-RU" sz="2400" dirty="0" smtClean="0">
-              <a:hlinkClick r:id="rId2"/>
-            </a:endParaRPr>
+              <a:t>!</a:t>
+            </a:r>
+            <a:endParaRPr lang="ru-RU" sz="2400" dirty="0"/>
           </a:p>
           <a:p>
             <a:pPr marL="0" indent="0">
               <a:buNone/>
             </a:pPr>
-            <a:endParaRPr lang="en-US" sz="2400" dirty="0" smtClean="0"/>
-          </a:p>
-          <a:p>
-            <a:pPr marL="0" indent="0">
-              <a:buNone/>
-            </a:pPr>
-            <a:r>
-              <a:rPr lang="en-US" sz="2400" dirty="0" smtClean="0">
-                <a:hlinkClick r:id="rId2"/>
-              </a:rPr>
-              <a:t>http</a:t>
-            </a:r>
-            <a:r>
-              <a:rPr lang="en-US" sz="2400" dirty="0">
-                <a:hlinkClick r:id="rId2"/>
-              </a:rPr>
-              <a:t>://</a:t>
-            </a:r>
-            <a:r>
-              <a:rPr lang="en-US" sz="2400" dirty="0" smtClean="0">
-                <a:hlinkClick r:id="rId2"/>
-              </a:rPr>
-              <a:t>confluence.jetbrains.com/display/NETCOM/dotPeek+Symbol+Server+and+PDB+Generation</a:t>
+            <a:r>
+              <a:rPr lang="ru-RU" sz="2400" dirty="0" smtClean="0"/>
+              <a:t>Необходимые настройки:</a:t>
             </a:r>
             <a:endParaRPr lang="ru-RU" sz="2400" dirty="0"/>
+          </a:p>
+        </p:txBody>
+      </p:sp>
+      <p:pic>
+        <p:nvPicPr>
+          <p:cNvPr id="1027" name="Picture 3"/>
+          <p:cNvPicPr>
+            <a:picLocks noChangeAspect="1" noChangeArrowheads="1"/>
+          </p:cNvPicPr>
+          <p:nvPr/>
+        </p:nvPicPr>
+        <p:blipFill>
+          <a:blip r:embed="rId2">
+            <a:extLst>
+              <a:ext uri="{28A0092B-C50C-407E-A947-70E740481C1C}">
+                <a14:useLocalDpi xmlns:a14="http://schemas.microsoft.com/office/drawing/2010/main" val="0"/>
+              </a:ext>
+            </a:extLst>
+          </a:blip>
+          <a:srcRect/>
+          <a:stretch>
+            <a:fillRect/>
+          </a:stretch>
+        </p:blipFill>
+        <p:spPr bwMode="auto">
+          <a:xfrm>
+            <a:off x="3995936" y="1459979"/>
+            <a:ext cx="4200525" cy="2905125"/>
+          </a:xfrm>
+          <a:prstGeom prst="rect">
+            <a:avLst/>
+          </a:prstGeom>
+          <a:noFill/>
+          <a:ln>
+            <a:noFill/>
+          </a:ln>
+          <a:effectLst/>
+          <a:extLst>
+            <a:ext uri="{909E8E84-426E-40DD-AFC4-6F175D3DCCD1}">
+              <a14:hiddenFill xmlns:a14="http://schemas.microsoft.com/office/drawing/2010/main">
+                <a:solidFill>
+                  <a:schemeClr val="accent1"/>
+                </a:solidFill>
+              </a14:hiddenFill>
+            </a:ext>
+            <a:ext uri="{91240B29-F687-4F45-9708-019B960494DF}">
+              <a14:hiddenLine xmlns:a14="http://schemas.microsoft.com/office/drawing/2010/main" w="9525">
+                <a:solidFill>
+                  <a:schemeClr val="tx1"/>
+                </a:solidFill>
+                <a:miter lim="800000"/>
+                <a:headEnd/>
+                <a:tailEnd/>
+              </a14:hiddenLine>
+            </a:ext>
+            <a:ext uri="{AF507438-7753-43E0-B8FC-AC1667EBCBE1}">
+              <a14:hiddenEffects xmlns:a14="http://schemas.microsoft.com/office/drawing/2010/main">
+                <a:effectLst>
+                  <a:outerShdw dist="35921" dir="2700000" algn="ctr" rotWithShape="0">
+                    <a:schemeClr val="bg2"/>
+                  </a:outerShdw>
+                </a:effectLst>
+              </a14:hiddenEffects>
+            </a:ext>
+          </a:extLst>
+        </p:spPr>
+      </p:pic>
+      <p:sp>
+        <p:nvSpPr>
+          <p:cNvPr id="4" name="TextBox 3"/>
+          <p:cNvSpPr txBox="1"/>
+          <p:nvPr/>
+        </p:nvSpPr>
+        <p:spPr>
+          <a:xfrm>
+            <a:off x="543158" y="2597756"/>
+            <a:ext cx="2722669" cy="461665"/>
+          </a:xfrm>
+          <a:prstGeom prst="rect">
+            <a:avLst/>
+          </a:prstGeom>
+          <a:noFill/>
+        </p:spPr>
+        <p:txBody>
+          <a:bodyPr wrap="none" rtlCol="0">
+            <a:spAutoFit/>
+          </a:bodyPr>
+          <a:lstStyle/>
+          <a:p>
+            <a:pPr algn="ctr"/>
+            <a:r>
+              <a:rPr lang="en-US" sz="2400" dirty="0" smtClean="0"/>
+              <a:t>Debugger \ General:</a:t>
+            </a:r>
+            <a:endParaRPr lang="ru-RU" sz="2400" dirty="0" smtClean="0"/>
+          </a:p>
+        </p:txBody>
+      </p:sp>
+      <p:pic>
+        <p:nvPicPr>
+          <p:cNvPr id="1028" name="Picture 4"/>
+          <p:cNvPicPr>
+            <a:picLocks noChangeAspect="1" noChangeArrowheads="1"/>
+          </p:cNvPicPr>
+          <p:nvPr/>
+        </p:nvPicPr>
+        <p:blipFill>
+          <a:blip r:embed="rId3">
+            <a:extLst>
+              <a:ext uri="{28A0092B-C50C-407E-A947-70E740481C1C}">
+                <a14:useLocalDpi xmlns:a14="http://schemas.microsoft.com/office/drawing/2010/main" val="0"/>
+              </a:ext>
+            </a:extLst>
+          </a:blip>
+          <a:srcRect/>
+          <a:stretch>
+            <a:fillRect/>
+          </a:stretch>
+        </p:blipFill>
+        <p:spPr bwMode="auto">
+          <a:xfrm>
+            <a:off x="3995936" y="5085184"/>
+            <a:ext cx="4381500" cy="1352550"/>
+          </a:xfrm>
+          <a:prstGeom prst="rect">
+            <a:avLst/>
+          </a:prstGeom>
+          <a:noFill/>
+          <a:ln>
+            <a:noFill/>
+          </a:ln>
+          <a:effectLst/>
+          <a:extLst>
+            <a:ext uri="{909E8E84-426E-40DD-AFC4-6F175D3DCCD1}">
+              <a14:hiddenFill xmlns:a14="http://schemas.microsoft.com/office/drawing/2010/main">
+                <a:solidFill>
+                  <a:schemeClr val="accent1"/>
+                </a:solidFill>
+              </a14:hiddenFill>
+            </a:ext>
+            <a:ext uri="{91240B29-F687-4F45-9708-019B960494DF}">
+              <a14:hiddenLine xmlns:a14="http://schemas.microsoft.com/office/drawing/2010/main" w="9525">
+                <a:solidFill>
+                  <a:schemeClr val="tx1"/>
+                </a:solidFill>
+                <a:miter lim="800000"/>
+                <a:headEnd/>
+                <a:tailEnd/>
+              </a14:hiddenLine>
+            </a:ext>
+            <a:ext uri="{AF507438-7753-43E0-B8FC-AC1667EBCBE1}">
+              <a14:hiddenEffects xmlns:a14="http://schemas.microsoft.com/office/drawing/2010/main">
+                <a:effectLst>
+                  <a:outerShdw dist="35921" dir="2700000" algn="ctr" rotWithShape="0">
+                    <a:schemeClr val="bg2"/>
+                  </a:outerShdw>
+                </a:effectLst>
+              </a14:hiddenEffects>
+            </a:ext>
+          </a:extLst>
+        </p:spPr>
+      </p:pic>
+      <p:sp>
+        <p:nvSpPr>
+          <p:cNvPr id="8" name="TextBox 7"/>
+          <p:cNvSpPr txBox="1"/>
+          <p:nvPr/>
+        </p:nvSpPr>
+        <p:spPr>
+          <a:xfrm>
+            <a:off x="516260" y="5085184"/>
+            <a:ext cx="2776466" cy="461665"/>
+          </a:xfrm>
+          <a:prstGeom prst="rect">
+            <a:avLst/>
+          </a:prstGeom>
+          <a:noFill/>
+        </p:spPr>
+        <p:txBody>
+          <a:bodyPr wrap="none" rtlCol="0">
+            <a:spAutoFit/>
+          </a:bodyPr>
+          <a:lstStyle/>
+          <a:p>
+            <a:pPr algn="ctr"/>
+            <a:r>
+              <a:rPr lang="en-US" sz="2400" dirty="0" smtClean="0"/>
+              <a:t>Debugger \ Symbols:</a:t>
+            </a:r>
+          </a:p>
+        </p:txBody>
+      </p:sp>
+      <p:sp>
+        <p:nvSpPr>
+          <p:cNvPr id="5" name="TextBox 4"/>
+          <p:cNvSpPr txBox="1"/>
+          <p:nvPr/>
+        </p:nvSpPr>
+        <p:spPr>
+          <a:xfrm>
+            <a:off x="2483768" y="4581128"/>
+            <a:ext cx="6192593" cy="369332"/>
+          </a:xfrm>
+          <a:prstGeom prst="rect">
+            <a:avLst/>
+          </a:prstGeom>
+          <a:noFill/>
+        </p:spPr>
+        <p:txBody>
+          <a:bodyPr wrap="none" rtlCol="0">
+            <a:spAutoFit/>
+          </a:bodyPr>
+          <a:lstStyle/>
+          <a:p>
+            <a:pPr algn="ctr"/>
+            <a:r>
+              <a:rPr lang="ru-RU" dirty="0" smtClean="0"/>
+              <a:t>Добавьте адрес </a:t>
+            </a:r>
+            <a:r>
+              <a:rPr lang="en-US" dirty="0"/>
+              <a:t>http://referencesource.microsoft.com/symbols</a:t>
+            </a:r>
+            <a:endParaRPr lang="ru-RU" dirty="0" smtClean="0"/>
           </a:p>
         </p:txBody>
       </p:sp>
     </p:spTree>
     <p:extLst>
       <p:ext uri="{BB962C8B-B14F-4D97-AF65-F5344CB8AC3E}">
-        <p14:creationId xmlns:p14="http://schemas.microsoft.com/office/powerpoint/2010/main" val="3583458690"/>
+        <p14:creationId xmlns:p14="http://schemas.microsoft.com/office/powerpoint/2010/main" val="2605966343"/>
       </p:ext>
     </p:extLst>
   </p:cSld>
@@ -17677,6 +17634,194 @@
             <p:ph type="title"/>
           </p:nvPr>
         </p:nvSpPr>
+        <p:spPr>
+          <a:xfrm>
+            <a:off x="457200" y="274638"/>
+            <a:ext cx="8229600" cy="706090"/>
+          </a:xfrm>
+        </p:spPr>
+        <p:txBody>
+          <a:bodyPr>
+            <a:normAutofit/>
+          </a:bodyPr>
+          <a:lstStyle/>
+          <a:p>
+            <a:r>
+              <a:rPr lang="ru-RU" sz="3200" dirty="0" smtClean="0"/>
+              <a:t>Отладка </a:t>
+            </a:r>
+            <a:r>
+              <a:rPr lang="en-US" sz="3200" dirty="0" smtClean="0"/>
+              <a:t>.NET </a:t>
+            </a:r>
+            <a:r>
+              <a:rPr lang="ru-RU" sz="3200" dirty="0" smtClean="0"/>
+              <a:t>с помощью </a:t>
+            </a:r>
+            <a:r>
+              <a:rPr lang="en-US" sz="3200" dirty="0" err="1" smtClean="0"/>
+              <a:t>dotPeek</a:t>
+            </a:r>
+            <a:r>
+              <a:rPr lang="en-US" sz="3200" dirty="0" smtClean="0"/>
+              <a:t> 1.2+</a:t>
+            </a:r>
+            <a:endParaRPr lang="ru-RU" sz="3200" dirty="0"/>
+          </a:p>
+        </p:txBody>
+      </p:sp>
+      <p:sp>
+        <p:nvSpPr>
+          <p:cNvPr id="3" name="Content Placeholder 2"/>
+          <p:cNvSpPr>
+            <a:spLocks noGrp="1"/>
+          </p:cNvSpPr>
+          <p:nvPr>
+            <p:ph idx="1"/>
+          </p:nvPr>
+        </p:nvSpPr>
+        <p:spPr>
+          <a:xfrm>
+            <a:off x="457200" y="980728"/>
+            <a:ext cx="8229600" cy="2520280"/>
+          </a:xfrm>
+        </p:spPr>
+        <p:txBody>
+          <a:bodyPr>
+            <a:noAutofit/>
+          </a:bodyPr>
+          <a:lstStyle/>
+          <a:p>
+            <a:pPr marL="0" indent="0">
+              <a:buNone/>
+            </a:pPr>
+            <a:r>
+              <a:rPr lang="ru-RU" sz="2400" dirty="0" smtClean="0"/>
+              <a:t>В </a:t>
+            </a:r>
+            <a:r>
+              <a:rPr lang="en-US" sz="2400" dirty="0" err="1" smtClean="0"/>
+              <a:t>dotPeek</a:t>
+            </a:r>
+            <a:r>
+              <a:rPr lang="en-US" sz="2400" dirty="0" smtClean="0"/>
+              <a:t> 1.2 </a:t>
+            </a:r>
+            <a:r>
+              <a:rPr lang="ru-RU" sz="2400" dirty="0" smtClean="0"/>
+              <a:t>была добавлена команда «</a:t>
+            </a:r>
+            <a:r>
+              <a:rPr lang="en-US" sz="2400" dirty="0" smtClean="0"/>
+              <a:t>Generate PDB</a:t>
+            </a:r>
+            <a:r>
+              <a:rPr lang="ru-RU" sz="2400" dirty="0" smtClean="0"/>
+              <a:t>» и поддержка </a:t>
+            </a:r>
+            <a:r>
+              <a:rPr lang="en-US" sz="2400" dirty="0" smtClean="0"/>
+              <a:t>Symbol Server. </a:t>
+            </a:r>
+            <a:r>
+              <a:rPr lang="ru-RU" sz="2400" dirty="0" smtClean="0"/>
+              <a:t>С их помощью можно отлаживать </a:t>
+            </a:r>
+            <a:r>
+              <a:rPr lang="en-US" sz="2400" dirty="0" smtClean="0"/>
+              <a:t>.NET </a:t>
+            </a:r>
+            <a:r>
+              <a:rPr lang="ru-RU" sz="2400" dirty="0" smtClean="0"/>
+              <a:t>и чужие сборки. Подробности читайте на сайте </a:t>
+            </a:r>
+            <a:r>
+              <a:rPr lang="en-US" sz="2400" dirty="0" smtClean="0"/>
+              <a:t>JetBrains:</a:t>
+            </a:r>
+            <a:endParaRPr lang="ru-RU" sz="2400" dirty="0" smtClean="0">
+              <a:hlinkClick r:id="rId2"/>
+            </a:endParaRPr>
+          </a:p>
+          <a:p>
+            <a:pPr marL="0" indent="0">
+              <a:buNone/>
+            </a:pPr>
+            <a:endParaRPr lang="en-US" sz="2400" dirty="0" smtClean="0"/>
+          </a:p>
+          <a:p>
+            <a:pPr marL="0" indent="0">
+              <a:buNone/>
+            </a:pPr>
+            <a:r>
+              <a:rPr lang="en-US" sz="2400" dirty="0" smtClean="0">
+                <a:hlinkClick r:id="rId2"/>
+              </a:rPr>
+              <a:t>http</a:t>
+            </a:r>
+            <a:r>
+              <a:rPr lang="en-US" sz="2400" dirty="0">
+                <a:hlinkClick r:id="rId2"/>
+              </a:rPr>
+              <a:t>://</a:t>
+            </a:r>
+            <a:r>
+              <a:rPr lang="en-US" sz="2400" dirty="0" smtClean="0">
+                <a:hlinkClick r:id="rId2"/>
+              </a:rPr>
+              <a:t>confluence.jetbrains.com/display/NETCOM/dotPeek+Symbol+Server+and+PDB+Generation</a:t>
+            </a:r>
+            <a:endParaRPr lang="ru-RU" sz="2400" dirty="0"/>
+          </a:p>
+        </p:txBody>
+      </p:sp>
+    </p:spTree>
+    <p:extLst>
+      <p:ext uri="{BB962C8B-B14F-4D97-AF65-F5344CB8AC3E}">
+        <p14:creationId xmlns:p14="http://schemas.microsoft.com/office/powerpoint/2010/main" val="3583458690"/>
+      </p:ext>
+    </p:extLst>
+  </p:cSld>
+  <p:clrMapOvr>
+    <a:masterClrMapping/>
+  </p:clrMapOvr>
+  <p:timing>
+    <p:tnLst>
+      <p:par>
+        <p:cTn id="1" dur="indefinite" restart="never" nodeType="tmRoot"/>
+      </p:par>
+    </p:tnLst>
+  </p:timing>
+</p:sld>
+</file>
+
+<file path=ppt/slides/slide46.xml><?xml version="1.0" encoding="utf-8"?>
+<p:sld xmlns:a="http://schemas.openxmlformats.org/drawingml/2006/main" xmlns:r="http://schemas.openxmlformats.org/officeDocument/2006/relationships" xmlns:p="http://schemas.openxmlformats.org/presentationml/2006/main">
+  <p:cSld>
+    <p:spTree>
+      <p:nvGrpSpPr>
+        <p:cNvPr id="1" name=""/>
+        <p:cNvGrpSpPr/>
+        <p:nvPr/>
+      </p:nvGrpSpPr>
+      <p:grpSpPr>
+        <a:xfrm>
+          <a:off x="0" y="0"/>
+          <a:ext cx="0" cy="0"/>
+          <a:chOff x="0" y="0"/>
+          <a:chExt cx="0" cy="0"/>
+        </a:xfrm>
+      </p:grpSpPr>
+      <p:sp>
+        <p:nvSpPr>
+          <p:cNvPr id="2" name="Title 1"/>
+          <p:cNvSpPr>
+            <a:spLocks noGrp="1"/>
+          </p:cNvSpPr>
+          <p:nvPr>
+            <p:ph type="title"/>
+          </p:nvPr>
+        </p:nvSpPr>
         <p:spPr/>
         <p:txBody>
           <a:bodyPr/>
@@ -17896,7 +18041,7 @@
 </p:sld>
 </file>
 
-<file path=ppt/slides/slide46.xml><?xml version="1.0" encoding="utf-8"?>
+<file path=ppt/slides/slide47.xml><?xml version="1.0" encoding="utf-8"?>
 <p:sld xmlns:a="http://schemas.openxmlformats.org/drawingml/2006/main" xmlns:r="http://schemas.openxmlformats.org/officeDocument/2006/relationships" xmlns:p="http://schemas.openxmlformats.org/presentationml/2006/main">
   <p:cSld>
     <p:spTree>
@@ -18767,7 +18912,7 @@
 </p:sld>
 </file>
 
-<file path=ppt/slides/slide47.xml><?xml version="1.0" encoding="utf-8"?>
+<file path=ppt/slides/slide48.xml><?xml version="1.0" encoding="utf-8"?>
 <p:sld xmlns:a="http://schemas.openxmlformats.org/drawingml/2006/main" xmlns:r="http://schemas.openxmlformats.org/officeDocument/2006/relationships" xmlns:p="http://schemas.openxmlformats.org/presentationml/2006/main">
   <p:cSld>
     <p:spTree>
@@ -19626,7 +19771,7 @@
 </p:sld>
 </file>
 
-<file path=ppt/slides/slide48.xml><?xml version="1.0" encoding="utf-8"?>
+<file path=ppt/slides/slide49.xml><?xml version="1.0" encoding="utf-8"?>
 <p:sld xmlns:a="http://schemas.openxmlformats.org/drawingml/2006/main" xmlns:r="http://schemas.openxmlformats.org/officeDocument/2006/relationships" xmlns:p="http://schemas.openxmlformats.org/presentationml/2006/main">
   <p:cSld>
     <p:spTree>
@@ -20264,719 +20409,6 @@
     <p:extLst>
       <p:ext uri="{BB962C8B-B14F-4D97-AF65-F5344CB8AC3E}">
         <p14:creationId xmlns:p14="http://schemas.microsoft.com/office/powerpoint/2010/main" val="2652139991"/>
-      </p:ext>
-    </p:extLst>
-  </p:cSld>
-  <p:clrMapOvr>
-    <a:masterClrMapping/>
-  </p:clrMapOvr>
-  <p:timing>
-    <p:tnLst>
-      <p:par>
-        <p:cTn id="1" dur="indefinite" restart="never" nodeType="tmRoot"/>
-      </p:par>
-    </p:tnLst>
-  </p:timing>
-</p:sld>
-</file>
-
-<file path=ppt/slides/slide49.xml><?xml version="1.0" encoding="utf-8"?>
-<p:sld xmlns:a="http://schemas.openxmlformats.org/drawingml/2006/main" xmlns:r="http://schemas.openxmlformats.org/officeDocument/2006/relationships" xmlns:p="http://schemas.openxmlformats.org/presentationml/2006/main">
-  <p:cSld>
-    <p:spTree>
-      <p:nvGrpSpPr>
-        <p:cNvPr id="1" name=""/>
-        <p:cNvGrpSpPr/>
-        <p:nvPr/>
-      </p:nvGrpSpPr>
-      <p:grpSpPr>
-        <a:xfrm>
-          <a:off x="0" y="0"/>
-          <a:ext cx="0" cy="0"/>
-          <a:chOff x="0" y="0"/>
-          <a:chExt cx="0" cy="0"/>
-        </a:xfrm>
-      </p:grpSpPr>
-      <p:sp>
-        <p:nvSpPr>
-          <p:cNvPr id="15362" name="Rectangle 3"/>
-          <p:cNvSpPr>
-            <a:spLocks noChangeArrowheads="1"/>
-          </p:cNvSpPr>
-          <p:nvPr/>
-        </p:nvSpPr>
-        <p:spPr bwMode="auto">
-          <a:xfrm>
-            <a:off x="152400" y="-4763"/>
-            <a:ext cx="8763000" cy="461963"/>
-          </a:xfrm>
-          <a:prstGeom prst="rect">
-            <a:avLst/>
-          </a:prstGeom>
-          <a:noFill/>
-          <a:ln>
-            <a:noFill/>
-          </a:ln>
-          <a:extLst>
-            <a:ext uri="{909E8E84-426E-40DD-AFC4-6F175D3DCCD1}">
-              <a14:hiddenFill xmlns:a14="http://schemas.microsoft.com/office/drawing/2010/main">
-                <a:solidFill>
-                  <a:srgbClr val="FFFFFF"/>
-                </a:solidFill>
-              </a14:hiddenFill>
-            </a:ext>
-            <a:ext uri="{91240B29-F687-4F45-9708-019B960494DF}">
-              <a14:hiddenLine xmlns:a14="http://schemas.microsoft.com/office/drawing/2010/main" w="9525">
-                <a:solidFill>
-                  <a:srgbClr val="000000"/>
-                </a:solidFill>
-                <a:miter lim="800000"/>
-                <a:headEnd/>
-                <a:tailEnd/>
-              </a14:hiddenLine>
-            </a:ext>
-          </a:extLst>
-        </p:spPr>
-        <p:txBody>
-          <a:bodyPr anchor="ctr">
-            <a:spAutoFit/>
-          </a:bodyPr>
-          <a:lstStyle/>
-          <a:p>
-            <a:pPr algn="ctr"/>
-            <a:r>
-              <a:rPr lang="ru-RU" sz="2400" b="1"/>
-              <a:t>Процессы и домены</a:t>
-            </a:r>
-            <a:r>
-              <a:rPr lang="en-US" sz="2400" b="1"/>
-              <a:t>.</a:t>
-            </a:r>
-          </a:p>
-        </p:txBody>
-      </p:sp>
-      <p:sp>
-        <p:nvSpPr>
-          <p:cNvPr id="15363" name="Rectangle 3"/>
-          <p:cNvSpPr>
-            <a:spLocks noChangeArrowheads="1"/>
-          </p:cNvSpPr>
-          <p:nvPr/>
-        </p:nvSpPr>
-        <p:spPr bwMode="auto">
-          <a:xfrm>
-            <a:off x="152400" y="457200"/>
-            <a:ext cx="8839200" cy="830263"/>
-          </a:xfrm>
-          <a:prstGeom prst="rect">
-            <a:avLst/>
-          </a:prstGeom>
-          <a:noFill/>
-          <a:ln>
-            <a:noFill/>
-          </a:ln>
-          <a:extLst>
-            <a:ext uri="{909E8E84-426E-40DD-AFC4-6F175D3DCCD1}">
-              <a14:hiddenFill xmlns:a14="http://schemas.microsoft.com/office/drawing/2010/main">
-                <a:solidFill>
-                  <a:srgbClr val="FFFFFF"/>
-                </a:solidFill>
-              </a14:hiddenFill>
-            </a:ext>
-            <a:ext uri="{91240B29-F687-4F45-9708-019B960494DF}">
-              <a14:hiddenLine xmlns:a14="http://schemas.microsoft.com/office/drawing/2010/main" w="9525">
-                <a:solidFill>
-                  <a:srgbClr val="000000"/>
-                </a:solidFill>
-                <a:miter lim="800000"/>
-                <a:headEnd/>
-                <a:tailEnd/>
-              </a14:hiddenLine>
-            </a:ext>
-          </a:extLst>
-        </p:spPr>
-        <p:txBody>
-          <a:bodyPr anchor="ctr">
-            <a:spAutoFit/>
-          </a:bodyPr>
-          <a:lstStyle/>
-          <a:p>
-            <a:endParaRPr lang="en-US" sz="1600"/>
-          </a:p>
-          <a:p>
-            <a:r>
-              <a:rPr lang="ru-RU" sz="1600"/>
-              <a:t>	Просмотр списка процессов</a:t>
-            </a:r>
-            <a:r>
-              <a:rPr lang="en-US" sz="1600"/>
-              <a:t>:</a:t>
-            </a:r>
-            <a:endParaRPr lang="ru-RU" sz="1600"/>
-          </a:p>
-          <a:p>
-            <a:r>
-              <a:rPr lang="ru-RU" sz="1600"/>
-              <a:t>	</a:t>
-            </a:r>
-          </a:p>
-        </p:txBody>
-      </p:sp>
-      <p:sp>
-        <p:nvSpPr>
-          <p:cNvPr id="39937" name="Rectangle 1"/>
-          <p:cNvSpPr>
-            <a:spLocks noChangeArrowheads="1"/>
-          </p:cNvSpPr>
-          <p:nvPr/>
-        </p:nvSpPr>
-        <p:spPr bwMode="auto">
-          <a:xfrm>
-            <a:off x="152400" y="1066800"/>
-            <a:ext cx="8839200" cy="1477963"/>
-          </a:xfrm>
-          <a:prstGeom prst="rect">
-            <a:avLst/>
-          </a:prstGeom>
-          <a:noFill/>
-          <a:ln w="9525">
-            <a:solidFill>
-              <a:schemeClr val="bg1">
-                <a:lumMod val="65000"/>
-              </a:schemeClr>
-            </a:solidFill>
-            <a:miter lim="800000"/>
-            <a:headEnd/>
-            <a:tailEnd/>
-          </a:ln>
-          <a:effectLst/>
-        </p:spPr>
-        <p:txBody>
-          <a:bodyPr anchor="ctr">
-            <a:spAutoFit/>
-          </a:bodyPr>
-          <a:lstStyle/>
-          <a:p>
-            <a:pPr eaLnBrk="0" hangingPunct="0">
-              <a:defRPr/>
-            </a:pPr>
-            <a:r>
-              <a:rPr lang="be-BY" sz="1000" dirty="0">
-                <a:solidFill>
-                  <a:schemeClr val="bg1"/>
-                </a:solidFill>
-                <a:latin typeface="Courier New" pitchFamily="49" charset="0"/>
-                <a:ea typeface="Calibri" pitchFamily="34" charset="0"/>
-                <a:cs typeface="Courier New" pitchFamily="49" charset="0"/>
-              </a:rPr>
-              <a:t>            Process current = Process.GetCurrentProcess();</a:t>
-            </a:r>
-            <a:endParaRPr lang="be-BY" sz="900" dirty="0">
-              <a:solidFill>
-                <a:schemeClr val="bg1"/>
-              </a:solidFill>
-              <a:latin typeface="Arial" pitchFamily="34" charset="0"/>
-            </a:endParaRPr>
-          </a:p>
-          <a:p>
-            <a:pPr eaLnBrk="0" hangingPunct="0">
-              <a:defRPr/>
-            </a:pPr>
-            <a:r>
-              <a:rPr lang="be-BY" sz="1000" dirty="0">
-                <a:solidFill>
-                  <a:schemeClr val="bg1"/>
-                </a:solidFill>
-                <a:latin typeface="Courier New" pitchFamily="49" charset="0"/>
-                <a:ea typeface="Calibri" pitchFamily="34" charset="0"/>
-                <a:cs typeface="Courier New" pitchFamily="49" charset="0"/>
-              </a:rPr>
-              <a:t>            foreach (Process p in Process.GetProcesses())</a:t>
-            </a:r>
-            <a:endParaRPr lang="be-BY" sz="900" dirty="0">
-              <a:solidFill>
-                <a:schemeClr val="bg1"/>
-              </a:solidFill>
-              <a:latin typeface="Arial" pitchFamily="34" charset="0"/>
-            </a:endParaRPr>
-          </a:p>
-          <a:p>
-            <a:pPr eaLnBrk="0" hangingPunct="0">
-              <a:defRPr/>
-            </a:pPr>
-            <a:r>
-              <a:rPr lang="be-BY" sz="1000" dirty="0">
-                <a:solidFill>
-                  <a:schemeClr val="bg1"/>
-                </a:solidFill>
-                <a:latin typeface="Courier New" pitchFamily="49" charset="0"/>
-                <a:ea typeface="Calibri" pitchFamily="34" charset="0"/>
-                <a:cs typeface="Courier New" pitchFamily="49" charset="0"/>
-              </a:rPr>
-              <a:t>            {</a:t>
-            </a:r>
-            <a:endParaRPr lang="be-BY" sz="900" dirty="0">
-              <a:solidFill>
-                <a:schemeClr val="bg1"/>
-              </a:solidFill>
-              <a:latin typeface="Arial" pitchFamily="34" charset="0"/>
-            </a:endParaRPr>
-          </a:p>
-          <a:p>
-            <a:pPr eaLnBrk="0" hangingPunct="0">
-              <a:defRPr/>
-            </a:pPr>
-            <a:r>
-              <a:rPr lang="be-BY" sz="1000" dirty="0">
-                <a:solidFill>
-                  <a:schemeClr val="bg1"/>
-                </a:solidFill>
-                <a:latin typeface="Courier New" pitchFamily="49" charset="0"/>
-                <a:ea typeface="Calibri" pitchFamily="34" charset="0"/>
-                <a:cs typeface="Courier New" pitchFamily="49" charset="0"/>
-              </a:rPr>
-              <a:t>                try</a:t>
-            </a:r>
-            <a:endParaRPr lang="be-BY" sz="900" dirty="0">
-              <a:solidFill>
-                <a:schemeClr val="bg1"/>
-              </a:solidFill>
-              <a:latin typeface="Arial" pitchFamily="34" charset="0"/>
-            </a:endParaRPr>
-          </a:p>
-          <a:p>
-            <a:pPr eaLnBrk="0" hangingPunct="0">
-              <a:defRPr/>
-            </a:pPr>
-            <a:r>
-              <a:rPr lang="be-BY" sz="1000" dirty="0">
-                <a:solidFill>
-                  <a:schemeClr val="bg1"/>
-                </a:solidFill>
-                <a:latin typeface="Courier New" pitchFamily="49" charset="0"/>
-                <a:ea typeface="Calibri" pitchFamily="34" charset="0"/>
-                <a:cs typeface="Courier New" pitchFamily="49" charset="0"/>
-              </a:rPr>
-              <a:t>                {</a:t>
-            </a:r>
-            <a:endParaRPr lang="be-BY" sz="900" dirty="0">
-              <a:solidFill>
-                <a:schemeClr val="bg1"/>
-              </a:solidFill>
-              <a:latin typeface="Arial" pitchFamily="34" charset="0"/>
-            </a:endParaRPr>
-          </a:p>
-          <a:p>
-            <a:pPr eaLnBrk="0" hangingPunct="0">
-              <a:defRPr/>
-            </a:pPr>
-            <a:r>
-              <a:rPr lang="be-BY" sz="1000" dirty="0">
-                <a:solidFill>
-                  <a:schemeClr val="bg1"/>
-                </a:solidFill>
-                <a:latin typeface="Courier New" pitchFamily="49" charset="0"/>
-                <a:ea typeface="Calibri" pitchFamily="34" charset="0"/>
-                <a:cs typeface="Courier New" pitchFamily="49" charset="0"/>
-              </a:rPr>
-              <a:t>                    Console.WriteLine("{0}\t{1}\t\t{2}", p.Id, p.ProcessName, p.StartTime);</a:t>
-            </a:r>
-            <a:endParaRPr lang="be-BY" sz="900" dirty="0">
-              <a:solidFill>
-                <a:schemeClr val="bg1"/>
-              </a:solidFill>
-              <a:latin typeface="Arial" pitchFamily="34" charset="0"/>
-            </a:endParaRPr>
-          </a:p>
-          <a:p>
-            <a:pPr eaLnBrk="0" hangingPunct="0">
-              <a:defRPr/>
-            </a:pPr>
-            <a:r>
-              <a:rPr lang="be-BY" sz="1000" dirty="0">
-                <a:solidFill>
-                  <a:schemeClr val="bg1"/>
-                </a:solidFill>
-                <a:latin typeface="Courier New" pitchFamily="49" charset="0"/>
-                <a:ea typeface="Calibri" pitchFamily="34" charset="0"/>
-                <a:cs typeface="Courier New" pitchFamily="49" charset="0"/>
-              </a:rPr>
-              <a:t>                }</a:t>
-            </a:r>
-            <a:endParaRPr lang="be-BY" sz="900" dirty="0">
-              <a:solidFill>
-                <a:schemeClr val="bg1"/>
-              </a:solidFill>
-              <a:latin typeface="Arial" pitchFamily="34" charset="0"/>
-            </a:endParaRPr>
-          </a:p>
-          <a:p>
-            <a:pPr eaLnBrk="0" hangingPunct="0">
-              <a:defRPr/>
-            </a:pPr>
-            <a:r>
-              <a:rPr lang="be-BY" sz="1000" dirty="0">
-                <a:solidFill>
-                  <a:schemeClr val="bg1"/>
-                </a:solidFill>
-                <a:latin typeface="Courier New" pitchFamily="49" charset="0"/>
-                <a:ea typeface="Calibri" pitchFamily="34" charset="0"/>
-                <a:cs typeface="Courier New" pitchFamily="49" charset="0"/>
-              </a:rPr>
-              <a:t>                catch { }</a:t>
-            </a:r>
-            <a:endParaRPr lang="be-BY" sz="900" dirty="0">
-              <a:solidFill>
-                <a:schemeClr val="bg1"/>
-              </a:solidFill>
-              <a:latin typeface="Arial" pitchFamily="34" charset="0"/>
-            </a:endParaRPr>
-          </a:p>
-          <a:p>
-            <a:pPr eaLnBrk="0" hangingPunct="0">
-              <a:defRPr/>
-            </a:pPr>
-            <a:r>
-              <a:rPr lang="be-BY" sz="1000" dirty="0">
-                <a:solidFill>
-                  <a:schemeClr val="bg1"/>
-                </a:solidFill>
-                <a:latin typeface="Courier New" pitchFamily="49" charset="0"/>
-                <a:ea typeface="Calibri" pitchFamily="34" charset="0"/>
-                <a:cs typeface="Courier New" pitchFamily="49" charset="0"/>
-              </a:rPr>
-              <a:t>            }</a:t>
-            </a:r>
-            <a:endParaRPr lang="be-BY" dirty="0">
-              <a:solidFill>
-                <a:schemeClr val="bg1"/>
-              </a:solidFill>
-              <a:latin typeface="Arial" pitchFamily="34" charset="0"/>
-            </a:endParaRPr>
-          </a:p>
-        </p:txBody>
-      </p:sp>
-      <p:sp>
-        <p:nvSpPr>
-          <p:cNvPr id="39939" name="Rectangle 3"/>
-          <p:cNvSpPr>
-            <a:spLocks noChangeArrowheads="1"/>
-          </p:cNvSpPr>
-          <p:nvPr/>
-        </p:nvSpPr>
-        <p:spPr bwMode="auto">
-          <a:xfrm>
-            <a:off x="152400" y="3059113"/>
-            <a:ext cx="8839200" cy="554037"/>
-          </a:xfrm>
-          <a:prstGeom prst="rect">
-            <a:avLst/>
-          </a:prstGeom>
-          <a:noFill/>
-          <a:ln w="9525">
-            <a:solidFill>
-              <a:schemeClr val="bg1">
-                <a:lumMod val="65000"/>
-              </a:schemeClr>
-            </a:solidFill>
-            <a:miter lim="800000"/>
-            <a:headEnd/>
-            <a:tailEnd/>
-          </a:ln>
-          <a:effectLst/>
-        </p:spPr>
-        <p:txBody>
-          <a:bodyPr anchor="ctr">
-            <a:spAutoFit/>
-          </a:bodyPr>
-          <a:lstStyle/>
-          <a:p>
-            <a:pPr eaLnBrk="0" hangingPunct="0">
-              <a:defRPr/>
-            </a:pPr>
-            <a:r>
-              <a:rPr lang="be-BY" sz="1000" dirty="0">
-                <a:solidFill>
-                  <a:schemeClr val="bg1"/>
-                </a:solidFill>
-                <a:latin typeface="Courier New" pitchFamily="49" charset="0"/>
-                <a:ea typeface="Calibri" pitchFamily="34" charset="0"/>
-                <a:cs typeface="Courier New" pitchFamily="49" charset="0"/>
-              </a:rPr>
-              <a:t>            Process p = Process.Start("notepad.exe");</a:t>
-            </a:r>
-            <a:endParaRPr lang="be-BY" sz="900" dirty="0">
-              <a:solidFill>
-                <a:schemeClr val="bg1"/>
-              </a:solidFill>
-              <a:latin typeface="Arial" pitchFamily="34" charset="0"/>
-            </a:endParaRPr>
-          </a:p>
-          <a:p>
-            <a:pPr eaLnBrk="0" hangingPunct="0">
-              <a:defRPr/>
-            </a:pPr>
-            <a:r>
-              <a:rPr lang="be-BY" sz="1000" dirty="0">
-                <a:solidFill>
-                  <a:schemeClr val="bg1"/>
-                </a:solidFill>
-                <a:latin typeface="Courier New" pitchFamily="49" charset="0"/>
-                <a:ea typeface="Calibri" pitchFamily="34" charset="0"/>
-                <a:cs typeface="Courier New" pitchFamily="49" charset="0"/>
-              </a:rPr>
-              <a:t>            Thread.Sleep(5000);</a:t>
-            </a:r>
-            <a:endParaRPr lang="be-BY" sz="900" dirty="0">
-              <a:solidFill>
-                <a:schemeClr val="bg1"/>
-              </a:solidFill>
-              <a:latin typeface="Arial" pitchFamily="34" charset="0"/>
-            </a:endParaRPr>
-          </a:p>
-          <a:p>
-            <a:pPr eaLnBrk="0" hangingPunct="0">
-              <a:defRPr/>
-            </a:pPr>
-            <a:r>
-              <a:rPr lang="be-BY" sz="1000" dirty="0">
-                <a:solidFill>
-                  <a:schemeClr val="bg1"/>
-                </a:solidFill>
-                <a:latin typeface="Courier New" pitchFamily="49" charset="0"/>
-                <a:ea typeface="Calibri" pitchFamily="34" charset="0"/>
-                <a:cs typeface="Courier New" pitchFamily="49" charset="0"/>
-              </a:rPr>
-              <a:t>            p.Kill();</a:t>
-            </a:r>
-            <a:endParaRPr lang="be-BY" dirty="0">
-              <a:solidFill>
-                <a:schemeClr val="bg1"/>
-              </a:solidFill>
-              <a:latin typeface="Arial" pitchFamily="34" charset="0"/>
-            </a:endParaRPr>
-          </a:p>
-        </p:txBody>
-      </p:sp>
-      <p:sp>
-        <p:nvSpPr>
-          <p:cNvPr id="39940" name="Rectangle 4"/>
-          <p:cNvSpPr>
-            <a:spLocks noChangeArrowheads="1"/>
-          </p:cNvSpPr>
-          <p:nvPr/>
-        </p:nvSpPr>
-        <p:spPr bwMode="auto">
-          <a:xfrm>
-            <a:off x="152400" y="4191000"/>
-            <a:ext cx="8839200" cy="554038"/>
-          </a:xfrm>
-          <a:prstGeom prst="rect">
-            <a:avLst/>
-          </a:prstGeom>
-          <a:noFill/>
-          <a:ln w="9525">
-            <a:solidFill>
-              <a:schemeClr val="bg1">
-                <a:lumMod val="65000"/>
-              </a:schemeClr>
-            </a:solidFill>
-            <a:miter lim="800000"/>
-            <a:headEnd/>
-            <a:tailEnd/>
-          </a:ln>
-          <a:effectLst/>
-        </p:spPr>
-        <p:txBody>
-          <a:bodyPr anchor="ctr">
-            <a:spAutoFit/>
-          </a:bodyPr>
-          <a:lstStyle/>
-          <a:p>
-            <a:pPr eaLnBrk="0" hangingPunct="0"/>
-            <a:r>
-              <a:rPr lang="be-BY" sz="1000" dirty="0">
-                <a:solidFill>
-                  <a:schemeClr val="bg1"/>
-                </a:solidFill>
-                <a:latin typeface="Courier New" pitchFamily="49" charset="0"/>
-                <a:ea typeface="Calibri" pitchFamily="34" charset="0"/>
-                <a:cs typeface="Courier New" pitchFamily="49" charset="0"/>
-              </a:rPr>
-              <a:t>            AppDomain newDomain = AppDomain.CreateDomain("nd");	//Создаем новый домен</a:t>
-            </a:r>
-            <a:endParaRPr lang="be-BY" sz="900" dirty="0">
-              <a:solidFill>
-                <a:schemeClr val="bg1"/>
-              </a:solidFill>
-              <a:ea typeface="Calibri" pitchFamily="34" charset="0"/>
-              <a:cs typeface="Courier New" pitchFamily="49" charset="0"/>
-            </a:endParaRPr>
-          </a:p>
-          <a:p>
-            <a:pPr eaLnBrk="0" hangingPunct="0"/>
-            <a:r>
-              <a:rPr lang="be-BY" sz="1000" dirty="0">
-                <a:solidFill>
-                  <a:schemeClr val="bg1"/>
-                </a:solidFill>
-                <a:latin typeface="Courier New" pitchFamily="49" charset="0"/>
-                <a:ea typeface="Calibri" pitchFamily="34" charset="0"/>
-                <a:cs typeface="Courier New" pitchFamily="49" charset="0"/>
-              </a:rPr>
-              <a:t>            newDomain.Load("assemblyName");			//Загружаем в него сборку</a:t>
-            </a:r>
-            <a:endParaRPr lang="be-BY" sz="900" dirty="0">
-              <a:solidFill>
-                <a:schemeClr val="bg1"/>
-              </a:solidFill>
-              <a:ea typeface="Calibri" pitchFamily="34" charset="0"/>
-              <a:cs typeface="Courier New" pitchFamily="49" charset="0"/>
-            </a:endParaRPr>
-          </a:p>
-          <a:p>
-            <a:pPr eaLnBrk="0" hangingPunct="0"/>
-            <a:r>
-              <a:rPr lang="be-BY" sz="1000" dirty="0">
-                <a:solidFill>
-                  <a:schemeClr val="bg1"/>
-                </a:solidFill>
-                <a:latin typeface="Courier New" pitchFamily="49" charset="0"/>
-                <a:ea typeface="Calibri" pitchFamily="34" charset="0"/>
-                <a:cs typeface="Courier New" pitchFamily="49" charset="0"/>
-              </a:rPr>
-              <a:t>            AppDomain.Unload(newDomain);			//Выгружаем домен</a:t>
-            </a:r>
-            <a:endParaRPr lang="be-BY" dirty="0">
-              <a:solidFill>
-                <a:schemeClr val="bg1"/>
-              </a:solidFill>
-              <a:ea typeface="Calibri" pitchFamily="34" charset="0"/>
-              <a:cs typeface="Courier New" pitchFamily="49" charset="0"/>
-            </a:endParaRPr>
-          </a:p>
-        </p:txBody>
-      </p:sp>
-      <p:sp>
-        <p:nvSpPr>
-          <p:cNvPr id="15367" name="Rectangle 3"/>
-          <p:cNvSpPr>
-            <a:spLocks noChangeArrowheads="1"/>
-          </p:cNvSpPr>
-          <p:nvPr/>
-        </p:nvSpPr>
-        <p:spPr bwMode="auto">
-          <a:xfrm>
-            <a:off x="152400" y="2743200"/>
-            <a:ext cx="8839200" cy="339725"/>
-          </a:xfrm>
-          <a:prstGeom prst="rect">
-            <a:avLst/>
-          </a:prstGeom>
-          <a:noFill/>
-          <a:ln>
-            <a:noFill/>
-          </a:ln>
-          <a:extLst>
-            <a:ext uri="{909E8E84-426E-40DD-AFC4-6F175D3DCCD1}">
-              <a14:hiddenFill xmlns:a14="http://schemas.microsoft.com/office/drawing/2010/main">
-                <a:solidFill>
-                  <a:srgbClr val="FFFFFF"/>
-                </a:solidFill>
-              </a14:hiddenFill>
-            </a:ext>
-            <a:ext uri="{91240B29-F687-4F45-9708-019B960494DF}">
-              <a14:hiddenLine xmlns:a14="http://schemas.microsoft.com/office/drawing/2010/main" w="9525">
-                <a:solidFill>
-                  <a:srgbClr val="000000"/>
-                </a:solidFill>
-                <a:miter lim="800000"/>
-                <a:headEnd/>
-                <a:tailEnd/>
-              </a14:hiddenLine>
-            </a:ext>
-          </a:extLst>
-        </p:spPr>
-        <p:txBody>
-          <a:bodyPr anchor="ctr">
-            <a:spAutoFit/>
-          </a:bodyPr>
-          <a:lstStyle/>
-          <a:p>
-            <a:r>
-              <a:rPr lang="ru-RU" sz="1600"/>
-              <a:t>	Создание нового процесса</a:t>
-            </a:r>
-            <a:r>
-              <a:rPr lang="en-US" sz="1600"/>
-              <a:t>:</a:t>
-            </a:r>
-            <a:endParaRPr lang="ru-RU" sz="1600"/>
-          </a:p>
-        </p:txBody>
-      </p:sp>
-      <p:sp>
-        <p:nvSpPr>
-          <p:cNvPr id="15368" name="Rectangle 3"/>
-          <p:cNvSpPr>
-            <a:spLocks noChangeArrowheads="1"/>
-          </p:cNvSpPr>
-          <p:nvPr/>
-        </p:nvSpPr>
-        <p:spPr bwMode="auto">
-          <a:xfrm>
-            <a:off x="152400" y="3886200"/>
-            <a:ext cx="8839200" cy="338138"/>
-          </a:xfrm>
-          <a:prstGeom prst="rect">
-            <a:avLst/>
-          </a:prstGeom>
-          <a:noFill/>
-          <a:ln>
-            <a:noFill/>
-          </a:ln>
-          <a:extLst>
-            <a:ext uri="{909E8E84-426E-40DD-AFC4-6F175D3DCCD1}">
-              <a14:hiddenFill xmlns:a14="http://schemas.microsoft.com/office/drawing/2010/main">
-                <a:solidFill>
-                  <a:srgbClr val="FFFFFF"/>
-                </a:solidFill>
-              </a14:hiddenFill>
-            </a:ext>
-            <a:ext uri="{91240B29-F687-4F45-9708-019B960494DF}">
-              <a14:hiddenLine xmlns:a14="http://schemas.microsoft.com/office/drawing/2010/main" w="9525">
-                <a:solidFill>
-                  <a:srgbClr val="000000"/>
-                </a:solidFill>
-                <a:miter lim="800000"/>
-                <a:headEnd/>
-                <a:tailEnd/>
-              </a14:hiddenLine>
-            </a:ext>
-          </a:extLst>
-        </p:spPr>
-        <p:txBody>
-          <a:bodyPr anchor="ctr">
-            <a:spAutoFit/>
-          </a:bodyPr>
-          <a:lstStyle/>
-          <a:p>
-            <a:r>
-              <a:rPr lang="ru-RU" sz="1600"/>
-              <a:t>	Создание домена в рамках  текущего процесса</a:t>
-            </a:r>
-            <a:r>
-              <a:rPr lang="en-US" sz="1600"/>
-              <a:t>:</a:t>
-            </a:r>
-            <a:endParaRPr lang="ru-RU" sz="1600"/>
-          </a:p>
-        </p:txBody>
-      </p:sp>
-    </p:spTree>
-    <p:extLst>
-      <p:ext uri="{BB962C8B-B14F-4D97-AF65-F5344CB8AC3E}">
-        <p14:creationId xmlns:p14="http://schemas.microsoft.com/office/powerpoint/2010/main" val="3777989149"/>
       </p:ext>
     </p:extLst>
   </p:cSld>
@@ -22450,6 +21882,719 @@
 </p:sld>
 </file>
 
+<file path=ppt/slides/slide50.xml><?xml version="1.0" encoding="utf-8"?>
+<p:sld xmlns:a="http://schemas.openxmlformats.org/drawingml/2006/main" xmlns:r="http://schemas.openxmlformats.org/officeDocument/2006/relationships" xmlns:p="http://schemas.openxmlformats.org/presentationml/2006/main">
+  <p:cSld>
+    <p:spTree>
+      <p:nvGrpSpPr>
+        <p:cNvPr id="1" name=""/>
+        <p:cNvGrpSpPr/>
+        <p:nvPr/>
+      </p:nvGrpSpPr>
+      <p:grpSpPr>
+        <a:xfrm>
+          <a:off x="0" y="0"/>
+          <a:ext cx="0" cy="0"/>
+          <a:chOff x="0" y="0"/>
+          <a:chExt cx="0" cy="0"/>
+        </a:xfrm>
+      </p:grpSpPr>
+      <p:sp>
+        <p:nvSpPr>
+          <p:cNvPr id="15362" name="Rectangle 3"/>
+          <p:cNvSpPr>
+            <a:spLocks noChangeArrowheads="1"/>
+          </p:cNvSpPr>
+          <p:nvPr/>
+        </p:nvSpPr>
+        <p:spPr bwMode="auto">
+          <a:xfrm>
+            <a:off x="152400" y="-4763"/>
+            <a:ext cx="8763000" cy="461963"/>
+          </a:xfrm>
+          <a:prstGeom prst="rect">
+            <a:avLst/>
+          </a:prstGeom>
+          <a:noFill/>
+          <a:ln>
+            <a:noFill/>
+          </a:ln>
+          <a:extLst>
+            <a:ext uri="{909E8E84-426E-40DD-AFC4-6F175D3DCCD1}">
+              <a14:hiddenFill xmlns:a14="http://schemas.microsoft.com/office/drawing/2010/main">
+                <a:solidFill>
+                  <a:srgbClr val="FFFFFF"/>
+                </a:solidFill>
+              </a14:hiddenFill>
+            </a:ext>
+            <a:ext uri="{91240B29-F687-4F45-9708-019B960494DF}">
+              <a14:hiddenLine xmlns:a14="http://schemas.microsoft.com/office/drawing/2010/main" w="9525">
+                <a:solidFill>
+                  <a:srgbClr val="000000"/>
+                </a:solidFill>
+                <a:miter lim="800000"/>
+                <a:headEnd/>
+                <a:tailEnd/>
+              </a14:hiddenLine>
+            </a:ext>
+          </a:extLst>
+        </p:spPr>
+        <p:txBody>
+          <a:bodyPr anchor="ctr">
+            <a:spAutoFit/>
+          </a:bodyPr>
+          <a:lstStyle/>
+          <a:p>
+            <a:pPr algn="ctr"/>
+            <a:r>
+              <a:rPr lang="ru-RU" sz="2400" b="1"/>
+              <a:t>Процессы и домены</a:t>
+            </a:r>
+            <a:r>
+              <a:rPr lang="en-US" sz="2400" b="1"/>
+              <a:t>.</a:t>
+            </a:r>
+          </a:p>
+        </p:txBody>
+      </p:sp>
+      <p:sp>
+        <p:nvSpPr>
+          <p:cNvPr id="15363" name="Rectangle 3"/>
+          <p:cNvSpPr>
+            <a:spLocks noChangeArrowheads="1"/>
+          </p:cNvSpPr>
+          <p:nvPr/>
+        </p:nvSpPr>
+        <p:spPr bwMode="auto">
+          <a:xfrm>
+            <a:off x="152400" y="457200"/>
+            <a:ext cx="8839200" cy="830263"/>
+          </a:xfrm>
+          <a:prstGeom prst="rect">
+            <a:avLst/>
+          </a:prstGeom>
+          <a:noFill/>
+          <a:ln>
+            <a:noFill/>
+          </a:ln>
+          <a:extLst>
+            <a:ext uri="{909E8E84-426E-40DD-AFC4-6F175D3DCCD1}">
+              <a14:hiddenFill xmlns:a14="http://schemas.microsoft.com/office/drawing/2010/main">
+                <a:solidFill>
+                  <a:srgbClr val="FFFFFF"/>
+                </a:solidFill>
+              </a14:hiddenFill>
+            </a:ext>
+            <a:ext uri="{91240B29-F687-4F45-9708-019B960494DF}">
+              <a14:hiddenLine xmlns:a14="http://schemas.microsoft.com/office/drawing/2010/main" w="9525">
+                <a:solidFill>
+                  <a:srgbClr val="000000"/>
+                </a:solidFill>
+                <a:miter lim="800000"/>
+                <a:headEnd/>
+                <a:tailEnd/>
+              </a14:hiddenLine>
+            </a:ext>
+          </a:extLst>
+        </p:spPr>
+        <p:txBody>
+          <a:bodyPr anchor="ctr">
+            <a:spAutoFit/>
+          </a:bodyPr>
+          <a:lstStyle/>
+          <a:p>
+            <a:endParaRPr lang="en-US" sz="1600"/>
+          </a:p>
+          <a:p>
+            <a:r>
+              <a:rPr lang="ru-RU" sz="1600"/>
+              <a:t>	Просмотр списка процессов</a:t>
+            </a:r>
+            <a:r>
+              <a:rPr lang="en-US" sz="1600"/>
+              <a:t>:</a:t>
+            </a:r>
+            <a:endParaRPr lang="ru-RU" sz="1600"/>
+          </a:p>
+          <a:p>
+            <a:r>
+              <a:rPr lang="ru-RU" sz="1600"/>
+              <a:t>	</a:t>
+            </a:r>
+          </a:p>
+        </p:txBody>
+      </p:sp>
+      <p:sp>
+        <p:nvSpPr>
+          <p:cNvPr id="39937" name="Rectangle 1"/>
+          <p:cNvSpPr>
+            <a:spLocks noChangeArrowheads="1"/>
+          </p:cNvSpPr>
+          <p:nvPr/>
+        </p:nvSpPr>
+        <p:spPr bwMode="auto">
+          <a:xfrm>
+            <a:off x="152400" y="1066800"/>
+            <a:ext cx="8839200" cy="1477963"/>
+          </a:xfrm>
+          <a:prstGeom prst="rect">
+            <a:avLst/>
+          </a:prstGeom>
+          <a:noFill/>
+          <a:ln w="9525">
+            <a:solidFill>
+              <a:schemeClr val="bg1">
+                <a:lumMod val="65000"/>
+              </a:schemeClr>
+            </a:solidFill>
+            <a:miter lim="800000"/>
+            <a:headEnd/>
+            <a:tailEnd/>
+          </a:ln>
+          <a:effectLst/>
+        </p:spPr>
+        <p:txBody>
+          <a:bodyPr anchor="ctr">
+            <a:spAutoFit/>
+          </a:bodyPr>
+          <a:lstStyle/>
+          <a:p>
+            <a:pPr eaLnBrk="0" hangingPunct="0">
+              <a:defRPr/>
+            </a:pPr>
+            <a:r>
+              <a:rPr lang="be-BY" sz="1000" dirty="0">
+                <a:solidFill>
+                  <a:schemeClr val="bg1"/>
+                </a:solidFill>
+                <a:latin typeface="Courier New" pitchFamily="49" charset="0"/>
+                <a:ea typeface="Calibri" pitchFamily="34" charset="0"/>
+                <a:cs typeface="Courier New" pitchFamily="49" charset="0"/>
+              </a:rPr>
+              <a:t>            Process current = Process.GetCurrentProcess();</a:t>
+            </a:r>
+            <a:endParaRPr lang="be-BY" sz="900" dirty="0">
+              <a:solidFill>
+                <a:schemeClr val="bg1"/>
+              </a:solidFill>
+              <a:latin typeface="Arial" pitchFamily="34" charset="0"/>
+            </a:endParaRPr>
+          </a:p>
+          <a:p>
+            <a:pPr eaLnBrk="0" hangingPunct="0">
+              <a:defRPr/>
+            </a:pPr>
+            <a:r>
+              <a:rPr lang="be-BY" sz="1000" dirty="0">
+                <a:solidFill>
+                  <a:schemeClr val="bg1"/>
+                </a:solidFill>
+                <a:latin typeface="Courier New" pitchFamily="49" charset="0"/>
+                <a:ea typeface="Calibri" pitchFamily="34" charset="0"/>
+                <a:cs typeface="Courier New" pitchFamily="49" charset="0"/>
+              </a:rPr>
+              <a:t>            foreach (Process p in Process.GetProcesses())</a:t>
+            </a:r>
+            <a:endParaRPr lang="be-BY" sz="900" dirty="0">
+              <a:solidFill>
+                <a:schemeClr val="bg1"/>
+              </a:solidFill>
+              <a:latin typeface="Arial" pitchFamily="34" charset="0"/>
+            </a:endParaRPr>
+          </a:p>
+          <a:p>
+            <a:pPr eaLnBrk="0" hangingPunct="0">
+              <a:defRPr/>
+            </a:pPr>
+            <a:r>
+              <a:rPr lang="be-BY" sz="1000" dirty="0">
+                <a:solidFill>
+                  <a:schemeClr val="bg1"/>
+                </a:solidFill>
+                <a:latin typeface="Courier New" pitchFamily="49" charset="0"/>
+                <a:ea typeface="Calibri" pitchFamily="34" charset="0"/>
+                <a:cs typeface="Courier New" pitchFamily="49" charset="0"/>
+              </a:rPr>
+              <a:t>            {</a:t>
+            </a:r>
+            <a:endParaRPr lang="be-BY" sz="900" dirty="0">
+              <a:solidFill>
+                <a:schemeClr val="bg1"/>
+              </a:solidFill>
+              <a:latin typeface="Arial" pitchFamily="34" charset="0"/>
+            </a:endParaRPr>
+          </a:p>
+          <a:p>
+            <a:pPr eaLnBrk="0" hangingPunct="0">
+              <a:defRPr/>
+            </a:pPr>
+            <a:r>
+              <a:rPr lang="be-BY" sz="1000" dirty="0">
+                <a:solidFill>
+                  <a:schemeClr val="bg1"/>
+                </a:solidFill>
+                <a:latin typeface="Courier New" pitchFamily="49" charset="0"/>
+                <a:ea typeface="Calibri" pitchFamily="34" charset="0"/>
+                <a:cs typeface="Courier New" pitchFamily="49" charset="0"/>
+              </a:rPr>
+              <a:t>                try</a:t>
+            </a:r>
+            <a:endParaRPr lang="be-BY" sz="900" dirty="0">
+              <a:solidFill>
+                <a:schemeClr val="bg1"/>
+              </a:solidFill>
+              <a:latin typeface="Arial" pitchFamily="34" charset="0"/>
+            </a:endParaRPr>
+          </a:p>
+          <a:p>
+            <a:pPr eaLnBrk="0" hangingPunct="0">
+              <a:defRPr/>
+            </a:pPr>
+            <a:r>
+              <a:rPr lang="be-BY" sz="1000" dirty="0">
+                <a:solidFill>
+                  <a:schemeClr val="bg1"/>
+                </a:solidFill>
+                <a:latin typeface="Courier New" pitchFamily="49" charset="0"/>
+                <a:ea typeface="Calibri" pitchFamily="34" charset="0"/>
+                <a:cs typeface="Courier New" pitchFamily="49" charset="0"/>
+              </a:rPr>
+              <a:t>                {</a:t>
+            </a:r>
+            <a:endParaRPr lang="be-BY" sz="900" dirty="0">
+              <a:solidFill>
+                <a:schemeClr val="bg1"/>
+              </a:solidFill>
+              <a:latin typeface="Arial" pitchFamily="34" charset="0"/>
+            </a:endParaRPr>
+          </a:p>
+          <a:p>
+            <a:pPr eaLnBrk="0" hangingPunct="0">
+              <a:defRPr/>
+            </a:pPr>
+            <a:r>
+              <a:rPr lang="be-BY" sz="1000" dirty="0">
+                <a:solidFill>
+                  <a:schemeClr val="bg1"/>
+                </a:solidFill>
+                <a:latin typeface="Courier New" pitchFamily="49" charset="0"/>
+                <a:ea typeface="Calibri" pitchFamily="34" charset="0"/>
+                <a:cs typeface="Courier New" pitchFamily="49" charset="0"/>
+              </a:rPr>
+              <a:t>                    Console.WriteLine("{0}\t{1}\t\t{2}", p.Id, p.ProcessName, p.StartTime);</a:t>
+            </a:r>
+            <a:endParaRPr lang="be-BY" sz="900" dirty="0">
+              <a:solidFill>
+                <a:schemeClr val="bg1"/>
+              </a:solidFill>
+              <a:latin typeface="Arial" pitchFamily="34" charset="0"/>
+            </a:endParaRPr>
+          </a:p>
+          <a:p>
+            <a:pPr eaLnBrk="0" hangingPunct="0">
+              <a:defRPr/>
+            </a:pPr>
+            <a:r>
+              <a:rPr lang="be-BY" sz="1000" dirty="0">
+                <a:solidFill>
+                  <a:schemeClr val="bg1"/>
+                </a:solidFill>
+                <a:latin typeface="Courier New" pitchFamily="49" charset="0"/>
+                <a:ea typeface="Calibri" pitchFamily="34" charset="0"/>
+                <a:cs typeface="Courier New" pitchFamily="49" charset="0"/>
+              </a:rPr>
+              <a:t>                }</a:t>
+            </a:r>
+            <a:endParaRPr lang="be-BY" sz="900" dirty="0">
+              <a:solidFill>
+                <a:schemeClr val="bg1"/>
+              </a:solidFill>
+              <a:latin typeface="Arial" pitchFamily="34" charset="0"/>
+            </a:endParaRPr>
+          </a:p>
+          <a:p>
+            <a:pPr eaLnBrk="0" hangingPunct="0">
+              <a:defRPr/>
+            </a:pPr>
+            <a:r>
+              <a:rPr lang="be-BY" sz="1000" dirty="0">
+                <a:solidFill>
+                  <a:schemeClr val="bg1"/>
+                </a:solidFill>
+                <a:latin typeface="Courier New" pitchFamily="49" charset="0"/>
+                <a:ea typeface="Calibri" pitchFamily="34" charset="0"/>
+                <a:cs typeface="Courier New" pitchFamily="49" charset="0"/>
+              </a:rPr>
+              <a:t>                catch { }</a:t>
+            </a:r>
+            <a:endParaRPr lang="be-BY" sz="900" dirty="0">
+              <a:solidFill>
+                <a:schemeClr val="bg1"/>
+              </a:solidFill>
+              <a:latin typeface="Arial" pitchFamily="34" charset="0"/>
+            </a:endParaRPr>
+          </a:p>
+          <a:p>
+            <a:pPr eaLnBrk="0" hangingPunct="0">
+              <a:defRPr/>
+            </a:pPr>
+            <a:r>
+              <a:rPr lang="be-BY" sz="1000" dirty="0">
+                <a:solidFill>
+                  <a:schemeClr val="bg1"/>
+                </a:solidFill>
+                <a:latin typeface="Courier New" pitchFamily="49" charset="0"/>
+                <a:ea typeface="Calibri" pitchFamily="34" charset="0"/>
+                <a:cs typeface="Courier New" pitchFamily="49" charset="0"/>
+              </a:rPr>
+              <a:t>            }</a:t>
+            </a:r>
+            <a:endParaRPr lang="be-BY" dirty="0">
+              <a:solidFill>
+                <a:schemeClr val="bg1"/>
+              </a:solidFill>
+              <a:latin typeface="Arial" pitchFamily="34" charset="0"/>
+            </a:endParaRPr>
+          </a:p>
+        </p:txBody>
+      </p:sp>
+      <p:sp>
+        <p:nvSpPr>
+          <p:cNvPr id="39939" name="Rectangle 3"/>
+          <p:cNvSpPr>
+            <a:spLocks noChangeArrowheads="1"/>
+          </p:cNvSpPr>
+          <p:nvPr/>
+        </p:nvSpPr>
+        <p:spPr bwMode="auto">
+          <a:xfrm>
+            <a:off x="152400" y="3059113"/>
+            <a:ext cx="8839200" cy="554037"/>
+          </a:xfrm>
+          <a:prstGeom prst="rect">
+            <a:avLst/>
+          </a:prstGeom>
+          <a:noFill/>
+          <a:ln w="9525">
+            <a:solidFill>
+              <a:schemeClr val="bg1">
+                <a:lumMod val="65000"/>
+              </a:schemeClr>
+            </a:solidFill>
+            <a:miter lim="800000"/>
+            <a:headEnd/>
+            <a:tailEnd/>
+          </a:ln>
+          <a:effectLst/>
+        </p:spPr>
+        <p:txBody>
+          <a:bodyPr anchor="ctr">
+            <a:spAutoFit/>
+          </a:bodyPr>
+          <a:lstStyle/>
+          <a:p>
+            <a:pPr eaLnBrk="0" hangingPunct="0">
+              <a:defRPr/>
+            </a:pPr>
+            <a:r>
+              <a:rPr lang="be-BY" sz="1000" dirty="0">
+                <a:solidFill>
+                  <a:schemeClr val="bg1"/>
+                </a:solidFill>
+                <a:latin typeface="Courier New" pitchFamily="49" charset="0"/>
+                <a:ea typeface="Calibri" pitchFamily="34" charset="0"/>
+                <a:cs typeface="Courier New" pitchFamily="49" charset="0"/>
+              </a:rPr>
+              <a:t>            Process p = Process.Start("notepad.exe");</a:t>
+            </a:r>
+            <a:endParaRPr lang="be-BY" sz="900" dirty="0">
+              <a:solidFill>
+                <a:schemeClr val="bg1"/>
+              </a:solidFill>
+              <a:latin typeface="Arial" pitchFamily="34" charset="0"/>
+            </a:endParaRPr>
+          </a:p>
+          <a:p>
+            <a:pPr eaLnBrk="0" hangingPunct="0">
+              <a:defRPr/>
+            </a:pPr>
+            <a:r>
+              <a:rPr lang="be-BY" sz="1000" dirty="0">
+                <a:solidFill>
+                  <a:schemeClr val="bg1"/>
+                </a:solidFill>
+                <a:latin typeface="Courier New" pitchFamily="49" charset="0"/>
+                <a:ea typeface="Calibri" pitchFamily="34" charset="0"/>
+                <a:cs typeface="Courier New" pitchFamily="49" charset="0"/>
+              </a:rPr>
+              <a:t>            Thread.Sleep(5000);</a:t>
+            </a:r>
+            <a:endParaRPr lang="be-BY" sz="900" dirty="0">
+              <a:solidFill>
+                <a:schemeClr val="bg1"/>
+              </a:solidFill>
+              <a:latin typeface="Arial" pitchFamily="34" charset="0"/>
+            </a:endParaRPr>
+          </a:p>
+          <a:p>
+            <a:pPr eaLnBrk="0" hangingPunct="0">
+              <a:defRPr/>
+            </a:pPr>
+            <a:r>
+              <a:rPr lang="be-BY" sz="1000" dirty="0">
+                <a:solidFill>
+                  <a:schemeClr val="bg1"/>
+                </a:solidFill>
+                <a:latin typeface="Courier New" pitchFamily="49" charset="0"/>
+                <a:ea typeface="Calibri" pitchFamily="34" charset="0"/>
+                <a:cs typeface="Courier New" pitchFamily="49" charset="0"/>
+              </a:rPr>
+              <a:t>            p.Kill();</a:t>
+            </a:r>
+            <a:endParaRPr lang="be-BY" dirty="0">
+              <a:solidFill>
+                <a:schemeClr val="bg1"/>
+              </a:solidFill>
+              <a:latin typeface="Arial" pitchFamily="34" charset="0"/>
+            </a:endParaRPr>
+          </a:p>
+        </p:txBody>
+      </p:sp>
+      <p:sp>
+        <p:nvSpPr>
+          <p:cNvPr id="39940" name="Rectangle 4"/>
+          <p:cNvSpPr>
+            <a:spLocks noChangeArrowheads="1"/>
+          </p:cNvSpPr>
+          <p:nvPr/>
+        </p:nvSpPr>
+        <p:spPr bwMode="auto">
+          <a:xfrm>
+            <a:off x="152400" y="4191000"/>
+            <a:ext cx="8839200" cy="554038"/>
+          </a:xfrm>
+          <a:prstGeom prst="rect">
+            <a:avLst/>
+          </a:prstGeom>
+          <a:noFill/>
+          <a:ln w="9525">
+            <a:solidFill>
+              <a:schemeClr val="bg1">
+                <a:lumMod val="65000"/>
+              </a:schemeClr>
+            </a:solidFill>
+            <a:miter lim="800000"/>
+            <a:headEnd/>
+            <a:tailEnd/>
+          </a:ln>
+          <a:effectLst/>
+        </p:spPr>
+        <p:txBody>
+          <a:bodyPr anchor="ctr">
+            <a:spAutoFit/>
+          </a:bodyPr>
+          <a:lstStyle/>
+          <a:p>
+            <a:pPr eaLnBrk="0" hangingPunct="0"/>
+            <a:r>
+              <a:rPr lang="be-BY" sz="1000" dirty="0">
+                <a:solidFill>
+                  <a:schemeClr val="bg1"/>
+                </a:solidFill>
+                <a:latin typeface="Courier New" pitchFamily="49" charset="0"/>
+                <a:ea typeface="Calibri" pitchFamily="34" charset="0"/>
+                <a:cs typeface="Courier New" pitchFamily="49" charset="0"/>
+              </a:rPr>
+              <a:t>            AppDomain newDomain = AppDomain.CreateDomain("nd");	//Создаем новый домен</a:t>
+            </a:r>
+            <a:endParaRPr lang="be-BY" sz="900" dirty="0">
+              <a:solidFill>
+                <a:schemeClr val="bg1"/>
+              </a:solidFill>
+              <a:ea typeface="Calibri" pitchFamily="34" charset="0"/>
+              <a:cs typeface="Courier New" pitchFamily="49" charset="0"/>
+            </a:endParaRPr>
+          </a:p>
+          <a:p>
+            <a:pPr eaLnBrk="0" hangingPunct="0"/>
+            <a:r>
+              <a:rPr lang="be-BY" sz="1000" dirty="0">
+                <a:solidFill>
+                  <a:schemeClr val="bg1"/>
+                </a:solidFill>
+                <a:latin typeface="Courier New" pitchFamily="49" charset="0"/>
+                <a:ea typeface="Calibri" pitchFamily="34" charset="0"/>
+                <a:cs typeface="Courier New" pitchFamily="49" charset="0"/>
+              </a:rPr>
+              <a:t>            newDomain.Load("assemblyName");			//Загружаем в него сборку</a:t>
+            </a:r>
+            <a:endParaRPr lang="be-BY" sz="900" dirty="0">
+              <a:solidFill>
+                <a:schemeClr val="bg1"/>
+              </a:solidFill>
+              <a:ea typeface="Calibri" pitchFamily="34" charset="0"/>
+              <a:cs typeface="Courier New" pitchFamily="49" charset="0"/>
+            </a:endParaRPr>
+          </a:p>
+          <a:p>
+            <a:pPr eaLnBrk="0" hangingPunct="0"/>
+            <a:r>
+              <a:rPr lang="be-BY" sz="1000" dirty="0">
+                <a:solidFill>
+                  <a:schemeClr val="bg1"/>
+                </a:solidFill>
+                <a:latin typeface="Courier New" pitchFamily="49" charset="0"/>
+                <a:ea typeface="Calibri" pitchFamily="34" charset="0"/>
+                <a:cs typeface="Courier New" pitchFamily="49" charset="0"/>
+              </a:rPr>
+              <a:t>            AppDomain.Unload(newDomain);			//Выгружаем домен</a:t>
+            </a:r>
+            <a:endParaRPr lang="be-BY" dirty="0">
+              <a:solidFill>
+                <a:schemeClr val="bg1"/>
+              </a:solidFill>
+              <a:ea typeface="Calibri" pitchFamily="34" charset="0"/>
+              <a:cs typeface="Courier New" pitchFamily="49" charset="0"/>
+            </a:endParaRPr>
+          </a:p>
+        </p:txBody>
+      </p:sp>
+      <p:sp>
+        <p:nvSpPr>
+          <p:cNvPr id="15367" name="Rectangle 3"/>
+          <p:cNvSpPr>
+            <a:spLocks noChangeArrowheads="1"/>
+          </p:cNvSpPr>
+          <p:nvPr/>
+        </p:nvSpPr>
+        <p:spPr bwMode="auto">
+          <a:xfrm>
+            <a:off x="152400" y="2743200"/>
+            <a:ext cx="8839200" cy="339725"/>
+          </a:xfrm>
+          <a:prstGeom prst="rect">
+            <a:avLst/>
+          </a:prstGeom>
+          <a:noFill/>
+          <a:ln>
+            <a:noFill/>
+          </a:ln>
+          <a:extLst>
+            <a:ext uri="{909E8E84-426E-40DD-AFC4-6F175D3DCCD1}">
+              <a14:hiddenFill xmlns:a14="http://schemas.microsoft.com/office/drawing/2010/main">
+                <a:solidFill>
+                  <a:srgbClr val="FFFFFF"/>
+                </a:solidFill>
+              </a14:hiddenFill>
+            </a:ext>
+            <a:ext uri="{91240B29-F687-4F45-9708-019B960494DF}">
+              <a14:hiddenLine xmlns:a14="http://schemas.microsoft.com/office/drawing/2010/main" w="9525">
+                <a:solidFill>
+                  <a:srgbClr val="000000"/>
+                </a:solidFill>
+                <a:miter lim="800000"/>
+                <a:headEnd/>
+                <a:tailEnd/>
+              </a14:hiddenLine>
+            </a:ext>
+          </a:extLst>
+        </p:spPr>
+        <p:txBody>
+          <a:bodyPr anchor="ctr">
+            <a:spAutoFit/>
+          </a:bodyPr>
+          <a:lstStyle/>
+          <a:p>
+            <a:r>
+              <a:rPr lang="ru-RU" sz="1600"/>
+              <a:t>	Создание нового процесса</a:t>
+            </a:r>
+            <a:r>
+              <a:rPr lang="en-US" sz="1600"/>
+              <a:t>:</a:t>
+            </a:r>
+            <a:endParaRPr lang="ru-RU" sz="1600"/>
+          </a:p>
+        </p:txBody>
+      </p:sp>
+      <p:sp>
+        <p:nvSpPr>
+          <p:cNvPr id="15368" name="Rectangle 3"/>
+          <p:cNvSpPr>
+            <a:spLocks noChangeArrowheads="1"/>
+          </p:cNvSpPr>
+          <p:nvPr/>
+        </p:nvSpPr>
+        <p:spPr bwMode="auto">
+          <a:xfrm>
+            <a:off x="152400" y="3886200"/>
+            <a:ext cx="8839200" cy="338138"/>
+          </a:xfrm>
+          <a:prstGeom prst="rect">
+            <a:avLst/>
+          </a:prstGeom>
+          <a:noFill/>
+          <a:ln>
+            <a:noFill/>
+          </a:ln>
+          <a:extLst>
+            <a:ext uri="{909E8E84-426E-40DD-AFC4-6F175D3DCCD1}">
+              <a14:hiddenFill xmlns:a14="http://schemas.microsoft.com/office/drawing/2010/main">
+                <a:solidFill>
+                  <a:srgbClr val="FFFFFF"/>
+                </a:solidFill>
+              </a14:hiddenFill>
+            </a:ext>
+            <a:ext uri="{91240B29-F687-4F45-9708-019B960494DF}">
+              <a14:hiddenLine xmlns:a14="http://schemas.microsoft.com/office/drawing/2010/main" w="9525">
+                <a:solidFill>
+                  <a:srgbClr val="000000"/>
+                </a:solidFill>
+                <a:miter lim="800000"/>
+                <a:headEnd/>
+                <a:tailEnd/>
+              </a14:hiddenLine>
+            </a:ext>
+          </a:extLst>
+        </p:spPr>
+        <p:txBody>
+          <a:bodyPr anchor="ctr">
+            <a:spAutoFit/>
+          </a:bodyPr>
+          <a:lstStyle/>
+          <a:p>
+            <a:r>
+              <a:rPr lang="ru-RU" sz="1600"/>
+              <a:t>	Создание домена в рамках  текущего процесса</a:t>
+            </a:r>
+            <a:r>
+              <a:rPr lang="en-US" sz="1600"/>
+              <a:t>:</a:t>
+            </a:r>
+            <a:endParaRPr lang="ru-RU" sz="1600"/>
+          </a:p>
+        </p:txBody>
+      </p:sp>
+    </p:spTree>
+    <p:extLst>
+      <p:ext uri="{BB962C8B-B14F-4D97-AF65-F5344CB8AC3E}">
+        <p14:creationId xmlns:p14="http://schemas.microsoft.com/office/powerpoint/2010/main" val="3777989149"/>
+      </p:ext>
+    </p:extLst>
+  </p:cSld>
+  <p:clrMapOvr>
+    <a:masterClrMapping/>
+  </p:clrMapOvr>
+  <p:timing>
+    <p:tnLst>
+      <p:par>
+        <p:cTn id="1" dur="indefinite" restart="never" nodeType="tmRoot"/>
+      </p:par>
+    </p:tnLst>
+  </p:timing>
+</p:sld>
+</file>
+
 <file path=ppt/slides/slide6.xml><?xml version="1.0" encoding="utf-8"?>
 <p:sld xmlns:a="http://schemas.openxmlformats.org/drawingml/2006/main" xmlns:r="http://schemas.openxmlformats.org/officeDocument/2006/relationships" xmlns:p="http://schemas.openxmlformats.org/presentationml/2006/main">
   <p:cSld>

</xml_diff>

<commit_message>
Added link to Package Of the Week
</commit_message>
<xml_diff>
--- a/Presentation/lesson-07-reflection.pptx
+++ b/Presentation/lesson-07-reflection.pptx
@@ -6,7 +6,7 @@
     <p:sldMasterId id="2147483663" r:id="rId2"/>
   </p:sldMasterIdLst>
   <p:notesMasterIdLst>
-    <p:notesMasterId r:id="rId53"/>
+    <p:notesMasterId r:id="rId54"/>
   </p:notesMasterIdLst>
   <p:sldIdLst>
     <p:sldId id="257" r:id="rId3"/>
@@ -50,15 +50,16 @@
     <p:sldId id="323" r:id="rId41"/>
     <p:sldId id="310" r:id="rId42"/>
     <p:sldId id="312" r:id="rId43"/>
-    <p:sldId id="311" r:id="rId44"/>
-    <p:sldId id="322" r:id="rId45"/>
-    <p:sldId id="318" r:id="rId46"/>
-    <p:sldId id="319" r:id="rId47"/>
-    <p:sldId id="299" r:id="rId48"/>
-    <p:sldId id="263" r:id="rId49"/>
-    <p:sldId id="264" r:id="rId50"/>
-    <p:sldId id="265" r:id="rId51"/>
-    <p:sldId id="271" r:id="rId52"/>
+    <p:sldId id="324" r:id="rId44"/>
+    <p:sldId id="311" r:id="rId45"/>
+    <p:sldId id="322" r:id="rId46"/>
+    <p:sldId id="318" r:id="rId47"/>
+    <p:sldId id="319" r:id="rId48"/>
+    <p:sldId id="299" r:id="rId49"/>
+    <p:sldId id="263" r:id="rId50"/>
+    <p:sldId id="264" r:id="rId51"/>
+    <p:sldId id="265" r:id="rId52"/>
+    <p:sldId id="271" r:id="rId53"/>
   </p:sldIdLst>
   <p:sldSz cx="9144000" cy="6858000" type="screen4x3"/>
   <p:notesSz cx="6858000" cy="9144000"/>
@@ -243,7 +244,7 @@
             <a:fld id="{B24A7054-7FFB-49F4-A126-5DF6E687FF53}" type="datetimeFigureOut">
               <a:rPr lang="ru-RU" smtClean="0"/>
               <a:pPr/>
-              <a:t>01.02.2015</a:t>
+              <a:t>28.02.2015</a:t>
             </a:fld>
             <a:endParaRPr lang="ru-RU"/>
           </a:p>
@@ -1527,7 +1528,7 @@
             <a:fld id="{8E6E6A2A-E9D3-4A0D-B04A-ABDD367A1E08}" type="datetimeFigureOut">
               <a:rPr lang="ru-RU" smtClean="0"/>
               <a:pPr/>
-              <a:t>01.02.2015</a:t>
+              <a:t>28.02.2015</a:t>
             </a:fld>
             <a:endParaRPr lang="ru-RU"/>
           </a:p>
@@ -1771,7 +1772,7 @@
             <a:fld id="{8E6E6A2A-E9D3-4A0D-B04A-ABDD367A1E08}" type="datetimeFigureOut">
               <a:rPr lang="ru-RU" smtClean="0"/>
               <a:pPr/>
-              <a:t>01.02.2015</a:t>
+              <a:t>28.02.2015</a:t>
             </a:fld>
             <a:endParaRPr lang="ru-RU"/>
           </a:p>
@@ -1943,7 +1944,7 @@
             <a:fld id="{8E6E6A2A-E9D3-4A0D-B04A-ABDD367A1E08}" type="datetimeFigureOut">
               <a:rPr lang="ru-RU" smtClean="0"/>
               <a:pPr/>
-              <a:t>01.02.2015</a:t>
+              <a:t>28.02.2015</a:t>
             </a:fld>
             <a:endParaRPr lang="ru-RU"/>
           </a:p>
@@ -2191,7 +2192,7 @@
             <a:fld id="{8E6E6A2A-E9D3-4A0D-B04A-ABDD367A1E08}" type="datetimeFigureOut">
               <a:rPr lang="ru-RU" smtClean="0"/>
               <a:pPr/>
-              <a:t>01.02.2015</a:t>
+              <a:t>28.02.2015</a:t>
             </a:fld>
             <a:endParaRPr lang="ru-RU"/>
           </a:p>
@@ -2481,7 +2482,7 @@
             <a:fld id="{8E6E6A2A-E9D3-4A0D-B04A-ABDD367A1E08}" type="datetimeFigureOut">
               <a:rPr lang="ru-RU" smtClean="0"/>
               <a:pPr/>
-              <a:t>01.02.2015</a:t>
+              <a:t>28.02.2015</a:t>
             </a:fld>
             <a:endParaRPr lang="ru-RU"/>
           </a:p>
@@ -2905,7 +2906,7 @@
             <a:fld id="{8E6E6A2A-E9D3-4A0D-B04A-ABDD367A1E08}" type="datetimeFigureOut">
               <a:rPr lang="ru-RU" smtClean="0"/>
               <a:pPr/>
-              <a:t>01.02.2015</a:t>
+              <a:t>28.02.2015</a:t>
             </a:fld>
             <a:endParaRPr lang="ru-RU"/>
           </a:p>
@@ -3234,7 +3235,7 @@
             <a:fld id="{8E6E6A2A-E9D3-4A0D-B04A-ABDD367A1E08}" type="datetimeFigureOut">
               <a:rPr lang="ru-RU" smtClean="0"/>
               <a:pPr/>
-              <a:t>01.02.2015</a:t>
+              <a:t>28.02.2015</a:t>
             </a:fld>
             <a:endParaRPr lang="ru-RU"/>
           </a:p>
@@ -3331,7 +3332,7 @@
             <a:fld id="{8E6E6A2A-E9D3-4A0D-B04A-ABDD367A1E08}" type="datetimeFigureOut">
               <a:rPr lang="ru-RU" smtClean="0"/>
               <a:pPr/>
-              <a:t>01.02.2015</a:t>
+              <a:t>28.02.2015</a:t>
             </a:fld>
             <a:endParaRPr lang="ru-RU"/>
           </a:p>
@@ -3610,7 +3611,7 @@
             <a:fld id="{8E6E6A2A-E9D3-4A0D-B04A-ABDD367A1E08}" type="datetimeFigureOut">
               <a:rPr lang="ru-RU" smtClean="0"/>
               <a:pPr/>
-              <a:t>01.02.2015</a:t>
+              <a:t>28.02.2015</a:t>
             </a:fld>
             <a:endParaRPr lang="ru-RU"/>
           </a:p>
@@ -3865,7 +3866,7 @@
             <a:fld id="{8E6E6A2A-E9D3-4A0D-B04A-ABDD367A1E08}" type="datetimeFigureOut">
               <a:rPr lang="ru-RU" smtClean="0"/>
               <a:pPr/>
-              <a:t>01.02.2015</a:t>
+              <a:t>28.02.2015</a:t>
             </a:fld>
             <a:endParaRPr lang="ru-RU"/>
           </a:p>
@@ -4037,7 +4038,7 @@
             <a:fld id="{8E6E6A2A-E9D3-4A0D-B04A-ABDD367A1E08}" type="datetimeFigureOut">
               <a:rPr lang="ru-RU" smtClean="0"/>
               <a:pPr/>
-              <a:t>01.02.2015</a:t>
+              <a:t>28.02.2015</a:t>
             </a:fld>
             <a:endParaRPr lang="ru-RU"/>
           </a:p>
@@ -4219,7 +4220,7 @@
             <a:fld id="{8E6E6A2A-E9D3-4A0D-B04A-ABDD367A1E08}" type="datetimeFigureOut">
               <a:rPr lang="ru-RU" smtClean="0"/>
               <a:pPr/>
-              <a:t>01.02.2015</a:t>
+              <a:t>28.02.2015</a:t>
             </a:fld>
             <a:endParaRPr lang="ru-RU"/>
           </a:p>
@@ -5457,7 +5458,7 @@
             <a:fld id="{AC3D3127-B7C4-45E3-9797-C527EC9FDD78}" type="datetimeFigureOut">
               <a:rPr lang="ru-RU" smtClean="0"/>
               <a:pPr/>
-              <a:t>01.02.2015</a:t>
+              <a:t>28.02.2015</a:t>
             </a:fld>
             <a:endParaRPr lang="ru-RU"/>
           </a:p>
@@ -5979,7 +5980,7 @@
             <a:fld id="{8E6E6A2A-E9D3-4A0D-B04A-ABDD367A1E08}" type="datetimeFigureOut">
               <a:rPr lang="ru-RU" smtClean="0"/>
               <a:pPr/>
-              <a:t>01.02.2015</a:t>
+              <a:t>28.02.2015</a:t>
             </a:fld>
             <a:endParaRPr lang="ru-RU"/>
           </a:p>
@@ -16966,12 +16967,8 @@
           <a:lstStyle/>
           <a:p>
             <a:r>
-              <a:rPr lang="ru-RU" dirty="0" smtClean="0"/>
-              <a:t>Утилиты для </a:t>
-            </a:r>
-            <a:r>
               <a:rPr lang="en-US" dirty="0" smtClean="0"/>
-              <a:t>NuGet</a:t>
+              <a:t>NuGet Package Of the Week</a:t>
             </a:r>
             <a:endParaRPr lang="ru-RU" dirty="0"/>
           </a:p>
@@ -16989,67 +16986,61 @@
         </p:nvSpPr>
         <p:spPr/>
         <p:txBody>
-          <a:bodyPr>
-            <a:normAutofit/>
-          </a:bodyPr>
+          <a:bodyPr/>
           <a:lstStyle/>
           <a:p>
-            <a:r>
-              <a:rPr lang="en-US" sz="2400" dirty="0" smtClean="0"/>
-              <a:t>NuGet </a:t>
-            </a:r>
-            <a:r>
-              <a:rPr lang="en-US" sz="2400" dirty="0"/>
-              <a:t>Package Explorer</a:t>
-            </a:r>
-            <a:br>
-              <a:rPr lang="en-US" sz="2400" dirty="0"/>
-            </a:br>
+            <a:pPr marL="0" indent="0">
+              <a:buNone/>
+            </a:pPr>
             <a:r>
               <a:rPr lang="en-US" sz="2400" dirty="0">
                 <a:hlinkClick r:id="rId2"/>
               </a:rPr>
-              <a:t>http://npe.codeplex.com</a:t>
+              <a:t>http://</a:t>
             </a:r>
             <a:r>
               <a:rPr lang="en-US" sz="2400" dirty="0" smtClean="0">
                 <a:hlinkClick r:id="rId2"/>
               </a:rPr>
-              <a:t>/</a:t>
+              <a:t>www.hanselman.com/blog/archives.aspx#NuGetPOW</a:t>
             </a:r>
             <a:endParaRPr lang="en-US" sz="2400" dirty="0" smtClean="0"/>
           </a:p>
           <a:p>
-            <a:endParaRPr lang="ru-RU" sz="2400" dirty="0" smtClean="0"/>
-          </a:p>
-          <a:p>
-            <a:r>
-              <a:rPr lang="ru-RU" sz="2400" dirty="0" smtClean="0"/>
-              <a:t>Утилита командной строки</a:t>
-            </a:r>
-            <a:br>
-              <a:rPr lang="ru-RU" sz="2400" dirty="0" smtClean="0"/>
-            </a:br>
-            <a:r>
-              <a:rPr lang="en-US" sz="2400" dirty="0">
-                <a:hlinkClick r:id="rId3"/>
-              </a:rPr>
-              <a:t>http://</a:t>
-            </a:r>
-            <a:r>
-              <a:rPr lang="en-US" sz="2400" dirty="0" smtClean="0">
-                <a:hlinkClick r:id="rId3"/>
-              </a:rPr>
-              <a:t>docs.nuget.org/docs/start-here/installing-nuget</a:t>
-            </a:r>
-            <a:endParaRPr lang="ru-RU" sz="2400" dirty="0"/>
+            <a:pPr marL="0" indent="0">
+              <a:buNone/>
+            </a:pPr>
+            <a:endParaRPr lang="en-US" dirty="0" smtClean="0"/>
+          </a:p>
+          <a:p>
+            <a:r>
+              <a:rPr lang="en-US" dirty="0" smtClean="0"/>
+              <a:t>Polly (</a:t>
+            </a:r>
+            <a:r>
+              <a:rPr lang="ru-RU" dirty="0" smtClean="0"/>
+              <a:t>удобная обработка исключений)</a:t>
+            </a:r>
+          </a:p>
+          <a:p>
+            <a:r>
+              <a:rPr lang="en-US" dirty="0"/>
+              <a:t>Humanizer </a:t>
+            </a:r>
+            <a:r>
+              <a:rPr lang="ru-RU" dirty="0" smtClean="0"/>
+              <a:t>(вывод стандартных типов в виде удобном для пользователей)</a:t>
+            </a:r>
+          </a:p>
+          <a:p>
+            <a:endParaRPr lang="ru-RU" dirty="0"/>
           </a:p>
         </p:txBody>
       </p:sp>
     </p:spTree>
     <p:extLst>
       <p:ext uri="{BB962C8B-B14F-4D97-AF65-F5344CB8AC3E}">
-        <p14:creationId xmlns:p14="http://schemas.microsoft.com/office/powerpoint/2010/main" val="2426017902"/>
+        <p14:creationId xmlns:p14="http://schemas.microsoft.com/office/powerpoint/2010/main" val="815437126"/>
       </p:ext>
     </p:extLst>
   </p:cSld>
@@ -17095,14 +17086,16 @@
         </p:nvSpPr>
         <p:spPr/>
         <p:txBody>
-          <a:bodyPr>
-            <a:normAutofit fontScale="90000"/>
-          </a:bodyPr>
+          <a:bodyPr/>
           <a:lstStyle/>
           <a:p>
             <a:r>
               <a:rPr lang="ru-RU" dirty="0" smtClean="0"/>
-              <a:t>Распространение своих библиотек</a:t>
+              <a:t>Утилиты для </a:t>
+            </a:r>
+            <a:r>
+              <a:rPr lang="en-US" dirty="0" smtClean="0"/>
+              <a:t>NuGet</a:t>
             </a:r>
             <a:endParaRPr lang="ru-RU" dirty="0"/>
           </a:p>
@@ -17121,110 +17114,66 @@
         <p:spPr/>
         <p:txBody>
           <a:bodyPr>
-            <a:normAutofit fontScale="70000" lnSpcReduction="20000"/>
+            <a:normAutofit/>
           </a:bodyPr>
           <a:lstStyle/>
           <a:p>
-            <a:pPr marL="0" indent="0">
-              <a:buNone/>
-            </a:pPr>
-            <a:r>
-              <a:rPr lang="ru-RU" dirty="0" smtClean="0"/>
-              <a:t>Хорошими библиотеками следует делиться с сообществом! Проекты с открытым исходны</a:t>
-            </a:r>
-            <a:r>
-              <a:rPr lang="ru-RU" dirty="0"/>
-              <a:t>м</a:t>
-            </a:r>
-            <a:r>
-              <a:rPr lang="ru-RU" dirty="0" smtClean="0"/>
-              <a:t> кодом можно размещать на специальных сайтах:</a:t>
-            </a:r>
-          </a:p>
-          <a:p>
-            <a:endParaRPr lang="ru-RU" dirty="0" smtClean="0">
-              <a:hlinkClick r:id="rId2"/>
-            </a:endParaRPr>
-          </a:p>
-          <a:p>
-            <a:r>
-              <a:rPr lang="en-US" dirty="0" smtClean="0">
+            <a:r>
+              <a:rPr lang="en-US" sz="2400" dirty="0" smtClean="0"/>
+              <a:t>NuGet </a:t>
+            </a:r>
+            <a:r>
+              <a:rPr lang="en-US" sz="2400" dirty="0"/>
+              <a:t>Package Explorer</a:t>
+            </a:r>
+            <a:br>
+              <a:rPr lang="en-US" sz="2400" dirty="0"/>
+            </a:br>
+            <a:r>
+              <a:rPr lang="en-US" sz="2400" dirty="0">
                 <a:hlinkClick r:id="rId2"/>
               </a:rPr>
-              <a:t>www.codeplex.com</a:t>
-            </a:r>
-            <a:endParaRPr lang="ru-RU" dirty="0" smtClean="0"/>
-          </a:p>
-          <a:p>
-            <a:r>
-              <a:rPr lang="en-US" dirty="0" smtClean="0">
+              <a:t>http://npe.codeplex.com</a:t>
+            </a:r>
+            <a:r>
+              <a:rPr lang="en-US" sz="2400" dirty="0" smtClean="0">
+                <a:hlinkClick r:id="rId2"/>
+              </a:rPr>
+              <a:t>/</a:t>
+            </a:r>
+            <a:endParaRPr lang="en-US" sz="2400" dirty="0" smtClean="0"/>
+          </a:p>
+          <a:p>
+            <a:endParaRPr lang="ru-RU" sz="2400" dirty="0" smtClean="0"/>
+          </a:p>
+          <a:p>
+            <a:r>
+              <a:rPr lang="ru-RU" sz="2400" dirty="0" smtClean="0"/>
+              <a:t>Утилита командной строки</a:t>
+            </a:r>
+            <a:br>
+              <a:rPr lang="ru-RU" sz="2400" dirty="0" smtClean="0"/>
+            </a:br>
+            <a:r>
+              <a:rPr lang="en-US" sz="2400" dirty="0">
                 <a:hlinkClick r:id="rId3"/>
               </a:rPr>
-              <a:t>github.com</a:t>
-            </a:r>
-            <a:endParaRPr lang="ru-RU" dirty="0" smtClean="0"/>
-          </a:p>
-          <a:p>
-            <a:r>
-              <a:rPr lang="en-US" dirty="0" smtClean="0">
-                <a:hlinkClick r:id="rId4"/>
-              </a:rPr>
-              <a:t>code.google.com</a:t>
-            </a:r>
-            <a:endParaRPr lang="ru-RU" dirty="0" smtClean="0"/>
-          </a:p>
-          <a:p>
-            <a:r>
-              <a:rPr lang="ru-RU" dirty="0" smtClean="0"/>
-              <a:t>и других ...</a:t>
-            </a:r>
-            <a:endParaRPr lang="en-US" dirty="0" smtClean="0"/>
-          </a:p>
-          <a:p>
-            <a:endParaRPr lang="en-US" dirty="0" smtClean="0"/>
-          </a:p>
-          <a:p>
-            <a:pPr marL="0" indent="0">
-              <a:buNone/>
-            </a:pPr>
-            <a:r>
-              <a:rPr lang="ru-RU" dirty="0" smtClean="0"/>
-              <a:t>Выбрать лицензию можно с помощью сайта </a:t>
-            </a:r>
-            <a:r>
-              <a:rPr lang="en-US" dirty="0" smtClean="0">
-                <a:hlinkClick r:id="rId5"/>
-              </a:rPr>
-              <a:t>choosealicense.com</a:t>
-            </a:r>
-            <a:endParaRPr lang="ru-RU" dirty="0" smtClean="0"/>
-          </a:p>
-          <a:p>
-            <a:pPr marL="0" indent="0">
-              <a:buNone/>
-            </a:pPr>
-            <a:endParaRPr lang="ru-RU" dirty="0" smtClean="0"/>
-          </a:p>
-          <a:p>
-            <a:pPr marL="0" indent="0">
-              <a:buNone/>
-            </a:pPr>
-            <a:r>
-              <a:rPr lang="ru-RU" dirty="0" smtClean="0"/>
-              <a:t>Откомпилированную версию не забудьте разместить на </a:t>
-            </a:r>
-            <a:r>
-              <a:rPr lang="en-US" dirty="0" smtClean="0"/>
-              <a:t>nuget.org.</a:t>
-            </a:r>
-            <a:endParaRPr lang="ru-RU" dirty="0"/>
+              <a:t>http://</a:t>
+            </a:r>
+            <a:r>
+              <a:rPr lang="en-US" sz="2400" dirty="0" smtClean="0">
+                <a:hlinkClick r:id="rId3"/>
+              </a:rPr>
+              <a:t>docs.nuget.org/docs/start-here/installing-nuget</a:t>
+            </a:r>
+            <a:endParaRPr lang="ru-RU" sz="2400" dirty="0"/>
           </a:p>
         </p:txBody>
       </p:sp>
     </p:spTree>
     <p:extLst>
       <p:ext uri="{BB962C8B-B14F-4D97-AF65-F5344CB8AC3E}">
-        <p14:creationId xmlns:p14="http://schemas.microsoft.com/office/powerpoint/2010/main" val="4107856204"/>
+        <p14:creationId xmlns:p14="http://schemas.microsoft.com/office/powerpoint/2010/main" val="2426017902"/>
       </p:ext>
     </p:extLst>
   </p:cSld>
@@ -17268,35 +17217,18 @@
             <p:ph type="title"/>
           </p:nvPr>
         </p:nvSpPr>
-        <p:spPr>
-          <a:xfrm>
-            <a:off x="457200" y="274638"/>
-            <a:ext cx="8229600" cy="706090"/>
-          </a:xfrm>
-        </p:spPr>
+        <p:spPr/>
         <p:txBody>
           <a:bodyPr>
-            <a:normAutofit/>
+            <a:normAutofit fontScale="90000"/>
           </a:bodyPr>
           <a:lstStyle/>
           <a:p>
             <a:r>
-              <a:rPr lang="ru-RU" sz="3200" dirty="0" smtClean="0"/>
-              <a:t>Отладка </a:t>
-            </a:r>
-            <a:r>
-              <a:rPr lang="en-US" sz="3200" dirty="0" smtClean="0"/>
-              <a:t>.NET </a:t>
-            </a:r>
-            <a:r>
-              <a:rPr lang="ru-RU" sz="3200" dirty="0" smtClean="0"/>
-              <a:t>с помощью </a:t>
-            </a:r>
-            <a:r>
-              <a:rPr lang="en-US" sz="3200" dirty="0" smtClean="0"/>
-              <a:t>reference source</a:t>
-            </a:r>
-            <a:endParaRPr lang="ru-RU" sz="3200" dirty="0"/>
+              <a:rPr lang="ru-RU" dirty="0" smtClean="0"/>
+              <a:t>Распространение своих библиотек</a:t>
+            </a:r>
+            <a:endParaRPr lang="ru-RU" dirty="0"/>
           </a:p>
         </p:txBody>
       </p:sp>
@@ -17310,15 +17242,10 @@
             <p:ph idx="1"/>
           </p:nvPr>
         </p:nvSpPr>
-        <p:spPr>
-          <a:xfrm>
-            <a:off x="457200" y="980728"/>
-            <a:ext cx="8229600" cy="864096"/>
-          </a:xfrm>
-        </p:spPr>
+        <p:spPr/>
         <p:txBody>
           <a:bodyPr>
-            <a:noAutofit/>
+            <a:normAutofit fontScale="70000" lnSpcReduction="20000"/>
           </a:bodyPr>
           <a:lstStyle/>
           <a:p>
@@ -17326,271 +17253,102 @@
               <a:buNone/>
             </a:pPr>
             <a:r>
-              <a:rPr lang="ru-RU" sz="2400" dirty="0" smtClean="0"/>
-              <a:t>Работает только для </a:t>
-            </a:r>
-            <a:r>
-              <a:rPr lang="en-US" sz="2400" dirty="0" smtClean="0"/>
-              <a:t>.NET 4.5.1 </a:t>
-            </a:r>
-            <a:r>
-              <a:rPr lang="ru-RU" sz="2400" dirty="0" smtClean="0"/>
-              <a:t>в </a:t>
-            </a:r>
-            <a:r>
-              <a:rPr lang="en-US" sz="2400" dirty="0" smtClean="0"/>
-              <a:t>VS 2012 </a:t>
-            </a:r>
-            <a:r>
-              <a:rPr lang="ru-RU" sz="2400" dirty="0" smtClean="0"/>
-              <a:t>и выше</a:t>
-            </a:r>
-            <a:r>
-              <a:rPr lang="en-US" sz="2400" dirty="0" smtClean="0"/>
-              <a:t>!</a:t>
-            </a:r>
-            <a:endParaRPr lang="ru-RU" sz="2400" dirty="0"/>
+              <a:rPr lang="ru-RU" dirty="0" smtClean="0"/>
+              <a:t>Хорошими библиотеками следует делиться с сообществом! Проекты с открытым исходны</a:t>
+            </a:r>
+            <a:r>
+              <a:rPr lang="ru-RU" dirty="0"/>
+              <a:t>м</a:t>
+            </a:r>
+            <a:r>
+              <a:rPr lang="ru-RU" dirty="0" smtClean="0"/>
+              <a:t> кодом можно размещать на специальных сайтах:</a:t>
+            </a:r>
+          </a:p>
+          <a:p>
+            <a:endParaRPr lang="ru-RU" dirty="0" smtClean="0">
+              <a:hlinkClick r:id="rId2"/>
+            </a:endParaRPr>
+          </a:p>
+          <a:p>
+            <a:r>
+              <a:rPr lang="en-US" dirty="0" smtClean="0">
+                <a:hlinkClick r:id="rId2"/>
+              </a:rPr>
+              <a:t>www.codeplex.com</a:t>
+            </a:r>
+            <a:endParaRPr lang="ru-RU" dirty="0" smtClean="0"/>
+          </a:p>
+          <a:p>
+            <a:r>
+              <a:rPr lang="en-US" dirty="0" smtClean="0">
+                <a:hlinkClick r:id="rId3"/>
+              </a:rPr>
+              <a:t>github.com</a:t>
+            </a:r>
+            <a:endParaRPr lang="ru-RU" dirty="0" smtClean="0"/>
+          </a:p>
+          <a:p>
+            <a:r>
+              <a:rPr lang="en-US" dirty="0" smtClean="0">
+                <a:hlinkClick r:id="rId4"/>
+              </a:rPr>
+              <a:t>code.google.com</a:t>
+            </a:r>
+            <a:endParaRPr lang="ru-RU" dirty="0" smtClean="0"/>
+          </a:p>
+          <a:p>
+            <a:r>
+              <a:rPr lang="ru-RU" dirty="0" smtClean="0"/>
+              <a:t>и других ...</a:t>
+            </a:r>
+            <a:endParaRPr lang="en-US" dirty="0" smtClean="0"/>
+          </a:p>
+          <a:p>
+            <a:endParaRPr lang="en-US" dirty="0" smtClean="0"/>
           </a:p>
           <a:p>
             <a:pPr marL="0" indent="0">
               <a:buNone/>
             </a:pPr>
             <a:r>
-              <a:rPr lang="ru-RU" sz="2400" dirty="0" smtClean="0"/>
-              <a:t>Необходимые настройки:</a:t>
-            </a:r>
-            <a:endParaRPr lang="ru-RU" sz="2400" dirty="0"/>
-          </a:p>
-        </p:txBody>
-      </p:sp>
-      <p:pic>
-        <p:nvPicPr>
-          <p:cNvPr id="1027" name="Picture 3"/>
-          <p:cNvPicPr>
-            <a:picLocks noChangeAspect="1" noChangeArrowheads="1"/>
-          </p:cNvPicPr>
-          <p:nvPr/>
-        </p:nvPicPr>
-        <p:blipFill>
-          <a:blip r:embed="rId2">
-            <a:extLst>
-              <a:ext uri="{28A0092B-C50C-407E-A947-70E740481C1C}">
-                <a14:useLocalDpi xmlns:a14="http://schemas.microsoft.com/office/drawing/2010/main" val="0"/>
-              </a:ext>
-            </a:extLst>
-          </a:blip>
-          <a:srcRect/>
-          <a:stretch>
-            <a:fillRect/>
-          </a:stretch>
-        </p:blipFill>
-        <p:spPr bwMode="auto">
-          <a:xfrm>
-            <a:off x="3995936" y="1459979"/>
-            <a:ext cx="4200525" cy="2905125"/>
-          </a:xfrm>
-          <a:prstGeom prst="rect">
-            <a:avLst/>
-          </a:prstGeom>
-          <a:noFill/>
-          <a:ln>
-            <a:noFill/>
-          </a:ln>
-          <a:effectLst/>
-          <a:extLst>
-            <a:ext uri="{909E8E84-426E-40DD-AFC4-6F175D3DCCD1}">
-              <a14:hiddenFill xmlns:a14="http://schemas.microsoft.com/office/drawing/2010/main">
-                <a:solidFill>
-                  <a:schemeClr val="accent1"/>
-                </a:solidFill>
-              </a14:hiddenFill>
-            </a:ext>
-            <a:ext uri="{91240B29-F687-4F45-9708-019B960494DF}">
-              <a14:hiddenLine xmlns:a14="http://schemas.microsoft.com/office/drawing/2010/main" w="9525">
-                <a:solidFill>
-                  <a:schemeClr val="tx1"/>
-                </a:solidFill>
-                <a:miter lim="800000"/>
-                <a:headEnd/>
-                <a:tailEnd/>
-              </a14:hiddenLine>
-            </a:ext>
-            <a:ext uri="{AF507438-7753-43E0-B8FC-AC1667EBCBE1}">
-              <a14:hiddenEffects xmlns:a14="http://schemas.microsoft.com/office/drawing/2010/main">
-                <a:effectLst>
-                  <a:outerShdw dist="35921" dir="2700000" algn="ctr" rotWithShape="0">
-                    <a:schemeClr val="bg2"/>
-                  </a:outerShdw>
-                </a:effectLst>
-              </a14:hiddenEffects>
-            </a:ext>
-          </a:extLst>
-        </p:spPr>
-      </p:pic>
-      <p:sp>
-        <p:nvSpPr>
-          <p:cNvPr id="4" name="TextBox 3"/>
-          <p:cNvSpPr txBox="1"/>
-          <p:nvPr/>
-        </p:nvSpPr>
-        <p:spPr>
-          <a:xfrm>
-            <a:off x="543158" y="2597756"/>
-            <a:ext cx="2722669" cy="461665"/>
-          </a:xfrm>
-          <a:prstGeom prst="rect">
-            <a:avLst/>
-          </a:prstGeom>
-          <a:noFill/>
-        </p:spPr>
-        <p:txBody>
-          <a:bodyPr wrap="none" rtlCol="0">
-            <a:spAutoFit/>
-          </a:bodyPr>
-          <a:lstStyle/>
-          <a:p>
-            <a:pPr algn="ctr"/>
-            <a:r>
-              <a:rPr lang="en-US" sz="2400" dirty="0" smtClean="0"/>
-              <a:t>Debugger \ General:</a:t>
-            </a:r>
-            <a:endParaRPr lang="ru-RU" sz="2400" dirty="0" smtClean="0"/>
-          </a:p>
-        </p:txBody>
-      </p:sp>
-      <p:pic>
-        <p:nvPicPr>
-          <p:cNvPr id="1028" name="Picture 4"/>
-          <p:cNvPicPr>
-            <a:picLocks noChangeAspect="1" noChangeArrowheads="1"/>
-          </p:cNvPicPr>
-          <p:nvPr/>
-        </p:nvPicPr>
-        <p:blipFill>
-          <a:blip r:embed="rId3">
-            <a:extLst>
-              <a:ext uri="{28A0092B-C50C-407E-A947-70E740481C1C}">
-                <a14:useLocalDpi xmlns:a14="http://schemas.microsoft.com/office/drawing/2010/main" val="0"/>
-              </a:ext>
-            </a:extLst>
-          </a:blip>
-          <a:srcRect/>
-          <a:stretch>
-            <a:fillRect/>
-          </a:stretch>
-        </p:blipFill>
-        <p:spPr bwMode="auto">
-          <a:xfrm>
-            <a:off x="3995936" y="5085184"/>
-            <a:ext cx="4381500" cy="1352550"/>
-          </a:xfrm>
-          <a:prstGeom prst="rect">
-            <a:avLst/>
-          </a:prstGeom>
-          <a:noFill/>
-          <a:ln>
-            <a:noFill/>
-          </a:ln>
-          <a:effectLst/>
-          <a:extLst>
-            <a:ext uri="{909E8E84-426E-40DD-AFC4-6F175D3DCCD1}">
-              <a14:hiddenFill xmlns:a14="http://schemas.microsoft.com/office/drawing/2010/main">
-                <a:solidFill>
-                  <a:schemeClr val="accent1"/>
-                </a:solidFill>
-              </a14:hiddenFill>
-            </a:ext>
-            <a:ext uri="{91240B29-F687-4F45-9708-019B960494DF}">
-              <a14:hiddenLine xmlns:a14="http://schemas.microsoft.com/office/drawing/2010/main" w="9525">
-                <a:solidFill>
-                  <a:schemeClr val="tx1"/>
-                </a:solidFill>
-                <a:miter lim="800000"/>
-                <a:headEnd/>
-                <a:tailEnd/>
-              </a14:hiddenLine>
-            </a:ext>
-            <a:ext uri="{AF507438-7753-43E0-B8FC-AC1667EBCBE1}">
-              <a14:hiddenEffects xmlns:a14="http://schemas.microsoft.com/office/drawing/2010/main">
-                <a:effectLst>
-                  <a:outerShdw dist="35921" dir="2700000" algn="ctr" rotWithShape="0">
-                    <a:schemeClr val="bg2"/>
-                  </a:outerShdw>
-                </a:effectLst>
-              </a14:hiddenEffects>
-            </a:ext>
-          </a:extLst>
-        </p:spPr>
-      </p:pic>
-      <p:sp>
-        <p:nvSpPr>
-          <p:cNvPr id="8" name="TextBox 7"/>
-          <p:cNvSpPr txBox="1"/>
-          <p:nvPr/>
-        </p:nvSpPr>
-        <p:spPr>
-          <a:xfrm>
-            <a:off x="516260" y="5085184"/>
-            <a:ext cx="2776466" cy="461665"/>
-          </a:xfrm>
-          <a:prstGeom prst="rect">
-            <a:avLst/>
-          </a:prstGeom>
-          <a:noFill/>
-        </p:spPr>
-        <p:txBody>
-          <a:bodyPr wrap="none" rtlCol="0">
-            <a:spAutoFit/>
-          </a:bodyPr>
-          <a:lstStyle/>
-          <a:p>
-            <a:pPr algn="ctr"/>
-            <a:r>
-              <a:rPr lang="en-US" sz="2400" dirty="0" smtClean="0"/>
-              <a:t>Debugger \ Symbols:</a:t>
-            </a:r>
-          </a:p>
-        </p:txBody>
-      </p:sp>
-      <p:sp>
-        <p:nvSpPr>
-          <p:cNvPr id="5" name="TextBox 4"/>
-          <p:cNvSpPr txBox="1"/>
-          <p:nvPr/>
-        </p:nvSpPr>
-        <p:spPr>
-          <a:xfrm>
-            <a:off x="2483768" y="4581128"/>
-            <a:ext cx="6192593" cy="369332"/>
-          </a:xfrm>
-          <a:prstGeom prst="rect">
-            <a:avLst/>
-          </a:prstGeom>
-          <a:noFill/>
-        </p:spPr>
-        <p:txBody>
-          <a:bodyPr wrap="none" rtlCol="0">
-            <a:spAutoFit/>
-          </a:bodyPr>
-          <a:lstStyle/>
-          <a:p>
-            <a:pPr algn="ctr"/>
-            <a:r>
               <a:rPr lang="ru-RU" dirty="0" smtClean="0"/>
-              <a:t>Добавьте адрес </a:t>
-            </a:r>
-            <a:r>
-              <a:rPr lang="en-US" dirty="0"/>
-              <a:t>http://referencesource.microsoft.com/symbols</a:t>
+              <a:t>Выбрать лицензию можно с помощью сайта </a:t>
+            </a:r>
+            <a:r>
+              <a:rPr lang="en-US" dirty="0" smtClean="0">
+                <a:hlinkClick r:id="rId5"/>
+              </a:rPr>
+              <a:t>choosealicense.com</a:t>
             </a:r>
             <a:endParaRPr lang="ru-RU" dirty="0" smtClean="0"/>
+          </a:p>
+          <a:p>
+            <a:pPr marL="0" indent="0">
+              <a:buNone/>
+            </a:pPr>
+            <a:endParaRPr lang="ru-RU" dirty="0" smtClean="0"/>
+          </a:p>
+          <a:p>
+            <a:pPr marL="0" indent="0">
+              <a:buNone/>
+            </a:pPr>
+            <a:r>
+              <a:rPr lang="ru-RU" dirty="0" smtClean="0"/>
+              <a:t>Откомпилированную версию не забудьте разместить на </a:t>
+            </a:r>
+            <a:r>
+              <a:rPr lang="en-US" dirty="0" smtClean="0"/>
+              <a:t>nuget.org.</a:t>
+            </a:r>
+            <a:endParaRPr lang="ru-RU" dirty="0"/>
           </a:p>
         </p:txBody>
       </p:sp>
     </p:spTree>
     <p:extLst>
       <p:ext uri="{BB962C8B-B14F-4D97-AF65-F5344CB8AC3E}">
-        <p14:creationId xmlns:p14="http://schemas.microsoft.com/office/powerpoint/2010/main" val="2605966343"/>
+        <p14:creationId xmlns:p14="http://schemas.microsoft.com/office/powerpoint/2010/main" val="4107856204"/>
       </p:ext>
     </p:extLst>
   </p:cSld>
@@ -17659,12 +17417,8 @@
               <a:t>с помощью </a:t>
             </a:r>
             <a:r>
-              <a:rPr lang="en-US" sz="3200" dirty="0" err="1" smtClean="0"/>
-              <a:t>dotPeek</a:t>
-            </a:r>
-            <a:r>
               <a:rPr lang="en-US" sz="3200" dirty="0" smtClean="0"/>
-              <a:t> 1.2+</a:t>
+              <a:t>reference source</a:t>
             </a:r>
             <a:endParaRPr lang="ru-RU" sz="3200" dirty="0"/>
           </a:p>
@@ -17683,7 +17437,7 @@
         <p:spPr>
           <a:xfrm>
             <a:off x="457200" y="980728"/>
-            <a:ext cx="8229600" cy="2520280"/>
+            <a:ext cx="8229600" cy="864096"/>
           </a:xfrm>
         </p:spPr>
         <p:txBody>
@@ -17697,88 +17451,270 @@
             </a:pPr>
             <a:r>
               <a:rPr lang="ru-RU" sz="2400" dirty="0" smtClean="0"/>
-              <a:t>В </a:t>
-            </a:r>
-            <a:r>
-              <a:rPr lang="en-US" sz="2400" dirty="0" err="1" smtClean="0"/>
-              <a:t>dotPeek</a:t>
+              <a:t>Работает только для </a:t>
             </a:r>
             <a:r>
               <a:rPr lang="en-US" sz="2400" dirty="0" smtClean="0"/>
-              <a:t> 1.2 </a:t>
+              <a:t>.NET 4.5.1 </a:t>
             </a:r>
             <a:r>
               <a:rPr lang="ru-RU" sz="2400" dirty="0" smtClean="0"/>
-              <a:t>была добавлена команда «</a:t>
+              <a:t>в </a:t>
             </a:r>
             <a:r>
               <a:rPr lang="en-US" sz="2400" dirty="0" smtClean="0"/>
-              <a:t>Generate PDB</a:t>
+              <a:t>VS 2012 </a:t>
             </a:r>
             <a:r>
               <a:rPr lang="ru-RU" sz="2400" dirty="0" smtClean="0"/>
-              <a:t>» и поддержка </a:t>
+              <a:t>и выше</a:t>
             </a:r>
             <a:r>
               <a:rPr lang="en-US" sz="2400" dirty="0" smtClean="0"/>
-              <a:t>Symbol Server. </a:t>
-            </a:r>
-            <a:r>
-              <a:rPr lang="ru-RU" sz="2400" dirty="0" smtClean="0"/>
-              <a:t>С их помощью можно отлаживать </a:t>
-            </a:r>
-            <a:r>
-              <a:rPr lang="en-US" sz="2400" dirty="0" smtClean="0"/>
-              <a:t>.NET </a:t>
-            </a:r>
-            <a:r>
-              <a:rPr lang="ru-RU" sz="2400" dirty="0" smtClean="0"/>
-              <a:t>и чужие сборки. Подробности читайте на сайте </a:t>
-            </a:r>
-            <a:r>
-              <a:rPr lang="en-US" sz="2400" dirty="0" smtClean="0"/>
-              <a:t>JetBrains:</a:t>
-            </a:r>
-            <a:endParaRPr lang="ru-RU" sz="2400" dirty="0" smtClean="0">
-              <a:hlinkClick r:id="rId2"/>
-            </a:endParaRPr>
+              <a:t>!</a:t>
+            </a:r>
+            <a:endParaRPr lang="ru-RU" sz="2400" dirty="0"/>
           </a:p>
           <a:p>
             <a:pPr marL="0" indent="0">
               <a:buNone/>
             </a:pPr>
-            <a:endParaRPr lang="en-US" sz="2400" dirty="0" smtClean="0"/>
-          </a:p>
-          <a:p>
-            <a:pPr marL="0" indent="0">
-              <a:buNone/>
-            </a:pPr>
-            <a:r>
-              <a:rPr lang="en-US" sz="2400" dirty="0" smtClean="0">
-                <a:hlinkClick r:id="rId2"/>
-              </a:rPr>
-              <a:t>http</a:t>
-            </a:r>
-            <a:r>
-              <a:rPr lang="en-US" sz="2400" dirty="0">
-                <a:hlinkClick r:id="rId2"/>
-              </a:rPr>
-              <a:t>://</a:t>
-            </a:r>
-            <a:r>
-              <a:rPr lang="en-US" sz="2400" dirty="0" smtClean="0">
-                <a:hlinkClick r:id="rId2"/>
-              </a:rPr>
-              <a:t>confluence.jetbrains.com/display/NETCOM/dotPeek+Symbol+Server+and+PDB+Generation</a:t>
+            <a:r>
+              <a:rPr lang="ru-RU" sz="2400" dirty="0" smtClean="0"/>
+              <a:t>Необходимые настройки:</a:t>
             </a:r>
             <a:endParaRPr lang="ru-RU" sz="2400" dirty="0"/>
+          </a:p>
+        </p:txBody>
+      </p:sp>
+      <p:pic>
+        <p:nvPicPr>
+          <p:cNvPr id="1027" name="Picture 3"/>
+          <p:cNvPicPr>
+            <a:picLocks noChangeAspect="1" noChangeArrowheads="1"/>
+          </p:cNvPicPr>
+          <p:nvPr/>
+        </p:nvPicPr>
+        <p:blipFill>
+          <a:blip r:embed="rId2">
+            <a:extLst>
+              <a:ext uri="{28A0092B-C50C-407E-A947-70E740481C1C}">
+                <a14:useLocalDpi xmlns:a14="http://schemas.microsoft.com/office/drawing/2010/main" val="0"/>
+              </a:ext>
+            </a:extLst>
+          </a:blip>
+          <a:srcRect/>
+          <a:stretch>
+            <a:fillRect/>
+          </a:stretch>
+        </p:blipFill>
+        <p:spPr bwMode="auto">
+          <a:xfrm>
+            <a:off x="3995936" y="1459979"/>
+            <a:ext cx="4200525" cy="2905125"/>
+          </a:xfrm>
+          <a:prstGeom prst="rect">
+            <a:avLst/>
+          </a:prstGeom>
+          <a:noFill/>
+          <a:ln>
+            <a:noFill/>
+          </a:ln>
+          <a:effectLst/>
+          <a:extLst>
+            <a:ext uri="{909E8E84-426E-40DD-AFC4-6F175D3DCCD1}">
+              <a14:hiddenFill xmlns:a14="http://schemas.microsoft.com/office/drawing/2010/main">
+                <a:solidFill>
+                  <a:schemeClr val="accent1"/>
+                </a:solidFill>
+              </a14:hiddenFill>
+            </a:ext>
+            <a:ext uri="{91240B29-F687-4F45-9708-019B960494DF}">
+              <a14:hiddenLine xmlns:a14="http://schemas.microsoft.com/office/drawing/2010/main" w="9525">
+                <a:solidFill>
+                  <a:schemeClr val="tx1"/>
+                </a:solidFill>
+                <a:miter lim="800000"/>
+                <a:headEnd/>
+                <a:tailEnd/>
+              </a14:hiddenLine>
+            </a:ext>
+            <a:ext uri="{AF507438-7753-43E0-B8FC-AC1667EBCBE1}">
+              <a14:hiddenEffects xmlns:a14="http://schemas.microsoft.com/office/drawing/2010/main">
+                <a:effectLst>
+                  <a:outerShdw dist="35921" dir="2700000" algn="ctr" rotWithShape="0">
+                    <a:schemeClr val="bg2"/>
+                  </a:outerShdw>
+                </a:effectLst>
+              </a14:hiddenEffects>
+            </a:ext>
+          </a:extLst>
+        </p:spPr>
+      </p:pic>
+      <p:sp>
+        <p:nvSpPr>
+          <p:cNvPr id="4" name="TextBox 3"/>
+          <p:cNvSpPr txBox="1"/>
+          <p:nvPr/>
+        </p:nvSpPr>
+        <p:spPr>
+          <a:xfrm>
+            <a:off x="543158" y="2597756"/>
+            <a:ext cx="2722669" cy="461665"/>
+          </a:xfrm>
+          <a:prstGeom prst="rect">
+            <a:avLst/>
+          </a:prstGeom>
+          <a:noFill/>
+        </p:spPr>
+        <p:txBody>
+          <a:bodyPr wrap="none" rtlCol="0">
+            <a:spAutoFit/>
+          </a:bodyPr>
+          <a:lstStyle/>
+          <a:p>
+            <a:pPr algn="ctr"/>
+            <a:r>
+              <a:rPr lang="en-US" sz="2400" dirty="0" smtClean="0"/>
+              <a:t>Debugger \ General:</a:t>
+            </a:r>
+            <a:endParaRPr lang="ru-RU" sz="2400" dirty="0" smtClean="0"/>
+          </a:p>
+        </p:txBody>
+      </p:sp>
+      <p:pic>
+        <p:nvPicPr>
+          <p:cNvPr id="1028" name="Picture 4"/>
+          <p:cNvPicPr>
+            <a:picLocks noChangeAspect="1" noChangeArrowheads="1"/>
+          </p:cNvPicPr>
+          <p:nvPr/>
+        </p:nvPicPr>
+        <p:blipFill>
+          <a:blip r:embed="rId3">
+            <a:extLst>
+              <a:ext uri="{28A0092B-C50C-407E-A947-70E740481C1C}">
+                <a14:useLocalDpi xmlns:a14="http://schemas.microsoft.com/office/drawing/2010/main" val="0"/>
+              </a:ext>
+            </a:extLst>
+          </a:blip>
+          <a:srcRect/>
+          <a:stretch>
+            <a:fillRect/>
+          </a:stretch>
+        </p:blipFill>
+        <p:spPr bwMode="auto">
+          <a:xfrm>
+            <a:off x="3995936" y="5085184"/>
+            <a:ext cx="4381500" cy="1352550"/>
+          </a:xfrm>
+          <a:prstGeom prst="rect">
+            <a:avLst/>
+          </a:prstGeom>
+          <a:noFill/>
+          <a:ln>
+            <a:noFill/>
+          </a:ln>
+          <a:effectLst/>
+          <a:extLst>
+            <a:ext uri="{909E8E84-426E-40DD-AFC4-6F175D3DCCD1}">
+              <a14:hiddenFill xmlns:a14="http://schemas.microsoft.com/office/drawing/2010/main">
+                <a:solidFill>
+                  <a:schemeClr val="accent1"/>
+                </a:solidFill>
+              </a14:hiddenFill>
+            </a:ext>
+            <a:ext uri="{91240B29-F687-4F45-9708-019B960494DF}">
+              <a14:hiddenLine xmlns:a14="http://schemas.microsoft.com/office/drawing/2010/main" w="9525">
+                <a:solidFill>
+                  <a:schemeClr val="tx1"/>
+                </a:solidFill>
+                <a:miter lim="800000"/>
+                <a:headEnd/>
+                <a:tailEnd/>
+              </a14:hiddenLine>
+            </a:ext>
+            <a:ext uri="{AF507438-7753-43E0-B8FC-AC1667EBCBE1}">
+              <a14:hiddenEffects xmlns:a14="http://schemas.microsoft.com/office/drawing/2010/main">
+                <a:effectLst>
+                  <a:outerShdw dist="35921" dir="2700000" algn="ctr" rotWithShape="0">
+                    <a:schemeClr val="bg2"/>
+                  </a:outerShdw>
+                </a:effectLst>
+              </a14:hiddenEffects>
+            </a:ext>
+          </a:extLst>
+        </p:spPr>
+      </p:pic>
+      <p:sp>
+        <p:nvSpPr>
+          <p:cNvPr id="8" name="TextBox 7"/>
+          <p:cNvSpPr txBox="1"/>
+          <p:nvPr/>
+        </p:nvSpPr>
+        <p:spPr>
+          <a:xfrm>
+            <a:off x="516260" y="5085184"/>
+            <a:ext cx="2776466" cy="461665"/>
+          </a:xfrm>
+          <a:prstGeom prst="rect">
+            <a:avLst/>
+          </a:prstGeom>
+          <a:noFill/>
+        </p:spPr>
+        <p:txBody>
+          <a:bodyPr wrap="none" rtlCol="0">
+            <a:spAutoFit/>
+          </a:bodyPr>
+          <a:lstStyle/>
+          <a:p>
+            <a:pPr algn="ctr"/>
+            <a:r>
+              <a:rPr lang="en-US" sz="2400" dirty="0" smtClean="0"/>
+              <a:t>Debugger \ Symbols:</a:t>
+            </a:r>
+          </a:p>
+        </p:txBody>
+      </p:sp>
+      <p:sp>
+        <p:nvSpPr>
+          <p:cNvPr id="5" name="TextBox 4"/>
+          <p:cNvSpPr txBox="1"/>
+          <p:nvPr/>
+        </p:nvSpPr>
+        <p:spPr>
+          <a:xfrm>
+            <a:off x="2483768" y="4581128"/>
+            <a:ext cx="6192593" cy="369332"/>
+          </a:xfrm>
+          <a:prstGeom prst="rect">
+            <a:avLst/>
+          </a:prstGeom>
+          <a:noFill/>
+        </p:spPr>
+        <p:txBody>
+          <a:bodyPr wrap="none" rtlCol="0">
+            <a:spAutoFit/>
+          </a:bodyPr>
+          <a:lstStyle/>
+          <a:p>
+            <a:pPr algn="ctr"/>
+            <a:r>
+              <a:rPr lang="ru-RU" dirty="0" smtClean="0"/>
+              <a:t>Добавьте адрес </a:t>
+            </a:r>
+            <a:r>
+              <a:rPr lang="en-US" dirty="0"/>
+              <a:t>http://referencesource.microsoft.com/symbols</a:t>
+            </a:r>
+            <a:endParaRPr lang="ru-RU" dirty="0" smtClean="0"/>
           </a:p>
         </p:txBody>
       </p:sp>
     </p:spTree>
     <p:extLst>
       <p:ext uri="{BB962C8B-B14F-4D97-AF65-F5344CB8AC3E}">
-        <p14:creationId xmlns:p14="http://schemas.microsoft.com/office/powerpoint/2010/main" val="3583458690"/>
+        <p14:creationId xmlns:p14="http://schemas.microsoft.com/office/powerpoint/2010/main" val="2605966343"/>
       </p:ext>
     </p:extLst>
   </p:cSld>
@@ -17822,6 +17758,194 @@
             <p:ph type="title"/>
           </p:nvPr>
         </p:nvSpPr>
+        <p:spPr>
+          <a:xfrm>
+            <a:off x="457200" y="274638"/>
+            <a:ext cx="8229600" cy="706090"/>
+          </a:xfrm>
+        </p:spPr>
+        <p:txBody>
+          <a:bodyPr>
+            <a:normAutofit/>
+          </a:bodyPr>
+          <a:lstStyle/>
+          <a:p>
+            <a:r>
+              <a:rPr lang="ru-RU" sz="3200" dirty="0" smtClean="0"/>
+              <a:t>Отладка </a:t>
+            </a:r>
+            <a:r>
+              <a:rPr lang="en-US" sz="3200" dirty="0" smtClean="0"/>
+              <a:t>.NET </a:t>
+            </a:r>
+            <a:r>
+              <a:rPr lang="ru-RU" sz="3200" dirty="0" smtClean="0"/>
+              <a:t>с помощью </a:t>
+            </a:r>
+            <a:r>
+              <a:rPr lang="en-US" sz="3200" dirty="0" err="1" smtClean="0"/>
+              <a:t>dotPeek</a:t>
+            </a:r>
+            <a:r>
+              <a:rPr lang="en-US" sz="3200" dirty="0" smtClean="0"/>
+              <a:t> 1.2+</a:t>
+            </a:r>
+            <a:endParaRPr lang="ru-RU" sz="3200" dirty="0"/>
+          </a:p>
+        </p:txBody>
+      </p:sp>
+      <p:sp>
+        <p:nvSpPr>
+          <p:cNvPr id="3" name="Content Placeholder 2"/>
+          <p:cNvSpPr>
+            <a:spLocks noGrp="1"/>
+          </p:cNvSpPr>
+          <p:nvPr>
+            <p:ph idx="1"/>
+          </p:nvPr>
+        </p:nvSpPr>
+        <p:spPr>
+          <a:xfrm>
+            <a:off x="457200" y="980728"/>
+            <a:ext cx="8229600" cy="2520280"/>
+          </a:xfrm>
+        </p:spPr>
+        <p:txBody>
+          <a:bodyPr>
+            <a:noAutofit/>
+          </a:bodyPr>
+          <a:lstStyle/>
+          <a:p>
+            <a:pPr marL="0" indent="0">
+              <a:buNone/>
+            </a:pPr>
+            <a:r>
+              <a:rPr lang="ru-RU" sz="2400" dirty="0" smtClean="0"/>
+              <a:t>В </a:t>
+            </a:r>
+            <a:r>
+              <a:rPr lang="en-US" sz="2400" dirty="0" err="1" smtClean="0"/>
+              <a:t>dotPeek</a:t>
+            </a:r>
+            <a:r>
+              <a:rPr lang="en-US" sz="2400" dirty="0" smtClean="0"/>
+              <a:t> 1.2 </a:t>
+            </a:r>
+            <a:r>
+              <a:rPr lang="ru-RU" sz="2400" dirty="0" smtClean="0"/>
+              <a:t>была добавлена команда «</a:t>
+            </a:r>
+            <a:r>
+              <a:rPr lang="en-US" sz="2400" dirty="0" smtClean="0"/>
+              <a:t>Generate PDB</a:t>
+            </a:r>
+            <a:r>
+              <a:rPr lang="ru-RU" sz="2400" dirty="0" smtClean="0"/>
+              <a:t>» и поддержка </a:t>
+            </a:r>
+            <a:r>
+              <a:rPr lang="en-US" sz="2400" dirty="0" smtClean="0"/>
+              <a:t>Symbol Server. </a:t>
+            </a:r>
+            <a:r>
+              <a:rPr lang="ru-RU" sz="2400" dirty="0" smtClean="0"/>
+              <a:t>С их помощью можно отлаживать </a:t>
+            </a:r>
+            <a:r>
+              <a:rPr lang="en-US" sz="2400" dirty="0" smtClean="0"/>
+              <a:t>.NET </a:t>
+            </a:r>
+            <a:r>
+              <a:rPr lang="ru-RU" sz="2400" dirty="0" smtClean="0"/>
+              <a:t>и чужие сборки. Подробности читайте на сайте </a:t>
+            </a:r>
+            <a:r>
+              <a:rPr lang="en-US" sz="2400" dirty="0" smtClean="0"/>
+              <a:t>JetBrains:</a:t>
+            </a:r>
+            <a:endParaRPr lang="ru-RU" sz="2400" dirty="0" smtClean="0">
+              <a:hlinkClick r:id="rId2"/>
+            </a:endParaRPr>
+          </a:p>
+          <a:p>
+            <a:pPr marL="0" indent="0">
+              <a:buNone/>
+            </a:pPr>
+            <a:endParaRPr lang="en-US" sz="2400" dirty="0" smtClean="0"/>
+          </a:p>
+          <a:p>
+            <a:pPr marL="0" indent="0">
+              <a:buNone/>
+            </a:pPr>
+            <a:r>
+              <a:rPr lang="en-US" sz="2400" dirty="0" smtClean="0">
+                <a:hlinkClick r:id="rId2"/>
+              </a:rPr>
+              <a:t>http</a:t>
+            </a:r>
+            <a:r>
+              <a:rPr lang="en-US" sz="2400" dirty="0">
+                <a:hlinkClick r:id="rId2"/>
+              </a:rPr>
+              <a:t>://</a:t>
+            </a:r>
+            <a:r>
+              <a:rPr lang="en-US" sz="2400" dirty="0" smtClean="0">
+                <a:hlinkClick r:id="rId2"/>
+              </a:rPr>
+              <a:t>confluence.jetbrains.com/display/NETCOM/dotPeek+Symbol+Server+and+PDB+Generation</a:t>
+            </a:r>
+            <a:endParaRPr lang="ru-RU" sz="2400" dirty="0"/>
+          </a:p>
+        </p:txBody>
+      </p:sp>
+    </p:spTree>
+    <p:extLst>
+      <p:ext uri="{BB962C8B-B14F-4D97-AF65-F5344CB8AC3E}">
+        <p14:creationId xmlns:p14="http://schemas.microsoft.com/office/powerpoint/2010/main" val="3583458690"/>
+      </p:ext>
+    </p:extLst>
+  </p:cSld>
+  <p:clrMapOvr>
+    <a:masterClrMapping/>
+  </p:clrMapOvr>
+  <p:timing>
+    <p:tnLst>
+      <p:par>
+        <p:cTn id="1" dur="indefinite" restart="never" nodeType="tmRoot"/>
+      </p:par>
+    </p:tnLst>
+  </p:timing>
+</p:sld>
+</file>
+
+<file path=ppt/slides/slide47.xml><?xml version="1.0" encoding="utf-8"?>
+<p:sld xmlns:a="http://schemas.openxmlformats.org/drawingml/2006/main" xmlns:r="http://schemas.openxmlformats.org/officeDocument/2006/relationships" xmlns:p="http://schemas.openxmlformats.org/presentationml/2006/main">
+  <p:cSld>
+    <p:spTree>
+      <p:nvGrpSpPr>
+        <p:cNvPr id="1" name=""/>
+        <p:cNvGrpSpPr/>
+        <p:nvPr/>
+      </p:nvGrpSpPr>
+      <p:grpSpPr>
+        <a:xfrm>
+          <a:off x="0" y="0"/>
+          <a:ext cx="0" cy="0"/>
+          <a:chOff x="0" y="0"/>
+          <a:chExt cx="0" cy="0"/>
+        </a:xfrm>
+      </p:grpSpPr>
+      <p:sp>
+        <p:nvSpPr>
+          <p:cNvPr id="2" name="Title 1"/>
+          <p:cNvSpPr>
+            <a:spLocks noGrp="1"/>
+          </p:cNvSpPr>
+          <p:nvPr>
+            <p:ph type="title"/>
+          </p:nvPr>
+        </p:nvSpPr>
         <p:spPr/>
         <p:txBody>
           <a:bodyPr/>
@@ -18041,7 +18165,7 @@
 </p:sld>
 </file>
 
-<file path=ppt/slides/slide47.xml><?xml version="1.0" encoding="utf-8"?>
+<file path=ppt/slides/slide48.xml><?xml version="1.0" encoding="utf-8"?>
 <p:sld xmlns:a="http://schemas.openxmlformats.org/drawingml/2006/main" xmlns:r="http://schemas.openxmlformats.org/officeDocument/2006/relationships" xmlns:p="http://schemas.openxmlformats.org/presentationml/2006/main">
   <p:cSld>
     <p:spTree>
@@ -18912,7 +19036,7 @@
 </p:sld>
 </file>
 
-<file path=ppt/slides/slide48.xml><?xml version="1.0" encoding="utf-8"?>
+<file path=ppt/slides/slide49.xml><?xml version="1.0" encoding="utf-8"?>
 <p:sld xmlns:a="http://schemas.openxmlformats.org/drawingml/2006/main" xmlns:r="http://schemas.openxmlformats.org/officeDocument/2006/relationships" xmlns:p="http://schemas.openxmlformats.org/presentationml/2006/main">
   <p:cSld>
     <p:spTree>
@@ -19755,660 +19879,6 @@
     <p:extLst>
       <p:ext uri="{BB962C8B-B14F-4D97-AF65-F5344CB8AC3E}">
         <p14:creationId xmlns:p14="http://schemas.microsoft.com/office/powerpoint/2010/main" val="146513021"/>
-      </p:ext>
-    </p:extLst>
-  </p:cSld>
-  <p:clrMapOvr>
-    <a:masterClrMapping/>
-  </p:clrMapOvr>
-  <p:timing>
-    <p:tnLst>
-      <p:par>
-        <p:cTn id="1" dur="indefinite" restart="never" nodeType="tmRoot"/>
-      </p:par>
-    </p:tnLst>
-  </p:timing>
-</p:sld>
-</file>
-
-<file path=ppt/slides/slide49.xml><?xml version="1.0" encoding="utf-8"?>
-<p:sld xmlns:a="http://schemas.openxmlformats.org/drawingml/2006/main" xmlns:r="http://schemas.openxmlformats.org/officeDocument/2006/relationships" xmlns:p="http://schemas.openxmlformats.org/presentationml/2006/main">
-  <p:cSld>
-    <p:spTree>
-      <p:nvGrpSpPr>
-        <p:cNvPr id="1" name=""/>
-        <p:cNvGrpSpPr/>
-        <p:nvPr/>
-      </p:nvGrpSpPr>
-      <p:grpSpPr>
-        <a:xfrm>
-          <a:off x="0" y="0"/>
-          <a:ext cx="0" cy="0"/>
-          <a:chOff x="0" y="0"/>
-          <a:chExt cx="0" cy="0"/>
-        </a:xfrm>
-      </p:grpSpPr>
-      <p:sp>
-        <p:nvSpPr>
-          <p:cNvPr id="9218" name="Rectangle 3"/>
-          <p:cNvSpPr>
-            <a:spLocks noChangeArrowheads="1"/>
-          </p:cNvSpPr>
-          <p:nvPr/>
-        </p:nvSpPr>
-        <p:spPr bwMode="auto">
-          <a:xfrm>
-            <a:off x="152400" y="-4763"/>
-            <a:ext cx="8763000" cy="461963"/>
-          </a:xfrm>
-          <a:prstGeom prst="rect">
-            <a:avLst/>
-          </a:prstGeom>
-          <a:noFill/>
-          <a:ln>
-            <a:noFill/>
-          </a:ln>
-          <a:extLst>
-            <a:ext uri="{909E8E84-426E-40DD-AFC4-6F175D3DCCD1}">
-              <a14:hiddenFill xmlns:a14="http://schemas.microsoft.com/office/drawing/2010/main">
-                <a:solidFill>
-                  <a:srgbClr val="FFFFFF"/>
-                </a:solidFill>
-              </a14:hiddenFill>
-            </a:ext>
-            <a:ext uri="{91240B29-F687-4F45-9708-019B960494DF}">
-              <a14:hiddenLine xmlns:a14="http://schemas.microsoft.com/office/drawing/2010/main" w="9525">
-                <a:solidFill>
-                  <a:srgbClr val="000000"/>
-                </a:solidFill>
-                <a:miter lim="800000"/>
-                <a:headEnd/>
-                <a:tailEnd/>
-              </a14:hiddenLine>
-            </a:ext>
-          </a:extLst>
-        </p:spPr>
-        <p:txBody>
-          <a:bodyPr anchor="ctr">
-            <a:spAutoFit/>
-          </a:bodyPr>
-          <a:lstStyle/>
-          <a:p>
-            <a:pPr algn="ctr"/>
-            <a:r>
-              <a:rPr lang="ru-RU" sz="2400" b="1"/>
-              <a:t>Пространство </a:t>
-            </a:r>
-            <a:r>
-              <a:rPr lang="en-US" sz="2400" b="1"/>
-              <a:t>System.Reflection.</a:t>
-            </a:r>
-          </a:p>
-        </p:txBody>
-      </p:sp>
-      <p:sp>
-        <p:nvSpPr>
-          <p:cNvPr id="9219" name="Rectangle 3"/>
-          <p:cNvSpPr>
-            <a:spLocks noChangeArrowheads="1"/>
-          </p:cNvSpPr>
-          <p:nvPr/>
-        </p:nvSpPr>
-        <p:spPr bwMode="auto">
-          <a:xfrm>
-            <a:off x="152400" y="581025"/>
-            <a:ext cx="8839200" cy="336550"/>
-          </a:xfrm>
-          <a:prstGeom prst="rect">
-            <a:avLst/>
-          </a:prstGeom>
-          <a:noFill/>
-          <a:ln>
-            <a:noFill/>
-          </a:ln>
-          <a:extLst>
-            <a:ext uri="{909E8E84-426E-40DD-AFC4-6F175D3DCCD1}">
-              <a14:hiddenFill xmlns:a14="http://schemas.microsoft.com/office/drawing/2010/main">
-                <a:solidFill>
-                  <a:srgbClr val="FFFFFF"/>
-                </a:solidFill>
-              </a14:hiddenFill>
-            </a:ext>
-            <a:ext uri="{91240B29-F687-4F45-9708-019B960494DF}">
-              <a14:hiddenLine xmlns:a14="http://schemas.microsoft.com/office/drawing/2010/main" w="9525">
-                <a:solidFill>
-                  <a:srgbClr val="000000"/>
-                </a:solidFill>
-                <a:miter lim="800000"/>
-                <a:headEnd/>
-                <a:tailEnd/>
-              </a14:hiddenLine>
-            </a:ext>
-          </a:extLst>
-        </p:spPr>
-        <p:txBody>
-          <a:bodyPr anchor="ctr">
-            <a:spAutoFit/>
-          </a:bodyPr>
-          <a:lstStyle/>
-          <a:p>
-            <a:r>
-              <a:rPr lang="ru-RU" sz="1600"/>
-              <a:t>	Используя класс </a:t>
-            </a:r>
-            <a:r>
-              <a:rPr lang="en-US" sz="1600"/>
-              <a:t>Activator</a:t>
-            </a:r>
-            <a:r>
-              <a:rPr lang="ru-RU" sz="1600"/>
-              <a:t> можно создать объект нудного класса.</a:t>
-            </a:r>
-          </a:p>
-        </p:txBody>
-      </p:sp>
-      <p:sp>
-        <p:nvSpPr>
-          <p:cNvPr id="22538" name="Rectangle 10"/>
-          <p:cNvSpPr>
-            <a:spLocks noChangeArrowheads="1"/>
-          </p:cNvSpPr>
-          <p:nvPr/>
-        </p:nvSpPr>
-        <p:spPr bwMode="auto">
-          <a:xfrm>
-            <a:off x="152400" y="990600"/>
-            <a:ext cx="8839200" cy="3478213"/>
-          </a:xfrm>
-          <a:prstGeom prst="rect">
-            <a:avLst/>
-          </a:prstGeom>
-          <a:noFill/>
-          <a:ln w="9525">
-            <a:solidFill>
-              <a:schemeClr val="bg1">
-                <a:lumMod val="65000"/>
-              </a:schemeClr>
-            </a:solidFill>
-            <a:miter lim="800000"/>
-            <a:headEnd/>
-            <a:tailEnd/>
-          </a:ln>
-          <a:effectLst/>
-        </p:spPr>
-        <p:txBody>
-          <a:bodyPr anchor="ctr">
-            <a:spAutoFit/>
-          </a:bodyPr>
-          <a:lstStyle/>
-          <a:p>
-            <a:pPr eaLnBrk="0" hangingPunct="0"/>
-            <a:r>
-              <a:rPr lang="be-BY" sz="1000" dirty="0">
-                <a:solidFill>
-                  <a:schemeClr val="bg1"/>
-                </a:solidFill>
-                <a:latin typeface="Courier New" pitchFamily="49" charset="0"/>
-                <a:ea typeface="Calibri" pitchFamily="34" charset="0"/>
-                <a:cs typeface="Courier New" pitchFamily="49" charset="0"/>
-              </a:rPr>
-              <a:t>    class Program</a:t>
-            </a:r>
-            <a:endParaRPr lang="be-BY" sz="900" dirty="0">
-              <a:solidFill>
-                <a:schemeClr val="bg1"/>
-              </a:solidFill>
-              <a:ea typeface="Calibri" pitchFamily="34" charset="0"/>
-              <a:cs typeface="Courier New" pitchFamily="49" charset="0"/>
-            </a:endParaRPr>
-          </a:p>
-          <a:p>
-            <a:pPr eaLnBrk="0" hangingPunct="0"/>
-            <a:r>
-              <a:rPr lang="be-BY" sz="1000" dirty="0">
-                <a:solidFill>
-                  <a:schemeClr val="bg1"/>
-                </a:solidFill>
-                <a:latin typeface="Courier New" pitchFamily="49" charset="0"/>
-                <a:ea typeface="Calibri" pitchFamily="34" charset="0"/>
-                <a:cs typeface="Courier New" pitchFamily="49" charset="0"/>
-              </a:rPr>
-              <a:t>    {</a:t>
-            </a:r>
-            <a:endParaRPr lang="be-BY" sz="900" dirty="0">
-              <a:solidFill>
-                <a:schemeClr val="bg1"/>
-              </a:solidFill>
-              <a:ea typeface="Calibri" pitchFamily="34" charset="0"/>
-              <a:cs typeface="Courier New" pitchFamily="49" charset="0"/>
-            </a:endParaRPr>
-          </a:p>
-          <a:p>
-            <a:pPr eaLnBrk="0" hangingPunct="0"/>
-            <a:r>
-              <a:rPr lang="be-BY" sz="1000" dirty="0">
-                <a:solidFill>
-                  <a:schemeClr val="bg1"/>
-                </a:solidFill>
-                <a:latin typeface="Courier New" pitchFamily="49" charset="0"/>
-                <a:ea typeface="Calibri" pitchFamily="34" charset="0"/>
-                <a:cs typeface="Courier New" pitchFamily="49" charset="0"/>
-              </a:rPr>
-              <a:t>        static void Main(string[] args)</a:t>
-            </a:r>
-            <a:endParaRPr lang="be-BY" sz="900" dirty="0">
-              <a:solidFill>
-                <a:schemeClr val="bg1"/>
-              </a:solidFill>
-              <a:ea typeface="Calibri" pitchFamily="34" charset="0"/>
-              <a:cs typeface="Courier New" pitchFamily="49" charset="0"/>
-            </a:endParaRPr>
-          </a:p>
-          <a:p>
-            <a:pPr eaLnBrk="0" hangingPunct="0"/>
-            <a:r>
-              <a:rPr lang="be-BY" sz="1000" dirty="0">
-                <a:solidFill>
-                  <a:schemeClr val="bg1"/>
-                </a:solidFill>
-                <a:latin typeface="Courier New" pitchFamily="49" charset="0"/>
-                <a:ea typeface="Calibri" pitchFamily="34" charset="0"/>
-                <a:cs typeface="Courier New" pitchFamily="49" charset="0"/>
-              </a:rPr>
-              <a:t>        {</a:t>
-            </a:r>
-            <a:endParaRPr lang="be-BY" sz="900" dirty="0">
-              <a:solidFill>
-                <a:schemeClr val="bg1"/>
-              </a:solidFill>
-              <a:ea typeface="Calibri" pitchFamily="34" charset="0"/>
-              <a:cs typeface="Courier New" pitchFamily="49" charset="0"/>
-            </a:endParaRPr>
-          </a:p>
-          <a:p>
-            <a:pPr eaLnBrk="0" hangingPunct="0"/>
-            <a:r>
-              <a:rPr lang="be-BY" sz="1000" dirty="0">
-                <a:solidFill>
-                  <a:schemeClr val="bg1"/>
-                </a:solidFill>
-                <a:latin typeface="Courier New" pitchFamily="49" charset="0"/>
-                <a:ea typeface="Calibri" pitchFamily="34" charset="0"/>
-                <a:cs typeface="Courier New" pitchFamily="49" charset="0"/>
-              </a:rPr>
-              <a:t>            AssemblyName name = new AssemblyName("Complex");</a:t>
-            </a:r>
-            <a:endParaRPr lang="be-BY" sz="900" dirty="0">
-              <a:solidFill>
-                <a:schemeClr val="bg1"/>
-              </a:solidFill>
-              <a:ea typeface="Calibri" pitchFamily="34" charset="0"/>
-              <a:cs typeface="Courier New" pitchFamily="49" charset="0"/>
-            </a:endParaRPr>
-          </a:p>
-          <a:p>
-            <a:pPr eaLnBrk="0" hangingPunct="0"/>
-            <a:r>
-              <a:rPr lang="be-BY" sz="1000" dirty="0">
-                <a:solidFill>
-                  <a:schemeClr val="bg1"/>
-                </a:solidFill>
-                <a:latin typeface="Courier New" pitchFamily="49" charset="0"/>
-                <a:ea typeface="Calibri" pitchFamily="34" charset="0"/>
-                <a:cs typeface="Courier New" pitchFamily="49" charset="0"/>
-              </a:rPr>
-              <a:t>            name.Version = new Version(1, 0, 0, 0);</a:t>
-            </a:r>
-            <a:endParaRPr lang="be-BY" sz="900" dirty="0">
-              <a:solidFill>
-                <a:schemeClr val="bg1"/>
-              </a:solidFill>
-              <a:ea typeface="Calibri" pitchFamily="34" charset="0"/>
-              <a:cs typeface="Courier New" pitchFamily="49" charset="0"/>
-            </a:endParaRPr>
-          </a:p>
-          <a:p>
-            <a:pPr eaLnBrk="0" hangingPunct="0"/>
-            <a:r>
-              <a:rPr lang="be-BY" sz="1000" dirty="0">
-                <a:solidFill>
-                  <a:schemeClr val="bg1"/>
-                </a:solidFill>
-                <a:latin typeface="Courier New" pitchFamily="49" charset="0"/>
-                <a:ea typeface="Calibri" pitchFamily="34" charset="0"/>
-                <a:cs typeface="Courier New" pitchFamily="49" charset="0"/>
-              </a:rPr>
-              <a:t>            Assembly asm;</a:t>
-            </a:r>
-            <a:endParaRPr lang="be-BY" sz="900" dirty="0">
-              <a:solidFill>
-                <a:schemeClr val="bg1"/>
-              </a:solidFill>
-              <a:ea typeface="Calibri" pitchFamily="34" charset="0"/>
-              <a:cs typeface="Courier New" pitchFamily="49" charset="0"/>
-            </a:endParaRPr>
-          </a:p>
-          <a:p>
-            <a:pPr eaLnBrk="0" hangingPunct="0"/>
-            <a:r>
-              <a:rPr lang="be-BY" sz="1000" dirty="0">
-                <a:solidFill>
-                  <a:schemeClr val="bg1"/>
-                </a:solidFill>
-                <a:latin typeface="Courier New" pitchFamily="49" charset="0"/>
-                <a:ea typeface="Calibri" pitchFamily="34" charset="0"/>
-                <a:cs typeface="Courier New" pitchFamily="49" charset="0"/>
-              </a:rPr>
-              <a:t>            try</a:t>
-            </a:r>
-            <a:endParaRPr lang="be-BY" sz="900" dirty="0">
-              <a:solidFill>
-                <a:schemeClr val="bg1"/>
-              </a:solidFill>
-              <a:ea typeface="Calibri" pitchFamily="34" charset="0"/>
-              <a:cs typeface="Courier New" pitchFamily="49" charset="0"/>
-            </a:endParaRPr>
-          </a:p>
-          <a:p>
-            <a:pPr eaLnBrk="0" hangingPunct="0"/>
-            <a:r>
-              <a:rPr lang="be-BY" sz="1000" dirty="0">
-                <a:solidFill>
-                  <a:schemeClr val="bg1"/>
-                </a:solidFill>
-                <a:latin typeface="Courier New" pitchFamily="49" charset="0"/>
-                <a:ea typeface="Calibri" pitchFamily="34" charset="0"/>
-                <a:cs typeface="Courier New" pitchFamily="49" charset="0"/>
-              </a:rPr>
-              <a:t>            {</a:t>
-            </a:r>
-            <a:endParaRPr lang="be-BY" sz="900" dirty="0">
-              <a:solidFill>
-                <a:schemeClr val="bg1"/>
-              </a:solidFill>
-              <a:ea typeface="Calibri" pitchFamily="34" charset="0"/>
-              <a:cs typeface="Courier New" pitchFamily="49" charset="0"/>
-            </a:endParaRPr>
-          </a:p>
-          <a:p>
-            <a:pPr eaLnBrk="0" hangingPunct="0"/>
-            <a:r>
-              <a:rPr lang="be-BY" sz="1000" dirty="0">
-                <a:solidFill>
-                  <a:schemeClr val="bg1"/>
-                </a:solidFill>
-                <a:latin typeface="Courier New" pitchFamily="49" charset="0"/>
-                <a:ea typeface="Calibri" pitchFamily="34" charset="0"/>
-                <a:cs typeface="Courier New" pitchFamily="49" charset="0"/>
-              </a:rPr>
-              <a:t>                asm = Assembly.Load(name);</a:t>
-            </a:r>
-            <a:endParaRPr lang="be-BY" sz="900" dirty="0">
-              <a:solidFill>
-                <a:schemeClr val="bg1"/>
-              </a:solidFill>
-              <a:ea typeface="Calibri" pitchFamily="34" charset="0"/>
-              <a:cs typeface="Courier New" pitchFamily="49" charset="0"/>
-            </a:endParaRPr>
-          </a:p>
-          <a:p>
-            <a:pPr eaLnBrk="0" hangingPunct="0"/>
-            <a:r>
-              <a:rPr lang="be-BY" sz="1000" dirty="0">
-                <a:solidFill>
-                  <a:schemeClr val="bg1"/>
-                </a:solidFill>
-                <a:latin typeface="Courier New" pitchFamily="49" charset="0"/>
-                <a:ea typeface="Calibri" pitchFamily="34" charset="0"/>
-                <a:cs typeface="Courier New" pitchFamily="49" charset="0"/>
-              </a:rPr>
-              <a:t>            }</a:t>
-            </a:r>
-            <a:endParaRPr lang="be-BY" sz="900" dirty="0">
-              <a:solidFill>
-                <a:schemeClr val="bg1"/>
-              </a:solidFill>
-              <a:ea typeface="Calibri" pitchFamily="34" charset="0"/>
-              <a:cs typeface="Courier New" pitchFamily="49" charset="0"/>
-            </a:endParaRPr>
-          </a:p>
-          <a:p>
-            <a:pPr eaLnBrk="0" hangingPunct="0"/>
-            <a:r>
-              <a:rPr lang="be-BY" sz="1000" dirty="0">
-                <a:solidFill>
-                  <a:schemeClr val="bg1"/>
-                </a:solidFill>
-                <a:latin typeface="Courier New" pitchFamily="49" charset="0"/>
-                <a:ea typeface="Calibri" pitchFamily="34" charset="0"/>
-                <a:cs typeface="Courier New" pitchFamily="49" charset="0"/>
-              </a:rPr>
-              <a:t>            catch (FileNotFoundException e)</a:t>
-            </a:r>
-            <a:endParaRPr lang="be-BY" sz="900" dirty="0">
-              <a:solidFill>
-                <a:schemeClr val="bg1"/>
-              </a:solidFill>
-              <a:ea typeface="Calibri" pitchFamily="34" charset="0"/>
-              <a:cs typeface="Courier New" pitchFamily="49" charset="0"/>
-            </a:endParaRPr>
-          </a:p>
-          <a:p>
-            <a:pPr eaLnBrk="0" hangingPunct="0"/>
-            <a:r>
-              <a:rPr lang="be-BY" sz="1000" dirty="0">
-                <a:solidFill>
-                  <a:schemeClr val="bg1"/>
-                </a:solidFill>
-                <a:latin typeface="Courier New" pitchFamily="49" charset="0"/>
-                <a:ea typeface="Calibri" pitchFamily="34" charset="0"/>
-                <a:cs typeface="Courier New" pitchFamily="49" charset="0"/>
-              </a:rPr>
-              <a:t>            {</a:t>
-            </a:r>
-            <a:endParaRPr lang="be-BY" sz="900" dirty="0">
-              <a:solidFill>
-                <a:schemeClr val="bg1"/>
-              </a:solidFill>
-              <a:ea typeface="Calibri" pitchFamily="34" charset="0"/>
-              <a:cs typeface="Courier New" pitchFamily="49" charset="0"/>
-            </a:endParaRPr>
-          </a:p>
-          <a:p>
-            <a:pPr eaLnBrk="0" hangingPunct="0"/>
-            <a:r>
-              <a:rPr lang="be-BY" sz="1000" dirty="0">
-                <a:solidFill>
-                  <a:schemeClr val="bg1"/>
-                </a:solidFill>
-                <a:latin typeface="Courier New" pitchFamily="49" charset="0"/>
-                <a:ea typeface="Calibri" pitchFamily="34" charset="0"/>
-                <a:cs typeface="Courier New" pitchFamily="49" charset="0"/>
-              </a:rPr>
-              <a:t>                Console.WriteLine(e.Message);</a:t>
-            </a:r>
-            <a:endParaRPr lang="be-BY" sz="900" dirty="0">
-              <a:solidFill>
-                <a:schemeClr val="bg1"/>
-              </a:solidFill>
-              <a:ea typeface="Calibri" pitchFamily="34" charset="0"/>
-              <a:cs typeface="Courier New" pitchFamily="49" charset="0"/>
-            </a:endParaRPr>
-          </a:p>
-          <a:p>
-            <a:pPr eaLnBrk="0" hangingPunct="0"/>
-            <a:r>
-              <a:rPr lang="be-BY" sz="1000" dirty="0">
-                <a:solidFill>
-                  <a:schemeClr val="bg1"/>
-                </a:solidFill>
-                <a:latin typeface="Courier New" pitchFamily="49" charset="0"/>
-                <a:ea typeface="Calibri" pitchFamily="34" charset="0"/>
-                <a:cs typeface="Courier New" pitchFamily="49" charset="0"/>
-              </a:rPr>
-              <a:t>                return;</a:t>
-            </a:r>
-            <a:endParaRPr lang="be-BY" sz="900" dirty="0">
-              <a:solidFill>
-                <a:schemeClr val="bg1"/>
-              </a:solidFill>
-              <a:ea typeface="Calibri" pitchFamily="34" charset="0"/>
-              <a:cs typeface="Courier New" pitchFamily="49" charset="0"/>
-            </a:endParaRPr>
-          </a:p>
-          <a:p>
-            <a:pPr eaLnBrk="0" hangingPunct="0"/>
-            <a:r>
-              <a:rPr lang="be-BY" sz="1000" dirty="0">
-                <a:solidFill>
-                  <a:schemeClr val="bg1"/>
-                </a:solidFill>
-                <a:latin typeface="Courier New" pitchFamily="49" charset="0"/>
-                <a:ea typeface="Calibri" pitchFamily="34" charset="0"/>
-                <a:cs typeface="Courier New" pitchFamily="49" charset="0"/>
-              </a:rPr>
-              <a:t>            }</a:t>
-            </a:r>
-            <a:endParaRPr lang="be-BY" sz="900" dirty="0">
-              <a:solidFill>
-                <a:schemeClr val="bg1"/>
-              </a:solidFill>
-              <a:ea typeface="Calibri" pitchFamily="34" charset="0"/>
-              <a:cs typeface="Courier New" pitchFamily="49" charset="0"/>
-            </a:endParaRPr>
-          </a:p>
-          <a:p>
-            <a:pPr eaLnBrk="0" hangingPunct="0"/>
-            <a:r>
-              <a:rPr lang="be-BY" sz="1000" dirty="0">
-                <a:solidFill>
-                  <a:schemeClr val="bg1"/>
-                </a:solidFill>
-                <a:latin typeface="Courier New" pitchFamily="49" charset="0"/>
-                <a:ea typeface="Calibri" pitchFamily="34" charset="0"/>
-                <a:cs typeface="Courier New" pitchFamily="49" charset="0"/>
-              </a:rPr>
-              <a:t>            Type complex = asm.GetType("ComplexNumbers.Complex");</a:t>
-            </a:r>
-            <a:endParaRPr lang="be-BY" sz="900" dirty="0">
-              <a:solidFill>
-                <a:schemeClr val="bg1"/>
-              </a:solidFill>
-              <a:ea typeface="Calibri" pitchFamily="34" charset="0"/>
-              <a:cs typeface="Courier New" pitchFamily="49" charset="0"/>
-            </a:endParaRPr>
-          </a:p>
-          <a:p>
-            <a:pPr eaLnBrk="0" hangingPunct="0"/>
-            <a:r>
-              <a:rPr lang="be-BY" sz="1000" dirty="0">
-                <a:solidFill>
-                  <a:schemeClr val="bg1"/>
-                </a:solidFill>
-                <a:latin typeface="Courier New" pitchFamily="49" charset="0"/>
-                <a:ea typeface="Calibri" pitchFamily="34" charset="0"/>
-                <a:cs typeface="Courier New" pitchFamily="49" charset="0"/>
-              </a:rPr>
-              <a:t>            object obj = Activator.CreateInstance(complex, 10, 35);</a:t>
-            </a:r>
-            <a:endParaRPr lang="be-BY" sz="900" dirty="0">
-              <a:solidFill>
-                <a:schemeClr val="bg1"/>
-              </a:solidFill>
-              <a:ea typeface="Calibri" pitchFamily="34" charset="0"/>
-              <a:cs typeface="Courier New" pitchFamily="49" charset="0"/>
-            </a:endParaRPr>
-          </a:p>
-          <a:p>
-            <a:pPr eaLnBrk="0" hangingPunct="0"/>
-            <a:r>
-              <a:rPr lang="be-BY" sz="1000" dirty="0">
-                <a:solidFill>
-                  <a:schemeClr val="bg1"/>
-                </a:solidFill>
-                <a:latin typeface="Courier New" pitchFamily="49" charset="0"/>
-                <a:ea typeface="Calibri" pitchFamily="34" charset="0"/>
-                <a:cs typeface="Courier New" pitchFamily="49" charset="0"/>
-              </a:rPr>
-              <a:t>            MethodInfo mi = complex.GetMethod("Abs");   //Получаем информацию о методе Abs </a:t>
-            </a:r>
-            <a:endParaRPr lang="be-BY" sz="900" dirty="0">
-              <a:solidFill>
-                <a:schemeClr val="bg1"/>
-              </a:solidFill>
-              <a:ea typeface="Calibri" pitchFamily="34" charset="0"/>
-              <a:cs typeface="Courier New" pitchFamily="49" charset="0"/>
-            </a:endParaRPr>
-          </a:p>
-          <a:p>
-            <a:pPr eaLnBrk="0" hangingPunct="0"/>
-            <a:r>
-              <a:rPr lang="be-BY" sz="1000" dirty="0">
-                <a:solidFill>
-                  <a:schemeClr val="bg1"/>
-                </a:solidFill>
-                <a:latin typeface="Courier New" pitchFamily="49" charset="0"/>
-                <a:ea typeface="Calibri" pitchFamily="34" charset="0"/>
-                <a:cs typeface="Courier New" pitchFamily="49" charset="0"/>
-              </a:rPr>
-              <a:t>            Console.WriteLine(mi.Invoke(obj, null));    //Вызываем метод</a:t>
-            </a:r>
-            <a:endParaRPr lang="be-BY" sz="900" dirty="0">
-              <a:solidFill>
-                <a:schemeClr val="bg1"/>
-              </a:solidFill>
-              <a:ea typeface="Calibri" pitchFamily="34" charset="0"/>
-              <a:cs typeface="Courier New" pitchFamily="49" charset="0"/>
-            </a:endParaRPr>
-          </a:p>
-          <a:p>
-            <a:pPr eaLnBrk="0" hangingPunct="0"/>
-            <a:r>
-              <a:rPr lang="be-BY" sz="1000" dirty="0">
-                <a:solidFill>
-                  <a:schemeClr val="bg1"/>
-                </a:solidFill>
-                <a:latin typeface="Courier New" pitchFamily="49" charset="0"/>
-                <a:ea typeface="Calibri" pitchFamily="34" charset="0"/>
-                <a:cs typeface="Courier New" pitchFamily="49" charset="0"/>
-              </a:rPr>
-              <a:t>        }</a:t>
-            </a:r>
-            <a:endParaRPr lang="be-BY" sz="900" dirty="0">
-              <a:solidFill>
-                <a:schemeClr val="bg1"/>
-              </a:solidFill>
-              <a:ea typeface="Calibri" pitchFamily="34" charset="0"/>
-              <a:cs typeface="Courier New" pitchFamily="49" charset="0"/>
-            </a:endParaRPr>
-          </a:p>
-          <a:p>
-            <a:pPr eaLnBrk="0" hangingPunct="0"/>
-            <a:r>
-              <a:rPr lang="be-BY" sz="1000" dirty="0">
-                <a:solidFill>
-                  <a:schemeClr val="bg1"/>
-                </a:solidFill>
-                <a:latin typeface="Courier New" pitchFamily="49" charset="0"/>
-                <a:ea typeface="Calibri" pitchFamily="34" charset="0"/>
-                <a:cs typeface="Courier New" pitchFamily="49" charset="0"/>
-              </a:rPr>
-              <a:t>    }</a:t>
-            </a:r>
-            <a:endParaRPr lang="be-BY" dirty="0">
-              <a:solidFill>
-                <a:schemeClr val="bg1"/>
-              </a:solidFill>
-              <a:ea typeface="Calibri" pitchFamily="34" charset="0"/>
-              <a:cs typeface="Courier New" pitchFamily="49" charset="0"/>
-            </a:endParaRPr>
-          </a:p>
-        </p:txBody>
-      </p:sp>
-    </p:spTree>
-    <p:extLst>
-      <p:ext uri="{BB962C8B-B14F-4D97-AF65-F5344CB8AC3E}">
-        <p14:creationId xmlns:p14="http://schemas.microsoft.com/office/powerpoint/2010/main" val="2652139991"/>
       </p:ext>
     </p:extLst>
   </p:cSld>
@@ -21901,6 +21371,660 @@
       </p:grpSpPr>
       <p:sp>
         <p:nvSpPr>
+          <p:cNvPr id="9218" name="Rectangle 3"/>
+          <p:cNvSpPr>
+            <a:spLocks noChangeArrowheads="1"/>
+          </p:cNvSpPr>
+          <p:nvPr/>
+        </p:nvSpPr>
+        <p:spPr bwMode="auto">
+          <a:xfrm>
+            <a:off x="152400" y="-4763"/>
+            <a:ext cx="8763000" cy="461963"/>
+          </a:xfrm>
+          <a:prstGeom prst="rect">
+            <a:avLst/>
+          </a:prstGeom>
+          <a:noFill/>
+          <a:ln>
+            <a:noFill/>
+          </a:ln>
+          <a:extLst>
+            <a:ext uri="{909E8E84-426E-40DD-AFC4-6F175D3DCCD1}">
+              <a14:hiddenFill xmlns:a14="http://schemas.microsoft.com/office/drawing/2010/main">
+                <a:solidFill>
+                  <a:srgbClr val="FFFFFF"/>
+                </a:solidFill>
+              </a14:hiddenFill>
+            </a:ext>
+            <a:ext uri="{91240B29-F687-4F45-9708-019B960494DF}">
+              <a14:hiddenLine xmlns:a14="http://schemas.microsoft.com/office/drawing/2010/main" w="9525">
+                <a:solidFill>
+                  <a:srgbClr val="000000"/>
+                </a:solidFill>
+                <a:miter lim="800000"/>
+                <a:headEnd/>
+                <a:tailEnd/>
+              </a14:hiddenLine>
+            </a:ext>
+          </a:extLst>
+        </p:spPr>
+        <p:txBody>
+          <a:bodyPr anchor="ctr">
+            <a:spAutoFit/>
+          </a:bodyPr>
+          <a:lstStyle/>
+          <a:p>
+            <a:pPr algn="ctr"/>
+            <a:r>
+              <a:rPr lang="ru-RU" sz="2400" b="1"/>
+              <a:t>Пространство </a:t>
+            </a:r>
+            <a:r>
+              <a:rPr lang="en-US" sz="2400" b="1"/>
+              <a:t>System.Reflection.</a:t>
+            </a:r>
+          </a:p>
+        </p:txBody>
+      </p:sp>
+      <p:sp>
+        <p:nvSpPr>
+          <p:cNvPr id="9219" name="Rectangle 3"/>
+          <p:cNvSpPr>
+            <a:spLocks noChangeArrowheads="1"/>
+          </p:cNvSpPr>
+          <p:nvPr/>
+        </p:nvSpPr>
+        <p:spPr bwMode="auto">
+          <a:xfrm>
+            <a:off x="152400" y="581025"/>
+            <a:ext cx="8839200" cy="336550"/>
+          </a:xfrm>
+          <a:prstGeom prst="rect">
+            <a:avLst/>
+          </a:prstGeom>
+          <a:noFill/>
+          <a:ln>
+            <a:noFill/>
+          </a:ln>
+          <a:extLst>
+            <a:ext uri="{909E8E84-426E-40DD-AFC4-6F175D3DCCD1}">
+              <a14:hiddenFill xmlns:a14="http://schemas.microsoft.com/office/drawing/2010/main">
+                <a:solidFill>
+                  <a:srgbClr val="FFFFFF"/>
+                </a:solidFill>
+              </a14:hiddenFill>
+            </a:ext>
+            <a:ext uri="{91240B29-F687-4F45-9708-019B960494DF}">
+              <a14:hiddenLine xmlns:a14="http://schemas.microsoft.com/office/drawing/2010/main" w="9525">
+                <a:solidFill>
+                  <a:srgbClr val="000000"/>
+                </a:solidFill>
+                <a:miter lim="800000"/>
+                <a:headEnd/>
+                <a:tailEnd/>
+              </a14:hiddenLine>
+            </a:ext>
+          </a:extLst>
+        </p:spPr>
+        <p:txBody>
+          <a:bodyPr anchor="ctr">
+            <a:spAutoFit/>
+          </a:bodyPr>
+          <a:lstStyle/>
+          <a:p>
+            <a:r>
+              <a:rPr lang="ru-RU" sz="1600"/>
+              <a:t>	Используя класс </a:t>
+            </a:r>
+            <a:r>
+              <a:rPr lang="en-US" sz="1600"/>
+              <a:t>Activator</a:t>
+            </a:r>
+            <a:r>
+              <a:rPr lang="ru-RU" sz="1600"/>
+              <a:t> можно создать объект нудного класса.</a:t>
+            </a:r>
+          </a:p>
+        </p:txBody>
+      </p:sp>
+      <p:sp>
+        <p:nvSpPr>
+          <p:cNvPr id="22538" name="Rectangle 10"/>
+          <p:cNvSpPr>
+            <a:spLocks noChangeArrowheads="1"/>
+          </p:cNvSpPr>
+          <p:nvPr/>
+        </p:nvSpPr>
+        <p:spPr bwMode="auto">
+          <a:xfrm>
+            <a:off x="152400" y="990600"/>
+            <a:ext cx="8839200" cy="3478213"/>
+          </a:xfrm>
+          <a:prstGeom prst="rect">
+            <a:avLst/>
+          </a:prstGeom>
+          <a:noFill/>
+          <a:ln w="9525">
+            <a:solidFill>
+              <a:schemeClr val="bg1">
+                <a:lumMod val="65000"/>
+              </a:schemeClr>
+            </a:solidFill>
+            <a:miter lim="800000"/>
+            <a:headEnd/>
+            <a:tailEnd/>
+          </a:ln>
+          <a:effectLst/>
+        </p:spPr>
+        <p:txBody>
+          <a:bodyPr anchor="ctr">
+            <a:spAutoFit/>
+          </a:bodyPr>
+          <a:lstStyle/>
+          <a:p>
+            <a:pPr eaLnBrk="0" hangingPunct="0"/>
+            <a:r>
+              <a:rPr lang="be-BY" sz="1000" dirty="0">
+                <a:solidFill>
+                  <a:schemeClr val="bg1"/>
+                </a:solidFill>
+                <a:latin typeface="Courier New" pitchFamily="49" charset="0"/>
+                <a:ea typeface="Calibri" pitchFamily="34" charset="0"/>
+                <a:cs typeface="Courier New" pitchFamily="49" charset="0"/>
+              </a:rPr>
+              <a:t>    class Program</a:t>
+            </a:r>
+            <a:endParaRPr lang="be-BY" sz="900" dirty="0">
+              <a:solidFill>
+                <a:schemeClr val="bg1"/>
+              </a:solidFill>
+              <a:ea typeface="Calibri" pitchFamily="34" charset="0"/>
+              <a:cs typeface="Courier New" pitchFamily="49" charset="0"/>
+            </a:endParaRPr>
+          </a:p>
+          <a:p>
+            <a:pPr eaLnBrk="0" hangingPunct="0"/>
+            <a:r>
+              <a:rPr lang="be-BY" sz="1000" dirty="0">
+                <a:solidFill>
+                  <a:schemeClr val="bg1"/>
+                </a:solidFill>
+                <a:latin typeface="Courier New" pitchFamily="49" charset="0"/>
+                <a:ea typeface="Calibri" pitchFamily="34" charset="0"/>
+                <a:cs typeface="Courier New" pitchFamily="49" charset="0"/>
+              </a:rPr>
+              <a:t>    {</a:t>
+            </a:r>
+            <a:endParaRPr lang="be-BY" sz="900" dirty="0">
+              <a:solidFill>
+                <a:schemeClr val="bg1"/>
+              </a:solidFill>
+              <a:ea typeface="Calibri" pitchFamily="34" charset="0"/>
+              <a:cs typeface="Courier New" pitchFamily="49" charset="0"/>
+            </a:endParaRPr>
+          </a:p>
+          <a:p>
+            <a:pPr eaLnBrk="0" hangingPunct="0"/>
+            <a:r>
+              <a:rPr lang="be-BY" sz="1000" dirty="0">
+                <a:solidFill>
+                  <a:schemeClr val="bg1"/>
+                </a:solidFill>
+                <a:latin typeface="Courier New" pitchFamily="49" charset="0"/>
+                <a:ea typeface="Calibri" pitchFamily="34" charset="0"/>
+                <a:cs typeface="Courier New" pitchFamily="49" charset="0"/>
+              </a:rPr>
+              <a:t>        static void Main(string[] args)</a:t>
+            </a:r>
+            <a:endParaRPr lang="be-BY" sz="900" dirty="0">
+              <a:solidFill>
+                <a:schemeClr val="bg1"/>
+              </a:solidFill>
+              <a:ea typeface="Calibri" pitchFamily="34" charset="0"/>
+              <a:cs typeface="Courier New" pitchFamily="49" charset="0"/>
+            </a:endParaRPr>
+          </a:p>
+          <a:p>
+            <a:pPr eaLnBrk="0" hangingPunct="0"/>
+            <a:r>
+              <a:rPr lang="be-BY" sz="1000" dirty="0">
+                <a:solidFill>
+                  <a:schemeClr val="bg1"/>
+                </a:solidFill>
+                <a:latin typeface="Courier New" pitchFamily="49" charset="0"/>
+                <a:ea typeface="Calibri" pitchFamily="34" charset="0"/>
+                <a:cs typeface="Courier New" pitchFamily="49" charset="0"/>
+              </a:rPr>
+              <a:t>        {</a:t>
+            </a:r>
+            <a:endParaRPr lang="be-BY" sz="900" dirty="0">
+              <a:solidFill>
+                <a:schemeClr val="bg1"/>
+              </a:solidFill>
+              <a:ea typeface="Calibri" pitchFamily="34" charset="0"/>
+              <a:cs typeface="Courier New" pitchFamily="49" charset="0"/>
+            </a:endParaRPr>
+          </a:p>
+          <a:p>
+            <a:pPr eaLnBrk="0" hangingPunct="0"/>
+            <a:r>
+              <a:rPr lang="be-BY" sz="1000" dirty="0">
+                <a:solidFill>
+                  <a:schemeClr val="bg1"/>
+                </a:solidFill>
+                <a:latin typeface="Courier New" pitchFamily="49" charset="0"/>
+                <a:ea typeface="Calibri" pitchFamily="34" charset="0"/>
+                <a:cs typeface="Courier New" pitchFamily="49" charset="0"/>
+              </a:rPr>
+              <a:t>            AssemblyName name = new AssemblyName("Complex");</a:t>
+            </a:r>
+            <a:endParaRPr lang="be-BY" sz="900" dirty="0">
+              <a:solidFill>
+                <a:schemeClr val="bg1"/>
+              </a:solidFill>
+              <a:ea typeface="Calibri" pitchFamily="34" charset="0"/>
+              <a:cs typeface="Courier New" pitchFamily="49" charset="0"/>
+            </a:endParaRPr>
+          </a:p>
+          <a:p>
+            <a:pPr eaLnBrk="0" hangingPunct="0"/>
+            <a:r>
+              <a:rPr lang="be-BY" sz="1000" dirty="0">
+                <a:solidFill>
+                  <a:schemeClr val="bg1"/>
+                </a:solidFill>
+                <a:latin typeface="Courier New" pitchFamily="49" charset="0"/>
+                <a:ea typeface="Calibri" pitchFamily="34" charset="0"/>
+                <a:cs typeface="Courier New" pitchFamily="49" charset="0"/>
+              </a:rPr>
+              <a:t>            name.Version = new Version(1, 0, 0, 0);</a:t>
+            </a:r>
+            <a:endParaRPr lang="be-BY" sz="900" dirty="0">
+              <a:solidFill>
+                <a:schemeClr val="bg1"/>
+              </a:solidFill>
+              <a:ea typeface="Calibri" pitchFamily="34" charset="0"/>
+              <a:cs typeface="Courier New" pitchFamily="49" charset="0"/>
+            </a:endParaRPr>
+          </a:p>
+          <a:p>
+            <a:pPr eaLnBrk="0" hangingPunct="0"/>
+            <a:r>
+              <a:rPr lang="be-BY" sz="1000" dirty="0">
+                <a:solidFill>
+                  <a:schemeClr val="bg1"/>
+                </a:solidFill>
+                <a:latin typeface="Courier New" pitchFamily="49" charset="0"/>
+                <a:ea typeface="Calibri" pitchFamily="34" charset="0"/>
+                <a:cs typeface="Courier New" pitchFamily="49" charset="0"/>
+              </a:rPr>
+              <a:t>            Assembly asm;</a:t>
+            </a:r>
+            <a:endParaRPr lang="be-BY" sz="900" dirty="0">
+              <a:solidFill>
+                <a:schemeClr val="bg1"/>
+              </a:solidFill>
+              <a:ea typeface="Calibri" pitchFamily="34" charset="0"/>
+              <a:cs typeface="Courier New" pitchFamily="49" charset="0"/>
+            </a:endParaRPr>
+          </a:p>
+          <a:p>
+            <a:pPr eaLnBrk="0" hangingPunct="0"/>
+            <a:r>
+              <a:rPr lang="be-BY" sz="1000" dirty="0">
+                <a:solidFill>
+                  <a:schemeClr val="bg1"/>
+                </a:solidFill>
+                <a:latin typeface="Courier New" pitchFamily="49" charset="0"/>
+                <a:ea typeface="Calibri" pitchFamily="34" charset="0"/>
+                <a:cs typeface="Courier New" pitchFamily="49" charset="0"/>
+              </a:rPr>
+              <a:t>            try</a:t>
+            </a:r>
+            <a:endParaRPr lang="be-BY" sz="900" dirty="0">
+              <a:solidFill>
+                <a:schemeClr val="bg1"/>
+              </a:solidFill>
+              <a:ea typeface="Calibri" pitchFamily="34" charset="0"/>
+              <a:cs typeface="Courier New" pitchFamily="49" charset="0"/>
+            </a:endParaRPr>
+          </a:p>
+          <a:p>
+            <a:pPr eaLnBrk="0" hangingPunct="0"/>
+            <a:r>
+              <a:rPr lang="be-BY" sz="1000" dirty="0">
+                <a:solidFill>
+                  <a:schemeClr val="bg1"/>
+                </a:solidFill>
+                <a:latin typeface="Courier New" pitchFamily="49" charset="0"/>
+                <a:ea typeface="Calibri" pitchFamily="34" charset="0"/>
+                <a:cs typeface="Courier New" pitchFamily="49" charset="0"/>
+              </a:rPr>
+              <a:t>            {</a:t>
+            </a:r>
+            <a:endParaRPr lang="be-BY" sz="900" dirty="0">
+              <a:solidFill>
+                <a:schemeClr val="bg1"/>
+              </a:solidFill>
+              <a:ea typeface="Calibri" pitchFamily="34" charset="0"/>
+              <a:cs typeface="Courier New" pitchFamily="49" charset="0"/>
+            </a:endParaRPr>
+          </a:p>
+          <a:p>
+            <a:pPr eaLnBrk="0" hangingPunct="0"/>
+            <a:r>
+              <a:rPr lang="be-BY" sz="1000" dirty="0">
+                <a:solidFill>
+                  <a:schemeClr val="bg1"/>
+                </a:solidFill>
+                <a:latin typeface="Courier New" pitchFamily="49" charset="0"/>
+                <a:ea typeface="Calibri" pitchFamily="34" charset="0"/>
+                <a:cs typeface="Courier New" pitchFamily="49" charset="0"/>
+              </a:rPr>
+              <a:t>                asm = Assembly.Load(name);</a:t>
+            </a:r>
+            <a:endParaRPr lang="be-BY" sz="900" dirty="0">
+              <a:solidFill>
+                <a:schemeClr val="bg1"/>
+              </a:solidFill>
+              <a:ea typeface="Calibri" pitchFamily="34" charset="0"/>
+              <a:cs typeface="Courier New" pitchFamily="49" charset="0"/>
+            </a:endParaRPr>
+          </a:p>
+          <a:p>
+            <a:pPr eaLnBrk="0" hangingPunct="0"/>
+            <a:r>
+              <a:rPr lang="be-BY" sz="1000" dirty="0">
+                <a:solidFill>
+                  <a:schemeClr val="bg1"/>
+                </a:solidFill>
+                <a:latin typeface="Courier New" pitchFamily="49" charset="0"/>
+                <a:ea typeface="Calibri" pitchFamily="34" charset="0"/>
+                <a:cs typeface="Courier New" pitchFamily="49" charset="0"/>
+              </a:rPr>
+              <a:t>            }</a:t>
+            </a:r>
+            <a:endParaRPr lang="be-BY" sz="900" dirty="0">
+              <a:solidFill>
+                <a:schemeClr val="bg1"/>
+              </a:solidFill>
+              <a:ea typeface="Calibri" pitchFamily="34" charset="0"/>
+              <a:cs typeface="Courier New" pitchFamily="49" charset="0"/>
+            </a:endParaRPr>
+          </a:p>
+          <a:p>
+            <a:pPr eaLnBrk="0" hangingPunct="0"/>
+            <a:r>
+              <a:rPr lang="be-BY" sz="1000" dirty="0">
+                <a:solidFill>
+                  <a:schemeClr val="bg1"/>
+                </a:solidFill>
+                <a:latin typeface="Courier New" pitchFamily="49" charset="0"/>
+                <a:ea typeface="Calibri" pitchFamily="34" charset="0"/>
+                <a:cs typeface="Courier New" pitchFamily="49" charset="0"/>
+              </a:rPr>
+              <a:t>            catch (FileNotFoundException e)</a:t>
+            </a:r>
+            <a:endParaRPr lang="be-BY" sz="900" dirty="0">
+              <a:solidFill>
+                <a:schemeClr val="bg1"/>
+              </a:solidFill>
+              <a:ea typeface="Calibri" pitchFamily="34" charset="0"/>
+              <a:cs typeface="Courier New" pitchFamily="49" charset="0"/>
+            </a:endParaRPr>
+          </a:p>
+          <a:p>
+            <a:pPr eaLnBrk="0" hangingPunct="0"/>
+            <a:r>
+              <a:rPr lang="be-BY" sz="1000" dirty="0">
+                <a:solidFill>
+                  <a:schemeClr val="bg1"/>
+                </a:solidFill>
+                <a:latin typeface="Courier New" pitchFamily="49" charset="0"/>
+                <a:ea typeface="Calibri" pitchFamily="34" charset="0"/>
+                <a:cs typeface="Courier New" pitchFamily="49" charset="0"/>
+              </a:rPr>
+              <a:t>            {</a:t>
+            </a:r>
+            <a:endParaRPr lang="be-BY" sz="900" dirty="0">
+              <a:solidFill>
+                <a:schemeClr val="bg1"/>
+              </a:solidFill>
+              <a:ea typeface="Calibri" pitchFamily="34" charset="0"/>
+              <a:cs typeface="Courier New" pitchFamily="49" charset="0"/>
+            </a:endParaRPr>
+          </a:p>
+          <a:p>
+            <a:pPr eaLnBrk="0" hangingPunct="0"/>
+            <a:r>
+              <a:rPr lang="be-BY" sz="1000" dirty="0">
+                <a:solidFill>
+                  <a:schemeClr val="bg1"/>
+                </a:solidFill>
+                <a:latin typeface="Courier New" pitchFamily="49" charset="0"/>
+                <a:ea typeface="Calibri" pitchFamily="34" charset="0"/>
+                <a:cs typeface="Courier New" pitchFamily="49" charset="0"/>
+              </a:rPr>
+              <a:t>                Console.WriteLine(e.Message);</a:t>
+            </a:r>
+            <a:endParaRPr lang="be-BY" sz="900" dirty="0">
+              <a:solidFill>
+                <a:schemeClr val="bg1"/>
+              </a:solidFill>
+              <a:ea typeface="Calibri" pitchFamily="34" charset="0"/>
+              <a:cs typeface="Courier New" pitchFamily="49" charset="0"/>
+            </a:endParaRPr>
+          </a:p>
+          <a:p>
+            <a:pPr eaLnBrk="0" hangingPunct="0"/>
+            <a:r>
+              <a:rPr lang="be-BY" sz="1000" dirty="0">
+                <a:solidFill>
+                  <a:schemeClr val="bg1"/>
+                </a:solidFill>
+                <a:latin typeface="Courier New" pitchFamily="49" charset="0"/>
+                <a:ea typeface="Calibri" pitchFamily="34" charset="0"/>
+                <a:cs typeface="Courier New" pitchFamily="49" charset="0"/>
+              </a:rPr>
+              <a:t>                return;</a:t>
+            </a:r>
+            <a:endParaRPr lang="be-BY" sz="900" dirty="0">
+              <a:solidFill>
+                <a:schemeClr val="bg1"/>
+              </a:solidFill>
+              <a:ea typeface="Calibri" pitchFamily="34" charset="0"/>
+              <a:cs typeface="Courier New" pitchFamily="49" charset="0"/>
+            </a:endParaRPr>
+          </a:p>
+          <a:p>
+            <a:pPr eaLnBrk="0" hangingPunct="0"/>
+            <a:r>
+              <a:rPr lang="be-BY" sz="1000" dirty="0">
+                <a:solidFill>
+                  <a:schemeClr val="bg1"/>
+                </a:solidFill>
+                <a:latin typeface="Courier New" pitchFamily="49" charset="0"/>
+                <a:ea typeface="Calibri" pitchFamily="34" charset="0"/>
+                <a:cs typeface="Courier New" pitchFamily="49" charset="0"/>
+              </a:rPr>
+              <a:t>            }</a:t>
+            </a:r>
+            <a:endParaRPr lang="be-BY" sz="900" dirty="0">
+              <a:solidFill>
+                <a:schemeClr val="bg1"/>
+              </a:solidFill>
+              <a:ea typeface="Calibri" pitchFamily="34" charset="0"/>
+              <a:cs typeface="Courier New" pitchFamily="49" charset="0"/>
+            </a:endParaRPr>
+          </a:p>
+          <a:p>
+            <a:pPr eaLnBrk="0" hangingPunct="0"/>
+            <a:r>
+              <a:rPr lang="be-BY" sz="1000" dirty="0">
+                <a:solidFill>
+                  <a:schemeClr val="bg1"/>
+                </a:solidFill>
+                <a:latin typeface="Courier New" pitchFamily="49" charset="0"/>
+                <a:ea typeface="Calibri" pitchFamily="34" charset="0"/>
+                <a:cs typeface="Courier New" pitchFamily="49" charset="0"/>
+              </a:rPr>
+              <a:t>            Type complex = asm.GetType("ComplexNumbers.Complex");</a:t>
+            </a:r>
+            <a:endParaRPr lang="be-BY" sz="900" dirty="0">
+              <a:solidFill>
+                <a:schemeClr val="bg1"/>
+              </a:solidFill>
+              <a:ea typeface="Calibri" pitchFamily="34" charset="0"/>
+              <a:cs typeface="Courier New" pitchFamily="49" charset="0"/>
+            </a:endParaRPr>
+          </a:p>
+          <a:p>
+            <a:pPr eaLnBrk="0" hangingPunct="0"/>
+            <a:r>
+              <a:rPr lang="be-BY" sz="1000" dirty="0">
+                <a:solidFill>
+                  <a:schemeClr val="bg1"/>
+                </a:solidFill>
+                <a:latin typeface="Courier New" pitchFamily="49" charset="0"/>
+                <a:ea typeface="Calibri" pitchFamily="34" charset="0"/>
+                <a:cs typeface="Courier New" pitchFamily="49" charset="0"/>
+              </a:rPr>
+              <a:t>            object obj = Activator.CreateInstance(complex, 10, 35);</a:t>
+            </a:r>
+            <a:endParaRPr lang="be-BY" sz="900" dirty="0">
+              <a:solidFill>
+                <a:schemeClr val="bg1"/>
+              </a:solidFill>
+              <a:ea typeface="Calibri" pitchFamily="34" charset="0"/>
+              <a:cs typeface="Courier New" pitchFamily="49" charset="0"/>
+            </a:endParaRPr>
+          </a:p>
+          <a:p>
+            <a:pPr eaLnBrk="0" hangingPunct="0"/>
+            <a:r>
+              <a:rPr lang="be-BY" sz="1000" dirty="0">
+                <a:solidFill>
+                  <a:schemeClr val="bg1"/>
+                </a:solidFill>
+                <a:latin typeface="Courier New" pitchFamily="49" charset="0"/>
+                <a:ea typeface="Calibri" pitchFamily="34" charset="0"/>
+                <a:cs typeface="Courier New" pitchFamily="49" charset="0"/>
+              </a:rPr>
+              <a:t>            MethodInfo mi = complex.GetMethod("Abs");   //Получаем информацию о методе Abs </a:t>
+            </a:r>
+            <a:endParaRPr lang="be-BY" sz="900" dirty="0">
+              <a:solidFill>
+                <a:schemeClr val="bg1"/>
+              </a:solidFill>
+              <a:ea typeface="Calibri" pitchFamily="34" charset="0"/>
+              <a:cs typeface="Courier New" pitchFamily="49" charset="0"/>
+            </a:endParaRPr>
+          </a:p>
+          <a:p>
+            <a:pPr eaLnBrk="0" hangingPunct="0"/>
+            <a:r>
+              <a:rPr lang="be-BY" sz="1000" dirty="0">
+                <a:solidFill>
+                  <a:schemeClr val="bg1"/>
+                </a:solidFill>
+                <a:latin typeface="Courier New" pitchFamily="49" charset="0"/>
+                <a:ea typeface="Calibri" pitchFamily="34" charset="0"/>
+                <a:cs typeface="Courier New" pitchFamily="49" charset="0"/>
+              </a:rPr>
+              <a:t>            Console.WriteLine(mi.Invoke(obj, null));    //Вызываем метод</a:t>
+            </a:r>
+            <a:endParaRPr lang="be-BY" sz="900" dirty="0">
+              <a:solidFill>
+                <a:schemeClr val="bg1"/>
+              </a:solidFill>
+              <a:ea typeface="Calibri" pitchFamily="34" charset="0"/>
+              <a:cs typeface="Courier New" pitchFamily="49" charset="0"/>
+            </a:endParaRPr>
+          </a:p>
+          <a:p>
+            <a:pPr eaLnBrk="0" hangingPunct="0"/>
+            <a:r>
+              <a:rPr lang="be-BY" sz="1000" dirty="0">
+                <a:solidFill>
+                  <a:schemeClr val="bg1"/>
+                </a:solidFill>
+                <a:latin typeface="Courier New" pitchFamily="49" charset="0"/>
+                <a:ea typeface="Calibri" pitchFamily="34" charset="0"/>
+                <a:cs typeface="Courier New" pitchFamily="49" charset="0"/>
+              </a:rPr>
+              <a:t>        }</a:t>
+            </a:r>
+            <a:endParaRPr lang="be-BY" sz="900" dirty="0">
+              <a:solidFill>
+                <a:schemeClr val="bg1"/>
+              </a:solidFill>
+              <a:ea typeface="Calibri" pitchFamily="34" charset="0"/>
+              <a:cs typeface="Courier New" pitchFamily="49" charset="0"/>
+            </a:endParaRPr>
+          </a:p>
+          <a:p>
+            <a:pPr eaLnBrk="0" hangingPunct="0"/>
+            <a:r>
+              <a:rPr lang="be-BY" sz="1000" dirty="0">
+                <a:solidFill>
+                  <a:schemeClr val="bg1"/>
+                </a:solidFill>
+                <a:latin typeface="Courier New" pitchFamily="49" charset="0"/>
+                <a:ea typeface="Calibri" pitchFamily="34" charset="0"/>
+                <a:cs typeface="Courier New" pitchFamily="49" charset="0"/>
+              </a:rPr>
+              <a:t>    }</a:t>
+            </a:r>
+            <a:endParaRPr lang="be-BY" dirty="0">
+              <a:solidFill>
+                <a:schemeClr val="bg1"/>
+              </a:solidFill>
+              <a:ea typeface="Calibri" pitchFamily="34" charset="0"/>
+              <a:cs typeface="Courier New" pitchFamily="49" charset="0"/>
+            </a:endParaRPr>
+          </a:p>
+        </p:txBody>
+      </p:sp>
+    </p:spTree>
+    <p:extLst>
+      <p:ext uri="{BB962C8B-B14F-4D97-AF65-F5344CB8AC3E}">
+        <p14:creationId xmlns:p14="http://schemas.microsoft.com/office/powerpoint/2010/main" val="2652139991"/>
+      </p:ext>
+    </p:extLst>
+  </p:cSld>
+  <p:clrMapOvr>
+    <a:masterClrMapping/>
+  </p:clrMapOvr>
+  <p:timing>
+    <p:tnLst>
+      <p:par>
+        <p:cTn id="1" dur="indefinite" restart="never" nodeType="tmRoot"/>
+      </p:par>
+    </p:tnLst>
+  </p:timing>
+</p:sld>
+</file>
+
+<file path=ppt/slides/slide51.xml><?xml version="1.0" encoding="utf-8"?>
+<p:sld xmlns:a="http://schemas.openxmlformats.org/drawingml/2006/main" xmlns:r="http://schemas.openxmlformats.org/officeDocument/2006/relationships" xmlns:p="http://schemas.openxmlformats.org/presentationml/2006/main">
+  <p:cSld>
+    <p:spTree>
+      <p:nvGrpSpPr>
+        <p:cNvPr id="1" name=""/>
+        <p:cNvGrpSpPr/>
+        <p:nvPr/>
+      </p:nvGrpSpPr>
+      <p:grpSpPr>
+        <a:xfrm>
+          <a:off x="0" y="0"/>
+          <a:ext cx="0" cy="0"/>
+          <a:chOff x="0" y="0"/>
+          <a:chExt cx="0" cy="0"/>
+        </a:xfrm>
+      </p:grpSpPr>
+      <p:sp>
+        <p:nvSpPr>
           <p:cNvPr id="15362" name="Rectangle 3"/>
           <p:cNvSpPr>
             <a:spLocks noChangeArrowheads="1"/>

</xml_diff>

<commit_message>
Minor changes to presentations
</commit_message>
<xml_diff>
--- a/Presentation/lesson-07-reflection.pptx
+++ b/Presentation/lesson-07-reflection.pptx
@@ -248,7 +248,7 @@
             <a:fld id="{B24A7054-7FFB-49F4-A126-5DF6E687FF53}" type="datetimeFigureOut">
               <a:rPr lang="ru-RU" smtClean="0"/>
               <a:pPr/>
-              <a:t>21.08.2015</a:t>
+              <a:t>03.10.2015</a:t>
             </a:fld>
             <a:endParaRPr lang="ru-RU"/>
           </a:p>
@@ -1532,7 +1532,7 @@
             <a:fld id="{8E6E6A2A-E9D3-4A0D-B04A-ABDD367A1E08}" type="datetimeFigureOut">
               <a:rPr lang="ru-RU" smtClean="0"/>
               <a:pPr/>
-              <a:t>21.08.2015</a:t>
+              <a:t>03.10.2015</a:t>
             </a:fld>
             <a:endParaRPr lang="ru-RU"/>
           </a:p>
@@ -1776,7 +1776,7 @@
             <a:fld id="{8E6E6A2A-E9D3-4A0D-B04A-ABDD367A1E08}" type="datetimeFigureOut">
               <a:rPr lang="ru-RU" smtClean="0"/>
               <a:pPr/>
-              <a:t>21.08.2015</a:t>
+              <a:t>03.10.2015</a:t>
             </a:fld>
             <a:endParaRPr lang="ru-RU"/>
           </a:p>
@@ -1948,7 +1948,7 @@
             <a:fld id="{8E6E6A2A-E9D3-4A0D-B04A-ABDD367A1E08}" type="datetimeFigureOut">
               <a:rPr lang="ru-RU" smtClean="0"/>
               <a:pPr/>
-              <a:t>21.08.2015</a:t>
+              <a:t>03.10.2015</a:t>
             </a:fld>
             <a:endParaRPr lang="ru-RU"/>
           </a:p>
@@ -2196,7 +2196,7 @@
             <a:fld id="{8E6E6A2A-E9D3-4A0D-B04A-ABDD367A1E08}" type="datetimeFigureOut">
               <a:rPr lang="ru-RU" smtClean="0"/>
               <a:pPr/>
-              <a:t>21.08.2015</a:t>
+              <a:t>03.10.2015</a:t>
             </a:fld>
             <a:endParaRPr lang="ru-RU"/>
           </a:p>
@@ -2486,7 +2486,7 @@
             <a:fld id="{8E6E6A2A-E9D3-4A0D-B04A-ABDD367A1E08}" type="datetimeFigureOut">
               <a:rPr lang="ru-RU" smtClean="0"/>
               <a:pPr/>
-              <a:t>21.08.2015</a:t>
+              <a:t>03.10.2015</a:t>
             </a:fld>
             <a:endParaRPr lang="ru-RU"/>
           </a:p>
@@ -2910,7 +2910,7 @@
             <a:fld id="{8E6E6A2A-E9D3-4A0D-B04A-ABDD367A1E08}" type="datetimeFigureOut">
               <a:rPr lang="ru-RU" smtClean="0"/>
               <a:pPr/>
-              <a:t>21.08.2015</a:t>
+              <a:t>03.10.2015</a:t>
             </a:fld>
             <a:endParaRPr lang="ru-RU"/>
           </a:p>
@@ -3239,7 +3239,7 @@
             <a:fld id="{8E6E6A2A-E9D3-4A0D-B04A-ABDD367A1E08}" type="datetimeFigureOut">
               <a:rPr lang="ru-RU" smtClean="0"/>
               <a:pPr/>
-              <a:t>21.08.2015</a:t>
+              <a:t>03.10.2015</a:t>
             </a:fld>
             <a:endParaRPr lang="ru-RU"/>
           </a:p>
@@ -3336,7 +3336,7 @@
             <a:fld id="{8E6E6A2A-E9D3-4A0D-B04A-ABDD367A1E08}" type="datetimeFigureOut">
               <a:rPr lang="ru-RU" smtClean="0"/>
               <a:pPr/>
-              <a:t>21.08.2015</a:t>
+              <a:t>03.10.2015</a:t>
             </a:fld>
             <a:endParaRPr lang="ru-RU"/>
           </a:p>
@@ -3615,7 +3615,7 @@
             <a:fld id="{8E6E6A2A-E9D3-4A0D-B04A-ABDD367A1E08}" type="datetimeFigureOut">
               <a:rPr lang="ru-RU" smtClean="0"/>
               <a:pPr/>
-              <a:t>21.08.2015</a:t>
+              <a:t>03.10.2015</a:t>
             </a:fld>
             <a:endParaRPr lang="ru-RU"/>
           </a:p>
@@ -3870,7 +3870,7 @@
             <a:fld id="{8E6E6A2A-E9D3-4A0D-B04A-ABDD367A1E08}" type="datetimeFigureOut">
               <a:rPr lang="ru-RU" smtClean="0"/>
               <a:pPr/>
-              <a:t>21.08.2015</a:t>
+              <a:t>03.10.2015</a:t>
             </a:fld>
             <a:endParaRPr lang="ru-RU"/>
           </a:p>
@@ -4042,7 +4042,7 @@
             <a:fld id="{8E6E6A2A-E9D3-4A0D-B04A-ABDD367A1E08}" type="datetimeFigureOut">
               <a:rPr lang="ru-RU" smtClean="0"/>
               <a:pPr/>
-              <a:t>21.08.2015</a:t>
+              <a:t>03.10.2015</a:t>
             </a:fld>
             <a:endParaRPr lang="ru-RU"/>
           </a:p>
@@ -4224,7 +4224,7 @@
             <a:fld id="{8E6E6A2A-E9D3-4A0D-B04A-ABDD367A1E08}" type="datetimeFigureOut">
               <a:rPr lang="ru-RU" smtClean="0"/>
               <a:pPr/>
-              <a:t>21.08.2015</a:t>
+              <a:t>03.10.2015</a:t>
             </a:fld>
             <a:endParaRPr lang="ru-RU"/>
           </a:p>
@@ -5462,7 +5462,7 @@
             <a:fld id="{AC3D3127-B7C4-45E3-9797-C527EC9FDD78}" type="datetimeFigureOut">
               <a:rPr lang="ru-RU" smtClean="0"/>
               <a:pPr/>
-              <a:t>21.08.2015</a:t>
+              <a:t>03.10.2015</a:t>
             </a:fld>
             <a:endParaRPr lang="ru-RU"/>
           </a:p>
@@ -5984,7 +5984,7 @@
             <a:fld id="{8E6E6A2A-E9D3-4A0D-B04A-ABDD367A1E08}" type="datetimeFigureOut">
               <a:rPr lang="ru-RU" smtClean="0"/>
               <a:pPr/>
-              <a:t>21.08.2015</a:t>
+              <a:t>03.10.2015</a:t>
             </a:fld>
             <a:endParaRPr lang="ru-RU"/>
           </a:p>
@@ -24237,8 +24237,8 @@
         </p:nvSpPr>
         <p:spPr bwMode="auto">
           <a:xfrm>
-            <a:off x="152400" y="1073642"/>
-            <a:ext cx="8839200" cy="1077218"/>
+            <a:off x="152400" y="581201"/>
+            <a:ext cx="8839200" cy="2062103"/>
           </a:xfrm>
           <a:prstGeom prst="rect">
             <a:avLst/>
@@ -24359,63 +24359,124 @@
               <a:buChar char="•"/>
             </a:pPr>
             <a:r>
-              <a:rPr lang="en-US" sz="1600" dirty="0" smtClean="0">
+              <a:rPr lang="en-US" sz="1600" b="1" dirty="0" smtClean="0"/>
+              <a:t>PInvoke.net </a:t>
+            </a:r>
+            <a:r>
+              <a:rPr lang="en-US" sz="1600" b="1" dirty="0"/>
+              <a:t>Visual Studio </a:t>
+            </a:r>
+            <a:r>
+              <a:rPr lang="en-US" sz="1600" b="1" dirty="0" smtClean="0"/>
+              <a:t>Extension </a:t>
+            </a:r>
+            <a:r>
+              <a:rPr lang="en-US" sz="1600" dirty="0" smtClean="0"/>
+              <a:t>– </a:t>
+            </a:r>
+            <a:r>
+              <a:rPr lang="ru-RU" sz="1600" dirty="0" smtClean="0"/>
+              <a:t>расширение для </a:t>
+            </a:r>
+            <a:r>
+              <a:rPr lang="en-US" sz="1600" dirty="0" smtClean="0"/>
+              <a:t>Visual Studio </a:t>
+            </a:r>
+            <a:r>
+              <a:rPr lang="ru-RU" sz="1600" dirty="0" smtClean="0"/>
+              <a:t>для быстрой вставки сигнатур функций </a:t>
+            </a:r>
+            <a:r>
+              <a:rPr lang="en-US" sz="1600" dirty="0" smtClean="0"/>
+              <a:t>Windows API </a:t>
+            </a:r>
+            <a:r>
+              <a:rPr lang="ru-RU" sz="1600" dirty="0" smtClean="0"/>
+              <a:t>с сайта </a:t>
+            </a:r>
+            <a:r>
+              <a:rPr lang="en-US" sz="1600" dirty="0" smtClean="0"/>
+              <a:t>pinvoke.net</a:t>
+            </a:r>
+            <a:endParaRPr lang="ru-RU" sz="1600" dirty="0" smtClean="0"/>
+          </a:p>
+          <a:p>
+            <a:pPr marL="285750" indent="-285750">
+              <a:buFont typeface="Arial" panose="020B0604020202020204" pitchFamily="34" charset="0"/>
+              <a:buChar char="•"/>
+            </a:pPr>
+            <a:endParaRPr lang="ru-RU" sz="1600" dirty="0">
+              <a:ea typeface="Calibri" pitchFamily="34" charset="0"/>
+              <a:cs typeface="Arial" panose="020B0604020202020204" pitchFamily="34" charset="0"/>
+            </a:endParaRPr>
+          </a:p>
+          <a:p>
+            <a:pPr marL="285750" indent="-285750">
+              <a:buFont typeface="Arial" panose="020B0604020202020204" pitchFamily="34" charset="0"/>
+              <a:buChar char="•"/>
+            </a:pPr>
+            <a:r>
+              <a:rPr lang="en-US" sz="1600" b="1" dirty="0">
                 <a:ea typeface="Calibri" pitchFamily="34" charset="0"/>
                 <a:cs typeface="Arial" panose="020B0604020202020204" pitchFamily="34" charset="0"/>
-                <a:hlinkClick r:id="rId3"/>
-              </a:rPr>
-              <a:t>P/Invoke </a:t>
-            </a:r>
+              </a:rPr>
+              <a:t>P/Invoke Interop Assistant</a:t>
+            </a:r>
+            <a:r>
+              <a:rPr lang="ru-RU" sz="1600" dirty="0">
+                <a:ea typeface="Calibri" pitchFamily="34" charset="0"/>
+                <a:cs typeface="Arial" panose="020B0604020202020204" pitchFamily="34" charset="0"/>
+              </a:rPr>
+              <a:t> – утилита для генерации объявлений функций для </a:t>
+            </a:r>
+            <a:r>
+              <a:rPr lang="en-US" sz="1600" dirty="0">
+                <a:ea typeface="Calibri" pitchFamily="34" charset="0"/>
+                <a:cs typeface="Arial" panose="020B0604020202020204" pitchFamily="34" charset="0"/>
+              </a:rPr>
+              <a:t>P/Invoke. </a:t>
+            </a:r>
+            <a:r>
+              <a:rPr lang="ru-RU" sz="1600" dirty="0">
+                <a:ea typeface="Calibri" pitchFamily="34" charset="0"/>
+                <a:cs typeface="Arial" panose="020B0604020202020204" pitchFamily="34" charset="0"/>
+              </a:rPr>
+              <a:t>Также включает базу данных </a:t>
+            </a:r>
+            <a:r>
+              <a:rPr lang="en-US" sz="1600" dirty="0">
+                <a:ea typeface="Calibri" pitchFamily="34" charset="0"/>
+                <a:cs typeface="Arial" panose="020B0604020202020204" pitchFamily="34" charset="0"/>
+              </a:rPr>
+              <a:t>Windows </a:t>
+            </a:r>
+            <a:r>
+              <a:rPr lang="ru-RU" sz="1600" dirty="0">
+                <a:ea typeface="Calibri" pitchFamily="34" charset="0"/>
+                <a:cs typeface="Arial" panose="020B0604020202020204" pitchFamily="34" charset="0"/>
+              </a:rPr>
+              <a:t>констант.</a:t>
+            </a:r>
+            <a:r>
+              <a:rPr lang="en-US" sz="1600" dirty="0">
+                <a:ea typeface="Calibri" pitchFamily="34" charset="0"/>
+                <a:cs typeface="Arial" panose="020B0604020202020204" pitchFamily="34" charset="0"/>
+              </a:rPr>
+              <a:t/>
+            </a:r>
+            <a:br>
+              <a:rPr lang="en-US" sz="1600" dirty="0">
+                <a:ea typeface="Calibri" pitchFamily="34" charset="0"/>
+                <a:cs typeface="Arial" panose="020B0604020202020204" pitchFamily="34" charset="0"/>
+              </a:rPr>
+            </a:br>
             <a:r>
               <a:rPr lang="en-US" sz="1600" dirty="0">
                 <a:ea typeface="Calibri" pitchFamily="34" charset="0"/>
                 <a:cs typeface="Arial" panose="020B0604020202020204" pitchFamily="34" charset="0"/>
                 <a:hlinkClick r:id="rId3"/>
               </a:rPr>
-              <a:t>Interop </a:t>
-            </a:r>
-            <a:r>
-              <a:rPr lang="en-US" sz="1600" dirty="0" smtClean="0">
-                <a:ea typeface="Calibri" pitchFamily="34" charset="0"/>
-                <a:cs typeface="Arial" panose="020B0604020202020204" pitchFamily="34" charset="0"/>
-                <a:hlinkClick r:id="rId3"/>
-              </a:rPr>
-              <a:t>Assistant</a:t>
-            </a:r>
-            <a:r>
-              <a:rPr lang="ru-RU" sz="1600" dirty="0" smtClean="0">
-                <a:ea typeface="Calibri" pitchFamily="34" charset="0"/>
-                <a:cs typeface="Arial" panose="020B0604020202020204" pitchFamily="34" charset="0"/>
-              </a:rPr>
-              <a:t> – утилита для генерации объявлений функций для </a:t>
-            </a:r>
-            <a:r>
-              <a:rPr lang="en-US" sz="1600" dirty="0" smtClean="0">
-                <a:ea typeface="Calibri" pitchFamily="34" charset="0"/>
-                <a:cs typeface="Arial" panose="020B0604020202020204" pitchFamily="34" charset="0"/>
-              </a:rPr>
-              <a:t>P/Invoke. </a:t>
-            </a:r>
-            <a:r>
-              <a:rPr lang="ru-RU" sz="1600" dirty="0" smtClean="0">
-                <a:ea typeface="Calibri" pitchFamily="34" charset="0"/>
-                <a:cs typeface="Arial" panose="020B0604020202020204" pitchFamily="34" charset="0"/>
-              </a:rPr>
-              <a:t>Также включает базу данных </a:t>
-            </a:r>
-            <a:r>
-              <a:rPr lang="en-US" sz="1600" dirty="0" smtClean="0">
-                <a:ea typeface="Calibri" pitchFamily="34" charset="0"/>
-                <a:cs typeface="Arial" panose="020B0604020202020204" pitchFamily="34" charset="0"/>
-              </a:rPr>
-              <a:t>Windows </a:t>
-            </a:r>
-            <a:r>
-              <a:rPr lang="ru-RU" sz="1600" dirty="0" smtClean="0">
-                <a:ea typeface="Calibri" pitchFamily="34" charset="0"/>
-                <a:cs typeface="Arial" panose="020B0604020202020204" pitchFamily="34" charset="0"/>
-              </a:rPr>
-              <a:t>констант.</a:t>
+              <a:t>http://clrinterop.codeplex.com/</a:t>
             </a:r>
             <a:endParaRPr lang="ru-RU" sz="1600" dirty="0">
               <a:ea typeface="Calibri" pitchFamily="34" charset="0"/>

</xml_diff>